<commit_message>
Tips 4 y 5 (comunidad 18/11)
</commit_message>
<xml_diff>
--- a/Test-Oriented Development.pptx
+++ b/Test-Oriented Development.pptx
@@ -5,10 +5,10 @@
     <p:sldMasterId id="2147483648" r:id="rId1"/>
   </p:sldMasterIdLst>
   <p:notesMasterIdLst>
-    <p:notesMasterId r:id="rId10"/>
+    <p:notesMasterId r:id="rId13"/>
   </p:notesMasterIdLst>
   <p:handoutMasterIdLst>
-    <p:handoutMasterId r:id="rId11"/>
+    <p:handoutMasterId r:id="rId14"/>
   </p:handoutMasterIdLst>
   <p:sldIdLst>
     <p:sldId id="276" r:id="rId2"/>
@@ -18,7 +18,10 @@
     <p:sldId id="430" r:id="rId6"/>
     <p:sldId id="432" r:id="rId7"/>
     <p:sldId id="431" r:id="rId8"/>
-    <p:sldId id="428" r:id="rId9"/>
+    <p:sldId id="434" r:id="rId9"/>
+    <p:sldId id="435" r:id="rId10"/>
+    <p:sldId id="433" r:id="rId11"/>
+    <p:sldId id="428" r:id="rId12"/>
   </p:sldIdLst>
   <p:sldSz cx="9144000" cy="6858000" type="screen4x3"/>
   <p:notesSz cx="7099300" cy="10234613"/>
@@ -302,7 +305,7 @@
               <a:pPr>
                 <a:defRPr/>
               </a:pPr>
-              <a:t>16/09/2014</a:t>
+              <a:t>18/11/2014</a:t>
             </a:fld>
             <a:endParaRPr lang="es-AR"/>
           </a:p>
@@ -521,7 +524,7 @@
               <a:pPr>
                 <a:defRPr/>
               </a:pPr>
-              <a:t>16/09/2014</a:t>
+              <a:t>18/11/2014</a:t>
             </a:fld>
             <a:endParaRPr lang="es-AR"/>
           </a:p>
@@ -1225,7 +1228,7 @@
               <a:pPr>
                 <a:defRPr/>
               </a:pPr>
-              <a:t>16/09/2014</a:t>
+              <a:t>18/11/2014</a:t>
             </a:fld>
             <a:endParaRPr lang="es-AR"/>
           </a:p>
@@ -1504,7 +1507,7 @@
               <a:pPr>
                 <a:defRPr/>
               </a:pPr>
-              <a:t>16/09/2014</a:t>
+              <a:t>18/11/2014</a:t>
             </a:fld>
             <a:endParaRPr lang="es-AR"/>
           </a:p>
@@ -1884,7 +1887,7 @@
               <a:pPr>
                 <a:defRPr/>
               </a:pPr>
-              <a:t>16/09/2014</a:t>
+              <a:t>18/11/2014</a:t>
             </a:fld>
             <a:endParaRPr lang="es-AR"/>
           </a:p>
@@ -2471,7 +2474,7 @@
               <a:pPr>
                 <a:defRPr/>
               </a:pPr>
-              <a:t>16/09/2014</a:t>
+              <a:t>18/11/2014</a:t>
             </a:fld>
             <a:endParaRPr lang="es-AR"/>
           </a:p>
@@ -2661,7 +2664,7 @@
               <a:pPr>
                 <a:defRPr/>
               </a:pPr>
-              <a:t>16/09/2014</a:t>
+              <a:t>18/11/2014</a:t>
             </a:fld>
             <a:endParaRPr lang="es-AR"/>
           </a:p>
@@ -2783,7 +2786,7 @@
               <a:pPr>
                 <a:defRPr/>
               </a:pPr>
-              <a:t>16/09/2014</a:t>
+              <a:t>18/11/2014</a:t>
             </a:fld>
             <a:endParaRPr lang="es-AR"/>
           </a:p>
@@ -3165,7 +3168,7 @@
               <a:pPr>
                 <a:defRPr/>
               </a:pPr>
-              <a:t>16/09/2014</a:t>
+              <a:t>18/11/2014</a:t>
             </a:fld>
             <a:endParaRPr lang="es-AR"/>
           </a:p>
@@ -4015,6 +4018,2027 @@
 </p:sld>
 </file>
 
+<file path=ppt/slides/slide10.xml><?xml version="1.0" encoding="utf-8"?>
+<p:sld xmlns:a="http://schemas.openxmlformats.org/drawingml/2006/main" xmlns:r="http://schemas.openxmlformats.org/officeDocument/2006/relationships" xmlns:p="http://schemas.openxmlformats.org/presentationml/2006/main">
+  <p:cSld>
+    <p:spTree>
+      <p:nvGrpSpPr>
+        <p:cNvPr id="1" name=""/>
+        <p:cNvGrpSpPr/>
+        <p:nvPr/>
+      </p:nvGrpSpPr>
+      <p:grpSpPr>
+        <a:xfrm>
+          <a:off x="0" y="0"/>
+          <a:ext cx="0" cy="0"/>
+          <a:chOff x="0" y="0"/>
+          <a:chExt cx="0" cy="0"/>
+        </a:xfrm>
+      </p:grpSpPr>
+      <p:sp>
+        <p:nvSpPr>
+          <p:cNvPr id="12290" name="Content Placeholder 2"/>
+          <p:cNvSpPr>
+            <a:spLocks noGrp="1"/>
+          </p:cNvSpPr>
+          <p:nvPr>
+            <p:ph sz="half" idx="2"/>
+          </p:nvPr>
+        </p:nvSpPr>
+        <p:spPr>
+          <a:xfrm>
+            <a:off x="755650" y="1130300"/>
+            <a:ext cx="8064500" cy="4891088"/>
+          </a:xfrm>
+        </p:spPr>
+        <p:txBody>
+          <a:bodyPr/>
+          <a:lstStyle/>
+          <a:p>
+            <a:pPr marL="0" lvl="1" indent="0" eaLnBrk="1" hangingPunct="1">
+              <a:spcBef>
+                <a:spcPts val="1200"/>
+              </a:spcBef>
+              <a:buFont typeface="Wingdings" panose="05000000000000000000" pitchFamily="2" charset="2"/>
+              <a:buChar char="§"/>
+            </a:pPr>
+            <a:r>
+              <a:rPr lang="en-GB" sz="2000" dirty="0">
+                <a:latin typeface="+mj-lt"/>
+              </a:rPr>
+              <a:t> </a:t>
+            </a:r>
+            <a:r>
+              <a:rPr lang="en-US" sz="2000" dirty="0">
+                <a:latin typeface="+mj-lt"/>
+              </a:rPr>
+              <a:t>Don’t mix object graph instantiation with application logic</a:t>
+            </a:r>
+            <a:endParaRPr lang="es-AR" sz="2000" dirty="0">
+              <a:latin typeface="+mj-lt"/>
+            </a:endParaRPr>
+          </a:p>
+          <a:p>
+            <a:pPr marL="0" lvl="1" indent="0" eaLnBrk="1" hangingPunct="1">
+              <a:spcBef>
+                <a:spcPts val="1200"/>
+              </a:spcBef>
+              <a:buFont typeface="Wingdings" panose="05000000000000000000" pitchFamily="2" charset="2"/>
+              <a:buChar char="§"/>
+            </a:pPr>
+            <a:r>
+              <a:rPr lang="en-US" sz="2000" dirty="0" smtClean="0">
+                <a:latin typeface="+mj-lt"/>
+              </a:rPr>
+              <a:t> Ask </a:t>
+            </a:r>
+            <a:r>
+              <a:rPr lang="en-US" sz="2000" dirty="0">
+                <a:latin typeface="+mj-lt"/>
+              </a:rPr>
+              <a:t>for things, don't look for things</a:t>
+            </a:r>
+            <a:endParaRPr lang="es-AR" sz="2000" dirty="0">
+              <a:latin typeface="+mj-lt"/>
+            </a:endParaRPr>
+          </a:p>
+          <a:p>
+            <a:pPr marL="0" lvl="1" indent="0" eaLnBrk="1" hangingPunct="1">
+              <a:spcBef>
+                <a:spcPts val="1200"/>
+              </a:spcBef>
+              <a:buFont typeface="Wingdings" panose="05000000000000000000" pitchFamily="2" charset="2"/>
+              <a:buChar char="§"/>
+            </a:pPr>
+            <a:r>
+              <a:rPr lang="en-US" sz="2000" dirty="0" smtClean="0">
+                <a:latin typeface="+mj-lt"/>
+              </a:rPr>
+              <a:t> Don’t </a:t>
+            </a:r>
+            <a:r>
+              <a:rPr lang="en-US" sz="2000" dirty="0">
+                <a:latin typeface="+mj-lt"/>
+              </a:rPr>
+              <a:t>do work in constructor</a:t>
+            </a:r>
+            <a:endParaRPr lang="es-AR" sz="2000" dirty="0">
+              <a:latin typeface="+mj-lt"/>
+            </a:endParaRPr>
+          </a:p>
+          <a:p>
+            <a:pPr marL="0" lvl="1" indent="0" eaLnBrk="1" hangingPunct="1">
+              <a:spcBef>
+                <a:spcPts val="1200"/>
+              </a:spcBef>
+              <a:buFont typeface="Wingdings" panose="05000000000000000000" pitchFamily="2" charset="2"/>
+              <a:buChar char="§"/>
+            </a:pPr>
+            <a:r>
+              <a:rPr lang="en-US" sz="2000" dirty="0" smtClean="0">
+                <a:latin typeface="+mj-lt"/>
+              </a:rPr>
+              <a:t> Be </a:t>
+            </a:r>
+            <a:r>
+              <a:rPr lang="en-US" sz="2000" dirty="0">
+                <a:latin typeface="+mj-lt"/>
+              </a:rPr>
+              <a:t>careful with global state and singletons</a:t>
+            </a:r>
+            <a:endParaRPr lang="es-AR" sz="2000" dirty="0">
+              <a:latin typeface="+mj-lt"/>
+            </a:endParaRPr>
+          </a:p>
+          <a:p>
+            <a:pPr marL="0" lvl="1" indent="0" eaLnBrk="1" hangingPunct="1">
+              <a:spcBef>
+                <a:spcPts val="1200"/>
+              </a:spcBef>
+              <a:buFont typeface="Wingdings" panose="05000000000000000000" pitchFamily="2" charset="2"/>
+              <a:buChar char="§"/>
+            </a:pPr>
+            <a:r>
+              <a:rPr lang="en-US" sz="2000" dirty="0" smtClean="0">
+                <a:latin typeface="+mj-lt"/>
+              </a:rPr>
+              <a:t> Be </a:t>
+            </a:r>
+            <a:r>
+              <a:rPr lang="en-US" sz="2000" dirty="0">
+                <a:latin typeface="+mj-lt"/>
+              </a:rPr>
+              <a:t>careful with static methods</a:t>
+            </a:r>
+            <a:endParaRPr lang="es-AR" sz="2000" dirty="0">
+              <a:latin typeface="+mj-lt"/>
+            </a:endParaRPr>
+          </a:p>
+          <a:p>
+            <a:pPr marL="0" lvl="1" indent="0" eaLnBrk="1" hangingPunct="1">
+              <a:spcBef>
+                <a:spcPts val="1200"/>
+              </a:spcBef>
+              <a:buFont typeface="Wingdings" panose="05000000000000000000" pitchFamily="2" charset="2"/>
+              <a:buChar char="§"/>
+            </a:pPr>
+            <a:r>
+              <a:rPr lang="en-US" sz="2000" dirty="0" smtClean="0">
+                <a:latin typeface="+mj-lt"/>
+              </a:rPr>
+              <a:t> Favor </a:t>
+            </a:r>
+            <a:r>
+              <a:rPr lang="en-US" sz="2000" dirty="0">
+                <a:latin typeface="+mj-lt"/>
+              </a:rPr>
+              <a:t>polymorphism over conditionals</a:t>
+            </a:r>
+            <a:endParaRPr lang="es-AR" sz="2000" dirty="0">
+              <a:latin typeface="+mj-lt"/>
+            </a:endParaRPr>
+          </a:p>
+          <a:p>
+            <a:pPr marL="0" lvl="1" indent="0" eaLnBrk="1" hangingPunct="1">
+              <a:spcBef>
+                <a:spcPts val="1200"/>
+              </a:spcBef>
+              <a:buFont typeface="Wingdings" panose="05000000000000000000" pitchFamily="2" charset="2"/>
+              <a:buChar char="§"/>
+            </a:pPr>
+            <a:r>
+              <a:rPr lang="en-US" sz="2000" dirty="0" smtClean="0">
+                <a:latin typeface="+mj-lt"/>
+              </a:rPr>
+              <a:t> Don’t </a:t>
+            </a:r>
+            <a:r>
+              <a:rPr lang="en-US" sz="2000" dirty="0">
+                <a:latin typeface="+mj-lt"/>
+              </a:rPr>
+              <a:t>mix service objects with value objects</a:t>
+            </a:r>
+            <a:endParaRPr lang="es-AR" sz="2000" dirty="0">
+              <a:latin typeface="+mj-lt"/>
+            </a:endParaRPr>
+          </a:p>
+          <a:p>
+            <a:pPr marL="0" lvl="1" indent="0" eaLnBrk="1" hangingPunct="1">
+              <a:spcBef>
+                <a:spcPts val="1200"/>
+              </a:spcBef>
+              <a:buFont typeface="Wingdings" panose="05000000000000000000" pitchFamily="2" charset="2"/>
+              <a:buChar char="§"/>
+            </a:pPr>
+            <a:r>
+              <a:rPr lang="en-US" sz="2000" dirty="0" smtClean="0">
+                <a:latin typeface="+mj-lt"/>
+              </a:rPr>
+              <a:t> Don’t </a:t>
+            </a:r>
+            <a:r>
+              <a:rPr lang="en-US" sz="2000" dirty="0">
+                <a:latin typeface="+mj-lt"/>
+              </a:rPr>
+              <a:t>mix concerns</a:t>
+            </a:r>
+            <a:endParaRPr lang="es-AR" sz="2000" dirty="0">
+              <a:latin typeface="+mj-lt"/>
+            </a:endParaRPr>
+          </a:p>
+          <a:p>
+            <a:pPr marL="0" indent="0" eaLnBrk="1" hangingPunct="1">
+              <a:spcBef>
+                <a:spcPts val="1200"/>
+              </a:spcBef>
+            </a:pPr>
+            <a:endParaRPr lang="en-GB" i="1" dirty="0">
+              <a:latin typeface="+mj-lt"/>
+            </a:endParaRPr>
+          </a:p>
+        </p:txBody>
+      </p:sp>
+      <p:sp>
+        <p:nvSpPr>
+          <p:cNvPr id="6" name="Title 5"/>
+          <p:cNvSpPr>
+            <a:spLocks noGrp="1"/>
+          </p:cNvSpPr>
+          <p:nvPr>
+            <p:ph type="title"/>
+          </p:nvPr>
+        </p:nvSpPr>
+        <p:spPr>
+          <a:xfrm>
+            <a:off x="755650" y="0"/>
+            <a:ext cx="7931150" cy="836613"/>
+          </a:xfrm>
+        </p:spPr>
+        <p:txBody>
+          <a:bodyPr>
+            <a:noAutofit/>
+          </a:bodyPr>
+          <a:lstStyle/>
+          <a:p>
+            <a:pPr lvl="0"/>
+            <a:r>
+              <a:rPr lang="en-US" sz="2800" dirty="0"/>
+              <a:t>Tip </a:t>
+            </a:r>
+            <a:r>
+              <a:rPr lang="en-US" sz="2800" dirty="0" smtClean="0"/>
+              <a:t>6: </a:t>
+            </a:r>
+            <a:r>
+              <a:rPr lang="en-US" sz="2800" dirty="0"/>
+              <a:t>Writing Testable Code</a:t>
+            </a:r>
+            <a:endParaRPr lang="es-AR" sz="2800" dirty="0"/>
+          </a:p>
+        </p:txBody>
+      </p:sp>
+    </p:spTree>
+    <p:extLst>
+      <p:ext uri="{BB962C8B-B14F-4D97-AF65-F5344CB8AC3E}">
+        <p14:creationId xmlns:p14="http://schemas.microsoft.com/office/powerpoint/2010/main" val="1174766049"/>
+      </p:ext>
+    </p:extLst>
+  </p:cSld>
+  <p:clrMapOvr>
+    <a:masterClrMapping/>
+  </p:clrMapOvr>
+  <p:timing>
+    <p:tnLst>
+      <p:par>
+        <p:cTn id="1" dur="indefinite" restart="never" nodeType="tmRoot"/>
+      </p:par>
+    </p:tnLst>
+  </p:timing>
+</p:sld>
+</file>
+
+<file path=ppt/slides/slide11.xml><?xml version="1.0" encoding="utf-8"?>
+<p:sld xmlns:a="http://schemas.openxmlformats.org/drawingml/2006/main" xmlns:r="http://schemas.openxmlformats.org/officeDocument/2006/relationships" xmlns:p="http://schemas.openxmlformats.org/presentationml/2006/main">
+  <p:cSld>
+    <p:spTree>
+      <p:nvGrpSpPr>
+        <p:cNvPr id="1" name=""/>
+        <p:cNvGrpSpPr/>
+        <p:nvPr/>
+      </p:nvGrpSpPr>
+      <p:grpSpPr>
+        <a:xfrm>
+          <a:off x="0" y="0"/>
+          <a:ext cx="0" cy="0"/>
+          <a:chOff x="0" y="0"/>
+          <a:chExt cx="0" cy="0"/>
+        </a:xfrm>
+      </p:grpSpPr>
+      <p:sp>
+        <p:nvSpPr>
+          <p:cNvPr id="36866" name="Line 6"/>
+          <p:cNvSpPr>
+            <a:spLocks noChangeShapeType="1"/>
+          </p:cNvSpPr>
+          <p:nvPr/>
+        </p:nvSpPr>
+        <p:spPr bwMode="auto">
+          <a:xfrm>
+            <a:off x="1158875" y="4097338"/>
+            <a:ext cx="0" cy="2160587"/>
+          </a:xfrm>
+          <a:prstGeom prst="line">
+            <a:avLst/>
+          </a:prstGeom>
+          <a:noFill/>
+          <a:ln w="9525">
+            <a:solidFill>
+              <a:schemeClr val="bg1"/>
+            </a:solidFill>
+            <a:round/>
+            <a:headEnd/>
+            <a:tailEnd/>
+          </a:ln>
+          <a:extLst>
+            <a:ext uri="{909E8E84-426E-40DD-AFC4-6F175D3DCCD1}">
+              <a14:hiddenFill xmlns:a14="http://schemas.microsoft.com/office/drawing/2010/main">
+                <a:noFill/>
+              </a14:hiddenFill>
+            </a:ext>
+          </a:extLst>
+        </p:spPr>
+        <p:txBody>
+          <a:bodyPr/>
+          <a:lstStyle/>
+          <a:p>
+            <a:endParaRPr lang="es-AR"/>
+          </a:p>
+        </p:txBody>
+      </p:sp>
+      <p:pic>
+        <p:nvPicPr>
+          <p:cNvPr id="36867" name="Picture 22" descr="final final 2"/>
+          <p:cNvPicPr>
+            <a:picLocks noChangeAspect="1" noChangeArrowheads="1"/>
+          </p:cNvPicPr>
+          <p:nvPr/>
+        </p:nvPicPr>
+        <p:blipFill>
+          <a:blip r:embed="rId3">
+            <a:extLst>
+              <a:ext uri="{28A0092B-C50C-407E-A947-70E740481C1C}">
+                <a14:useLocalDpi xmlns:a14="http://schemas.microsoft.com/office/drawing/2010/main" val="0"/>
+              </a:ext>
+            </a:extLst>
+          </a:blip>
+          <a:srcRect/>
+          <a:stretch>
+            <a:fillRect/>
+          </a:stretch>
+        </p:blipFill>
+        <p:spPr bwMode="auto">
+          <a:xfrm>
+            <a:off x="900113" y="1125538"/>
+            <a:ext cx="7916862" cy="1936750"/>
+          </a:xfrm>
+          <a:prstGeom prst="rect">
+            <a:avLst/>
+          </a:prstGeom>
+          <a:noFill/>
+          <a:ln>
+            <a:noFill/>
+          </a:ln>
+          <a:extLst>
+            <a:ext uri="{909E8E84-426E-40DD-AFC4-6F175D3DCCD1}">
+              <a14:hiddenFill xmlns:a14="http://schemas.microsoft.com/office/drawing/2010/main">
+                <a:solidFill>
+                  <a:srgbClr val="FFFFFF"/>
+                </a:solidFill>
+              </a14:hiddenFill>
+            </a:ext>
+            <a:ext uri="{91240B29-F687-4F45-9708-019B960494DF}">
+              <a14:hiddenLine xmlns:a14="http://schemas.microsoft.com/office/drawing/2010/main" w="9525">
+                <a:solidFill>
+                  <a:srgbClr val="000000"/>
+                </a:solidFill>
+                <a:miter lim="800000"/>
+                <a:headEnd/>
+                <a:tailEnd/>
+              </a14:hiddenLine>
+            </a:ext>
+          </a:extLst>
+        </p:spPr>
+      </p:pic>
+      <p:sp>
+        <p:nvSpPr>
+          <p:cNvPr id="36868" name="Line 6"/>
+          <p:cNvSpPr>
+            <a:spLocks noChangeShapeType="1"/>
+          </p:cNvSpPr>
+          <p:nvPr/>
+        </p:nvSpPr>
+        <p:spPr bwMode="auto">
+          <a:xfrm>
+            <a:off x="1158875" y="4097338"/>
+            <a:ext cx="0" cy="2160587"/>
+          </a:xfrm>
+          <a:prstGeom prst="line">
+            <a:avLst/>
+          </a:prstGeom>
+          <a:noFill/>
+          <a:ln w="9525">
+            <a:solidFill>
+              <a:schemeClr val="bg1"/>
+            </a:solidFill>
+            <a:round/>
+            <a:headEnd/>
+            <a:tailEnd/>
+          </a:ln>
+          <a:extLst>
+            <a:ext uri="{909E8E84-426E-40DD-AFC4-6F175D3DCCD1}">
+              <a14:hiddenFill xmlns:a14="http://schemas.microsoft.com/office/drawing/2010/main">
+                <a:noFill/>
+              </a14:hiddenFill>
+            </a:ext>
+          </a:extLst>
+        </p:spPr>
+        <p:txBody>
+          <a:bodyPr/>
+          <a:lstStyle/>
+          <a:p>
+            <a:endParaRPr lang="es-AR"/>
+          </a:p>
+        </p:txBody>
+      </p:sp>
+      <p:sp>
+        <p:nvSpPr>
+          <p:cNvPr id="36869" name="Text Box 14"/>
+          <p:cNvSpPr txBox="1">
+            <a:spLocks noChangeArrowheads="1"/>
+          </p:cNvSpPr>
+          <p:nvPr/>
+        </p:nvSpPr>
+        <p:spPr bwMode="auto">
+          <a:xfrm>
+            <a:off x="6961188" y="3149600"/>
+            <a:ext cx="1801812" cy="431800"/>
+          </a:xfrm>
+          <a:prstGeom prst="rect">
+            <a:avLst/>
+          </a:prstGeom>
+          <a:noFill/>
+          <a:ln>
+            <a:noFill/>
+          </a:ln>
+          <a:extLst>
+            <a:ext uri="{909E8E84-426E-40DD-AFC4-6F175D3DCCD1}">
+              <a14:hiddenFill xmlns:a14="http://schemas.microsoft.com/office/drawing/2010/main">
+                <a:solidFill>
+                  <a:srgbClr val="FFFFFF"/>
+                </a:solidFill>
+              </a14:hiddenFill>
+            </a:ext>
+            <a:ext uri="{91240B29-F687-4F45-9708-019B960494DF}">
+              <a14:hiddenLine xmlns:a14="http://schemas.microsoft.com/office/drawing/2010/main" w="12700">
+                <a:solidFill>
+                  <a:srgbClr val="000000"/>
+                </a:solidFill>
+                <a:miter lim="800000"/>
+                <a:headEnd/>
+                <a:tailEnd/>
+              </a14:hiddenLine>
+            </a:ext>
+          </a:extLst>
+        </p:spPr>
+        <p:txBody>
+          <a:bodyPr tIns="91440"/>
+          <a:lstStyle>
+            <a:lvl1pPr>
+              <a:defRPr>
+                <a:solidFill>
+                  <a:schemeClr val="tx1"/>
+                </a:solidFill>
+                <a:latin typeface="Arial" panose="020B0604020202020204" pitchFamily="34" charset="0"/>
+                <a:cs typeface="Arial" panose="020B0604020202020204" pitchFamily="34" charset="0"/>
+              </a:defRPr>
+            </a:lvl1pPr>
+            <a:lvl2pPr marL="742950" indent="-285750">
+              <a:defRPr>
+                <a:solidFill>
+                  <a:schemeClr val="tx1"/>
+                </a:solidFill>
+                <a:latin typeface="Arial" panose="020B0604020202020204" pitchFamily="34" charset="0"/>
+                <a:cs typeface="Arial" panose="020B0604020202020204" pitchFamily="34" charset="0"/>
+              </a:defRPr>
+            </a:lvl2pPr>
+            <a:lvl3pPr marL="1143000" indent="-228600">
+              <a:defRPr>
+                <a:solidFill>
+                  <a:schemeClr val="tx1"/>
+                </a:solidFill>
+                <a:latin typeface="Arial" panose="020B0604020202020204" pitchFamily="34" charset="0"/>
+                <a:cs typeface="Arial" panose="020B0604020202020204" pitchFamily="34" charset="0"/>
+              </a:defRPr>
+            </a:lvl3pPr>
+            <a:lvl4pPr marL="1600200" indent="-228600">
+              <a:defRPr>
+                <a:solidFill>
+                  <a:schemeClr val="tx1"/>
+                </a:solidFill>
+                <a:latin typeface="Arial" panose="020B0604020202020204" pitchFamily="34" charset="0"/>
+                <a:cs typeface="Arial" panose="020B0604020202020204" pitchFamily="34" charset="0"/>
+              </a:defRPr>
+            </a:lvl4pPr>
+            <a:lvl5pPr marL="2057400" indent="-228600">
+              <a:defRPr>
+                <a:solidFill>
+                  <a:schemeClr val="tx1"/>
+                </a:solidFill>
+                <a:latin typeface="Arial" panose="020B0604020202020204" pitchFamily="34" charset="0"/>
+                <a:cs typeface="Arial" panose="020B0604020202020204" pitchFamily="34" charset="0"/>
+              </a:defRPr>
+            </a:lvl5pPr>
+            <a:lvl6pPr marL="2514600" indent="-228600" eaLnBrk="0" fontAlgn="base" hangingPunct="0">
+              <a:spcBef>
+                <a:spcPct val="0"/>
+              </a:spcBef>
+              <a:spcAft>
+                <a:spcPct val="0"/>
+              </a:spcAft>
+              <a:defRPr>
+                <a:solidFill>
+                  <a:schemeClr val="tx1"/>
+                </a:solidFill>
+                <a:latin typeface="Arial" panose="020B0604020202020204" pitchFamily="34" charset="0"/>
+                <a:cs typeface="Arial" panose="020B0604020202020204" pitchFamily="34" charset="0"/>
+              </a:defRPr>
+            </a:lvl6pPr>
+            <a:lvl7pPr marL="2971800" indent="-228600" eaLnBrk="0" fontAlgn="base" hangingPunct="0">
+              <a:spcBef>
+                <a:spcPct val="0"/>
+              </a:spcBef>
+              <a:spcAft>
+                <a:spcPct val="0"/>
+              </a:spcAft>
+              <a:defRPr>
+                <a:solidFill>
+                  <a:schemeClr val="tx1"/>
+                </a:solidFill>
+                <a:latin typeface="Arial" panose="020B0604020202020204" pitchFamily="34" charset="0"/>
+                <a:cs typeface="Arial" panose="020B0604020202020204" pitchFamily="34" charset="0"/>
+              </a:defRPr>
+            </a:lvl7pPr>
+            <a:lvl8pPr marL="3429000" indent="-228600" eaLnBrk="0" fontAlgn="base" hangingPunct="0">
+              <a:spcBef>
+                <a:spcPct val="0"/>
+              </a:spcBef>
+              <a:spcAft>
+                <a:spcPct val="0"/>
+              </a:spcAft>
+              <a:defRPr>
+                <a:solidFill>
+                  <a:schemeClr val="tx1"/>
+                </a:solidFill>
+                <a:latin typeface="Arial" panose="020B0604020202020204" pitchFamily="34" charset="0"/>
+                <a:cs typeface="Arial" panose="020B0604020202020204" pitchFamily="34" charset="0"/>
+              </a:defRPr>
+            </a:lvl8pPr>
+            <a:lvl9pPr marL="3886200" indent="-228600" eaLnBrk="0" fontAlgn="base" hangingPunct="0">
+              <a:spcBef>
+                <a:spcPct val="0"/>
+              </a:spcBef>
+              <a:spcAft>
+                <a:spcPct val="0"/>
+              </a:spcAft>
+              <a:defRPr>
+                <a:solidFill>
+                  <a:schemeClr val="tx1"/>
+                </a:solidFill>
+                <a:latin typeface="Arial" panose="020B0604020202020204" pitchFamily="34" charset="0"/>
+                <a:cs typeface="Arial" panose="020B0604020202020204" pitchFamily="34" charset="0"/>
+              </a:defRPr>
+            </a:lvl9pPr>
+          </a:lstStyle>
+          <a:p>
+            <a:pPr algn="r"/>
+            <a:r>
+              <a:rPr lang="es-ES" altLang="es-AR" sz="1000" b="1">
+                <a:solidFill>
+                  <a:srgbClr val="333333"/>
+                </a:solidFill>
+                <a:latin typeface="Calibri" panose="020F0502020204030204" pitchFamily="34" charset="0"/>
+                <a:ea typeface="ＭＳ Ｐゴシック" panose="020B0600070205080204" pitchFamily="34" charset="-128"/>
+              </a:rPr>
+              <a:t>info@baufest.com</a:t>
+            </a:r>
+            <a:r>
+              <a:rPr lang="en-US" altLang="es-AR" sz="1000">
+                <a:solidFill>
+                  <a:srgbClr val="333333"/>
+                </a:solidFill>
+                <a:latin typeface="Calibri" panose="020F0502020204030204" pitchFamily="34" charset="0"/>
+                <a:ea typeface="ＭＳ Ｐゴシック" panose="020B0600070205080204" pitchFamily="34" charset="-128"/>
+              </a:rPr>
+              <a:t> </a:t>
+            </a:r>
+          </a:p>
+          <a:p>
+            <a:pPr algn="r"/>
+            <a:r>
+              <a:rPr lang="es-ES" altLang="es-AR" sz="1000">
+                <a:solidFill>
+                  <a:srgbClr val="333333"/>
+                </a:solidFill>
+                <a:latin typeface="Calibri" panose="020F0502020204030204" pitchFamily="34" charset="0"/>
+                <a:ea typeface="ＭＳ Ｐゴシック" panose="020B0600070205080204" pitchFamily="34" charset="-128"/>
+              </a:rPr>
+              <a:t>baufest.com</a:t>
+            </a:r>
+            <a:endParaRPr lang="en-US" altLang="es-AR" sz="1000">
+              <a:solidFill>
+                <a:srgbClr val="333333"/>
+              </a:solidFill>
+              <a:latin typeface="Calibri" panose="020F0502020204030204" pitchFamily="34" charset="0"/>
+              <a:ea typeface="ＭＳ Ｐゴシック" panose="020B0600070205080204" pitchFamily="34" charset="-128"/>
+            </a:endParaRPr>
+          </a:p>
+        </p:txBody>
+      </p:sp>
+      <p:sp>
+        <p:nvSpPr>
+          <p:cNvPr id="36870" name="Text Box 15"/>
+          <p:cNvSpPr txBox="1">
+            <a:spLocks noChangeArrowheads="1"/>
+          </p:cNvSpPr>
+          <p:nvPr/>
+        </p:nvSpPr>
+        <p:spPr bwMode="auto">
+          <a:xfrm>
+            <a:off x="828675" y="3149600"/>
+            <a:ext cx="1649413" cy="1185863"/>
+          </a:xfrm>
+          <a:prstGeom prst="rect">
+            <a:avLst/>
+          </a:prstGeom>
+          <a:noFill/>
+          <a:ln>
+            <a:noFill/>
+          </a:ln>
+          <a:extLst>
+            <a:ext uri="{909E8E84-426E-40DD-AFC4-6F175D3DCCD1}">
+              <a14:hiddenFill xmlns:a14="http://schemas.microsoft.com/office/drawing/2010/main">
+                <a:solidFill>
+                  <a:srgbClr val="FFFFFF"/>
+                </a:solidFill>
+              </a14:hiddenFill>
+            </a:ext>
+            <a:ext uri="{91240B29-F687-4F45-9708-019B960494DF}">
+              <a14:hiddenLine xmlns:a14="http://schemas.microsoft.com/office/drawing/2010/main" w="12700">
+                <a:solidFill>
+                  <a:srgbClr val="000000"/>
+                </a:solidFill>
+                <a:miter lim="800000"/>
+                <a:headEnd/>
+                <a:tailEnd/>
+              </a14:hiddenLine>
+            </a:ext>
+          </a:extLst>
+        </p:spPr>
+        <p:txBody>
+          <a:bodyPr tIns="91440"/>
+          <a:lstStyle>
+            <a:lvl1pPr>
+              <a:defRPr>
+                <a:solidFill>
+                  <a:schemeClr val="tx1"/>
+                </a:solidFill>
+                <a:latin typeface="Arial" panose="020B0604020202020204" pitchFamily="34" charset="0"/>
+                <a:cs typeface="Arial" panose="020B0604020202020204" pitchFamily="34" charset="0"/>
+              </a:defRPr>
+            </a:lvl1pPr>
+            <a:lvl2pPr marL="742950" indent="-285750">
+              <a:defRPr>
+                <a:solidFill>
+                  <a:schemeClr val="tx1"/>
+                </a:solidFill>
+                <a:latin typeface="Arial" panose="020B0604020202020204" pitchFamily="34" charset="0"/>
+                <a:cs typeface="Arial" panose="020B0604020202020204" pitchFamily="34" charset="0"/>
+              </a:defRPr>
+            </a:lvl2pPr>
+            <a:lvl3pPr marL="1143000" indent="-228600">
+              <a:defRPr>
+                <a:solidFill>
+                  <a:schemeClr val="tx1"/>
+                </a:solidFill>
+                <a:latin typeface="Arial" panose="020B0604020202020204" pitchFamily="34" charset="0"/>
+                <a:cs typeface="Arial" panose="020B0604020202020204" pitchFamily="34" charset="0"/>
+              </a:defRPr>
+            </a:lvl3pPr>
+            <a:lvl4pPr marL="1600200" indent="-228600">
+              <a:defRPr>
+                <a:solidFill>
+                  <a:schemeClr val="tx1"/>
+                </a:solidFill>
+                <a:latin typeface="Arial" panose="020B0604020202020204" pitchFamily="34" charset="0"/>
+                <a:cs typeface="Arial" panose="020B0604020202020204" pitchFamily="34" charset="0"/>
+              </a:defRPr>
+            </a:lvl4pPr>
+            <a:lvl5pPr marL="2057400" indent="-228600">
+              <a:defRPr>
+                <a:solidFill>
+                  <a:schemeClr val="tx1"/>
+                </a:solidFill>
+                <a:latin typeface="Arial" panose="020B0604020202020204" pitchFamily="34" charset="0"/>
+                <a:cs typeface="Arial" panose="020B0604020202020204" pitchFamily="34" charset="0"/>
+              </a:defRPr>
+            </a:lvl5pPr>
+            <a:lvl6pPr marL="2514600" indent="-228600" eaLnBrk="0" fontAlgn="base" hangingPunct="0">
+              <a:spcBef>
+                <a:spcPct val="0"/>
+              </a:spcBef>
+              <a:spcAft>
+                <a:spcPct val="0"/>
+              </a:spcAft>
+              <a:defRPr>
+                <a:solidFill>
+                  <a:schemeClr val="tx1"/>
+                </a:solidFill>
+                <a:latin typeface="Arial" panose="020B0604020202020204" pitchFamily="34" charset="0"/>
+                <a:cs typeface="Arial" panose="020B0604020202020204" pitchFamily="34" charset="0"/>
+              </a:defRPr>
+            </a:lvl6pPr>
+            <a:lvl7pPr marL="2971800" indent="-228600" eaLnBrk="0" fontAlgn="base" hangingPunct="0">
+              <a:spcBef>
+                <a:spcPct val="0"/>
+              </a:spcBef>
+              <a:spcAft>
+                <a:spcPct val="0"/>
+              </a:spcAft>
+              <a:defRPr>
+                <a:solidFill>
+                  <a:schemeClr val="tx1"/>
+                </a:solidFill>
+                <a:latin typeface="Arial" panose="020B0604020202020204" pitchFamily="34" charset="0"/>
+                <a:cs typeface="Arial" panose="020B0604020202020204" pitchFamily="34" charset="0"/>
+              </a:defRPr>
+            </a:lvl7pPr>
+            <a:lvl8pPr marL="3429000" indent="-228600" eaLnBrk="0" fontAlgn="base" hangingPunct="0">
+              <a:spcBef>
+                <a:spcPct val="0"/>
+              </a:spcBef>
+              <a:spcAft>
+                <a:spcPct val="0"/>
+              </a:spcAft>
+              <a:defRPr>
+                <a:solidFill>
+                  <a:schemeClr val="tx1"/>
+                </a:solidFill>
+                <a:latin typeface="Arial" panose="020B0604020202020204" pitchFamily="34" charset="0"/>
+                <a:cs typeface="Arial" panose="020B0604020202020204" pitchFamily="34" charset="0"/>
+              </a:defRPr>
+            </a:lvl8pPr>
+            <a:lvl9pPr marL="3886200" indent="-228600" eaLnBrk="0" fontAlgn="base" hangingPunct="0">
+              <a:spcBef>
+                <a:spcPct val="0"/>
+              </a:spcBef>
+              <a:spcAft>
+                <a:spcPct val="0"/>
+              </a:spcAft>
+              <a:defRPr>
+                <a:solidFill>
+                  <a:schemeClr val="tx1"/>
+                </a:solidFill>
+                <a:latin typeface="Arial" panose="020B0604020202020204" pitchFamily="34" charset="0"/>
+                <a:cs typeface="Arial" panose="020B0604020202020204" pitchFamily="34" charset="0"/>
+              </a:defRPr>
+            </a:lvl9pPr>
+          </a:lstStyle>
+          <a:p>
+            <a:r>
+              <a:rPr lang="en-US" altLang="es-AR" sz="1100" b="1">
+                <a:solidFill>
+                  <a:srgbClr val="C00000"/>
+                </a:solidFill>
+                <a:latin typeface="Calibri" panose="020F0502020204030204" pitchFamily="34" charset="0"/>
+                <a:ea typeface="ＭＳ Ｐゴシック" panose="020B0600070205080204" pitchFamily="34" charset="-128"/>
+              </a:rPr>
+              <a:t>Argentina</a:t>
+            </a:r>
+          </a:p>
+          <a:p>
+            <a:endParaRPr lang="en-US" altLang="es-AR" sz="900">
+              <a:solidFill>
+                <a:srgbClr val="333333"/>
+              </a:solidFill>
+              <a:latin typeface="Calibri" panose="020F0502020204030204" pitchFamily="34" charset="0"/>
+              <a:ea typeface="ＭＳ Ｐゴシック" panose="020B0600070205080204" pitchFamily="34" charset="-128"/>
+            </a:endParaRPr>
+          </a:p>
+          <a:p>
+            <a:r>
+              <a:rPr lang="en-US" altLang="es-AR" sz="900">
+                <a:solidFill>
+                  <a:srgbClr val="333333"/>
+                </a:solidFill>
+                <a:latin typeface="Calibri" panose="020F0502020204030204" pitchFamily="34" charset="0"/>
+                <a:ea typeface="ＭＳ Ｐゴシック" panose="020B0600070205080204" pitchFamily="34" charset="-128"/>
+              </a:rPr>
+              <a:t>Tel.: +54 (11) 4118-8080</a:t>
+            </a:r>
+          </a:p>
+          <a:p>
+            <a:r>
+              <a:rPr lang="en-US" altLang="es-AR" sz="900">
+                <a:solidFill>
+                  <a:srgbClr val="333333"/>
+                </a:solidFill>
+                <a:latin typeface="Calibri" panose="020F0502020204030204" pitchFamily="34" charset="0"/>
+                <a:ea typeface="ＭＳ Ｐゴシック" panose="020B0600070205080204" pitchFamily="34" charset="-128"/>
+              </a:rPr>
+              <a:t>Fax: +54 (11) 4118-8080</a:t>
+            </a:r>
+          </a:p>
+          <a:p>
+            <a:r>
+              <a:rPr lang="es-ES" altLang="es-AR" sz="900">
+                <a:solidFill>
+                  <a:srgbClr val="333333"/>
+                </a:solidFill>
+                <a:latin typeface="Calibri" panose="020F0502020204030204" pitchFamily="34" charset="0"/>
+                <a:ea typeface="ＭＳ Ｐゴシック" panose="020B0600070205080204" pitchFamily="34" charset="-128"/>
+              </a:rPr>
+              <a:t>Roosevelt 1655</a:t>
+            </a:r>
+          </a:p>
+          <a:p>
+            <a:r>
+              <a:rPr lang="es-ES" altLang="es-AR" sz="900">
+                <a:solidFill>
+                  <a:srgbClr val="333333"/>
+                </a:solidFill>
+                <a:latin typeface="Calibri" panose="020F0502020204030204" pitchFamily="34" charset="0"/>
+                <a:ea typeface="ＭＳ Ｐゴシック" panose="020B0600070205080204" pitchFamily="34" charset="-128"/>
+              </a:rPr>
+              <a:t>C1428BNC, Buenos Aires</a:t>
+            </a:r>
+          </a:p>
+          <a:p>
+            <a:r>
+              <a:rPr lang="es-ES" altLang="es-AR" sz="900">
+                <a:solidFill>
+                  <a:srgbClr val="333333"/>
+                </a:solidFill>
+                <a:latin typeface="Calibri" panose="020F0502020204030204" pitchFamily="34" charset="0"/>
+                <a:ea typeface="ＭＳ Ｐゴシック" panose="020B0600070205080204" pitchFamily="34" charset="-128"/>
+              </a:rPr>
+              <a:t>Argentina</a:t>
+            </a:r>
+          </a:p>
+        </p:txBody>
+      </p:sp>
+      <p:sp>
+        <p:nvSpPr>
+          <p:cNvPr id="36871" name="Text Box 16"/>
+          <p:cNvSpPr txBox="1">
+            <a:spLocks noChangeArrowheads="1"/>
+          </p:cNvSpPr>
+          <p:nvPr/>
+        </p:nvSpPr>
+        <p:spPr bwMode="auto">
+          <a:xfrm>
+            <a:off x="5802313" y="3149600"/>
+            <a:ext cx="1577975" cy="1244600"/>
+          </a:xfrm>
+          <a:prstGeom prst="rect">
+            <a:avLst/>
+          </a:prstGeom>
+          <a:noFill/>
+          <a:ln>
+            <a:noFill/>
+          </a:ln>
+          <a:extLst>
+            <a:ext uri="{909E8E84-426E-40DD-AFC4-6F175D3DCCD1}">
+              <a14:hiddenFill xmlns:a14="http://schemas.microsoft.com/office/drawing/2010/main">
+                <a:solidFill>
+                  <a:srgbClr val="FFFFFF"/>
+                </a:solidFill>
+              </a14:hiddenFill>
+            </a:ext>
+            <a:ext uri="{91240B29-F687-4F45-9708-019B960494DF}">
+              <a14:hiddenLine xmlns:a14="http://schemas.microsoft.com/office/drawing/2010/main" w="12700">
+                <a:solidFill>
+                  <a:srgbClr val="000000"/>
+                </a:solidFill>
+                <a:miter lim="800000"/>
+                <a:headEnd/>
+                <a:tailEnd/>
+              </a14:hiddenLine>
+            </a:ext>
+          </a:extLst>
+        </p:spPr>
+        <p:txBody>
+          <a:bodyPr tIns="91440"/>
+          <a:lstStyle>
+            <a:lvl1pPr>
+              <a:defRPr>
+                <a:solidFill>
+                  <a:schemeClr val="tx1"/>
+                </a:solidFill>
+                <a:latin typeface="Arial" panose="020B0604020202020204" pitchFamily="34" charset="0"/>
+                <a:cs typeface="Arial" panose="020B0604020202020204" pitchFamily="34" charset="0"/>
+              </a:defRPr>
+            </a:lvl1pPr>
+            <a:lvl2pPr marL="742950" indent="-285750">
+              <a:defRPr>
+                <a:solidFill>
+                  <a:schemeClr val="tx1"/>
+                </a:solidFill>
+                <a:latin typeface="Arial" panose="020B0604020202020204" pitchFamily="34" charset="0"/>
+                <a:cs typeface="Arial" panose="020B0604020202020204" pitchFamily="34" charset="0"/>
+              </a:defRPr>
+            </a:lvl2pPr>
+            <a:lvl3pPr marL="1143000" indent="-228600">
+              <a:defRPr>
+                <a:solidFill>
+                  <a:schemeClr val="tx1"/>
+                </a:solidFill>
+                <a:latin typeface="Arial" panose="020B0604020202020204" pitchFamily="34" charset="0"/>
+                <a:cs typeface="Arial" panose="020B0604020202020204" pitchFamily="34" charset="0"/>
+              </a:defRPr>
+            </a:lvl3pPr>
+            <a:lvl4pPr marL="1600200" indent="-228600">
+              <a:defRPr>
+                <a:solidFill>
+                  <a:schemeClr val="tx1"/>
+                </a:solidFill>
+                <a:latin typeface="Arial" panose="020B0604020202020204" pitchFamily="34" charset="0"/>
+                <a:cs typeface="Arial" panose="020B0604020202020204" pitchFamily="34" charset="0"/>
+              </a:defRPr>
+            </a:lvl4pPr>
+            <a:lvl5pPr marL="2057400" indent="-228600">
+              <a:defRPr>
+                <a:solidFill>
+                  <a:schemeClr val="tx1"/>
+                </a:solidFill>
+                <a:latin typeface="Arial" panose="020B0604020202020204" pitchFamily="34" charset="0"/>
+                <a:cs typeface="Arial" panose="020B0604020202020204" pitchFamily="34" charset="0"/>
+              </a:defRPr>
+            </a:lvl5pPr>
+            <a:lvl6pPr marL="2514600" indent="-228600" eaLnBrk="0" fontAlgn="base" hangingPunct="0">
+              <a:spcBef>
+                <a:spcPct val="0"/>
+              </a:spcBef>
+              <a:spcAft>
+                <a:spcPct val="0"/>
+              </a:spcAft>
+              <a:defRPr>
+                <a:solidFill>
+                  <a:schemeClr val="tx1"/>
+                </a:solidFill>
+                <a:latin typeface="Arial" panose="020B0604020202020204" pitchFamily="34" charset="0"/>
+                <a:cs typeface="Arial" panose="020B0604020202020204" pitchFamily="34" charset="0"/>
+              </a:defRPr>
+            </a:lvl6pPr>
+            <a:lvl7pPr marL="2971800" indent="-228600" eaLnBrk="0" fontAlgn="base" hangingPunct="0">
+              <a:spcBef>
+                <a:spcPct val="0"/>
+              </a:spcBef>
+              <a:spcAft>
+                <a:spcPct val="0"/>
+              </a:spcAft>
+              <a:defRPr>
+                <a:solidFill>
+                  <a:schemeClr val="tx1"/>
+                </a:solidFill>
+                <a:latin typeface="Arial" panose="020B0604020202020204" pitchFamily="34" charset="0"/>
+                <a:cs typeface="Arial" panose="020B0604020202020204" pitchFamily="34" charset="0"/>
+              </a:defRPr>
+            </a:lvl7pPr>
+            <a:lvl8pPr marL="3429000" indent="-228600" eaLnBrk="0" fontAlgn="base" hangingPunct="0">
+              <a:spcBef>
+                <a:spcPct val="0"/>
+              </a:spcBef>
+              <a:spcAft>
+                <a:spcPct val="0"/>
+              </a:spcAft>
+              <a:defRPr>
+                <a:solidFill>
+                  <a:schemeClr val="tx1"/>
+                </a:solidFill>
+                <a:latin typeface="Arial" panose="020B0604020202020204" pitchFamily="34" charset="0"/>
+                <a:cs typeface="Arial" panose="020B0604020202020204" pitchFamily="34" charset="0"/>
+              </a:defRPr>
+            </a:lvl8pPr>
+            <a:lvl9pPr marL="3886200" indent="-228600" eaLnBrk="0" fontAlgn="base" hangingPunct="0">
+              <a:spcBef>
+                <a:spcPct val="0"/>
+              </a:spcBef>
+              <a:spcAft>
+                <a:spcPct val="0"/>
+              </a:spcAft>
+              <a:defRPr>
+                <a:solidFill>
+                  <a:schemeClr val="tx1"/>
+                </a:solidFill>
+                <a:latin typeface="Arial" panose="020B0604020202020204" pitchFamily="34" charset="0"/>
+                <a:cs typeface="Arial" panose="020B0604020202020204" pitchFamily="34" charset="0"/>
+              </a:defRPr>
+            </a:lvl9pPr>
+          </a:lstStyle>
+          <a:p>
+            <a:r>
+              <a:rPr lang="en-US" altLang="es-AR" sz="1100" b="1">
+                <a:solidFill>
+                  <a:srgbClr val="C00000"/>
+                </a:solidFill>
+                <a:latin typeface="Calibri" panose="020F0502020204030204" pitchFamily="34" charset="0"/>
+                <a:ea typeface="ＭＳ Ｐゴシック" panose="020B0600070205080204" pitchFamily="34" charset="-128"/>
+              </a:rPr>
+              <a:t>España</a:t>
+            </a:r>
+          </a:p>
+          <a:p>
+            <a:endParaRPr lang="en-US" altLang="es-AR" sz="900" b="1">
+              <a:solidFill>
+                <a:srgbClr val="333333"/>
+              </a:solidFill>
+              <a:latin typeface="Calibri" panose="020F0502020204030204" pitchFamily="34" charset="0"/>
+              <a:ea typeface="ＭＳ Ｐゴシック" panose="020B0600070205080204" pitchFamily="34" charset="-128"/>
+            </a:endParaRPr>
+          </a:p>
+          <a:p>
+            <a:r>
+              <a:rPr lang="en-US" altLang="es-AR" sz="900">
+                <a:solidFill>
+                  <a:srgbClr val="333333"/>
+                </a:solidFill>
+                <a:latin typeface="Calibri" panose="020F0502020204030204" pitchFamily="34" charset="0"/>
+                <a:ea typeface="ＭＳ Ｐゴシック" panose="020B0600070205080204" pitchFamily="34" charset="-128"/>
+              </a:rPr>
+              <a:t>Tel.: +34 91 745-2763</a:t>
+            </a:r>
+          </a:p>
+          <a:p>
+            <a:r>
+              <a:rPr lang="en-US" altLang="es-AR" sz="900">
+                <a:solidFill>
+                  <a:srgbClr val="333333"/>
+                </a:solidFill>
+                <a:latin typeface="Calibri" panose="020F0502020204030204" pitchFamily="34" charset="0"/>
+                <a:ea typeface="ＭＳ Ｐゴシック" panose="020B0600070205080204" pitchFamily="34" charset="-128"/>
+              </a:rPr>
+              <a:t>Fax: +34 91 561-5626</a:t>
+            </a:r>
+          </a:p>
+          <a:p>
+            <a:r>
+              <a:rPr lang="es-ES" altLang="es-AR" sz="900">
+                <a:solidFill>
+                  <a:srgbClr val="333333"/>
+                </a:solidFill>
+                <a:latin typeface="Calibri" panose="020F0502020204030204" pitchFamily="34" charset="0"/>
+                <a:ea typeface="ＭＳ Ｐゴシック" panose="020B0600070205080204" pitchFamily="34" charset="-128"/>
+              </a:rPr>
+              <a:t>c/ Francisco Giralte, 2</a:t>
+            </a:r>
+          </a:p>
+          <a:p>
+            <a:r>
+              <a:rPr lang="es-ES" altLang="es-AR" sz="900">
+                <a:solidFill>
+                  <a:srgbClr val="333333"/>
+                </a:solidFill>
+                <a:latin typeface="Calibri" panose="020F0502020204030204" pitchFamily="34" charset="0"/>
+                <a:ea typeface="ＭＳ Ｐゴシック" panose="020B0600070205080204" pitchFamily="34" charset="-128"/>
+              </a:rPr>
+              <a:t>28002, Madrid</a:t>
+            </a:r>
+          </a:p>
+          <a:p>
+            <a:r>
+              <a:rPr lang="es-ES" altLang="es-AR" sz="900">
+                <a:solidFill>
+                  <a:srgbClr val="333333"/>
+                </a:solidFill>
+                <a:latin typeface="Calibri" panose="020F0502020204030204" pitchFamily="34" charset="0"/>
+                <a:ea typeface="ＭＳ Ｐゴシック" panose="020B0600070205080204" pitchFamily="34" charset="-128"/>
+              </a:rPr>
+              <a:t>España</a:t>
+            </a:r>
+          </a:p>
+        </p:txBody>
+      </p:sp>
+      <p:sp>
+        <p:nvSpPr>
+          <p:cNvPr id="36872" name="Text Box 17"/>
+          <p:cNvSpPr txBox="1">
+            <a:spLocks noChangeArrowheads="1"/>
+          </p:cNvSpPr>
+          <p:nvPr/>
+        </p:nvSpPr>
+        <p:spPr bwMode="auto">
+          <a:xfrm>
+            <a:off x="2436813" y="3149600"/>
+            <a:ext cx="1939925" cy="1346200"/>
+          </a:xfrm>
+          <a:prstGeom prst="rect">
+            <a:avLst/>
+          </a:prstGeom>
+          <a:noFill/>
+          <a:ln>
+            <a:noFill/>
+          </a:ln>
+          <a:extLst>
+            <a:ext uri="{909E8E84-426E-40DD-AFC4-6F175D3DCCD1}">
+              <a14:hiddenFill xmlns:a14="http://schemas.microsoft.com/office/drawing/2010/main">
+                <a:solidFill>
+                  <a:srgbClr val="FFFFFF"/>
+                </a:solidFill>
+              </a14:hiddenFill>
+            </a:ext>
+            <a:ext uri="{91240B29-F687-4F45-9708-019B960494DF}">
+              <a14:hiddenLine xmlns:a14="http://schemas.microsoft.com/office/drawing/2010/main" w="12700">
+                <a:solidFill>
+                  <a:srgbClr val="000000"/>
+                </a:solidFill>
+                <a:miter lim="800000"/>
+                <a:headEnd/>
+                <a:tailEnd/>
+              </a14:hiddenLine>
+            </a:ext>
+          </a:extLst>
+        </p:spPr>
+        <p:txBody>
+          <a:bodyPr tIns="91440"/>
+          <a:lstStyle>
+            <a:lvl1pPr>
+              <a:defRPr>
+                <a:solidFill>
+                  <a:schemeClr val="tx1"/>
+                </a:solidFill>
+                <a:latin typeface="Arial" panose="020B0604020202020204" pitchFamily="34" charset="0"/>
+                <a:cs typeface="Arial" panose="020B0604020202020204" pitchFamily="34" charset="0"/>
+              </a:defRPr>
+            </a:lvl1pPr>
+            <a:lvl2pPr marL="742950" indent="-285750">
+              <a:defRPr>
+                <a:solidFill>
+                  <a:schemeClr val="tx1"/>
+                </a:solidFill>
+                <a:latin typeface="Arial" panose="020B0604020202020204" pitchFamily="34" charset="0"/>
+                <a:cs typeface="Arial" panose="020B0604020202020204" pitchFamily="34" charset="0"/>
+              </a:defRPr>
+            </a:lvl2pPr>
+            <a:lvl3pPr marL="1143000" indent="-228600">
+              <a:defRPr>
+                <a:solidFill>
+                  <a:schemeClr val="tx1"/>
+                </a:solidFill>
+                <a:latin typeface="Arial" panose="020B0604020202020204" pitchFamily="34" charset="0"/>
+                <a:cs typeface="Arial" panose="020B0604020202020204" pitchFamily="34" charset="0"/>
+              </a:defRPr>
+            </a:lvl3pPr>
+            <a:lvl4pPr marL="1600200" indent="-228600">
+              <a:defRPr>
+                <a:solidFill>
+                  <a:schemeClr val="tx1"/>
+                </a:solidFill>
+                <a:latin typeface="Arial" panose="020B0604020202020204" pitchFamily="34" charset="0"/>
+                <a:cs typeface="Arial" panose="020B0604020202020204" pitchFamily="34" charset="0"/>
+              </a:defRPr>
+            </a:lvl4pPr>
+            <a:lvl5pPr marL="2057400" indent="-228600">
+              <a:defRPr>
+                <a:solidFill>
+                  <a:schemeClr val="tx1"/>
+                </a:solidFill>
+                <a:latin typeface="Arial" panose="020B0604020202020204" pitchFamily="34" charset="0"/>
+                <a:cs typeface="Arial" panose="020B0604020202020204" pitchFamily="34" charset="0"/>
+              </a:defRPr>
+            </a:lvl5pPr>
+            <a:lvl6pPr marL="2514600" indent="-228600" eaLnBrk="0" fontAlgn="base" hangingPunct="0">
+              <a:spcBef>
+                <a:spcPct val="0"/>
+              </a:spcBef>
+              <a:spcAft>
+                <a:spcPct val="0"/>
+              </a:spcAft>
+              <a:defRPr>
+                <a:solidFill>
+                  <a:schemeClr val="tx1"/>
+                </a:solidFill>
+                <a:latin typeface="Arial" panose="020B0604020202020204" pitchFamily="34" charset="0"/>
+                <a:cs typeface="Arial" panose="020B0604020202020204" pitchFamily="34" charset="0"/>
+              </a:defRPr>
+            </a:lvl6pPr>
+            <a:lvl7pPr marL="2971800" indent="-228600" eaLnBrk="0" fontAlgn="base" hangingPunct="0">
+              <a:spcBef>
+                <a:spcPct val="0"/>
+              </a:spcBef>
+              <a:spcAft>
+                <a:spcPct val="0"/>
+              </a:spcAft>
+              <a:defRPr>
+                <a:solidFill>
+                  <a:schemeClr val="tx1"/>
+                </a:solidFill>
+                <a:latin typeface="Arial" panose="020B0604020202020204" pitchFamily="34" charset="0"/>
+                <a:cs typeface="Arial" panose="020B0604020202020204" pitchFamily="34" charset="0"/>
+              </a:defRPr>
+            </a:lvl7pPr>
+            <a:lvl8pPr marL="3429000" indent="-228600" eaLnBrk="0" fontAlgn="base" hangingPunct="0">
+              <a:spcBef>
+                <a:spcPct val="0"/>
+              </a:spcBef>
+              <a:spcAft>
+                <a:spcPct val="0"/>
+              </a:spcAft>
+              <a:defRPr>
+                <a:solidFill>
+                  <a:schemeClr val="tx1"/>
+                </a:solidFill>
+                <a:latin typeface="Arial" panose="020B0604020202020204" pitchFamily="34" charset="0"/>
+                <a:cs typeface="Arial" panose="020B0604020202020204" pitchFamily="34" charset="0"/>
+              </a:defRPr>
+            </a:lvl8pPr>
+            <a:lvl9pPr marL="3886200" indent="-228600" eaLnBrk="0" fontAlgn="base" hangingPunct="0">
+              <a:spcBef>
+                <a:spcPct val="0"/>
+              </a:spcBef>
+              <a:spcAft>
+                <a:spcPct val="0"/>
+              </a:spcAft>
+              <a:defRPr>
+                <a:solidFill>
+                  <a:schemeClr val="tx1"/>
+                </a:solidFill>
+                <a:latin typeface="Arial" panose="020B0604020202020204" pitchFamily="34" charset="0"/>
+                <a:cs typeface="Arial" panose="020B0604020202020204" pitchFamily="34" charset="0"/>
+              </a:defRPr>
+            </a:lvl9pPr>
+          </a:lstStyle>
+          <a:p>
+            <a:r>
+              <a:rPr lang="en-US" altLang="es-AR" sz="1100" b="1">
+                <a:solidFill>
+                  <a:srgbClr val="C00000"/>
+                </a:solidFill>
+                <a:latin typeface="Calibri" panose="020F0502020204030204" pitchFamily="34" charset="0"/>
+                <a:ea typeface="ＭＳ Ｐゴシック" panose="020B0600070205080204" pitchFamily="34" charset="-128"/>
+              </a:rPr>
+              <a:t>México</a:t>
+            </a:r>
+          </a:p>
+          <a:p>
+            <a:endParaRPr lang="en-US" altLang="es-AR" sz="900" b="1">
+              <a:solidFill>
+                <a:srgbClr val="333333"/>
+              </a:solidFill>
+              <a:latin typeface="Calibri" panose="020F0502020204030204" pitchFamily="34" charset="0"/>
+              <a:ea typeface="ＭＳ Ｐゴシック" panose="020B0600070205080204" pitchFamily="34" charset="-128"/>
+            </a:endParaRPr>
+          </a:p>
+          <a:p>
+            <a:r>
+              <a:rPr lang="es-AR" altLang="es-AR" sz="900">
+                <a:latin typeface="Calibri" panose="020F0502020204030204" pitchFamily="34" charset="0"/>
+                <a:ea typeface="ＭＳ Ｐゴシック" panose="020B0600070205080204" pitchFamily="34" charset="-128"/>
+              </a:rPr>
+              <a:t>Tel.: +52 (55) 5284-2842 </a:t>
+            </a:r>
+            <a:br>
+              <a:rPr lang="es-AR" altLang="es-AR" sz="900">
+                <a:latin typeface="Calibri" panose="020F0502020204030204" pitchFamily="34" charset="0"/>
+                <a:ea typeface="ＭＳ Ｐゴシック" panose="020B0600070205080204" pitchFamily="34" charset="-128"/>
+              </a:rPr>
+            </a:br>
+            <a:r>
+              <a:rPr lang="es-AR" altLang="es-AR" sz="900">
+                <a:latin typeface="Calibri" panose="020F0502020204030204" pitchFamily="34" charset="0"/>
+                <a:ea typeface="ＭＳ Ｐゴシック" panose="020B0600070205080204" pitchFamily="34" charset="-128"/>
+              </a:rPr>
+              <a:t>Fax: +52 (55) 5284-2803 </a:t>
+            </a:r>
+            <a:r>
+              <a:rPr lang="en-US" altLang="es-AR" sz="900">
+                <a:solidFill>
+                  <a:srgbClr val="333333"/>
+                </a:solidFill>
+                <a:latin typeface="Calibri" panose="020F0502020204030204" pitchFamily="34" charset="0"/>
+                <a:ea typeface="ＭＳ Ｐゴシック" panose="020B0600070205080204" pitchFamily="34" charset="-128"/>
+              </a:rPr>
+              <a:t/>
+            </a:r>
+            <a:br>
+              <a:rPr lang="en-US" altLang="es-AR" sz="900">
+                <a:solidFill>
+                  <a:srgbClr val="333333"/>
+                </a:solidFill>
+                <a:latin typeface="Calibri" panose="020F0502020204030204" pitchFamily="34" charset="0"/>
+                <a:ea typeface="ＭＳ Ｐゴシック" panose="020B0600070205080204" pitchFamily="34" charset="-128"/>
+              </a:rPr>
+            </a:br>
+            <a:r>
+              <a:rPr lang="es-AR" altLang="es-AR" sz="900">
+                <a:latin typeface="Calibri" panose="020F0502020204030204" pitchFamily="34" charset="0"/>
+              </a:rPr>
+              <a:t>Avda. Ejército Nacional 678,</a:t>
+            </a:r>
+            <a:br>
+              <a:rPr lang="es-AR" altLang="es-AR" sz="900">
+                <a:latin typeface="Calibri" panose="020F0502020204030204" pitchFamily="34" charset="0"/>
+              </a:rPr>
+            </a:br>
+            <a:r>
+              <a:rPr lang="es-AR" altLang="es-AR" sz="900">
+                <a:latin typeface="Calibri" panose="020F0502020204030204" pitchFamily="34" charset="0"/>
+              </a:rPr>
+              <a:t>Col. Polanco Reforma, </a:t>
+            </a:r>
+          </a:p>
+          <a:p>
+            <a:r>
+              <a:rPr lang="es-AR" altLang="es-AR" sz="900">
+                <a:latin typeface="Calibri" panose="020F0502020204030204" pitchFamily="34" charset="0"/>
+              </a:rPr>
+              <a:t>Distrito Federal C.P. 11550 </a:t>
+            </a:r>
+          </a:p>
+          <a:p>
+            <a:r>
+              <a:rPr lang="es-MX" altLang="es-AR" sz="900">
+                <a:solidFill>
+                  <a:srgbClr val="333333"/>
+                </a:solidFill>
+                <a:latin typeface="Calibri" panose="020F0502020204030204" pitchFamily="34" charset="0"/>
+                <a:ea typeface="ＭＳ Ｐゴシック" panose="020B0600070205080204" pitchFamily="34" charset="-128"/>
+              </a:rPr>
+              <a:t>México D.F.</a:t>
+            </a:r>
+            <a:endParaRPr lang="es-ES" altLang="es-AR" sz="900">
+              <a:solidFill>
+                <a:srgbClr val="333333"/>
+              </a:solidFill>
+              <a:latin typeface="Calibri" panose="020F0502020204030204" pitchFamily="34" charset="0"/>
+              <a:ea typeface="ＭＳ Ｐゴシック" panose="020B0600070205080204" pitchFamily="34" charset="-128"/>
+            </a:endParaRPr>
+          </a:p>
+          <a:p>
+            <a:endParaRPr lang="es-ES" altLang="es-AR" sz="900">
+              <a:solidFill>
+                <a:srgbClr val="333333"/>
+              </a:solidFill>
+              <a:latin typeface="Calibri" panose="020F0502020204030204" pitchFamily="34" charset="0"/>
+              <a:ea typeface="ＭＳ Ｐゴシック" panose="020B0600070205080204" pitchFamily="34" charset="-128"/>
+            </a:endParaRPr>
+          </a:p>
+        </p:txBody>
+      </p:sp>
+      <p:sp>
+        <p:nvSpPr>
+          <p:cNvPr id="36873" name="Text Box 17"/>
+          <p:cNvSpPr txBox="1">
+            <a:spLocks noChangeArrowheads="1"/>
+          </p:cNvSpPr>
+          <p:nvPr/>
+        </p:nvSpPr>
+        <p:spPr bwMode="auto">
+          <a:xfrm>
+            <a:off x="4217988" y="3149600"/>
+            <a:ext cx="1939925" cy="1185863"/>
+          </a:xfrm>
+          <a:prstGeom prst="rect">
+            <a:avLst/>
+          </a:prstGeom>
+          <a:noFill/>
+          <a:ln>
+            <a:noFill/>
+          </a:ln>
+          <a:extLst>
+            <a:ext uri="{909E8E84-426E-40DD-AFC4-6F175D3DCCD1}">
+              <a14:hiddenFill xmlns:a14="http://schemas.microsoft.com/office/drawing/2010/main">
+                <a:solidFill>
+                  <a:srgbClr val="FFFFFF"/>
+                </a:solidFill>
+              </a14:hiddenFill>
+            </a:ext>
+            <a:ext uri="{91240B29-F687-4F45-9708-019B960494DF}">
+              <a14:hiddenLine xmlns:a14="http://schemas.microsoft.com/office/drawing/2010/main" w="12700">
+                <a:solidFill>
+                  <a:srgbClr val="000000"/>
+                </a:solidFill>
+                <a:miter lim="800000"/>
+                <a:headEnd/>
+                <a:tailEnd/>
+              </a14:hiddenLine>
+            </a:ext>
+          </a:extLst>
+        </p:spPr>
+        <p:txBody>
+          <a:bodyPr tIns="91440"/>
+          <a:lstStyle>
+            <a:lvl1pPr>
+              <a:defRPr>
+                <a:solidFill>
+                  <a:schemeClr val="tx1"/>
+                </a:solidFill>
+                <a:latin typeface="Arial" panose="020B0604020202020204" pitchFamily="34" charset="0"/>
+                <a:cs typeface="Arial" panose="020B0604020202020204" pitchFamily="34" charset="0"/>
+              </a:defRPr>
+            </a:lvl1pPr>
+            <a:lvl2pPr marL="742950" indent="-285750">
+              <a:defRPr>
+                <a:solidFill>
+                  <a:schemeClr val="tx1"/>
+                </a:solidFill>
+                <a:latin typeface="Arial" panose="020B0604020202020204" pitchFamily="34" charset="0"/>
+                <a:cs typeface="Arial" panose="020B0604020202020204" pitchFamily="34" charset="0"/>
+              </a:defRPr>
+            </a:lvl2pPr>
+            <a:lvl3pPr marL="1143000" indent="-228600">
+              <a:defRPr>
+                <a:solidFill>
+                  <a:schemeClr val="tx1"/>
+                </a:solidFill>
+                <a:latin typeface="Arial" panose="020B0604020202020204" pitchFamily="34" charset="0"/>
+                <a:cs typeface="Arial" panose="020B0604020202020204" pitchFamily="34" charset="0"/>
+              </a:defRPr>
+            </a:lvl3pPr>
+            <a:lvl4pPr marL="1600200" indent="-228600">
+              <a:defRPr>
+                <a:solidFill>
+                  <a:schemeClr val="tx1"/>
+                </a:solidFill>
+                <a:latin typeface="Arial" panose="020B0604020202020204" pitchFamily="34" charset="0"/>
+                <a:cs typeface="Arial" panose="020B0604020202020204" pitchFamily="34" charset="0"/>
+              </a:defRPr>
+            </a:lvl4pPr>
+            <a:lvl5pPr marL="2057400" indent="-228600">
+              <a:defRPr>
+                <a:solidFill>
+                  <a:schemeClr val="tx1"/>
+                </a:solidFill>
+                <a:latin typeface="Arial" panose="020B0604020202020204" pitchFamily="34" charset="0"/>
+                <a:cs typeface="Arial" panose="020B0604020202020204" pitchFamily="34" charset="0"/>
+              </a:defRPr>
+            </a:lvl5pPr>
+            <a:lvl6pPr marL="2514600" indent="-228600" eaLnBrk="0" fontAlgn="base" hangingPunct="0">
+              <a:spcBef>
+                <a:spcPct val="0"/>
+              </a:spcBef>
+              <a:spcAft>
+                <a:spcPct val="0"/>
+              </a:spcAft>
+              <a:defRPr>
+                <a:solidFill>
+                  <a:schemeClr val="tx1"/>
+                </a:solidFill>
+                <a:latin typeface="Arial" panose="020B0604020202020204" pitchFamily="34" charset="0"/>
+                <a:cs typeface="Arial" panose="020B0604020202020204" pitchFamily="34" charset="0"/>
+              </a:defRPr>
+            </a:lvl6pPr>
+            <a:lvl7pPr marL="2971800" indent="-228600" eaLnBrk="0" fontAlgn="base" hangingPunct="0">
+              <a:spcBef>
+                <a:spcPct val="0"/>
+              </a:spcBef>
+              <a:spcAft>
+                <a:spcPct val="0"/>
+              </a:spcAft>
+              <a:defRPr>
+                <a:solidFill>
+                  <a:schemeClr val="tx1"/>
+                </a:solidFill>
+                <a:latin typeface="Arial" panose="020B0604020202020204" pitchFamily="34" charset="0"/>
+                <a:cs typeface="Arial" panose="020B0604020202020204" pitchFamily="34" charset="0"/>
+              </a:defRPr>
+            </a:lvl7pPr>
+            <a:lvl8pPr marL="3429000" indent="-228600" eaLnBrk="0" fontAlgn="base" hangingPunct="0">
+              <a:spcBef>
+                <a:spcPct val="0"/>
+              </a:spcBef>
+              <a:spcAft>
+                <a:spcPct val="0"/>
+              </a:spcAft>
+              <a:defRPr>
+                <a:solidFill>
+                  <a:schemeClr val="tx1"/>
+                </a:solidFill>
+                <a:latin typeface="Arial" panose="020B0604020202020204" pitchFamily="34" charset="0"/>
+                <a:cs typeface="Arial" panose="020B0604020202020204" pitchFamily="34" charset="0"/>
+              </a:defRPr>
+            </a:lvl8pPr>
+            <a:lvl9pPr marL="3886200" indent="-228600" eaLnBrk="0" fontAlgn="base" hangingPunct="0">
+              <a:spcBef>
+                <a:spcPct val="0"/>
+              </a:spcBef>
+              <a:spcAft>
+                <a:spcPct val="0"/>
+              </a:spcAft>
+              <a:defRPr>
+                <a:solidFill>
+                  <a:schemeClr val="tx1"/>
+                </a:solidFill>
+                <a:latin typeface="Arial" panose="020B0604020202020204" pitchFamily="34" charset="0"/>
+                <a:cs typeface="Arial" panose="020B0604020202020204" pitchFamily="34" charset="0"/>
+              </a:defRPr>
+            </a:lvl9pPr>
+          </a:lstStyle>
+          <a:p>
+            <a:r>
+              <a:rPr lang="en-US" altLang="es-AR" sz="1100" b="1">
+                <a:solidFill>
+                  <a:srgbClr val="C00000"/>
+                </a:solidFill>
+                <a:latin typeface="Calibri" panose="020F0502020204030204" pitchFamily="34" charset="0"/>
+                <a:ea typeface="ＭＳ Ｐゴシック" panose="020B0600070205080204" pitchFamily="34" charset="-128"/>
+              </a:rPr>
+              <a:t>USA</a:t>
+            </a:r>
+          </a:p>
+          <a:p>
+            <a:endParaRPr lang="en-US" altLang="es-AR" sz="900" b="1">
+              <a:solidFill>
+                <a:srgbClr val="333333"/>
+              </a:solidFill>
+              <a:latin typeface="Calibri" panose="020F0502020204030204" pitchFamily="34" charset="0"/>
+              <a:ea typeface="ＭＳ Ｐゴシック" panose="020B0600070205080204" pitchFamily="34" charset="-128"/>
+            </a:endParaRPr>
+          </a:p>
+          <a:p>
+            <a:r>
+              <a:rPr lang="en-US" altLang="es-AR" sz="900">
+                <a:solidFill>
+                  <a:srgbClr val="333333"/>
+                </a:solidFill>
+                <a:latin typeface="Calibri" panose="020F0502020204030204" pitchFamily="34" charset="0"/>
+                <a:ea typeface="ＭＳ Ｐゴシック" panose="020B0600070205080204" pitchFamily="34" charset="-128"/>
+              </a:rPr>
+              <a:t>Tel</a:t>
+            </a:r>
+            <a:r>
+              <a:rPr lang="es-AR" altLang="es-AR" sz="900">
+                <a:latin typeface="Calibri" panose="020F0502020204030204" pitchFamily="34" charset="0"/>
+              </a:rPr>
+              <a:t>  +1 (617) 275-2420</a:t>
+            </a:r>
+            <a:r>
+              <a:rPr lang="en-US" altLang="es-AR" sz="900">
+                <a:solidFill>
+                  <a:srgbClr val="333333"/>
+                </a:solidFill>
+                <a:latin typeface="Calibri" panose="020F0502020204030204" pitchFamily="34" charset="0"/>
+                <a:ea typeface="ＭＳ Ｐゴシック" panose="020B0600070205080204" pitchFamily="34" charset="-128"/>
+              </a:rPr>
+              <a:t/>
+            </a:r>
+            <a:br>
+              <a:rPr lang="en-US" altLang="es-AR" sz="900">
+                <a:solidFill>
+                  <a:srgbClr val="333333"/>
+                </a:solidFill>
+                <a:latin typeface="Calibri" panose="020F0502020204030204" pitchFamily="34" charset="0"/>
+                <a:ea typeface="ＭＳ Ｐゴシック" panose="020B0600070205080204" pitchFamily="34" charset="-128"/>
+              </a:rPr>
+            </a:br>
+            <a:r>
+              <a:rPr lang="en-US" altLang="es-AR" sz="900">
+                <a:latin typeface="Calibri" panose="020F0502020204030204" pitchFamily="34" charset="0"/>
+              </a:rPr>
+              <a:t>1 Broadway 14th floor</a:t>
+            </a:r>
+            <a:br>
+              <a:rPr lang="en-US" altLang="es-AR" sz="900">
+                <a:latin typeface="Calibri" panose="020F0502020204030204" pitchFamily="34" charset="0"/>
+              </a:rPr>
+            </a:br>
+            <a:r>
+              <a:rPr lang="en-US" altLang="es-AR" sz="900">
+                <a:latin typeface="Calibri" panose="020F0502020204030204" pitchFamily="34" charset="0"/>
+              </a:rPr>
+              <a:t>Cambridge, MA 02142</a:t>
+            </a:r>
+          </a:p>
+          <a:p>
+            <a:r>
+              <a:rPr lang="es-AR" altLang="es-AR" sz="900">
+                <a:latin typeface="Calibri" panose="020F0502020204030204" pitchFamily="34" charset="0"/>
+              </a:rPr>
+              <a:t>EE.UU</a:t>
+            </a:r>
+            <a:endParaRPr lang="es-ES" altLang="es-AR" sz="900">
+              <a:solidFill>
+                <a:srgbClr val="333333"/>
+              </a:solidFill>
+              <a:latin typeface="Calibri" panose="020F0502020204030204" pitchFamily="34" charset="0"/>
+              <a:ea typeface="ＭＳ Ｐゴシック" panose="020B0600070205080204" pitchFamily="34" charset="-128"/>
+            </a:endParaRPr>
+          </a:p>
+          <a:p>
+            <a:endParaRPr lang="es-ES" altLang="es-AR" sz="900">
+              <a:solidFill>
+                <a:srgbClr val="333333"/>
+              </a:solidFill>
+              <a:latin typeface="Calibri" panose="020F0502020204030204" pitchFamily="34" charset="0"/>
+              <a:ea typeface="ＭＳ Ｐゴシック" panose="020B0600070205080204" pitchFamily="34" charset="-128"/>
+            </a:endParaRPr>
+          </a:p>
+        </p:txBody>
+      </p:sp>
+      <p:sp>
+        <p:nvSpPr>
+          <p:cNvPr id="36874" name="Text Box 15"/>
+          <p:cNvSpPr txBox="1">
+            <a:spLocks noChangeArrowheads="1"/>
+          </p:cNvSpPr>
+          <p:nvPr/>
+        </p:nvSpPr>
+        <p:spPr bwMode="auto">
+          <a:xfrm>
+            <a:off x="828675" y="4508500"/>
+            <a:ext cx="1649413" cy="1185863"/>
+          </a:xfrm>
+          <a:prstGeom prst="rect">
+            <a:avLst/>
+          </a:prstGeom>
+          <a:noFill/>
+          <a:ln>
+            <a:noFill/>
+          </a:ln>
+          <a:extLst>
+            <a:ext uri="{909E8E84-426E-40DD-AFC4-6F175D3DCCD1}">
+              <a14:hiddenFill xmlns:a14="http://schemas.microsoft.com/office/drawing/2010/main">
+                <a:solidFill>
+                  <a:srgbClr val="FFFFFF"/>
+                </a:solidFill>
+              </a14:hiddenFill>
+            </a:ext>
+            <a:ext uri="{91240B29-F687-4F45-9708-019B960494DF}">
+              <a14:hiddenLine xmlns:a14="http://schemas.microsoft.com/office/drawing/2010/main" w="12700">
+                <a:solidFill>
+                  <a:srgbClr val="000000"/>
+                </a:solidFill>
+                <a:miter lim="800000"/>
+                <a:headEnd/>
+                <a:tailEnd/>
+              </a14:hiddenLine>
+            </a:ext>
+          </a:extLst>
+        </p:spPr>
+        <p:txBody>
+          <a:bodyPr tIns="91440"/>
+          <a:lstStyle>
+            <a:lvl1pPr>
+              <a:defRPr>
+                <a:solidFill>
+                  <a:schemeClr val="tx1"/>
+                </a:solidFill>
+                <a:latin typeface="Arial" panose="020B0604020202020204" pitchFamily="34" charset="0"/>
+                <a:cs typeface="Arial" panose="020B0604020202020204" pitchFamily="34" charset="0"/>
+              </a:defRPr>
+            </a:lvl1pPr>
+            <a:lvl2pPr marL="742950" indent="-285750">
+              <a:defRPr>
+                <a:solidFill>
+                  <a:schemeClr val="tx1"/>
+                </a:solidFill>
+                <a:latin typeface="Arial" panose="020B0604020202020204" pitchFamily="34" charset="0"/>
+                <a:cs typeface="Arial" panose="020B0604020202020204" pitchFamily="34" charset="0"/>
+              </a:defRPr>
+            </a:lvl2pPr>
+            <a:lvl3pPr marL="1143000" indent="-228600">
+              <a:defRPr>
+                <a:solidFill>
+                  <a:schemeClr val="tx1"/>
+                </a:solidFill>
+                <a:latin typeface="Arial" panose="020B0604020202020204" pitchFamily="34" charset="0"/>
+                <a:cs typeface="Arial" panose="020B0604020202020204" pitchFamily="34" charset="0"/>
+              </a:defRPr>
+            </a:lvl3pPr>
+            <a:lvl4pPr marL="1600200" indent="-228600">
+              <a:defRPr>
+                <a:solidFill>
+                  <a:schemeClr val="tx1"/>
+                </a:solidFill>
+                <a:latin typeface="Arial" panose="020B0604020202020204" pitchFamily="34" charset="0"/>
+                <a:cs typeface="Arial" panose="020B0604020202020204" pitchFamily="34" charset="0"/>
+              </a:defRPr>
+            </a:lvl4pPr>
+            <a:lvl5pPr marL="2057400" indent="-228600">
+              <a:defRPr>
+                <a:solidFill>
+                  <a:schemeClr val="tx1"/>
+                </a:solidFill>
+                <a:latin typeface="Arial" panose="020B0604020202020204" pitchFamily="34" charset="0"/>
+                <a:cs typeface="Arial" panose="020B0604020202020204" pitchFamily="34" charset="0"/>
+              </a:defRPr>
+            </a:lvl5pPr>
+            <a:lvl6pPr marL="2514600" indent="-228600" eaLnBrk="0" fontAlgn="base" hangingPunct="0">
+              <a:spcBef>
+                <a:spcPct val="0"/>
+              </a:spcBef>
+              <a:spcAft>
+                <a:spcPct val="0"/>
+              </a:spcAft>
+              <a:defRPr>
+                <a:solidFill>
+                  <a:schemeClr val="tx1"/>
+                </a:solidFill>
+                <a:latin typeface="Arial" panose="020B0604020202020204" pitchFamily="34" charset="0"/>
+                <a:cs typeface="Arial" panose="020B0604020202020204" pitchFamily="34" charset="0"/>
+              </a:defRPr>
+            </a:lvl6pPr>
+            <a:lvl7pPr marL="2971800" indent="-228600" eaLnBrk="0" fontAlgn="base" hangingPunct="0">
+              <a:spcBef>
+                <a:spcPct val="0"/>
+              </a:spcBef>
+              <a:spcAft>
+                <a:spcPct val="0"/>
+              </a:spcAft>
+              <a:defRPr>
+                <a:solidFill>
+                  <a:schemeClr val="tx1"/>
+                </a:solidFill>
+                <a:latin typeface="Arial" panose="020B0604020202020204" pitchFamily="34" charset="0"/>
+                <a:cs typeface="Arial" panose="020B0604020202020204" pitchFamily="34" charset="0"/>
+              </a:defRPr>
+            </a:lvl7pPr>
+            <a:lvl8pPr marL="3429000" indent="-228600" eaLnBrk="0" fontAlgn="base" hangingPunct="0">
+              <a:spcBef>
+                <a:spcPct val="0"/>
+              </a:spcBef>
+              <a:spcAft>
+                <a:spcPct val="0"/>
+              </a:spcAft>
+              <a:defRPr>
+                <a:solidFill>
+                  <a:schemeClr val="tx1"/>
+                </a:solidFill>
+                <a:latin typeface="Arial" panose="020B0604020202020204" pitchFamily="34" charset="0"/>
+                <a:cs typeface="Arial" panose="020B0604020202020204" pitchFamily="34" charset="0"/>
+              </a:defRPr>
+            </a:lvl8pPr>
+            <a:lvl9pPr marL="3886200" indent="-228600" eaLnBrk="0" fontAlgn="base" hangingPunct="0">
+              <a:spcBef>
+                <a:spcPct val="0"/>
+              </a:spcBef>
+              <a:spcAft>
+                <a:spcPct val="0"/>
+              </a:spcAft>
+              <a:defRPr>
+                <a:solidFill>
+                  <a:schemeClr val="tx1"/>
+                </a:solidFill>
+                <a:latin typeface="Arial" panose="020B0604020202020204" pitchFamily="34" charset="0"/>
+                <a:cs typeface="Arial" panose="020B0604020202020204" pitchFamily="34" charset="0"/>
+              </a:defRPr>
+            </a:lvl9pPr>
+          </a:lstStyle>
+          <a:p>
+            <a:r>
+              <a:rPr lang="en-US" altLang="es-AR" sz="1100" b="1">
+                <a:solidFill>
+                  <a:srgbClr val="C00000"/>
+                </a:solidFill>
+                <a:latin typeface="Calibri" panose="020F0502020204030204" pitchFamily="34" charset="0"/>
+                <a:ea typeface="ＭＳ Ｐゴシック" panose="020B0600070205080204" pitchFamily="34" charset="-128"/>
+              </a:rPr>
+              <a:t>Santa Fe</a:t>
+            </a:r>
+          </a:p>
+          <a:p>
+            <a:endParaRPr lang="en-US" altLang="es-AR" sz="900">
+              <a:solidFill>
+                <a:srgbClr val="333333"/>
+              </a:solidFill>
+              <a:latin typeface="Calibri" panose="020F0502020204030204" pitchFamily="34" charset="0"/>
+              <a:ea typeface="ＭＳ Ｐゴシック" panose="020B0600070205080204" pitchFamily="34" charset="-128"/>
+            </a:endParaRPr>
+          </a:p>
+          <a:p>
+            <a:r>
+              <a:rPr lang="en-US" altLang="es-AR" sz="900">
+                <a:solidFill>
+                  <a:srgbClr val="333333"/>
+                </a:solidFill>
+                <a:latin typeface="Calibri" panose="020F0502020204030204" pitchFamily="34" charset="0"/>
+                <a:ea typeface="ＭＳ Ｐゴシック" panose="020B0600070205080204" pitchFamily="34" charset="-128"/>
+              </a:rPr>
+              <a:t>Tel.: +54 (342) 412-0368</a:t>
+            </a:r>
+          </a:p>
+          <a:p>
+            <a:r>
+              <a:rPr lang="es-ES" altLang="es-AR" sz="900">
+                <a:solidFill>
+                  <a:srgbClr val="333333"/>
+                </a:solidFill>
+                <a:latin typeface="Calibri" panose="020F0502020204030204" pitchFamily="34" charset="0"/>
+                <a:ea typeface="ＭＳ Ｐゴシック" panose="020B0600070205080204" pitchFamily="34" charset="-128"/>
+              </a:rPr>
+              <a:t>San Jerónimo 1838</a:t>
+            </a:r>
+          </a:p>
+          <a:p>
+            <a:r>
+              <a:rPr lang="es-ES" altLang="es-AR" sz="900">
+                <a:solidFill>
+                  <a:srgbClr val="333333"/>
+                </a:solidFill>
+                <a:latin typeface="Calibri" panose="020F0502020204030204" pitchFamily="34" charset="0"/>
+                <a:ea typeface="ＭＳ Ｐゴシック" panose="020B0600070205080204" pitchFamily="34" charset="-128"/>
+              </a:rPr>
+              <a:t>S3000FPP, Santa Fe</a:t>
+            </a:r>
+          </a:p>
+          <a:p>
+            <a:r>
+              <a:rPr lang="es-ES" altLang="es-AR" sz="900">
+                <a:solidFill>
+                  <a:srgbClr val="333333"/>
+                </a:solidFill>
+                <a:latin typeface="Calibri" panose="020F0502020204030204" pitchFamily="34" charset="0"/>
+                <a:ea typeface="ＭＳ Ｐゴシック" panose="020B0600070205080204" pitchFamily="34" charset="-128"/>
+              </a:rPr>
+              <a:t>Argentina</a:t>
+            </a:r>
+          </a:p>
+        </p:txBody>
+      </p:sp>
+      <p:sp>
+        <p:nvSpPr>
+          <p:cNvPr id="36875" name="1 Título"/>
+          <p:cNvSpPr txBox="1">
+            <a:spLocks/>
+          </p:cNvSpPr>
+          <p:nvPr/>
+        </p:nvSpPr>
+        <p:spPr bwMode="auto">
+          <a:xfrm>
+            <a:off x="755650" y="0"/>
+            <a:ext cx="7931150" cy="836613"/>
+          </a:xfrm>
+          <a:prstGeom prst="rect">
+            <a:avLst/>
+          </a:prstGeom>
+          <a:noFill/>
+          <a:ln>
+            <a:noFill/>
+          </a:ln>
+          <a:extLst>
+            <a:ext uri="{909E8E84-426E-40DD-AFC4-6F175D3DCCD1}">
+              <a14:hiddenFill xmlns:a14="http://schemas.microsoft.com/office/drawing/2010/main">
+                <a:solidFill>
+                  <a:srgbClr val="FFFFFF"/>
+                </a:solidFill>
+              </a14:hiddenFill>
+            </a:ext>
+            <a:ext uri="{91240B29-F687-4F45-9708-019B960494DF}">
+              <a14:hiddenLine xmlns:a14="http://schemas.microsoft.com/office/drawing/2010/main" w="9525">
+                <a:solidFill>
+                  <a:srgbClr val="000000"/>
+                </a:solidFill>
+                <a:miter lim="800000"/>
+                <a:headEnd/>
+                <a:tailEnd/>
+              </a14:hiddenLine>
+            </a:ext>
+          </a:extLst>
+        </p:spPr>
+        <p:txBody>
+          <a:bodyPr anchor="b"/>
+          <a:lstStyle>
+            <a:lvl1pPr>
+              <a:defRPr>
+                <a:solidFill>
+                  <a:schemeClr val="tx1"/>
+                </a:solidFill>
+                <a:latin typeface="Arial" panose="020B0604020202020204" pitchFamily="34" charset="0"/>
+                <a:cs typeface="Arial" panose="020B0604020202020204" pitchFamily="34" charset="0"/>
+              </a:defRPr>
+            </a:lvl1pPr>
+            <a:lvl2pPr marL="742950" indent="-285750">
+              <a:defRPr>
+                <a:solidFill>
+                  <a:schemeClr val="tx1"/>
+                </a:solidFill>
+                <a:latin typeface="Arial" panose="020B0604020202020204" pitchFamily="34" charset="0"/>
+                <a:cs typeface="Arial" panose="020B0604020202020204" pitchFamily="34" charset="0"/>
+              </a:defRPr>
+            </a:lvl2pPr>
+            <a:lvl3pPr marL="1143000" indent="-228600">
+              <a:defRPr>
+                <a:solidFill>
+                  <a:schemeClr val="tx1"/>
+                </a:solidFill>
+                <a:latin typeface="Arial" panose="020B0604020202020204" pitchFamily="34" charset="0"/>
+                <a:cs typeface="Arial" panose="020B0604020202020204" pitchFamily="34" charset="0"/>
+              </a:defRPr>
+            </a:lvl3pPr>
+            <a:lvl4pPr marL="1600200" indent="-228600">
+              <a:defRPr>
+                <a:solidFill>
+                  <a:schemeClr val="tx1"/>
+                </a:solidFill>
+                <a:latin typeface="Arial" panose="020B0604020202020204" pitchFamily="34" charset="0"/>
+                <a:cs typeface="Arial" panose="020B0604020202020204" pitchFamily="34" charset="0"/>
+              </a:defRPr>
+            </a:lvl4pPr>
+            <a:lvl5pPr marL="2057400" indent="-228600">
+              <a:defRPr>
+                <a:solidFill>
+                  <a:schemeClr val="tx1"/>
+                </a:solidFill>
+                <a:latin typeface="Arial" panose="020B0604020202020204" pitchFamily="34" charset="0"/>
+                <a:cs typeface="Arial" panose="020B0604020202020204" pitchFamily="34" charset="0"/>
+              </a:defRPr>
+            </a:lvl5pPr>
+            <a:lvl6pPr marL="2514600" indent="-228600" eaLnBrk="0" fontAlgn="base" hangingPunct="0">
+              <a:spcBef>
+                <a:spcPct val="0"/>
+              </a:spcBef>
+              <a:spcAft>
+                <a:spcPct val="0"/>
+              </a:spcAft>
+              <a:defRPr>
+                <a:solidFill>
+                  <a:schemeClr val="tx1"/>
+                </a:solidFill>
+                <a:latin typeface="Arial" panose="020B0604020202020204" pitchFamily="34" charset="0"/>
+                <a:cs typeface="Arial" panose="020B0604020202020204" pitchFamily="34" charset="0"/>
+              </a:defRPr>
+            </a:lvl6pPr>
+            <a:lvl7pPr marL="2971800" indent="-228600" eaLnBrk="0" fontAlgn="base" hangingPunct="0">
+              <a:spcBef>
+                <a:spcPct val="0"/>
+              </a:spcBef>
+              <a:spcAft>
+                <a:spcPct val="0"/>
+              </a:spcAft>
+              <a:defRPr>
+                <a:solidFill>
+                  <a:schemeClr val="tx1"/>
+                </a:solidFill>
+                <a:latin typeface="Arial" panose="020B0604020202020204" pitchFamily="34" charset="0"/>
+                <a:cs typeface="Arial" panose="020B0604020202020204" pitchFamily="34" charset="0"/>
+              </a:defRPr>
+            </a:lvl7pPr>
+            <a:lvl8pPr marL="3429000" indent="-228600" eaLnBrk="0" fontAlgn="base" hangingPunct="0">
+              <a:spcBef>
+                <a:spcPct val="0"/>
+              </a:spcBef>
+              <a:spcAft>
+                <a:spcPct val="0"/>
+              </a:spcAft>
+              <a:defRPr>
+                <a:solidFill>
+                  <a:schemeClr val="tx1"/>
+                </a:solidFill>
+                <a:latin typeface="Arial" panose="020B0604020202020204" pitchFamily="34" charset="0"/>
+                <a:cs typeface="Arial" panose="020B0604020202020204" pitchFamily="34" charset="0"/>
+              </a:defRPr>
+            </a:lvl8pPr>
+            <a:lvl9pPr marL="3886200" indent="-228600" eaLnBrk="0" fontAlgn="base" hangingPunct="0">
+              <a:spcBef>
+                <a:spcPct val="0"/>
+              </a:spcBef>
+              <a:spcAft>
+                <a:spcPct val="0"/>
+              </a:spcAft>
+              <a:defRPr>
+                <a:solidFill>
+                  <a:schemeClr val="tx1"/>
+                </a:solidFill>
+                <a:latin typeface="Arial" panose="020B0604020202020204" pitchFamily="34" charset="0"/>
+                <a:cs typeface="Arial" panose="020B0604020202020204" pitchFamily="34" charset="0"/>
+              </a:defRPr>
+            </a:lvl9pPr>
+          </a:lstStyle>
+          <a:p>
+            <a:pPr eaLnBrk="1" hangingPunct="1"/>
+            <a:r>
+              <a:rPr lang="es-AR" altLang="es-AR" sz="3200" b="1">
+                <a:latin typeface="Calibri" panose="020F0502020204030204" pitchFamily="34" charset="0"/>
+              </a:rPr>
+              <a:t>¡Muchas Gracias!</a:t>
+            </a:r>
+          </a:p>
+        </p:txBody>
+      </p:sp>
+    </p:spTree>
+  </p:cSld>
+  <p:clrMapOvr>
+    <a:masterClrMapping/>
+  </p:clrMapOvr>
+  <p:timing>
+    <p:tnLst>
+      <p:par>
+        <p:cTn id="1" dur="indefinite" restart="never" nodeType="tmRoot"/>
+      </p:par>
+    </p:tnLst>
+  </p:timing>
+</p:sld>
+</file>
+
 <file path=ppt/slides/slide2.xml><?xml version="1.0" encoding="utf-8"?>
 <p:sld xmlns:a="http://schemas.openxmlformats.org/drawingml/2006/main" xmlns:r="http://schemas.openxmlformats.org/officeDocument/2006/relationships" xmlns:p="http://schemas.openxmlformats.org/presentationml/2006/main">
   <p:cSld>
@@ -4611,9 +6635,6 @@
               </a:rPr>
               <a:t>Application code does not depend on the concrete class </a:t>
             </a:r>
-            <a:endParaRPr lang="en-GB" altLang="es-AR" dirty="0" smtClean="0">
-              <a:latin typeface="+mj-lt"/>
-            </a:endParaRPr>
           </a:p>
         </p:txBody>
       </p:sp>
@@ -4815,7 +6836,7 @@
               </a:spcBef>
             </a:pPr>
             <a:r>
-              <a:rPr lang="en-GB" b="1" dirty="0" smtClean="0">
+              <a:rPr lang="en-GB" dirty="0" smtClean="0">
                 <a:latin typeface="+mj-lt"/>
               </a:rPr>
               <a:t> Ideal for cases where a type will implement only some/part of the behaviour exposed by the superclass. </a:t>
@@ -4828,10 +6849,16 @@
               </a:spcBef>
             </a:pPr>
             <a:r>
-              <a:rPr lang="en-GB" b="1" dirty="0" smtClean="0">
+              <a:rPr lang="en-GB" dirty="0" smtClean="0">
                 <a:latin typeface="+mj-lt"/>
               </a:rPr>
-              <a:t>Allows subclasses to implement new functionality without affecting other subclasses.</a:t>
+              <a:t> Allows </a:t>
+            </a:r>
+            <a:r>
+              <a:rPr lang="en-GB" dirty="0" smtClean="0">
+                <a:latin typeface="+mj-lt"/>
+              </a:rPr>
+              <a:t>subclasses to implement new functionality without affecting other subclasses.</a:t>
             </a:r>
           </a:p>
           <a:p>
@@ -4841,13 +6868,13 @@
               </a:spcBef>
             </a:pPr>
             <a:r>
-              <a:rPr lang="en-GB" b="1" dirty="0">
+              <a:rPr lang="en-GB" dirty="0">
                 <a:latin typeface="+mj-lt"/>
               </a:rPr>
               <a:t> </a:t>
             </a:r>
             <a:r>
-              <a:rPr lang="en-GB" b="1" dirty="0" smtClean="0">
+              <a:rPr lang="en-GB" dirty="0" smtClean="0">
                 <a:latin typeface="+mj-lt"/>
               </a:rPr>
               <a:t>Allows behaviour to change on the fly.</a:t>
@@ -4910,12 +6937,12 @@
               <a:t> </a:t>
             </a:r>
             <a:r>
-              <a:rPr lang="en-US" b="1" i="1" dirty="0">
+              <a:rPr lang="en-US" i="1" dirty="0">
                 <a:latin typeface="+mj-lt"/>
               </a:rPr>
               <a:t>Prefer composition over inheritance as it is more malleable / easy to modify later, but do not use a compose-always approach</a:t>
             </a:r>
-            <a:endParaRPr lang="en-GB" b="1" i="1" dirty="0">
+            <a:endParaRPr lang="en-GB" i="1" dirty="0">
               <a:latin typeface="+mj-lt"/>
             </a:endParaRPr>
           </a:p>
@@ -5003,1695 +7030,635 @@
       </p:grpSpPr>
       <p:sp>
         <p:nvSpPr>
-          <p:cNvPr id="36866" name="Line 6"/>
+          <p:cNvPr id="12290" name="Content Placeholder 2"/>
           <p:cNvSpPr>
-            <a:spLocks noChangeShapeType="1"/>
+            <a:spLocks noGrp="1"/>
           </p:cNvSpPr>
-          <p:nvPr/>
+          <p:nvPr>
+            <p:ph sz="half" idx="2"/>
+          </p:nvPr>
         </p:nvSpPr>
-        <p:spPr bwMode="auto">
+        <p:spPr>
           <a:xfrm>
-            <a:off x="1158875" y="4097338"/>
-            <a:ext cx="0" cy="2160587"/>
+            <a:off x="755650" y="1130300"/>
+            <a:ext cx="8064500" cy="4891088"/>
           </a:xfrm>
-          <a:prstGeom prst="line">
-            <a:avLst/>
-          </a:prstGeom>
-          <a:noFill/>
-          <a:ln w="9525">
-            <a:solidFill>
-              <a:schemeClr val="bg1"/>
-            </a:solidFill>
-            <a:round/>
-            <a:headEnd/>
-            <a:tailEnd/>
-          </a:ln>
-          <a:extLst>
-            <a:ext uri="{909E8E84-426E-40DD-AFC4-6F175D3DCCD1}">
-              <a14:hiddenFill xmlns:a14="http://schemas.microsoft.com/office/drawing/2010/main">
-                <a:noFill/>
-              </a14:hiddenFill>
-            </a:ext>
-          </a:extLst>
         </p:spPr>
         <p:txBody>
           <a:bodyPr/>
           <a:lstStyle/>
           <a:p>
-            <a:endParaRPr lang="es-AR"/>
+            <a:pPr eaLnBrk="1" hangingPunct="1">
+              <a:spcBef>
+                <a:spcPts val="1200"/>
+              </a:spcBef>
+            </a:pPr>
+            <a:r>
+              <a:rPr lang="en-GB" dirty="0">
+                <a:latin typeface="+mj-lt"/>
+              </a:rPr>
+              <a:t>How to write unit tests:</a:t>
+            </a:r>
+          </a:p>
+          <a:p>
+            <a:pPr marL="547688" lvl="1" indent="-285750" eaLnBrk="1" hangingPunct="1">
+              <a:spcBef>
+                <a:spcPts val="1200"/>
+              </a:spcBef>
+              <a:buFont typeface="Wingdings" panose="05000000000000000000" pitchFamily="2" charset="2"/>
+              <a:buChar char="§"/>
+            </a:pPr>
+            <a:r>
+              <a:rPr lang="en-US" dirty="0">
+                <a:latin typeface="+mj-lt"/>
+              </a:rPr>
+              <a:t>Setup preconditions</a:t>
+            </a:r>
+          </a:p>
+          <a:p>
+            <a:pPr marL="547688" lvl="1" indent="-285750" eaLnBrk="1" hangingPunct="1">
+              <a:spcBef>
+                <a:spcPts val="1200"/>
+              </a:spcBef>
+              <a:buFont typeface="Wingdings" panose="05000000000000000000" pitchFamily="2" charset="2"/>
+              <a:buChar char="§"/>
+            </a:pPr>
+            <a:r>
+              <a:rPr lang="en-US" dirty="0">
+                <a:latin typeface="+mj-lt"/>
+              </a:rPr>
+              <a:t>Execute the code to be tested</a:t>
+            </a:r>
+          </a:p>
+          <a:p>
+            <a:pPr marL="547688" lvl="1" indent="-285750" eaLnBrk="1" hangingPunct="1">
+              <a:spcBef>
+                <a:spcPts val="1200"/>
+              </a:spcBef>
+              <a:buFont typeface="Wingdings" panose="05000000000000000000" pitchFamily="2" charset="2"/>
+              <a:buChar char="§"/>
+            </a:pPr>
+            <a:r>
+              <a:rPr lang="en-US" dirty="0">
+                <a:latin typeface="+mj-lt"/>
+              </a:rPr>
+              <a:t>Assert on the expected </a:t>
+            </a:r>
+            <a:r>
+              <a:rPr lang="en-US" dirty="0">
+                <a:latin typeface="+mj-lt"/>
+              </a:rPr>
+              <a:t>results</a:t>
+            </a:r>
+          </a:p>
+          <a:p>
+            <a:pPr marL="0" indent="0" eaLnBrk="1" hangingPunct="1">
+              <a:spcBef>
+                <a:spcPts val="1200"/>
+              </a:spcBef>
+            </a:pPr>
+            <a:r>
+              <a:rPr lang="en-US" dirty="0" smtClean="0">
+                <a:latin typeface="+mj-lt"/>
+              </a:rPr>
+              <a:t> A good unit test:</a:t>
+            </a:r>
+          </a:p>
+          <a:p>
+            <a:pPr marL="547688" lvl="1" indent="-285750" eaLnBrk="1" hangingPunct="1">
+              <a:spcBef>
+                <a:spcPts val="1200"/>
+              </a:spcBef>
+              <a:buFont typeface="Wingdings" panose="05000000000000000000" pitchFamily="2" charset="2"/>
+              <a:buChar char="§"/>
+            </a:pPr>
+            <a:r>
+              <a:rPr lang="en-US" dirty="0" smtClean="0">
+                <a:latin typeface="+mj-lt"/>
+              </a:rPr>
+              <a:t>Documents your design</a:t>
+            </a:r>
+          </a:p>
+          <a:p>
+            <a:pPr marL="547688" lvl="1" indent="-285750" eaLnBrk="1" hangingPunct="1">
+              <a:spcBef>
+                <a:spcPts val="1200"/>
+              </a:spcBef>
+              <a:buFont typeface="Wingdings" panose="05000000000000000000" pitchFamily="2" charset="2"/>
+              <a:buChar char="§"/>
+            </a:pPr>
+            <a:r>
+              <a:rPr lang="en-US" dirty="0" smtClean="0">
+                <a:latin typeface="+mj-lt"/>
+              </a:rPr>
+              <a:t>Has </a:t>
+            </a:r>
+            <a:r>
+              <a:rPr lang="en-US" dirty="0">
+                <a:latin typeface="+mj-lt"/>
+              </a:rPr>
+              <a:t>full control over all the pieces </a:t>
+            </a:r>
+            <a:r>
+              <a:rPr lang="en-US" dirty="0" smtClean="0">
+                <a:latin typeface="+mj-lt"/>
+              </a:rPr>
+              <a:t>running</a:t>
+            </a:r>
+            <a:endParaRPr lang="en-US" dirty="0">
+              <a:latin typeface="+mj-lt"/>
+            </a:endParaRPr>
+          </a:p>
+          <a:p>
+            <a:pPr marL="547688" lvl="1" indent="-285750" eaLnBrk="1" hangingPunct="1">
+              <a:spcBef>
+                <a:spcPts val="1200"/>
+              </a:spcBef>
+              <a:buFont typeface="Wingdings" panose="05000000000000000000" pitchFamily="2" charset="2"/>
+              <a:buChar char="§"/>
+            </a:pPr>
+            <a:r>
+              <a:rPr lang="en-US" dirty="0" smtClean="0">
+                <a:latin typeface="+mj-lt"/>
+              </a:rPr>
+              <a:t>Can </a:t>
+            </a:r>
+            <a:r>
+              <a:rPr lang="en-US" dirty="0">
+                <a:latin typeface="+mj-lt"/>
+              </a:rPr>
+              <a:t>be run in any </a:t>
+            </a:r>
+            <a:r>
+              <a:rPr lang="en-US" dirty="0" smtClean="0">
+                <a:latin typeface="+mj-lt"/>
+              </a:rPr>
+              <a:t>order if </a:t>
+            </a:r>
+            <a:r>
+              <a:rPr lang="en-US" dirty="0">
+                <a:latin typeface="+mj-lt"/>
+              </a:rPr>
+              <a:t>part of many other tests</a:t>
+            </a:r>
+          </a:p>
+          <a:p>
+            <a:pPr marL="547688" lvl="1" indent="-285750" eaLnBrk="1" hangingPunct="1">
+              <a:spcBef>
+                <a:spcPts val="1200"/>
+              </a:spcBef>
+              <a:buFont typeface="Wingdings" panose="05000000000000000000" pitchFamily="2" charset="2"/>
+              <a:buChar char="§"/>
+            </a:pPr>
+            <a:r>
+              <a:rPr lang="en-US" dirty="0" smtClean="0">
+                <a:latin typeface="+mj-lt"/>
+              </a:rPr>
+              <a:t>Consistently</a:t>
+            </a:r>
+            <a:r>
+              <a:rPr lang="en-US" dirty="0">
+                <a:latin typeface="+mj-lt"/>
+              </a:rPr>
+              <a:t> returns the same </a:t>
+            </a:r>
+            <a:r>
+              <a:rPr lang="en-US" dirty="0" smtClean="0">
+                <a:latin typeface="+mj-lt"/>
+              </a:rPr>
+              <a:t>result</a:t>
+            </a:r>
+          </a:p>
+          <a:p>
+            <a:pPr marL="547688" lvl="1" indent="-285750" eaLnBrk="1" hangingPunct="1">
+              <a:spcBef>
+                <a:spcPts val="1200"/>
+              </a:spcBef>
+              <a:buFont typeface="Wingdings" panose="05000000000000000000" pitchFamily="2" charset="2"/>
+              <a:buChar char="§"/>
+            </a:pPr>
+            <a:r>
+              <a:rPr lang="en-US" dirty="0" smtClean="0">
+                <a:latin typeface="+mj-lt"/>
+              </a:rPr>
+              <a:t>Tests </a:t>
+            </a:r>
+            <a:r>
+              <a:rPr lang="en-US" dirty="0">
+                <a:latin typeface="+mj-lt"/>
+              </a:rPr>
+              <a:t>a single logical concept in the </a:t>
+            </a:r>
+            <a:r>
+              <a:rPr lang="en-US" dirty="0" smtClean="0">
+                <a:latin typeface="+mj-lt"/>
+              </a:rPr>
+              <a:t>system</a:t>
+            </a:r>
+          </a:p>
+          <a:p>
+            <a:pPr marL="547688" lvl="1" indent="-285750" eaLnBrk="1" hangingPunct="1">
+              <a:spcBef>
+                <a:spcPts val="1200"/>
+              </a:spcBef>
+              <a:buFont typeface="Wingdings" panose="05000000000000000000" pitchFamily="2" charset="2"/>
+              <a:buChar char="§"/>
+            </a:pPr>
+            <a:r>
+              <a:rPr lang="en-US" dirty="0" smtClean="0">
+                <a:latin typeface="+mj-lt"/>
+              </a:rPr>
+              <a:t>Named clearly and consistently</a:t>
+            </a:r>
+            <a:endParaRPr lang="en-US" dirty="0">
+              <a:latin typeface="+mj-lt"/>
+            </a:endParaRPr>
+          </a:p>
+          <a:p>
+            <a:pPr marL="547688" lvl="1" indent="-285750" eaLnBrk="1" hangingPunct="1">
+              <a:spcBef>
+                <a:spcPts val="1200"/>
+              </a:spcBef>
+              <a:buFont typeface="Wingdings" panose="05000000000000000000" pitchFamily="2" charset="2"/>
+              <a:buChar char="§"/>
+            </a:pPr>
+            <a:r>
+              <a:rPr lang="en-US" dirty="0">
+                <a:latin typeface="+mj-lt"/>
+              </a:rPr>
+              <a:t>Readable</a:t>
+            </a:r>
+          </a:p>
+          <a:p>
+            <a:pPr marL="547688" lvl="1" indent="-285750" eaLnBrk="1" hangingPunct="1">
+              <a:spcBef>
+                <a:spcPts val="1200"/>
+              </a:spcBef>
+              <a:buFont typeface="Wingdings" panose="05000000000000000000" pitchFamily="2" charset="2"/>
+              <a:buChar char="§"/>
+            </a:pPr>
+            <a:r>
+              <a:rPr lang="en-US" dirty="0" smtClean="0">
+                <a:latin typeface="+mj-lt"/>
+              </a:rPr>
+              <a:t>Maintainable</a:t>
+            </a:r>
+            <a:endParaRPr lang="en-GB" i="1" dirty="0">
+              <a:latin typeface="+mj-lt"/>
+            </a:endParaRPr>
           </a:p>
         </p:txBody>
       </p:sp>
-      <p:pic>
-        <p:nvPicPr>
-          <p:cNvPr id="36867" name="Picture 22" descr="final final 2"/>
-          <p:cNvPicPr>
-            <a:picLocks noChangeAspect="1" noChangeArrowheads="1"/>
-          </p:cNvPicPr>
-          <p:nvPr/>
-        </p:nvPicPr>
-        <p:blipFill>
-          <a:blip r:embed="rId3">
-            <a:extLst>
-              <a:ext uri="{28A0092B-C50C-407E-A947-70E740481C1C}">
-                <a14:useLocalDpi xmlns:a14="http://schemas.microsoft.com/office/drawing/2010/main" val="0"/>
-              </a:ext>
-            </a:extLst>
-          </a:blip>
-          <a:srcRect/>
-          <a:stretch>
-            <a:fillRect/>
-          </a:stretch>
-        </p:blipFill>
-        <p:spPr bwMode="auto">
-          <a:xfrm>
-            <a:off x="900113" y="1125538"/>
-            <a:ext cx="7916862" cy="1936750"/>
-          </a:xfrm>
-          <a:prstGeom prst="rect">
-            <a:avLst/>
-          </a:prstGeom>
-          <a:noFill/>
-          <a:ln>
-            <a:noFill/>
-          </a:ln>
-          <a:extLst>
-            <a:ext uri="{909E8E84-426E-40DD-AFC4-6F175D3DCCD1}">
-              <a14:hiddenFill xmlns:a14="http://schemas.microsoft.com/office/drawing/2010/main">
-                <a:solidFill>
-                  <a:srgbClr val="FFFFFF"/>
-                </a:solidFill>
-              </a14:hiddenFill>
-            </a:ext>
-            <a:ext uri="{91240B29-F687-4F45-9708-019B960494DF}">
-              <a14:hiddenLine xmlns:a14="http://schemas.microsoft.com/office/drawing/2010/main" w="9525">
-                <a:solidFill>
-                  <a:srgbClr val="000000"/>
-                </a:solidFill>
-                <a:miter lim="800000"/>
-                <a:headEnd/>
-                <a:tailEnd/>
-              </a14:hiddenLine>
-            </a:ext>
-          </a:extLst>
-        </p:spPr>
-      </p:pic>
       <p:sp>
         <p:nvSpPr>
-          <p:cNvPr id="36868" name="Line 6"/>
+          <p:cNvPr id="6" name="Title 5"/>
           <p:cNvSpPr>
-            <a:spLocks noChangeShapeType="1"/>
+            <a:spLocks noGrp="1"/>
           </p:cNvSpPr>
-          <p:nvPr/>
+          <p:nvPr>
+            <p:ph type="title"/>
+          </p:nvPr>
         </p:nvSpPr>
-        <p:spPr bwMode="auto">
+        <p:spPr>
           <a:xfrm>
-            <a:off x="1158875" y="4097338"/>
-            <a:ext cx="0" cy="2160587"/>
+            <a:off x="755650" y="0"/>
+            <a:ext cx="7931150" cy="836613"/>
           </a:xfrm>
-          <a:prstGeom prst="line">
-            <a:avLst/>
-          </a:prstGeom>
-          <a:noFill/>
-          <a:ln w="9525">
-            <a:solidFill>
-              <a:schemeClr val="bg1"/>
-            </a:solidFill>
-            <a:round/>
-            <a:headEnd/>
-            <a:tailEnd/>
-          </a:ln>
-          <a:extLst>
-            <a:ext uri="{909E8E84-426E-40DD-AFC4-6F175D3DCCD1}">
-              <a14:hiddenFill xmlns:a14="http://schemas.microsoft.com/office/drawing/2010/main">
-                <a:noFill/>
-              </a14:hiddenFill>
-            </a:ext>
-          </a:extLst>
+        </p:spPr>
+        <p:txBody>
+          <a:bodyPr>
+            <a:noAutofit/>
+          </a:bodyPr>
+          <a:lstStyle/>
+          <a:p>
+            <a:pPr lvl="0"/>
+            <a:r>
+              <a:rPr lang="en-US" sz="2800" dirty="0"/>
+              <a:t>Tip </a:t>
+            </a:r>
+            <a:r>
+              <a:rPr lang="en-US" sz="2800" dirty="0" smtClean="0"/>
+              <a:t>4: </a:t>
+            </a:r>
+            <a:r>
+              <a:rPr lang="en-US" sz="2800" dirty="0"/>
+              <a:t>Generate Unit tests</a:t>
+            </a:r>
+            <a:endParaRPr lang="es-AR" sz="2800" dirty="0"/>
+          </a:p>
+        </p:txBody>
+      </p:sp>
+    </p:spTree>
+    <p:extLst>
+      <p:ext uri="{BB962C8B-B14F-4D97-AF65-F5344CB8AC3E}">
+        <p14:creationId xmlns:p14="http://schemas.microsoft.com/office/powerpoint/2010/main" val="2903620404"/>
+      </p:ext>
+    </p:extLst>
+  </p:cSld>
+  <p:clrMapOvr>
+    <a:masterClrMapping/>
+  </p:clrMapOvr>
+  <p:timing>
+    <p:tnLst>
+      <p:par>
+        <p:cTn id="1" dur="indefinite" restart="never" nodeType="tmRoot"/>
+      </p:par>
+    </p:tnLst>
+  </p:timing>
+</p:sld>
+</file>
+
+<file path=ppt/slides/slide9.xml><?xml version="1.0" encoding="utf-8"?>
+<p:sld xmlns:a="http://schemas.openxmlformats.org/drawingml/2006/main" xmlns:r="http://schemas.openxmlformats.org/officeDocument/2006/relationships" xmlns:p="http://schemas.openxmlformats.org/presentationml/2006/main">
+  <p:cSld>
+    <p:spTree>
+      <p:nvGrpSpPr>
+        <p:cNvPr id="1" name=""/>
+        <p:cNvGrpSpPr/>
+        <p:nvPr/>
+      </p:nvGrpSpPr>
+      <p:grpSpPr>
+        <a:xfrm>
+          <a:off x="0" y="0"/>
+          <a:ext cx="0" cy="0"/>
+          <a:chOff x="0" y="0"/>
+          <a:chExt cx="0" cy="0"/>
+        </a:xfrm>
+      </p:grpSpPr>
+      <p:sp>
+        <p:nvSpPr>
+          <p:cNvPr id="12290" name="Content Placeholder 2"/>
+          <p:cNvSpPr>
+            <a:spLocks noGrp="1"/>
+          </p:cNvSpPr>
+          <p:nvPr>
+            <p:ph sz="half" idx="2"/>
+          </p:nvPr>
+        </p:nvSpPr>
+        <p:spPr>
+          <a:xfrm>
+            <a:off x="755650" y="1130300"/>
+            <a:ext cx="8064500" cy="4891088"/>
+          </a:xfrm>
         </p:spPr>
         <p:txBody>
           <a:bodyPr/>
           <a:lstStyle/>
           <a:p>
-            <a:endParaRPr lang="es-AR"/>
+            <a:pPr eaLnBrk="1" hangingPunct="1">
+              <a:spcBef>
+                <a:spcPts val="1200"/>
+              </a:spcBef>
+            </a:pPr>
+            <a:r>
+              <a:rPr lang="en-US" dirty="0">
+                <a:latin typeface="+mj-lt"/>
+              </a:rPr>
+              <a:t>Mock objects are simulated objects that mimic the behavior of real objects in controlled </a:t>
+            </a:r>
+            <a:r>
+              <a:rPr lang="en-US" dirty="0">
+                <a:latin typeface="+mj-lt"/>
+              </a:rPr>
+              <a:t>ways</a:t>
+            </a:r>
+          </a:p>
+          <a:p>
+            <a:pPr eaLnBrk="1" hangingPunct="1">
+              <a:spcBef>
+                <a:spcPts val="1200"/>
+              </a:spcBef>
+            </a:pPr>
+            <a:r>
+              <a:rPr lang="en-US" dirty="0" smtClean="0">
+                <a:latin typeface="+mj-lt"/>
+              </a:rPr>
+              <a:t>Not </a:t>
+            </a:r>
+            <a:r>
+              <a:rPr lang="en-US" dirty="0">
+                <a:latin typeface="+mj-lt"/>
+              </a:rPr>
+              <a:t>all code is self </a:t>
+            </a:r>
+            <a:r>
+              <a:rPr lang="en-US" dirty="0" smtClean="0">
+                <a:latin typeface="+mj-lt"/>
+              </a:rPr>
+              <a:t>contained</a:t>
+            </a:r>
+          </a:p>
+          <a:p>
+            <a:pPr eaLnBrk="1" hangingPunct="1">
+              <a:spcBef>
+                <a:spcPts val="1200"/>
+              </a:spcBef>
+            </a:pPr>
+            <a:r>
+              <a:rPr lang="en-US" dirty="0" smtClean="0">
+                <a:latin typeface="+mj-lt"/>
+              </a:rPr>
+              <a:t>A unit test should test code without testing dependencies</a:t>
+            </a:r>
+          </a:p>
+          <a:p>
+            <a:pPr eaLnBrk="1" hangingPunct="1">
+              <a:spcBef>
+                <a:spcPts val="1200"/>
+              </a:spcBef>
+            </a:pPr>
+            <a:r>
+              <a:rPr lang="en-US" dirty="0" smtClean="0">
+                <a:latin typeface="+mj-lt"/>
+              </a:rPr>
+              <a:t>Refer to Tips 1 and 2</a:t>
+            </a:r>
+          </a:p>
+          <a:p>
+            <a:pPr lvl="1" eaLnBrk="1" hangingPunct="1">
+              <a:spcBef>
+                <a:spcPts val="1200"/>
+              </a:spcBef>
+              <a:buFont typeface="Wingdings" panose="05000000000000000000" pitchFamily="2" charset="2"/>
+              <a:buChar char="§"/>
+            </a:pPr>
+            <a:r>
+              <a:rPr lang="en-US" dirty="0">
+                <a:latin typeface="+mj-lt"/>
+              </a:rPr>
+              <a:t>Program to an interface, not an </a:t>
+            </a:r>
+            <a:r>
+              <a:rPr lang="en-US" dirty="0">
+                <a:latin typeface="+mj-lt"/>
+              </a:rPr>
+              <a:t>implementation</a:t>
+            </a:r>
+          </a:p>
+          <a:p>
+            <a:pPr lvl="1" eaLnBrk="1" hangingPunct="1">
+              <a:spcBef>
+                <a:spcPts val="1200"/>
+              </a:spcBef>
+              <a:buFont typeface="Wingdings" panose="05000000000000000000" pitchFamily="2" charset="2"/>
+              <a:buChar char="§"/>
+            </a:pPr>
+            <a:r>
+              <a:rPr lang="en-US" dirty="0">
+                <a:latin typeface="+mj-lt"/>
+              </a:rPr>
+              <a:t>Use Constructor dependency </a:t>
+            </a:r>
+            <a:r>
+              <a:rPr lang="en-US" dirty="0" smtClean="0">
+                <a:latin typeface="+mj-lt"/>
+              </a:rPr>
+              <a:t>injection</a:t>
+            </a:r>
+            <a:endParaRPr lang="en-US" dirty="0">
+              <a:latin typeface="+mj-lt"/>
+            </a:endParaRPr>
+          </a:p>
+          <a:p>
+            <a:pPr eaLnBrk="1" hangingPunct="1">
+              <a:spcBef>
+                <a:spcPts val="1200"/>
+              </a:spcBef>
+            </a:pPr>
+            <a:r>
+              <a:rPr lang="en-US" dirty="0" smtClean="0">
+                <a:latin typeface="+mj-lt"/>
+              </a:rPr>
+              <a:t>How to write unit tests using mocks:</a:t>
+            </a:r>
+          </a:p>
+          <a:p>
+            <a:pPr lvl="1" eaLnBrk="1" hangingPunct="1">
+              <a:spcBef>
+                <a:spcPts val="1200"/>
+              </a:spcBef>
+              <a:buFont typeface="Wingdings" panose="05000000000000000000" pitchFamily="2" charset="2"/>
+              <a:buChar char="§"/>
+            </a:pPr>
+            <a:r>
+              <a:rPr lang="en-US" dirty="0" smtClean="0">
+                <a:latin typeface="+mj-lt"/>
+              </a:rPr>
+              <a:t>Setup preconditions including the setup of mock objects</a:t>
+            </a:r>
+          </a:p>
+          <a:p>
+            <a:pPr lvl="1" eaLnBrk="1" hangingPunct="1">
+              <a:spcBef>
+                <a:spcPts val="1200"/>
+              </a:spcBef>
+              <a:buFont typeface="Wingdings" panose="05000000000000000000" pitchFamily="2" charset="2"/>
+              <a:buChar char="§"/>
+            </a:pPr>
+            <a:r>
+              <a:rPr lang="en-US" dirty="0" smtClean="0">
+                <a:latin typeface="+mj-lt"/>
+              </a:rPr>
+              <a:t>Inject mocked dependencies</a:t>
+            </a:r>
+          </a:p>
+          <a:p>
+            <a:pPr lvl="1" eaLnBrk="1" hangingPunct="1">
+              <a:spcBef>
+                <a:spcPts val="1200"/>
+              </a:spcBef>
+              <a:buFont typeface="Wingdings" panose="05000000000000000000" pitchFamily="2" charset="2"/>
+              <a:buChar char="§"/>
+            </a:pPr>
+            <a:r>
+              <a:rPr lang="en-US" dirty="0" smtClean="0">
+                <a:latin typeface="+mj-lt"/>
+              </a:rPr>
+              <a:t>Execute the code to be tested</a:t>
+            </a:r>
+          </a:p>
+          <a:p>
+            <a:pPr lvl="1" eaLnBrk="1" hangingPunct="1">
+              <a:spcBef>
+                <a:spcPts val="1200"/>
+              </a:spcBef>
+              <a:buFont typeface="Wingdings" panose="05000000000000000000" pitchFamily="2" charset="2"/>
+              <a:buChar char="§"/>
+            </a:pPr>
+            <a:r>
+              <a:rPr lang="en-US" dirty="0" smtClean="0">
+                <a:latin typeface="+mj-lt"/>
+              </a:rPr>
+              <a:t>Assert on the expected results</a:t>
+            </a:r>
+          </a:p>
+          <a:p>
+            <a:pPr lvl="1" eaLnBrk="1" hangingPunct="1">
+              <a:spcBef>
+                <a:spcPts val="1200"/>
+              </a:spcBef>
+              <a:buFont typeface="Wingdings" panose="05000000000000000000" pitchFamily="2" charset="2"/>
+              <a:buChar char="§"/>
+            </a:pPr>
+            <a:r>
+              <a:rPr lang="en-US" dirty="0" smtClean="0">
+                <a:latin typeface="+mj-lt"/>
+              </a:rPr>
+              <a:t>Verify that the mock object was called the expected number of times and with the expected parameters</a:t>
+            </a:r>
+            <a:endParaRPr lang="en-US" dirty="0">
+              <a:latin typeface="+mj-lt"/>
+            </a:endParaRPr>
+          </a:p>
+          <a:p>
+            <a:pPr eaLnBrk="1" hangingPunct="1">
+              <a:spcBef>
+                <a:spcPts val="1200"/>
+              </a:spcBef>
+            </a:pPr>
+            <a:endParaRPr lang="en-GB" i="1" dirty="0">
+              <a:latin typeface="+mj-lt"/>
+            </a:endParaRPr>
           </a:p>
         </p:txBody>
       </p:sp>
       <p:sp>
         <p:nvSpPr>
-          <p:cNvPr id="36869" name="Text Box 14"/>
-          <p:cNvSpPr txBox="1">
-            <a:spLocks noChangeArrowheads="1"/>
+          <p:cNvPr id="6" name="Title 5"/>
+          <p:cNvSpPr>
+            <a:spLocks noGrp="1"/>
           </p:cNvSpPr>
-          <p:nvPr/>
+          <p:nvPr>
+            <p:ph type="title"/>
+          </p:nvPr>
         </p:nvSpPr>
-        <p:spPr bwMode="auto">
-          <a:xfrm>
-            <a:off x="6961188" y="3149600"/>
-            <a:ext cx="1801812" cy="431800"/>
-          </a:xfrm>
-          <a:prstGeom prst="rect">
-            <a:avLst/>
-          </a:prstGeom>
-          <a:noFill/>
-          <a:ln>
-            <a:noFill/>
-          </a:ln>
-          <a:extLst>
-            <a:ext uri="{909E8E84-426E-40DD-AFC4-6F175D3DCCD1}">
-              <a14:hiddenFill xmlns:a14="http://schemas.microsoft.com/office/drawing/2010/main">
-                <a:solidFill>
-                  <a:srgbClr val="FFFFFF"/>
-                </a:solidFill>
-              </a14:hiddenFill>
-            </a:ext>
-            <a:ext uri="{91240B29-F687-4F45-9708-019B960494DF}">
-              <a14:hiddenLine xmlns:a14="http://schemas.microsoft.com/office/drawing/2010/main" w="12700">
-                <a:solidFill>
-                  <a:srgbClr val="000000"/>
-                </a:solidFill>
-                <a:miter lim="800000"/>
-                <a:headEnd/>
-                <a:tailEnd/>
-              </a14:hiddenLine>
-            </a:ext>
-          </a:extLst>
-        </p:spPr>
-        <p:txBody>
-          <a:bodyPr tIns="91440"/>
-          <a:lstStyle>
-            <a:lvl1pPr>
-              <a:defRPr>
-                <a:solidFill>
-                  <a:schemeClr val="tx1"/>
-                </a:solidFill>
-                <a:latin typeface="Arial" panose="020B0604020202020204" pitchFamily="34" charset="0"/>
-                <a:cs typeface="Arial" panose="020B0604020202020204" pitchFamily="34" charset="0"/>
-              </a:defRPr>
-            </a:lvl1pPr>
-            <a:lvl2pPr marL="742950" indent="-285750">
-              <a:defRPr>
-                <a:solidFill>
-                  <a:schemeClr val="tx1"/>
-                </a:solidFill>
-                <a:latin typeface="Arial" panose="020B0604020202020204" pitchFamily="34" charset="0"/>
-                <a:cs typeface="Arial" panose="020B0604020202020204" pitchFamily="34" charset="0"/>
-              </a:defRPr>
-            </a:lvl2pPr>
-            <a:lvl3pPr marL="1143000" indent="-228600">
-              <a:defRPr>
-                <a:solidFill>
-                  <a:schemeClr val="tx1"/>
-                </a:solidFill>
-                <a:latin typeface="Arial" panose="020B0604020202020204" pitchFamily="34" charset="0"/>
-                <a:cs typeface="Arial" panose="020B0604020202020204" pitchFamily="34" charset="0"/>
-              </a:defRPr>
-            </a:lvl3pPr>
-            <a:lvl4pPr marL="1600200" indent="-228600">
-              <a:defRPr>
-                <a:solidFill>
-                  <a:schemeClr val="tx1"/>
-                </a:solidFill>
-                <a:latin typeface="Arial" panose="020B0604020202020204" pitchFamily="34" charset="0"/>
-                <a:cs typeface="Arial" panose="020B0604020202020204" pitchFamily="34" charset="0"/>
-              </a:defRPr>
-            </a:lvl4pPr>
-            <a:lvl5pPr marL="2057400" indent="-228600">
-              <a:defRPr>
-                <a:solidFill>
-                  <a:schemeClr val="tx1"/>
-                </a:solidFill>
-                <a:latin typeface="Arial" panose="020B0604020202020204" pitchFamily="34" charset="0"/>
-                <a:cs typeface="Arial" panose="020B0604020202020204" pitchFamily="34" charset="0"/>
-              </a:defRPr>
-            </a:lvl5pPr>
-            <a:lvl6pPr marL="2514600" indent="-228600" eaLnBrk="0" fontAlgn="base" hangingPunct="0">
-              <a:spcBef>
-                <a:spcPct val="0"/>
-              </a:spcBef>
-              <a:spcAft>
-                <a:spcPct val="0"/>
-              </a:spcAft>
-              <a:defRPr>
-                <a:solidFill>
-                  <a:schemeClr val="tx1"/>
-                </a:solidFill>
-                <a:latin typeface="Arial" panose="020B0604020202020204" pitchFamily="34" charset="0"/>
-                <a:cs typeface="Arial" panose="020B0604020202020204" pitchFamily="34" charset="0"/>
-              </a:defRPr>
-            </a:lvl6pPr>
-            <a:lvl7pPr marL="2971800" indent="-228600" eaLnBrk="0" fontAlgn="base" hangingPunct="0">
-              <a:spcBef>
-                <a:spcPct val="0"/>
-              </a:spcBef>
-              <a:spcAft>
-                <a:spcPct val="0"/>
-              </a:spcAft>
-              <a:defRPr>
-                <a:solidFill>
-                  <a:schemeClr val="tx1"/>
-                </a:solidFill>
-                <a:latin typeface="Arial" panose="020B0604020202020204" pitchFamily="34" charset="0"/>
-                <a:cs typeface="Arial" panose="020B0604020202020204" pitchFamily="34" charset="0"/>
-              </a:defRPr>
-            </a:lvl7pPr>
-            <a:lvl8pPr marL="3429000" indent="-228600" eaLnBrk="0" fontAlgn="base" hangingPunct="0">
-              <a:spcBef>
-                <a:spcPct val="0"/>
-              </a:spcBef>
-              <a:spcAft>
-                <a:spcPct val="0"/>
-              </a:spcAft>
-              <a:defRPr>
-                <a:solidFill>
-                  <a:schemeClr val="tx1"/>
-                </a:solidFill>
-                <a:latin typeface="Arial" panose="020B0604020202020204" pitchFamily="34" charset="0"/>
-                <a:cs typeface="Arial" panose="020B0604020202020204" pitchFamily="34" charset="0"/>
-              </a:defRPr>
-            </a:lvl8pPr>
-            <a:lvl9pPr marL="3886200" indent="-228600" eaLnBrk="0" fontAlgn="base" hangingPunct="0">
-              <a:spcBef>
-                <a:spcPct val="0"/>
-              </a:spcBef>
-              <a:spcAft>
-                <a:spcPct val="0"/>
-              </a:spcAft>
-              <a:defRPr>
-                <a:solidFill>
-                  <a:schemeClr val="tx1"/>
-                </a:solidFill>
-                <a:latin typeface="Arial" panose="020B0604020202020204" pitchFamily="34" charset="0"/>
-                <a:cs typeface="Arial" panose="020B0604020202020204" pitchFamily="34" charset="0"/>
-              </a:defRPr>
-            </a:lvl9pPr>
-          </a:lstStyle>
-          <a:p>
-            <a:pPr algn="r"/>
-            <a:r>
-              <a:rPr lang="es-ES" altLang="es-AR" sz="1000" b="1">
-                <a:solidFill>
-                  <a:srgbClr val="333333"/>
-                </a:solidFill>
-                <a:latin typeface="Calibri" panose="020F0502020204030204" pitchFamily="34" charset="0"/>
-                <a:ea typeface="ＭＳ Ｐゴシック" panose="020B0600070205080204" pitchFamily="34" charset="-128"/>
-              </a:rPr>
-              <a:t>info@baufest.com</a:t>
-            </a:r>
-            <a:r>
-              <a:rPr lang="en-US" altLang="es-AR" sz="1000">
-                <a:solidFill>
-                  <a:srgbClr val="333333"/>
-                </a:solidFill>
-                <a:latin typeface="Calibri" panose="020F0502020204030204" pitchFamily="34" charset="0"/>
-                <a:ea typeface="ＭＳ Ｐゴシック" panose="020B0600070205080204" pitchFamily="34" charset="-128"/>
-              </a:rPr>
-              <a:t> </a:t>
-            </a:r>
-          </a:p>
-          <a:p>
-            <a:pPr algn="r"/>
-            <a:r>
-              <a:rPr lang="es-ES" altLang="es-AR" sz="1000">
-                <a:solidFill>
-                  <a:srgbClr val="333333"/>
-                </a:solidFill>
-                <a:latin typeface="Calibri" panose="020F0502020204030204" pitchFamily="34" charset="0"/>
-                <a:ea typeface="ＭＳ Ｐゴシック" panose="020B0600070205080204" pitchFamily="34" charset="-128"/>
-              </a:rPr>
-              <a:t>baufest.com</a:t>
-            </a:r>
-            <a:endParaRPr lang="en-US" altLang="es-AR" sz="1000">
-              <a:solidFill>
-                <a:srgbClr val="333333"/>
-              </a:solidFill>
-              <a:latin typeface="Calibri" panose="020F0502020204030204" pitchFamily="34" charset="0"/>
-              <a:ea typeface="ＭＳ Ｐゴシック" panose="020B0600070205080204" pitchFamily="34" charset="-128"/>
-            </a:endParaRPr>
-          </a:p>
-        </p:txBody>
-      </p:sp>
-      <p:sp>
-        <p:nvSpPr>
-          <p:cNvPr id="36870" name="Text Box 15"/>
-          <p:cNvSpPr txBox="1">
-            <a:spLocks noChangeArrowheads="1"/>
-          </p:cNvSpPr>
-          <p:nvPr/>
-        </p:nvSpPr>
-        <p:spPr bwMode="auto">
-          <a:xfrm>
-            <a:off x="828675" y="3149600"/>
-            <a:ext cx="1649413" cy="1185863"/>
-          </a:xfrm>
-          <a:prstGeom prst="rect">
-            <a:avLst/>
-          </a:prstGeom>
-          <a:noFill/>
-          <a:ln>
-            <a:noFill/>
-          </a:ln>
-          <a:extLst>
-            <a:ext uri="{909E8E84-426E-40DD-AFC4-6F175D3DCCD1}">
-              <a14:hiddenFill xmlns:a14="http://schemas.microsoft.com/office/drawing/2010/main">
-                <a:solidFill>
-                  <a:srgbClr val="FFFFFF"/>
-                </a:solidFill>
-              </a14:hiddenFill>
-            </a:ext>
-            <a:ext uri="{91240B29-F687-4F45-9708-019B960494DF}">
-              <a14:hiddenLine xmlns:a14="http://schemas.microsoft.com/office/drawing/2010/main" w="12700">
-                <a:solidFill>
-                  <a:srgbClr val="000000"/>
-                </a:solidFill>
-                <a:miter lim="800000"/>
-                <a:headEnd/>
-                <a:tailEnd/>
-              </a14:hiddenLine>
-            </a:ext>
-          </a:extLst>
-        </p:spPr>
-        <p:txBody>
-          <a:bodyPr tIns="91440"/>
-          <a:lstStyle>
-            <a:lvl1pPr>
-              <a:defRPr>
-                <a:solidFill>
-                  <a:schemeClr val="tx1"/>
-                </a:solidFill>
-                <a:latin typeface="Arial" panose="020B0604020202020204" pitchFamily="34" charset="0"/>
-                <a:cs typeface="Arial" panose="020B0604020202020204" pitchFamily="34" charset="0"/>
-              </a:defRPr>
-            </a:lvl1pPr>
-            <a:lvl2pPr marL="742950" indent="-285750">
-              <a:defRPr>
-                <a:solidFill>
-                  <a:schemeClr val="tx1"/>
-                </a:solidFill>
-                <a:latin typeface="Arial" panose="020B0604020202020204" pitchFamily="34" charset="0"/>
-                <a:cs typeface="Arial" panose="020B0604020202020204" pitchFamily="34" charset="0"/>
-              </a:defRPr>
-            </a:lvl2pPr>
-            <a:lvl3pPr marL="1143000" indent="-228600">
-              <a:defRPr>
-                <a:solidFill>
-                  <a:schemeClr val="tx1"/>
-                </a:solidFill>
-                <a:latin typeface="Arial" panose="020B0604020202020204" pitchFamily="34" charset="0"/>
-                <a:cs typeface="Arial" panose="020B0604020202020204" pitchFamily="34" charset="0"/>
-              </a:defRPr>
-            </a:lvl3pPr>
-            <a:lvl4pPr marL="1600200" indent="-228600">
-              <a:defRPr>
-                <a:solidFill>
-                  <a:schemeClr val="tx1"/>
-                </a:solidFill>
-                <a:latin typeface="Arial" panose="020B0604020202020204" pitchFamily="34" charset="0"/>
-                <a:cs typeface="Arial" panose="020B0604020202020204" pitchFamily="34" charset="0"/>
-              </a:defRPr>
-            </a:lvl4pPr>
-            <a:lvl5pPr marL="2057400" indent="-228600">
-              <a:defRPr>
-                <a:solidFill>
-                  <a:schemeClr val="tx1"/>
-                </a:solidFill>
-                <a:latin typeface="Arial" panose="020B0604020202020204" pitchFamily="34" charset="0"/>
-                <a:cs typeface="Arial" panose="020B0604020202020204" pitchFamily="34" charset="0"/>
-              </a:defRPr>
-            </a:lvl5pPr>
-            <a:lvl6pPr marL="2514600" indent="-228600" eaLnBrk="0" fontAlgn="base" hangingPunct="0">
-              <a:spcBef>
-                <a:spcPct val="0"/>
-              </a:spcBef>
-              <a:spcAft>
-                <a:spcPct val="0"/>
-              </a:spcAft>
-              <a:defRPr>
-                <a:solidFill>
-                  <a:schemeClr val="tx1"/>
-                </a:solidFill>
-                <a:latin typeface="Arial" panose="020B0604020202020204" pitchFamily="34" charset="0"/>
-                <a:cs typeface="Arial" panose="020B0604020202020204" pitchFamily="34" charset="0"/>
-              </a:defRPr>
-            </a:lvl6pPr>
-            <a:lvl7pPr marL="2971800" indent="-228600" eaLnBrk="0" fontAlgn="base" hangingPunct="0">
-              <a:spcBef>
-                <a:spcPct val="0"/>
-              </a:spcBef>
-              <a:spcAft>
-                <a:spcPct val="0"/>
-              </a:spcAft>
-              <a:defRPr>
-                <a:solidFill>
-                  <a:schemeClr val="tx1"/>
-                </a:solidFill>
-                <a:latin typeface="Arial" panose="020B0604020202020204" pitchFamily="34" charset="0"/>
-                <a:cs typeface="Arial" panose="020B0604020202020204" pitchFamily="34" charset="0"/>
-              </a:defRPr>
-            </a:lvl7pPr>
-            <a:lvl8pPr marL="3429000" indent="-228600" eaLnBrk="0" fontAlgn="base" hangingPunct="0">
-              <a:spcBef>
-                <a:spcPct val="0"/>
-              </a:spcBef>
-              <a:spcAft>
-                <a:spcPct val="0"/>
-              </a:spcAft>
-              <a:defRPr>
-                <a:solidFill>
-                  <a:schemeClr val="tx1"/>
-                </a:solidFill>
-                <a:latin typeface="Arial" panose="020B0604020202020204" pitchFamily="34" charset="0"/>
-                <a:cs typeface="Arial" panose="020B0604020202020204" pitchFamily="34" charset="0"/>
-              </a:defRPr>
-            </a:lvl8pPr>
-            <a:lvl9pPr marL="3886200" indent="-228600" eaLnBrk="0" fontAlgn="base" hangingPunct="0">
-              <a:spcBef>
-                <a:spcPct val="0"/>
-              </a:spcBef>
-              <a:spcAft>
-                <a:spcPct val="0"/>
-              </a:spcAft>
-              <a:defRPr>
-                <a:solidFill>
-                  <a:schemeClr val="tx1"/>
-                </a:solidFill>
-                <a:latin typeface="Arial" panose="020B0604020202020204" pitchFamily="34" charset="0"/>
-                <a:cs typeface="Arial" panose="020B0604020202020204" pitchFamily="34" charset="0"/>
-              </a:defRPr>
-            </a:lvl9pPr>
-          </a:lstStyle>
-          <a:p>
-            <a:r>
-              <a:rPr lang="en-US" altLang="es-AR" sz="1100" b="1">
-                <a:solidFill>
-                  <a:srgbClr val="C00000"/>
-                </a:solidFill>
-                <a:latin typeface="Calibri" panose="020F0502020204030204" pitchFamily="34" charset="0"/>
-                <a:ea typeface="ＭＳ Ｐゴシック" panose="020B0600070205080204" pitchFamily="34" charset="-128"/>
-              </a:rPr>
-              <a:t>Argentina</a:t>
-            </a:r>
-          </a:p>
-          <a:p>
-            <a:endParaRPr lang="en-US" altLang="es-AR" sz="900">
-              <a:solidFill>
-                <a:srgbClr val="333333"/>
-              </a:solidFill>
-              <a:latin typeface="Calibri" panose="020F0502020204030204" pitchFamily="34" charset="0"/>
-              <a:ea typeface="ＭＳ Ｐゴシック" panose="020B0600070205080204" pitchFamily="34" charset="-128"/>
-            </a:endParaRPr>
-          </a:p>
-          <a:p>
-            <a:r>
-              <a:rPr lang="en-US" altLang="es-AR" sz="900">
-                <a:solidFill>
-                  <a:srgbClr val="333333"/>
-                </a:solidFill>
-                <a:latin typeface="Calibri" panose="020F0502020204030204" pitchFamily="34" charset="0"/>
-                <a:ea typeface="ＭＳ Ｐゴシック" panose="020B0600070205080204" pitchFamily="34" charset="-128"/>
-              </a:rPr>
-              <a:t>Tel.: +54 (11) 4118-8080</a:t>
-            </a:r>
-          </a:p>
-          <a:p>
-            <a:r>
-              <a:rPr lang="en-US" altLang="es-AR" sz="900">
-                <a:solidFill>
-                  <a:srgbClr val="333333"/>
-                </a:solidFill>
-                <a:latin typeface="Calibri" panose="020F0502020204030204" pitchFamily="34" charset="0"/>
-                <a:ea typeface="ＭＳ Ｐゴシック" panose="020B0600070205080204" pitchFamily="34" charset="-128"/>
-              </a:rPr>
-              <a:t>Fax: +54 (11) 4118-8080</a:t>
-            </a:r>
-          </a:p>
-          <a:p>
-            <a:r>
-              <a:rPr lang="es-ES" altLang="es-AR" sz="900">
-                <a:solidFill>
-                  <a:srgbClr val="333333"/>
-                </a:solidFill>
-                <a:latin typeface="Calibri" panose="020F0502020204030204" pitchFamily="34" charset="0"/>
-                <a:ea typeface="ＭＳ Ｐゴシック" panose="020B0600070205080204" pitchFamily="34" charset="-128"/>
-              </a:rPr>
-              <a:t>Roosevelt 1655</a:t>
-            </a:r>
-          </a:p>
-          <a:p>
-            <a:r>
-              <a:rPr lang="es-ES" altLang="es-AR" sz="900">
-                <a:solidFill>
-                  <a:srgbClr val="333333"/>
-                </a:solidFill>
-                <a:latin typeface="Calibri" panose="020F0502020204030204" pitchFamily="34" charset="0"/>
-                <a:ea typeface="ＭＳ Ｐゴシック" panose="020B0600070205080204" pitchFamily="34" charset="-128"/>
-              </a:rPr>
-              <a:t>C1428BNC, Buenos Aires</a:t>
-            </a:r>
-          </a:p>
-          <a:p>
-            <a:r>
-              <a:rPr lang="es-ES" altLang="es-AR" sz="900">
-                <a:solidFill>
-                  <a:srgbClr val="333333"/>
-                </a:solidFill>
-                <a:latin typeface="Calibri" panose="020F0502020204030204" pitchFamily="34" charset="0"/>
-                <a:ea typeface="ＭＳ Ｐゴシック" panose="020B0600070205080204" pitchFamily="34" charset="-128"/>
-              </a:rPr>
-              <a:t>Argentina</a:t>
-            </a:r>
-          </a:p>
-        </p:txBody>
-      </p:sp>
-      <p:sp>
-        <p:nvSpPr>
-          <p:cNvPr id="36871" name="Text Box 16"/>
-          <p:cNvSpPr txBox="1">
-            <a:spLocks noChangeArrowheads="1"/>
-          </p:cNvSpPr>
-          <p:nvPr/>
-        </p:nvSpPr>
-        <p:spPr bwMode="auto">
-          <a:xfrm>
-            <a:off x="5802313" y="3149600"/>
-            <a:ext cx="1577975" cy="1244600"/>
-          </a:xfrm>
-          <a:prstGeom prst="rect">
-            <a:avLst/>
-          </a:prstGeom>
-          <a:noFill/>
-          <a:ln>
-            <a:noFill/>
-          </a:ln>
-          <a:extLst>
-            <a:ext uri="{909E8E84-426E-40DD-AFC4-6F175D3DCCD1}">
-              <a14:hiddenFill xmlns:a14="http://schemas.microsoft.com/office/drawing/2010/main">
-                <a:solidFill>
-                  <a:srgbClr val="FFFFFF"/>
-                </a:solidFill>
-              </a14:hiddenFill>
-            </a:ext>
-            <a:ext uri="{91240B29-F687-4F45-9708-019B960494DF}">
-              <a14:hiddenLine xmlns:a14="http://schemas.microsoft.com/office/drawing/2010/main" w="12700">
-                <a:solidFill>
-                  <a:srgbClr val="000000"/>
-                </a:solidFill>
-                <a:miter lim="800000"/>
-                <a:headEnd/>
-                <a:tailEnd/>
-              </a14:hiddenLine>
-            </a:ext>
-          </a:extLst>
-        </p:spPr>
-        <p:txBody>
-          <a:bodyPr tIns="91440"/>
-          <a:lstStyle>
-            <a:lvl1pPr>
-              <a:defRPr>
-                <a:solidFill>
-                  <a:schemeClr val="tx1"/>
-                </a:solidFill>
-                <a:latin typeface="Arial" panose="020B0604020202020204" pitchFamily="34" charset="0"/>
-                <a:cs typeface="Arial" panose="020B0604020202020204" pitchFamily="34" charset="0"/>
-              </a:defRPr>
-            </a:lvl1pPr>
-            <a:lvl2pPr marL="742950" indent="-285750">
-              <a:defRPr>
-                <a:solidFill>
-                  <a:schemeClr val="tx1"/>
-                </a:solidFill>
-                <a:latin typeface="Arial" panose="020B0604020202020204" pitchFamily="34" charset="0"/>
-                <a:cs typeface="Arial" panose="020B0604020202020204" pitchFamily="34" charset="0"/>
-              </a:defRPr>
-            </a:lvl2pPr>
-            <a:lvl3pPr marL="1143000" indent="-228600">
-              <a:defRPr>
-                <a:solidFill>
-                  <a:schemeClr val="tx1"/>
-                </a:solidFill>
-                <a:latin typeface="Arial" panose="020B0604020202020204" pitchFamily="34" charset="0"/>
-                <a:cs typeface="Arial" panose="020B0604020202020204" pitchFamily="34" charset="0"/>
-              </a:defRPr>
-            </a:lvl3pPr>
-            <a:lvl4pPr marL="1600200" indent="-228600">
-              <a:defRPr>
-                <a:solidFill>
-                  <a:schemeClr val="tx1"/>
-                </a:solidFill>
-                <a:latin typeface="Arial" panose="020B0604020202020204" pitchFamily="34" charset="0"/>
-                <a:cs typeface="Arial" panose="020B0604020202020204" pitchFamily="34" charset="0"/>
-              </a:defRPr>
-            </a:lvl4pPr>
-            <a:lvl5pPr marL="2057400" indent="-228600">
-              <a:defRPr>
-                <a:solidFill>
-                  <a:schemeClr val="tx1"/>
-                </a:solidFill>
-                <a:latin typeface="Arial" panose="020B0604020202020204" pitchFamily="34" charset="0"/>
-                <a:cs typeface="Arial" panose="020B0604020202020204" pitchFamily="34" charset="0"/>
-              </a:defRPr>
-            </a:lvl5pPr>
-            <a:lvl6pPr marL="2514600" indent="-228600" eaLnBrk="0" fontAlgn="base" hangingPunct="0">
-              <a:spcBef>
-                <a:spcPct val="0"/>
-              </a:spcBef>
-              <a:spcAft>
-                <a:spcPct val="0"/>
-              </a:spcAft>
-              <a:defRPr>
-                <a:solidFill>
-                  <a:schemeClr val="tx1"/>
-                </a:solidFill>
-                <a:latin typeface="Arial" panose="020B0604020202020204" pitchFamily="34" charset="0"/>
-                <a:cs typeface="Arial" panose="020B0604020202020204" pitchFamily="34" charset="0"/>
-              </a:defRPr>
-            </a:lvl6pPr>
-            <a:lvl7pPr marL="2971800" indent="-228600" eaLnBrk="0" fontAlgn="base" hangingPunct="0">
-              <a:spcBef>
-                <a:spcPct val="0"/>
-              </a:spcBef>
-              <a:spcAft>
-                <a:spcPct val="0"/>
-              </a:spcAft>
-              <a:defRPr>
-                <a:solidFill>
-                  <a:schemeClr val="tx1"/>
-                </a:solidFill>
-                <a:latin typeface="Arial" panose="020B0604020202020204" pitchFamily="34" charset="0"/>
-                <a:cs typeface="Arial" panose="020B0604020202020204" pitchFamily="34" charset="0"/>
-              </a:defRPr>
-            </a:lvl7pPr>
-            <a:lvl8pPr marL="3429000" indent="-228600" eaLnBrk="0" fontAlgn="base" hangingPunct="0">
-              <a:spcBef>
-                <a:spcPct val="0"/>
-              </a:spcBef>
-              <a:spcAft>
-                <a:spcPct val="0"/>
-              </a:spcAft>
-              <a:defRPr>
-                <a:solidFill>
-                  <a:schemeClr val="tx1"/>
-                </a:solidFill>
-                <a:latin typeface="Arial" panose="020B0604020202020204" pitchFamily="34" charset="0"/>
-                <a:cs typeface="Arial" panose="020B0604020202020204" pitchFamily="34" charset="0"/>
-              </a:defRPr>
-            </a:lvl8pPr>
-            <a:lvl9pPr marL="3886200" indent="-228600" eaLnBrk="0" fontAlgn="base" hangingPunct="0">
-              <a:spcBef>
-                <a:spcPct val="0"/>
-              </a:spcBef>
-              <a:spcAft>
-                <a:spcPct val="0"/>
-              </a:spcAft>
-              <a:defRPr>
-                <a:solidFill>
-                  <a:schemeClr val="tx1"/>
-                </a:solidFill>
-                <a:latin typeface="Arial" panose="020B0604020202020204" pitchFamily="34" charset="0"/>
-                <a:cs typeface="Arial" panose="020B0604020202020204" pitchFamily="34" charset="0"/>
-              </a:defRPr>
-            </a:lvl9pPr>
-          </a:lstStyle>
-          <a:p>
-            <a:r>
-              <a:rPr lang="en-US" altLang="es-AR" sz="1100" b="1">
-                <a:solidFill>
-                  <a:srgbClr val="C00000"/>
-                </a:solidFill>
-                <a:latin typeface="Calibri" panose="020F0502020204030204" pitchFamily="34" charset="0"/>
-                <a:ea typeface="ＭＳ Ｐゴシック" panose="020B0600070205080204" pitchFamily="34" charset="-128"/>
-              </a:rPr>
-              <a:t>España</a:t>
-            </a:r>
-          </a:p>
-          <a:p>
-            <a:endParaRPr lang="en-US" altLang="es-AR" sz="900" b="1">
-              <a:solidFill>
-                <a:srgbClr val="333333"/>
-              </a:solidFill>
-              <a:latin typeface="Calibri" panose="020F0502020204030204" pitchFamily="34" charset="0"/>
-              <a:ea typeface="ＭＳ Ｐゴシック" panose="020B0600070205080204" pitchFamily="34" charset="-128"/>
-            </a:endParaRPr>
-          </a:p>
-          <a:p>
-            <a:r>
-              <a:rPr lang="en-US" altLang="es-AR" sz="900">
-                <a:solidFill>
-                  <a:srgbClr val="333333"/>
-                </a:solidFill>
-                <a:latin typeface="Calibri" panose="020F0502020204030204" pitchFamily="34" charset="0"/>
-                <a:ea typeface="ＭＳ Ｐゴシック" panose="020B0600070205080204" pitchFamily="34" charset="-128"/>
-              </a:rPr>
-              <a:t>Tel.: +34 91 745-2763</a:t>
-            </a:r>
-          </a:p>
-          <a:p>
-            <a:r>
-              <a:rPr lang="en-US" altLang="es-AR" sz="900">
-                <a:solidFill>
-                  <a:srgbClr val="333333"/>
-                </a:solidFill>
-                <a:latin typeface="Calibri" panose="020F0502020204030204" pitchFamily="34" charset="0"/>
-                <a:ea typeface="ＭＳ Ｐゴシック" panose="020B0600070205080204" pitchFamily="34" charset="-128"/>
-              </a:rPr>
-              <a:t>Fax: +34 91 561-5626</a:t>
-            </a:r>
-          </a:p>
-          <a:p>
-            <a:r>
-              <a:rPr lang="es-ES" altLang="es-AR" sz="900">
-                <a:solidFill>
-                  <a:srgbClr val="333333"/>
-                </a:solidFill>
-                <a:latin typeface="Calibri" panose="020F0502020204030204" pitchFamily="34" charset="0"/>
-                <a:ea typeface="ＭＳ Ｐゴシック" panose="020B0600070205080204" pitchFamily="34" charset="-128"/>
-              </a:rPr>
-              <a:t>c/ Francisco Giralte, 2</a:t>
-            </a:r>
-          </a:p>
-          <a:p>
-            <a:r>
-              <a:rPr lang="es-ES" altLang="es-AR" sz="900">
-                <a:solidFill>
-                  <a:srgbClr val="333333"/>
-                </a:solidFill>
-                <a:latin typeface="Calibri" panose="020F0502020204030204" pitchFamily="34" charset="0"/>
-                <a:ea typeface="ＭＳ Ｐゴシック" panose="020B0600070205080204" pitchFamily="34" charset="-128"/>
-              </a:rPr>
-              <a:t>28002, Madrid</a:t>
-            </a:r>
-          </a:p>
-          <a:p>
-            <a:r>
-              <a:rPr lang="es-ES" altLang="es-AR" sz="900">
-                <a:solidFill>
-                  <a:srgbClr val="333333"/>
-                </a:solidFill>
-                <a:latin typeface="Calibri" panose="020F0502020204030204" pitchFamily="34" charset="0"/>
-                <a:ea typeface="ＭＳ Ｐゴシック" panose="020B0600070205080204" pitchFamily="34" charset="-128"/>
-              </a:rPr>
-              <a:t>España</a:t>
-            </a:r>
-          </a:p>
-        </p:txBody>
-      </p:sp>
-      <p:sp>
-        <p:nvSpPr>
-          <p:cNvPr id="36872" name="Text Box 17"/>
-          <p:cNvSpPr txBox="1">
-            <a:spLocks noChangeArrowheads="1"/>
-          </p:cNvSpPr>
-          <p:nvPr/>
-        </p:nvSpPr>
-        <p:spPr bwMode="auto">
-          <a:xfrm>
-            <a:off x="2436813" y="3149600"/>
-            <a:ext cx="1939925" cy="1346200"/>
-          </a:xfrm>
-          <a:prstGeom prst="rect">
-            <a:avLst/>
-          </a:prstGeom>
-          <a:noFill/>
-          <a:ln>
-            <a:noFill/>
-          </a:ln>
-          <a:extLst>
-            <a:ext uri="{909E8E84-426E-40DD-AFC4-6F175D3DCCD1}">
-              <a14:hiddenFill xmlns:a14="http://schemas.microsoft.com/office/drawing/2010/main">
-                <a:solidFill>
-                  <a:srgbClr val="FFFFFF"/>
-                </a:solidFill>
-              </a14:hiddenFill>
-            </a:ext>
-            <a:ext uri="{91240B29-F687-4F45-9708-019B960494DF}">
-              <a14:hiddenLine xmlns:a14="http://schemas.microsoft.com/office/drawing/2010/main" w="12700">
-                <a:solidFill>
-                  <a:srgbClr val="000000"/>
-                </a:solidFill>
-                <a:miter lim="800000"/>
-                <a:headEnd/>
-                <a:tailEnd/>
-              </a14:hiddenLine>
-            </a:ext>
-          </a:extLst>
-        </p:spPr>
-        <p:txBody>
-          <a:bodyPr tIns="91440"/>
-          <a:lstStyle>
-            <a:lvl1pPr>
-              <a:defRPr>
-                <a:solidFill>
-                  <a:schemeClr val="tx1"/>
-                </a:solidFill>
-                <a:latin typeface="Arial" panose="020B0604020202020204" pitchFamily="34" charset="0"/>
-                <a:cs typeface="Arial" panose="020B0604020202020204" pitchFamily="34" charset="0"/>
-              </a:defRPr>
-            </a:lvl1pPr>
-            <a:lvl2pPr marL="742950" indent="-285750">
-              <a:defRPr>
-                <a:solidFill>
-                  <a:schemeClr val="tx1"/>
-                </a:solidFill>
-                <a:latin typeface="Arial" panose="020B0604020202020204" pitchFamily="34" charset="0"/>
-                <a:cs typeface="Arial" panose="020B0604020202020204" pitchFamily="34" charset="0"/>
-              </a:defRPr>
-            </a:lvl2pPr>
-            <a:lvl3pPr marL="1143000" indent="-228600">
-              <a:defRPr>
-                <a:solidFill>
-                  <a:schemeClr val="tx1"/>
-                </a:solidFill>
-                <a:latin typeface="Arial" panose="020B0604020202020204" pitchFamily="34" charset="0"/>
-                <a:cs typeface="Arial" panose="020B0604020202020204" pitchFamily="34" charset="0"/>
-              </a:defRPr>
-            </a:lvl3pPr>
-            <a:lvl4pPr marL="1600200" indent="-228600">
-              <a:defRPr>
-                <a:solidFill>
-                  <a:schemeClr val="tx1"/>
-                </a:solidFill>
-                <a:latin typeface="Arial" panose="020B0604020202020204" pitchFamily="34" charset="0"/>
-                <a:cs typeface="Arial" panose="020B0604020202020204" pitchFamily="34" charset="0"/>
-              </a:defRPr>
-            </a:lvl4pPr>
-            <a:lvl5pPr marL="2057400" indent="-228600">
-              <a:defRPr>
-                <a:solidFill>
-                  <a:schemeClr val="tx1"/>
-                </a:solidFill>
-                <a:latin typeface="Arial" panose="020B0604020202020204" pitchFamily="34" charset="0"/>
-                <a:cs typeface="Arial" panose="020B0604020202020204" pitchFamily="34" charset="0"/>
-              </a:defRPr>
-            </a:lvl5pPr>
-            <a:lvl6pPr marL="2514600" indent="-228600" eaLnBrk="0" fontAlgn="base" hangingPunct="0">
-              <a:spcBef>
-                <a:spcPct val="0"/>
-              </a:spcBef>
-              <a:spcAft>
-                <a:spcPct val="0"/>
-              </a:spcAft>
-              <a:defRPr>
-                <a:solidFill>
-                  <a:schemeClr val="tx1"/>
-                </a:solidFill>
-                <a:latin typeface="Arial" panose="020B0604020202020204" pitchFamily="34" charset="0"/>
-                <a:cs typeface="Arial" panose="020B0604020202020204" pitchFamily="34" charset="0"/>
-              </a:defRPr>
-            </a:lvl6pPr>
-            <a:lvl7pPr marL="2971800" indent="-228600" eaLnBrk="0" fontAlgn="base" hangingPunct="0">
-              <a:spcBef>
-                <a:spcPct val="0"/>
-              </a:spcBef>
-              <a:spcAft>
-                <a:spcPct val="0"/>
-              </a:spcAft>
-              <a:defRPr>
-                <a:solidFill>
-                  <a:schemeClr val="tx1"/>
-                </a:solidFill>
-                <a:latin typeface="Arial" panose="020B0604020202020204" pitchFamily="34" charset="0"/>
-                <a:cs typeface="Arial" panose="020B0604020202020204" pitchFamily="34" charset="0"/>
-              </a:defRPr>
-            </a:lvl7pPr>
-            <a:lvl8pPr marL="3429000" indent="-228600" eaLnBrk="0" fontAlgn="base" hangingPunct="0">
-              <a:spcBef>
-                <a:spcPct val="0"/>
-              </a:spcBef>
-              <a:spcAft>
-                <a:spcPct val="0"/>
-              </a:spcAft>
-              <a:defRPr>
-                <a:solidFill>
-                  <a:schemeClr val="tx1"/>
-                </a:solidFill>
-                <a:latin typeface="Arial" panose="020B0604020202020204" pitchFamily="34" charset="0"/>
-                <a:cs typeface="Arial" panose="020B0604020202020204" pitchFamily="34" charset="0"/>
-              </a:defRPr>
-            </a:lvl8pPr>
-            <a:lvl9pPr marL="3886200" indent="-228600" eaLnBrk="0" fontAlgn="base" hangingPunct="0">
-              <a:spcBef>
-                <a:spcPct val="0"/>
-              </a:spcBef>
-              <a:spcAft>
-                <a:spcPct val="0"/>
-              </a:spcAft>
-              <a:defRPr>
-                <a:solidFill>
-                  <a:schemeClr val="tx1"/>
-                </a:solidFill>
-                <a:latin typeface="Arial" panose="020B0604020202020204" pitchFamily="34" charset="0"/>
-                <a:cs typeface="Arial" panose="020B0604020202020204" pitchFamily="34" charset="0"/>
-              </a:defRPr>
-            </a:lvl9pPr>
-          </a:lstStyle>
-          <a:p>
-            <a:r>
-              <a:rPr lang="en-US" altLang="es-AR" sz="1100" b="1">
-                <a:solidFill>
-                  <a:srgbClr val="C00000"/>
-                </a:solidFill>
-                <a:latin typeface="Calibri" panose="020F0502020204030204" pitchFamily="34" charset="0"/>
-                <a:ea typeface="ＭＳ Ｐゴシック" panose="020B0600070205080204" pitchFamily="34" charset="-128"/>
-              </a:rPr>
-              <a:t>México</a:t>
-            </a:r>
-          </a:p>
-          <a:p>
-            <a:endParaRPr lang="en-US" altLang="es-AR" sz="900" b="1">
-              <a:solidFill>
-                <a:srgbClr val="333333"/>
-              </a:solidFill>
-              <a:latin typeface="Calibri" panose="020F0502020204030204" pitchFamily="34" charset="0"/>
-              <a:ea typeface="ＭＳ Ｐゴシック" panose="020B0600070205080204" pitchFamily="34" charset="-128"/>
-            </a:endParaRPr>
-          </a:p>
-          <a:p>
-            <a:r>
-              <a:rPr lang="es-AR" altLang="es-AR" sz="900">
-                <a:latin typeface="Calibri" panose="020F0502020204030204" pitchFamily="34" charset="0"/>
-                <a:ea typeface="ＭＳ Ｐゴシック" panose="020B0600070205080204" pitchFamily="34" charset="-128"/>
-              </a:rPr>
-              <a:t>Tel.: +52 (55) 5284-2842 </a:t>
-            </a:r>
-            <a:br>
-              <a:rPr lang="es-AR" altLang="es-AR" sz="900">
-                <a:latin typeface="Calibri" panose="020F0502020204030204" pitchFamily="34" charset="0"/>
-                <a:ea typeface="ＭＳ Ｐゴシック" panose="020B0600070205080204" pitchFamily="34" charset="-128"/>
-              </a:rPr>
-            </a:br>
-            <a:r>
-              <a:rPr lang="es-AR" altLang="es-AR" sz="900">
-                <a:latin typeface="Calibri" panose="020F0502020204030204" pitchFamily="34" charset="0"/>
-                <a:ea typeface="ＭＳ Ｐゴシック" panose="020B0600070205080204" pitchFamily="34" charset="-128"/>
-              </a:rPr>
-              <a:t>Fax: +52 (55) 5284-2803 </a:t>
-            </a:r>
-            <a:r>
-              <a:rPr lang="en-US" altLang="es-AR" sz="900">
-                <a:solidFill>
-                  <a:srgbClr val="333333"/>
-                </a:solidFill>
-                <a:latin typeface="Calibri" panose="020F0502020204030204" pitchFamily="34" charset="0"/>
-                <a:ea typeface="ＭＳ Ｐゴシック" panose="020B0600070205080204" pitchFamily="34" charset="-128"/>
-              </a:rPr>
-              <a:t/>
-            </a:r>
-            <a:br>
-              <a:rPr lang="en-US" altLang="es-AR" sz="900">
-                <a:solidFill>
-                  <a:srgbClr val="333333"/>
-                </a:solidFill>
-                <a:latin typeface="Calibri" panose="020F0502020204030204" pitchFamily="34" charset="0"/>
-                <a:ea typeface="ＭＳ Ｐゴシック" panose="020B0600070205080204" pitchFamily="34" charset="-128"/>
-              </a:rPr>
-            </a:br>
-            <a:r>
-              <a:rPr lang="es-AR" altLang="es-AR" sz="900">
-                <a:latin typeface="Calibri" panose="020F0502020204030204" pitchFamily="34" charset="0"/>
-              </a:rPr>
-              <a:t>Avda. Ejército Nacional 678,</a:t>
-            </a:r>
-            <a:br>
-              <a:rPr lang="es-AR" altLang="es-AR" sz="900">
-                <a:latin typeface="Calibri" panose="020F0502020204030204" pitchFamily="34" charset="0"/>
-              </a:rPr>
-            </a:br>
-            <a:r>
-              <a:rPr lang="es-AR" altLang="es-AR" sz="900">
-                <a:latin typeface="Calibri" panose="020F0502020204030204" pitchFamily="34" charset="0"/>
-              </a:rPr>
-              <a:t>Col. Polanco Reforma, </a:t>
-            </a:r>
-          </a:p>
-          <a:p>
-            <a:r>
-              <a:rPr lang="es-AR" altLang="es-AR" sz="900">
-                <a:latin typeface="Calibri" panose="020F0502020204030204" pitchFamily="34" charset="0"/>
-              </a:rPr>
-              <a:t>Distrito Federal C.P. 11550 </a:t>
-            </a:r>
-          </a:p>
-          <a:p>
-            <a:r>
-              <a:rPr lang="es-MX" altLang="es-AR" sz="900">
-                <a:solidFill>
-                  <a:srgbClr val="333333"/>
-                </a:solidFill>
-                <a:latin typeface="Calibri" panose="020F0502020204030204" pitchFamily="34" charset="0"/>
-                <a:ea typeface="ＭＳ Ｐゴシック" panose="020B0600070205080204" pitchFamily="34" charset="-128"/>
-              </a:rPr>
-              <a:t>México D.F.</a:t>
-            </a:r>
-            <a:endParaRPr lang="es-ES" altLang="es-AR" sz="900">
-              <a:solidFill>
-                <a:srgbClr val="333333"/>
-              </a:solidFill>
-              <a:latin typeface="Calibri" panose="020F0502020204030204" pitchFamily="34" charset="0"/>
-              <a:ea typeface="ＭＳ Ｐゴシック" panose="020B0600070205080204" pitchFamily="34" charset="-128"/>
-            </a:endParaRPr>
-          </a:p>
-          <a:p>
-            <a:endParaRPr lang="es-ES" altLang="es-AR" sz="900">
-              <a:solidFill>
-                <a:srgbClr val="333333"/>
-              </a:solidFill>
-              <a:latin typeface="Calibri" panose="020F0502020204030204" pitchFamily="34" charset="0"/>
-              <a:ea typeface="ＭＳ Ｐゴシック" panose="020B0600070205080204" pitchFamily="34" charset="-128"/>
-            </a:endParaRPr>
-          </a:p>
-        </p:txBody>
-      </p:sp>
-      <p:sp>
-        <p:nvSpPr>
-          <p:cNvPr id="36873" name="Text Box 17"/>
-          <p:cNvSpPr txBox="1">
-            <a:spLocks noChangeArrowheads="1"/>
-          </p:cNvSpPr>
-          <p:nvPr/>
-        </p:nvSpPr>
-        <p:spPr bwMode="auto">
-          <a:xfrm>
-            <a:off x="4217988" y="3149600"/>
-            <a:ext cx="1939925" cy="1185863"/>
-          </a:xfrm>
-          <a:prstGeom prst="rect">
-            <a:avLst/>
-          </a:prstGeom>
-          <a:noFill/>
-          <a:ln>
-            <a:noFill/>
-          </a:ln>
-          <a:extLst>
-            <a:ext uri="{909E8E84-426E-40DD-AFC4-6F175D3DCCD1}">
-              <a14:hiddenFill xmlns:a14="http://schemas.microsoft.com/office/drawing/2010/main">
-                <a:solidFill>
-                  <a:srgbClr val="FFFFFF"/>
-                </a:solidFill>
-              </a14:hiddenFill>
-            </a:ext>
-            <a:ext uri="{91240B29-F687-4F45-9708-019B960494DF}">
-              <a14:hiddenLine xmlns:a14="http://schemas.microsoft.com/office/drawing/2010/main" w="12700">
-                <a:solidFill>
-                  <a:srgbClr val="000000"/>
-                </a:solidFill>
-                <a:miter lim="800000"/>
-                <a:headEnd/>
-                <a:tailEnd/>
-              </a14:hiddenLine>
-            </a:ext>
-          </a:extLst>
-        </p:spPr>
-        <p:txBody>
-          <a:bodyPr tIns="91440"/>
-          <a:lstStyle>
-            <a:lvl1pPr>
-              <a:defRPr>
-                <a:solidFill>
-                  <a:schemeClr val="tx1"/>
-                </a:solidFill>
-                <a:latin typeface="Arial" panose="020B0604020202020204" pitchFamily="34" charset="0"/>
-                <a:cs typeface="Arial" panose="020B0604020202020204" pitchFamily="34" charset="0"/>
-              </a:defRPr>
-            </a:lvl1pPr>
-            <a:lvl2pPr marL="742950" indent="-285750">
-              <a:defRPr>
-                <a:solidFill>
-                  <a:schemeClr val="tx1"/>
-                </a:solidFill>
-                <a:latin typeface="Arial" panose="020B0604020202020204" pitchFamily="34" charset="0"/>
-                <a:cs typeface="Arial" panose="020B0604020202020204" pitchFamily="34" charset="0"/>
-              </a:defRPr>
-            </a:lvl2pPr>
-            <a:lvl3pPr marL="1143000" indent="-228600">
-              <a:defRPr>
-                <a:solidFill>
-                  <a:schemeClr val="tx1"/>
-                </a:solidFill>
-                <a:latin typeface="Arial" panose="020B0604020202020204" pitchFamily="34" charset="0"/>
-                <a:cs typeface="Arial" panose="020B0604020202020204" pitchFamily="34" charset="0"/>
-              </a:defRPr>
-            </a:lvl3pPr>
-            <a:lvl4pPr marL="1600200" indent="-228600">
-              <a:defRPr>
-                <a:solidFill>
-                  <a:schemeClr val="tx1"/>
-                </a:solidFill>
-                <a:latin typeface="Arial" panose="020B0604020202020204" pitchFamily="34" charset="0"/>
-                <a:cs typeface="Arial" panose="020B0604020202020204" pitchFamily="34" charset="0"/>
-              </a:defRPr>
-            </a:lvl4pPr>
-            <a:lvl5pPr marL="2057400" indent="-228600">
-              <a:defRPr>
-                <a:solidFill>
-                  <a:schemeClr val="tx1"/>
-                </a:solidFill>
-                <a:latin typeface="Arial" panose="020B0604020202020204" pitchFamily="34" charset="0"/>
-                <a:cs typeface="Arial" panose="020B0604020202020204" pitchFamily="34" charset="0"/>
-              </a:defRPr>
-            </a:lvl5pPr>
-            <a:lvl6pPr marL="2514600" indent="-228600" eaLnBrk="0" fontAlgn="base" hangingPunct="0">
-              <a:spcBef>
-                <a:spcPct val="0"/>
-              </a:spcBef>
-              <a:spcAft>
-                <a:spcPct val="0"/>
-              </a:spcAft>
-              <a:defRPr>
-                <a:solidFill>
-                  <a:schemeClr val="tx1"/>
-                </a:solidFill>
-                <a:latin typeface="Arial" panose="020B0604020202020204" pitchFamily="34" charset="0"/>
-                <a:cs typeface="Arial" panose="020B0604020202020204" pitchFamily="34" charset="0"/>
-              </a:defRPr>
-            </a:lvl6pPr>
-            <a:lvl7pPr marL="2971800" indent="-228600" eaLnBrk="0" fontAlgn="base" hangingPunct="0">
-              <a:spcBef>
-                <a:spcPct val="0"/>
-              </a:spcBef>
-              <a:spcAft>
-                <a:spcPct val="0"/>
-              </a:spcAft>
-              <a:defRPr>
-                <a:solidFill>
-                  <a:schemeClr val="tx1"/>
-                </a:solidFill>
-                <a:latin typeface="Arial" panose="020B0604020202020204" pitchFamily="34" charset="0"/>
-                <a:cs typeface="Arial" panose="020B0604020202020204" pitchFamily="34" charset="0"/>
-              </a:defRPr>
-            </a:lvl7pPr>
-            <a:lvl8pPr marL="3429000" indent="-228600" eaLnBrk="0" fontAlgn="base" hangingPunct="0">
-              <a:spcBef>
-                <a:spcPct val="0"/>
-              </a:spcBef>
-              <a:spcAft>
-                <a:spcPct val="0"/>
-              </a:spcAft>
-              <a:defRPr>
-                <a:solidFill>
-                  <a:schemeClr val="tx1"/>
-                </a:solidFill>
-                <a:latin typeface="Arial" panose="020B0604020202020204" pitchFamily="34" charset="0"/>
-                <a:cs typeface="Arial" panose="020B0604020202020204" pitchFamily="34" charset="0"/>
-              </a:defRPr>
-            </a:lvl8pPr>
-            <a:lvl9pPr marL="3886200" indent="-228600" eaLnBrk="0" fontAlgn="base" hangingPunct="0">
-              <a:spcBef>
-                <a:spcPct val="0"/>
-              </a:spcBef>
-              <a:spcAft>
-                <a:spcPct val="0"/>
-              </a:spcAft>
-              <a:defRPr>
-                <a:solidFill>
-                  <a:schemeClr val="tx1"/>
-                </a:solidFill>
-                <a:latin typeface="Arial" panose="020B0604020202020204" pitchFamily="34" charset="0"/>
-                <a:cs typeface="Arial" panose="020B0604020202020204" pitchFamily="34" charset="0"/>
-              </a:defRPr>
-            </a:lvl9pPr>
-          </a:lstStyle>
-          <a:p>
-            <a:r>
-              <a:rPr lang="en-US" altLang="es-AR" sz="1100" b="1">
-                <a:solidFill>
-                  <a:srgbClr val="C00000"/>
-                </a:solidFill>
-                <a:latin typeface="Calibri" panose="020F0502020204030204" pitchFamily="34" charset="0"/>
-                <a:ea typeface="ＭＳ Ｐゴシック" panose="020B0600070205080204" pitchFamily="34" charset="-128"/>
-              </a:rPr>
-              <a:t>USA</a:t>
-            </a:r>
-          </a:p>
-          <a:p>
-            <a:endParaRPr lang="en-US" altLang="es-AR" sz="900" b="1">
-              <a:solidFill>
-                <a:srgbClr val="333333"/>
-              </a:solidFill>
-              <a:latin typeface="Calibri" panose="020F0502020204030204" pitchFamily="34" charset="0"/>
-              <a:ea typeface="ＭＳ Ｐゴシック" panose="020B0600070205080204" pitchFamily="34" charset="-128"/>
-            </a:endParaRPr>
-          </a:p>
-          <a:p>
-            <a:r>
-              <a:rPr lang="en-US" altLang="es-AR" sz="900">
-                <a:solidFill>
-                  <a:srgbClr val="333333"/>
-                </a:solidFill>
-                <a:latin typeface="Calibri" panose="020F0502020204030204" pitchFamily="34" charset="0"/>
-                <a:ea typeface="ＭＳ Ｐゴシック" panose="020B0600070205080204" pitchFamily="34" charset="-128"/>
-              </a:rPr>
-              <a:t>Tel</a:t>
-            </a:r>
-            <a:r>
-              <a:rPr lang="es-AR" altLang="es-AR" sz="900">
-                <a:latin typeface="Calibri" panose="020F0502020204030204" pitchFamily="34" charset="0"/>
-              </a:rPr>
-              <a:t>  +1 (617) 275-2420</a:t>
-            </a:r>
-            <a:r>
-              <a:rPr lang="en-US" altLang="es-AR" sz="900">
-                <a:solidFill>
-                  <a:srgbClr val="333333"/>
-                </a:solidFill>
-                <a:latin typeface="Calibri" panose="020F0502020204030204" pitchFamily="34" charset="0"/>
-                <a:ea typeface="ＭＳ Ｐゴシック" panose="020B0600070205080204" pitchFamily="34" charset="-128"/>
-              </a:rPr>
-              <a:t/>
-            </a:r>
-            <a:br>
-              <a:rPr lang="en-US" altLang="es-AR" sz="900">
-                <a:solidFill>
-                  <a:srgbClr val="333333"/>
-                </a:solidFill>
-                <a:latin typeface="Calibri" panose="020F0502020204030204" pitchFamily="34" charset="0"/>
-                <a:ea typeface="ＭＳ Ｐゴシック" panose="020B0600070205080204" pitchFamily="34" charset="-128"/>
-              </a:rPr>
-            </a:br>
-            <a:r>
-              <a:rPr lang="en-US" altLang="es-AR" sz="900">
-                <a:latin typeface="Calibri" panose="020F0502020204030204" pitchFamily="34" charset="0"/>
-              </a:rPr>
-              <a:t>1 Broadway 14th floor</a:t>
-            </a:r>
-            <a:br>
-              <a:rPr lang="en-US" altLang="es-AR" sz="900">
-                <a:latin typeface="Calibri" panose="020F0502020204030204" pitchFamily="34" charset="0"/>
-              </a:rPr>
-            </a:br>
-            <a:r>
-              <a:rPr lang="en-US" altLang="es-AR" sz="900">
-                <a:latin typeface="Calibri" panose="020F0502020204030204" pitchFamily="34" charset="0"/>
-              </a:rPr>
-              <a:t>Cambridge, MA 02142</a:t>
-            </a:r>
-          </a:p>
-          <a:p>
-            <a:r>
-              <a:rPr lang="es-AR" altLang="es-AR" sz="900">
-                <a:latin typeface="Calibri" panose="020F0502020204030204" pitchFamily="34" charset="0"/>
-              </a:rPr>
-              <a:t>EE.UU</a:t>
-            </a:r>
-            <a:endParaRPr lang="es-ES" altLang="es-AR" sz="900">
-              <a:solidFill>
-                <a:srgbClr val="333333"/>
-              </a:solidFill>
-              <a:latin typeface="Calibri" panose="020F0502020204030204" pitchFamily="34" charset="0"/>
-              <a:ea typeface="ＭＳ Ｐゴシック" panose="020B0600070205080204" pitchFamily="34" charset="-128"/>
-            </a:endParaRPr>
-          </a:p>
-          <a:p>
-            <a:endParaRPr lang="es-ES" altLang="es-AR" sz="900">
-              <a:solidFill>
-                <a:srgbClr val="333333"/>
-              </a:solidFill>
-              <a:latin typeface="Calibri" panose="020F0502020204030204" pitchFamily="34" charset="0"/>
-              <a:ea typeface="ＭＳ Ｐゴシック" panose="020B0600070205080204" pitchFamily="34" charset="-128"/>
-            </a:endParaRPr>
-          </a:p>
-        </p:txBody>
-      </p:sp>
-      <p:sp>
-        <p:nvSpPr>
-          <p:cNvPr id="36874" name="Text Box 15"/>
-          <p:cNvSpPr txBox="1">
-            <a:spLocks noChangeArrowheads="1"/>
-          </p:cNvSpPr>
-          <p:nvPr/>
-        </p:nvSpPr>
-        <p:spPr bwMode="auto">
-          <a:xfrm>
-            <a:off x="828675" y="4508500"/>
-            <a:ext cx="1649413" cy="1185863"/>
-          </a:xfrm>
-          <a:prstGeom prst="rect">
-            <a:avLst/>
-          </a:prstGeom>
-          <a:noFill/>
-          <a:ln>
-            <a:noFill/>
-          </a:ln>
-          <a:extLst>
-            <a:ext uri="{909E8E84-426E-40DD-AFC4-6F175D3DCCD1}">
-              <a14:hiddenFill xmlns:a14="http://schemas.microsoft.com/office/drawing/2010/main">
-                <a:solidFill>
-                  <a:srgbClr val="FFFFFF"/>
-                </a:solidFill>
-              </a14:hiddenFill>
-            </a:ext>
-            <a:ext uri="{91240B29-F687-4F45-9708-019B960494DF}">
-              <a14:hiddenLine xmlns:a14="http://schemas.microsoft.com/office/drawing/2010/main" w="12700">
-                <a:solidFill>
-                  <a:srgbClr val="000000"/>
-                </a:solidFill>
-                <a:miter lim="800000"/>
-                <a:headEnd/>
-                <a:tailEnd/>
-              </a14:hiddenLine>
-            </a:ext>
-          </a:extLst>
-        </p:spPr>
-        <p:txBody>
-          <a:bodyPr tIns="91440"/>
-          <a:lstStyle>
-            <a:lvl1pPr>
-              <a:defRPr>
-                <a:solidFill>
-                  <a:schemeClr val="tx1"/>
-                </a:solidFill>
-                <a:latin typeface="Arial" panose="020B0604020202020204" pitchFamily="34" charset="0"/>
-                <a:cs typeface="Arial" panose="020B0604020202020204" pitchFamily="34" charset="0"/>
-              </a:defRPr>
-            </a:lvl1pPr>
-            <a:lvl2pPr marL="742950" indent="-285750">
-              <a:defRPr>
-                <a:solidFill>
-                  <a:schemeClr val="tx1"/>
-                </a:solidFill>
-                <a:latin typeface="Arial" panose="020B0604020202020204" pitchFamily="34" charset="0"/>
-                <a:cs typeface="Arial" panose="020B0604020202020204" pitchFamily="34" charset="0"/>
-              </a:defRPr>
-            </a:lvl2pPr>
-            <a:lvl3pPr marL="1143000" indent="-228600">
-              <a:defRPr>
-                <a:solidFill>
-                  <a:schemeClr val="tx1"/>
-                </a:solidFill>
-                <a:latin typeface="Arial" panose="020B0604020202020204" pitchFamily="34" charset="0"/>
-                <a:cs typeface="Arial" panose="020B0604020202020204" pitchFamily="34" charset="0"/>
-              </a:defRPr>
-            </a:lvl3pPr>
-            <a:lvl4pPr marL="1600200" indent="-228600">
-              <a:defRPr>
-                <a:solidFill>
-                  <a:schemeClr val="tx1"/>
-                </a:solidFill>
-                <a:latin typeface="Arial" panose="020B0604020202020204" pitchFamily="34" charset="0"/>
-                <a:cs typeface="Arial" panose="020B0604020202020204" pitchFamily="34" charset="0"/>
-              </a:defRPr>
-            </a:lvl4pPr>
-            <a:lvl5pPr marL="2057400" indent="-228600">
-              <a:defRPr>
-                <a:solidFill>
-                  <a:schemeClr val="tx1"/>
-                </a:solidFill>
-                <a:latin typeface="Arial" panose="020B0604020202020204" pitchFamily="34" charset="0"/>
-                <a:cs typeface="Arial" panose="020B0604020202020204" pitchFamily="34" charset="0"/>
-              </a:defRPr>
-            </a:lvl5pPr>
-            <a:lvl6pPr marL="2514600" indent="-228600" eaLnBrk="0" fontAlgn="base" hangingPunct="0">
-              <a:spcBef>
-                <a:spcPct val="0"/>
-              </a:spcBef>
-              <a:spcAft>
-                <a:spcPct val="0"/>
-              </a:spcAft>
-              <a:defRPr>
-                <a:solidFill>
-                  <a:schemeClr val="tx1"/>
-                </a:solidFill>
-                <a:latin typeface="Arial" panose="020B0604020202020204" pitchFamily="34" charset="0"/>
-                <a:cs typeface="Arial" panose="020B0604020202020204" pitchFamily="34" charset="0"/>
-              </a:defRPr>
-            </a:lvl6pPr>
-            <a:lvl7pPr marL="2971800" indent="-228600" eaLnBrk="0" fontAlgn="base" hangingPunct="0">
-              <a:spcBef>
-                <a:spcPct val="0"/>
-              </a:spcBef>
-              <a:spcAft>
-                <a:spcPct val="0"/>
-              </a:spcAft>
-              <a:defRPr>
-                <a:solidFill>
-                  <a:schemeClr val="tx1"/>
-                </a:solidFill>
-                <a:latin typeface="Arial" panose="020B0604020202020204" pitchFamily="34" charset="0"/>
-                <a:cs typeface="Arial" panose="020B0604020202020204" pitchFamily="34" charset="0"/>
-              </a:defRPr>
-            </a:lvl7pPr>
-            <a:lvl8pPr marL="3429000" indent="-228600" eaLnBrk="0" fontAlgn="base" hangingPunct="0">
-              <a:spcBef>
-                <a:spcPct val="0"/>
-              </a:spcBef>
-              <a:spcAft>
-                <a:spcPct val="0"/>
-              </a:spcAft>
-              <a:defRPr>
-                <a:solidFill>
-                  <a:schemeClr val="tx1"/>
-                </a:solidFill>
-                <a:latin typeface="Arial" panose="020B0604020202020204" pitchFamily="34" charset="0"/>
-                <a:cs typeface="Arial" panose="020B0604020202020204" pitchFamily="34" charset="0"/>
-              </a:defRPr>
-            </a:lvl8pPr>
-            <a:lvl9pPr marL="3886200" indent="-228600" eaLnBrk="0" fontAlgn="base" hangingPunct="0">
-              <a:spcBef>
-                <a:spcPct val="0"/>
-              </a:spcBef>
-              <a:spcAft>
-                <a:spcPct val="0"/>
-              </a:spcAft>
-              <a:defRPr>
-                <a:solidFill>
-                  <a:schemeClr val="tx1"/>
-                </a:solidFill>
-                <a:latin typeface="Arial" panose="020B0604020202020204" pitchFamily="34" charset="0"/>
-                <a:cs typeface="Arial" panose="020B0604020202020204" pitchFamily="34" charset="0"/>
-              </a:defRPr>
-            </a:lvl9pPr>
-          </a:lstStyle>
-          <a:p>
-            <a:r>
-              <a:rPr lang="en-US" altLang="es-AR" sz="1100" b="1">
-                <a:solidFill>
-                  <a:srgbClr val="C00000"/>
-                </a:solidFill>
-                <a:latin typeface="Calibri" panose="020F0502020204030204" pitchFamily="34" charset="0"/>
-                <a:ea typeface="ＭＳ Ｐゴシック" panose="020B0600070205080204" pitchFamily="34" charset="-128"/>
-              </a:rPr>
-              <a:t>Santa Fe</a:t>
-            </a:r>
-          </a:p>
-          <a:p>
-            <a:endParaRPr lang="en-US" altLang="es-AR" sz="900">
-              <a:solidFill>
-                <a:srgbClr val="333333"/>
-              </a:solidFill>
-              <a:latin typeface="Calibri" panose="020F0502020204030204" pitchFamily="34" charset="0"/>
-              <a:ea typeface="ＭＳ Ｐゴシック" panose="020B0600070205080204" pitchFamily="34" charset="-128"/>
-            </a:endParaRPr>
-          </a:p>
-          <a:p>
-            <a:r>
-              <a:rPr lang="en-US" altLang="es-AR" sz="900">
-                <a:solidFill>
-                  <a:srgbClr val="333333"/>
-                </a:solidFill>
-                <a:latin typeface="Calibri" panose="020F0502020204030204" pitchFamily="34" charset="0"/>
-                <a:ea typeface="ＭＳ Ｐゴシック" panose="020B0600070205080204" pitchFamily="34" charset="-128"/>
-              </a:rPr>
-              <a:t>Tel.: +54 (342) 412-0368</a:t>
-            </a:r>
-          </a:p>
-          <a:p>
-            <a:r>
-              <a:rPr lang="es-ES" altLang="es-AR" sz="900">
-                <a:solidFill>
-                  <a:srgbClr val="333333"/>
-                </a:solidFill>
-                <a:latin typeface="Calibri" panose="020F0502020204030204" pitchFamily="34" charset="0"/>
-                <a:ea typeface="ＭＳ Ｐゴシック" panose="020B0600070205080204" pitchFamily="34" charset="-128"/>
-              </a:rPr>
-              <a:t>San Jerónimo 1838</a:t>
-            </a:r>
-          </a:p>
-          <a:p>
-            <a:r>
-              <a:rPr lang="es-ES" altLang="es-AR" sz="900">
-                <a:solidFill>
-                  <a:srgbClr val="333333"/>
-                </a:solidFill>
-                <a:latin typeface="Calibri" panose="020F0502020204030204" pitchFamily="34" charset="0"/>
-                <a:ea typeface="ＭＳ Ｐゴシック" panose="020B0600070205080204" pitchFamily="34" charset="-128"/>
-              </a:rPr>
-              <a:t>S3000FPP, Santa Fe</a:t>
-            </a:r>
-          </a:p>
-          <a:p>
-            <a:r>
-              <a:rPr lang="es-ES" altLang="es-AR" sz="900">
-                <a:solidFill>
-                  <a:srgbClr val="333333"/>
-                </a:solidFill>
-                <a:latin typeface="Calibri" panose="020F0502020204030204" pitchFamily="34" charset="0"/>
-                <a:ea typeface="ＭＳ Ｐゴシック" panose="020B0600070205080204" pitchFamily="34" charset="-128"/>
-              </a:rPr>
-              <a:t>Argentina</a:t>
-            </a:r>
-          </a:p>
-        </p:txBody>
-      </p:sp>
-      <p:sp>
-        <p:nvSpPr>
-          <p:cNvPr id="36875" name="1 Título"/>
-          <p:cNvSpPr txBox="1">
-            <a:spLocks/>
-          </p:cNvSpPr>
-          <p:nvPr/>
-        </p:nvSpPr>
-        <p:spPr bwMode="auto">
+        <p:spPr>
           <a:xfrm>
             <a:off x="755650" y="0"/>
             <a:ext cx="7931150" cy="836613"/>
           </a:xfrm>
-          <a:prstGeom prst="rect">
-            <a:avLst/>
-          </a:prstGeom>
-          <a:noFill/>
-          <a:ln>
-            <a:noFill/>
-          </a:ln>
-          <a:extLst>
-            <a:ext uri="{909E8E84-426E-40DD-AFC4-6F175D3DCCD1}">
-              <a14:hiddenFill xmlns:a14="http://schemas.microsoft.com/office/drawing/2010/main">
-                <a:solidFill>
-                  <a:srgbClr val="FFFFFF"/>
-                </a:solidFill>
-              </a14:hiddenFill>
-            </a:ext>
-            <a:ext uri="{91240B29-F687-4F45-9708-019B960494DF}">
-              <a14:hiddenLine xmlns:a14="http://schemas.microsoft.com/office/drawing/2010/main" w="9525">
-                <a:solidFill>
-                  <a:srgbClr val="000000"/>
-                </a:solidFill>
-                <a:miter lim="800000"/>
-                <a:headEnd/>
-                <a:tailEnd/>
-              </a14:hiddenLine>
-            </a:ext>
-          </a:extLst>
         </p:spPr>
         <p:txBody>
-          <a:bodyPr anchor="b"/>
-          <a:lstStyle>
-            <a:lvl1pPr>
-              <a:defRPr>
-                <a:solidFill>
-                  <a:schemeClr val="tx1"/>
-                </a:solidFill>
-                <a:latin typeface="Arial" panose="020B0604020202020204" pitchFamily="34" charset="0"/>
-                <a:cs typeface="Arial" panose="020B0604020202020204" pitchFamily="34" charset="0"/>
-              </a:defRPr>
-            </a:lvl1pPr>
-            <a:lvl2pPr marL="742950" indent="-285750">
-              <a:defRPr>
-                <a:solidFill>
-                  <a:schemeClr val="tx1"/>
-                </a:solidFill>
-                <a:latin typeface="Arial" panose="020B0604020202020204" pitchFamily="34" charset="0"/>
-                <a:cs typeface="Arial" panose="020B0604020202020204" pitchFamily="34" charset="0"/>
-              </a:defRPr>
-            </a:lvl2pPr>
-            <a:lvl3pPr marL="1143000" indent="-228600">
-              <a:defRPr>
-                <a:solidFill>
-                  <a:schemeClr val="tx1"/>
-                </a:solidFill>
-                <a:latin typeface="Arial" panose="020B0604020202020204" pitchFamily="34" charset="0"/>
-                <a:cs typeface="Arial" panose="020B0604020202020204" pitchFamily="34" charset="0"/>
-              </a:defRPr>
-            </a:lvl3pPr>
-            <a:lvl4pPr marL="1600200" indent="-228600">
-              <a:defRPr>
-                <a:solidFill>
-                  <a:schemeClr val="tx1"/>
-                </a:solidFill>
-                <a:latin typeface="Arial" panose="020B0604020202020204" pitchFamily="34" charset="0"/>
-                <a:cs typeface="Arial" panose="020B0604020202020204" pitchFamily="34" charset="0"/>
-              </a:defRPr>
-            </a:lvl4pPr>
-            <a:lvl5pPr marL="2057400" indent="-228600">
-              <a:defRPr>
-                <a:solidFill>
-                  <a:schemeClr val="tx1"/>
-                </a:solidFill>
-                <a:latin typeface="Arial" panose="020B0604020202020204" pitchFamily="34" charset="0"/>
-                <a:cs typeface="Arial" panose="020B0604020202020204" pitchFamily="34" charset="0"/>
-              </a:defRPr>
-            </a:lvl5pPr>
-            <a:lvl6pPr marL="2514600" indent="-228600" eaLnBrk="0" fontAlgn="base" hangingPunct="0">
-              <a:spcBef>
-                <a:spcPct val="0"/>
-              </a:spcBef>
-              <a:spcAft>
-                <a:spcPct val="0"/>
-              </a:spcAft>
-              <a:defRPr>
-                <a:solidFill>
-                  <a:schemeClr val="tx1"/>
-                </a:solidFill>
-                <a:latin typeface="Arial" panose="020B0604020202020204" pitchFamily="34" charset="0"/>
-                <a:cs typeface="Arial" panose="020B0604020202020204" pitchFamily="34" charset="0"/>
-              </a:defRPr>
-            </a:lvl6pPr>
-            <a:lvl7pPr marL="2971800" indent="-228600" eaLnBrk="0" fontAlgn="base" hangingPunct="0">
-              <a:spcBef>
-                <a:spcPct val="0"/>
-              </a:spcBef>
-              <a:spcAft>
-                <a:spcPct val="0"/>
-              </a:spcAft>
-              <a:defRPr>
-                <a:solidFill>
-                  <a:schemeClr val="tx1"/>
-                </a:solidFill>
-                <a:latin typeface="Arial" panose="020B0604020202020204" pitchFamily="34" charset="0"/>
-                <a:cs typeface="Arial" panose="020B0604020202020204" pitchFamily="34" charset="0"/>
-              </a:defRPr>
-            </a:lvl7pPr>
-            <a:lvl8pPr marL="3429000" indent="-228600" eaLnBrk="0" fontAlgn="base" hangingPunct="0">
-              <a:spcBef>
-                <a:spcPct val="0"/>
-              </a:spcBef>
-              <a:spcAft>
-                <a:spcPct val="0"/>
-              </a:spcAft>
-              <a:defRPr>
-                <a:solidFill>
-                  <a:schemeClr val="tx1"/>
-                </a:solidFill>
-                <a:latin typeface="Arial" panose="020B0604020202020204" pitchFamily="34" charset="0"/>
-                <a:cs typeface="Arial" panose="020B0604020202020204" pitchFamily="34" charset="0"/>
-              </a:defRPr>
-            </a:lvl8pPr>
-            <a:lvl9pPr marL="3886200" indent="-228600" eaLnBrk="0" fontAlgn="base" hangingPunct="0">
-              <a:spcBef>
-                <a:spcPct val="0"/>
-              </a:spcBef>
-              <a:spcAft>
-                <a:spcPct val="0"/>
-              </a:spcAft>
-              <a:defRPr>
-                <a:solidFill>
-                  <a:schemeClr val="tx1"/>
-                </a:solidFill>
-                <a:latin typeface="Arial" panose="020B0604020202020204" pitchFamily="34" charset="0"/>
-                <a:cs typeface="Arial" panose="020B0604020202020204" pitchFamily="34" charset="0"/>
-              </a:defRPr>
-            </a:lvl9pPr>
-          </a:lstStyle>
-          <a:p>
-            <a:pPr eaLnBrk="1" hangingPunct="1"/>
-            <a:r>
-              <a:rPr lang="es-AR" altLang="es-AR" sz="3200" b="1">
-                <a:latin typeface="Calibri" panose="020F0502020204030204" pitchFamily="34" charset="0"/>
-              </a:rPr>
-              <a:t>¡Muchas Gracias!</a:t>
-            </a:r>
+          <a:bodyPr>
+            <a:noAutofit/>
+          </a:bodyPr>
+          <a:lstStyle/>
+          <a:p>
+            <a:pPr lvl="0"/>
+            <a:r>
+              <a:rPr lang="en-US" sz="2800" dirty="0"/>
+              <a:t>Tip 5: Mock dependencies</a:t>
+            </a:r>
+            <a:endParaRPr lang="es-AR" sz="2800" dirty="0"/>
           </a:p>
         </p:txBody>
       </p:sp>
     </p:spTree>
+    <p:extLst>
+      <p:ext uri="{BB962C8B-B14F-4D97-AF65-F5344CB8AC3E}">
+        <p14:creationId xmlns:p14="http://schemas.microsoft.com/office/powerpoint/2010/main" val="603481000"/>
+      </p:ext>
+    </p:extLst>
   </p:cSld>
   <p:clrMapOvr>
     <a:masterClrMapping/>

</xml_diff>

<commit_message>
PPT Tips 2 y 7 + Codigo Tip 7
</commit_message>
<xml_diff>
--- a/Test-Oriented Development.pptx
+++ b/Test-Oriented Development.pptx
@@ -5,10 +5,10 @@
     <p:sldMasterId id="2147483648" r:id="rId1"/>
   </p:sldMasterIdLst>
   <p:notesMasterIdLst>
-    <p:notesMasterId r:id="rId13"/>
+    <p:notesMasterId r:id="rId28"/>
   </p:notesMasterIdLst>
   <p:handoutMasterIdLst>
-    <p:handoutMasterId r:id="rId14"/>
+    <p:handoutMasterId r:id="rId29"/>
   </p:handoutMasterIdLst>
   <p:sldIdLst>
     <p:sldId id="276" r:id="rId2"/>
@@ -21,7 +21,22 @@
     <p:sldId id="434" r:id="rId9"/>
     <p:sldId id="435" r:id="rId10"/>
     <p:sldId id="433" r:id="rId11"/>
-    <p:sldId id="428" r:id="rId12"/>
+    <p:sldId id="436" r:id="rId12"/>
+    <p:sldId id="437" r:id="rId13"/>
+    <p:sldId id="438" r:id="rId14"/>
+    <p:sldId id="439" r:id="rId15"/>
+    <p:sldId id="441" r:id="rId16"/>
+    <p:sldId id="442" r:id="rId17"/>
+    <p:sldId id="443" r:id="rId18"/>
+    <p:sldId id="444" r:id="rId19"/>
+    <p:sldId id="445" r:id="rId20"/>
+    <p:sldId id="446" r:id="rId21"/>
+    <p:sldId id="447" r:id="rId22"/>
+    <p:sldId id="440" r:id="rId23"/>
+    <p:sldId id="448" r:id="rId24"/>
+    <p:sldId id="449" r:id="rId25"/>
+    <p:sldId id="450" r:id="rId26"/>
+    <p:sldId id="428" r:id="rId27"/>
   </p:sldIdLst>
   <p:sldSz cx="9144000" cy="6858000" type="screen4x3"/>
   <p:notesSz cx="7099300" cy="10234613"/>
@@ -305,7 +320,7 @@
               <a:pPr>
                 <a:defRPr/>
               </a:pPr>
-              <a:t>18/11/2014</a:t>
+              <a:t>20/01/2015</a:t>
             </a:fld>
             <a:endParaRPr lang="es-AR"/>
           </a:p>
@@ -524,7 +539,7 @@
               <a:pPr>
                 <a:defRPr/>
               </a:pPr>
-              <a:t>18/11/2014</a:t>
+              <a:t>20/01/2015</a:t>
             </a:fld>
             <a:endParaRPr lang="es-AR"/>
           </a:p>
@@ -1228,7 +1243,7 @@
               <a:pPr>
                 <a:defRPr/>
               </a:pPr>
-              <a:t>18/11/2014</a:t>
+              <a:t>20/01/2015</a:t>
             </a:fld>
             <a:endParaRPr lang="es-AR"/>
           </a:p>
@@ -1507,7 +1522,7 @@
               <a:pPr>
                 <a:defRPr/>
               </a:pPr>
-              <a:t>18/11/2014</a:t>
+              <a:t>20/01/2015</a:t>
             </a:fld>
             <a:endParaRPr lang="es-AR"/>
           </a:p>
@@ -1887,7 +1902,7 @@
               <a:pPr>
                 <a:defRPr/>
               </a:pPr>
-              <a:t>18/11/2014</a:t>
+              <a:t>20/01/2015</a:t>
             </a:fld>
             <a:endParaRPr lang="es-AR"/>
           </a:p>
@@ -2474,7 +2489,7 @@
               <a:pPr>
                 <a:defRPr/>
               </a:pPr>
-              <a:t>18/11/2014</a:t>
+              <a:t>20/01/2015</a:t>
             </a:fld>
             <a:endParaRPr lang="es-AR"/>
           </a:p>
@@ -2664,7 +2679,7 @@
               <a:pPr>
                 <a:defRPr/>
               </a:pPr>
-              <a:t>18/11/2014</a:t>
+              <a:t>20/01/2015</a:t>
             </a:fld>
             <a:endParaRPr lang="es-AR"/>
           </a:p>
@@ -2786,7 +2801,7 @@
               <a:pPr>
                 <a:defRPr/>
               </a:pPr>
-              <a:t>18/11/2014</a:t>
+              <a:t>20/01/2015</a:t>
             </a:fld>
             <a:endParaRPr lang="es-AR"/>
           </a:p>
@@ -3168,7 +3183,7 @@
               <a:pPr>
                 <a:defRPr/>
               </a:pPr>
-              <a:t>18/11/2014</a:t>
+              <a:t>20/01/2015</a:t>
             </a:fld>
             <a:endParaRPr lang="es-AR"/>
           </a:p>
@@ -3980,19 +3995,25 @@
               <a:rPr lang="es-AR" dirty="0" smtClean="0">
                 <a:latin typeface="+mn-lt"/>
               </a:rPr>
-              <a:t>Charla UT + CI (nombre </a:t>
+              <a:t>Test-</a:t>
             </a:r>
             <a:r>
               <a:rPr lang="es-AR" dirty="0" err="1" smtClean="0">
                 <a:latin typeface="+mn-lt"/>
               </a:rPr>
-              <a:t>pending</a:t>
+              <a:t>Oriented</a:t>
             </a:r>
             <a:r>
               <a:rPr lang="es-AR" dirty="0" smtClean="0">
                 <a:latin typeface="+mn-lt"/>
               </a:rPr>
-              <a:t>)</a:t>
+              <a:t> </a:t>
+            </a:r>
+            <a:r>
+              <a:rPr lang="es-AR" dirty="0" err="1" smtClean="0">
+                <a:latin typeface="+mn-lt"/>
+              </a:rPr>
+              <a:t>Development</a:t>
             </a:r>
             <a:endParaRPr lang="es-AR" dirty="0">
               <a:latin typeface="+mn-lt"/>
@@ -4336,6 +4357,1991 @@
       </p:grpSpPr>
       <p:sp>
         <p:nvSpPr>
+          <p:cNvPr id="12290" name="Content Placeholder 2"/>
+          <p:cNvSpPr>
+            <a:spLocks noGrp="1"/>
+          </p:cNvSpPr>
+          <p:nvPr>
+            <p:ph sz="half" idx="2"/>
+          </p:nvPr>
+        </p:nvSpPr>
+        <p:spPr>
+          <a:xfrm>
+            <a:off x="755650" y="1130300"/>
+            <a:ext cx="8064500" cy="4891088"/>
+          </a:xfrm>
+        </p:spPr>
+        <p:txBody>
+          <a:bodyPr/>
+          <a:lstStyle/>
+          <a:p>
+            <a:pPr marL="0" lvl="1" indent="0" eaLnBrk="1" hangingPunct="1">
+              <a:spcBef>
+                <a:spcPts val="1200"/>
+              </a:spcBef>
+              <a:buFont typeface="Wingdings" panose="05000000000000000000" pitchFamily="2" charset="2"/>
+              <a:buChar char="§"/>
+            </a:pPr>
+            <a:r>
+              <a:rPr lang="en-GB" sz="2000" dirty="0">
+                <a:latin typeface="+mj-lt"/>
+              </a:rPr>
+              <a:t> </a:t>
+            </a:r>
+            <a:r>
+              <a:rPr lang="en-GB" sz="2000" dirty="0" smtClean="0">
+                <a:latin typeface="+mj-lt"/>
+              </a:rPr>
+              <a:t>Avoids coupling your code directly to third-party libraries</a:t>
+            </a:r>
+          </a:p>
+          <a:p>
+            <a:pPr marL="0" lvl="1" indent="0" eaLnBrk="1" hangingPunct="1">
+              <a:spcBef>
+                <a:spcPts val="1200"/>
+              </a:spcBef>
+              <a:buFont typeface="Wingdings" panose="05000000000000000000" pitchFamily="2" charset="2"/>
+              <a:buChar char="§"/>
+            </a:pPr>
+            <a:r>
+              <a:rPr lang="en-GB" sz="2000" i="1" dirty="0">
+                <a:latin typeface="+mj-lt"/>
+              </a:rPr>
+              <a:t> </a:t>
+            </a:r>
+            <a:r>
+              <a:rPr lang="en-GB" sz="2000" dirty="0" smtClean="0">
+                <a:latin typeface="+mj-lt"/>
+              </a:rPr>
+              <a:t>You can change the third-party library without changing your code</a:t>
+            </a:r>
+          </a:p>
+          <a:p>
+            <a:pPr marL="0" lvl="1" indent="0" eaLnBrk="1" hangingPunct="1">
+              <a:spcBef>
+                <a:spcPts val="1200"/>
+              </a:spcBef>
+              <a:buFont typeface="Wingdings" panose="05000000000000000000" pitchFamily="2" charset="2"/>
+              <a:buChar char="§"/>
+            </a:pPr>
+            <a:r>
+              <a:rPr lang="en-GB" sz="2000" dirty="0">
+                <a:latin typeface="+mj-lt"/>
+              </a:rPr>
+              <a:t> </a:t>
+            </a:r>
+            <a:r>
+              <a:rPr lang="en-GB" sz="2000" dirty="0" smtClean="0">
+                <a:latin typeface="+mj-lt"/>
+              </a:rPr>
+              <a:t>Allows mocking of </a:t>
+            </a:r>
+            <a:r>
+              <a:rPr lang="en-GB" sz="2000" b="1" dirty="0" smtClean="0">
+                <a:latin typeface="+mj-lt"/>
+              </a:rPr>
+              <a:t>static</a:t>
+            </a:r>
+            <a:r>
+              <a:rPr lang="en-GB" sz="2000" dirty="0" smtClean="0">
+                <a:latin typeface="+mj-lt"/>
+              </a:rPr>
+              <a:t> third-party dependencies</a:t>
+            </a:r>
+          </a:p>
+          <a:p>
+            <a:pPr marL="0" lvl="1" indent="0" eaLnBrk="1" hangingPunct="1">
+              <a:spcBef>
+                <a:spcPts val="1200"/>
+              </a:spcBef>
+              <a:buFont typeface="Wingdings" panose="05000000000000000000" pitchFamily="2" charset="2"/>
+              <a:buChar char="§"/>
+            </a:pPr>
+            <a:r>
+              <a:rPr lang="en-GB" sz="2000" dirty="0">
+                <a:latin typeface="+mj-lt"/>
+              </a:rPr>
+              <a:t> </a:t>
+            </a:r>
+            <a:r>
+              <a:rPr lang="en-GB" sz="2000" dirty="0" smtClean="0">
+                <a:latin typeface="+mj-lt"/>
+              </a:rPr>
+              <a:t>Do not </a:t>
+            </a:r>
+            <a:r>
+              <a:rPr lang="en-GB" sz="2000" b="1" dirty="0" smtClean="0">
+                <a:latin typeface="+mj-lt"/>
+              </a:rPr>
+              <a:t>always</a:t>
+            </a:r>
+            <a:r>
+              <a:rPr lang="en-GB" sz="2000" dirty="0" smtClean="0">
+                <a:latin typeface="+mj-lt"/>
+              </a:rPr>
+              <a:t> use wrappers for third-party dependencies</a:t>
+            </a:r>
+            <a:endParaRPr lang="en-GB" dirty="0">
+              <a:latin typeface="+mj-lt"/>
+            </a:endParaRPr>
+          </a:p>
+        </p:txBody>
+      </p:sp>
+      <p:sp>
+        <p:nvSpPr>
+          <p:cNvPr id="6" name="Title 5"/>
+          <p:cNvSpPr>
+            <a:spLocks noGrp="1"/>
+          </p:cNvSpPr>
+          <p:nvPr>
+            <p:ph type="title"/>
+          </p:nvPr>
+        </p:nvSpPr>
+        <p:spPr>
+          <a:xfrm>
+            <a:off x="755650" y="0"/>
+            <a:ext cx="7931150" cy="836613"/>
+          </a:xfrm>
+        </p:spPr>
+        <p:txBody>
+          <a:bodyPr>
+            <a:noAutofit/>
+          </a:bodyPr>
+          <a:lstStyle/>
+          <a:p>
+            <a:r>
+              <a:rPr lang="en-US" sz="2400" dirty="0"/>
+              <a:t>Tip 7: Use wrappers to encapsulate static </a:t>
+            </a:r>
+            <a:r>
+              <a:rPr lang="en-US" sz="2400" dirty="0" smtClean="0"/>
+              <a:t>dependencies</a:t>
+            </a:r>
+            <a:endParaRPr lang="es-AR" sz="2400" dirty="0"/>
+          </a:p>
+        </p:txBody>
+      </p:sp>
+    </p:spTree>
+    <p:extLst>
+      <p:ext uri="{BB962C8B-B14F-4D97-AF65-F5344CB8AC3E}">
+        <p14:creationId xmlns:p14="http://schemas.microsoft.com/office/powerpoint/2010/main" val="1904475055"/>
+      </p:ext>
+    </p:extLst>
+  </p:cSld>
+  <p:clrMapOvr>
+    <a:masterClrMapping/>
+  </p:clrMapOvr>
+  <p:timing>
+    <p:tnLst>
+      <p:par>
+        <p:cTn id="1" dur="indefinite" restart="never" nodeType="tmRoot"/>
+      </p:par>
+    </p:tnLst>
+  </p:timing>
+</p:sld>
+</file>
+
+<file path=ppt/slides/slide12.xml><?xml version="1.0" encoding="utf-8"?>
+<p:sld xmlns:a="http://schemas.openxmlformats.org/drawingml/2006/main" xmlns:r="http://schemas.openxmlformats.org/officeDocument/2006/relationships" xmlns:p="http://schemas.openxmlformats.org/presentationml/2006/main">
+  <p:cSld>
+    <p:spTree>
+      <p:nvGrpSpPr>
+        <p:cNvPr id="1" name=""/>
+        <p:cNvGrpSpPr/>
+        <p:nvPr/>
+      </p:nvGrpSpPr>
+      <p:grpSpPr>
+        <a:xfrm>
+          <a:off x="0" y="0"/>
+          <a:ext cx="0" cy="0"/>
+          <a:chOff x="0" y="0"/>
+          <a:chExt cx="0" cy="0"/>
+        </a:xfrm>
+      </p:grpSpPr>
+      <p:sp>
+        <p:nvSpPr>
+          <p:cNvPr id="12290" name="Content Placeholder 2"/>
+          <p:cNvSpPr>
+            <a:spLocks noGrp="1"/>
+          </p:cNvSpPr>
+          <p:nvPr>
+            <p:ph sz="half" idx="2"/>
+          </p:nvPr>
+        </p:nvSpPr>
+        <p:spPr>
+          <a:xfrm>
+            <a:off x="755650" y="1130300"/>
+            <a:ext cx="8064500" cy="4891088"/>
+          </a:xfrm>
+        </p:spPr>
+        <p:txBody>
+          <a:bodyPr/>
+          <a:lstStyle/>
+          <a:p>
+            <a:pPr marL="0" lvl="1" indent="0" eaLnBrk="1" hangingPunct="1">
+              <a:spcBef>
+                <a:spcPts val="1200"/>
+              </a:spcBef>
+              <a:buFont typeface="Wingdings" panose="05000000000000000000" pitchFamily="2" charset="2"/>
+              <a:buChar char="§"/>
+            </a:pPr>
+            <a:r>
+              <a:rPr lang="en-GB" sz="2000" dirty="0">
+                <a:latin typeface="+mj-lt"/>
+              </a:rPr>
+              <a:t> </a:t>
+            </a:r>
+            <a:endParaRPr lang="en-GB" i="1" dirty="0">
+              <a:latin typeface="+mj-lt"/>
+            </a:endParaRPr>
+          </a:p>
+        </p:txBody>
+      </p:sp>
+      <p:sp>
+        <p:nvSpPr>
+          <p:cNvPr id="6" name="Title 5"/>
+          <p:cNvSpPr>
+            <a:spLocks noGrp="1"/>
+          </p:cNvSpPr>
+          <p:nvPr>
+            <p:ph type="title"/>
+          </p:nvPr>
+        </p:nvSpPr>
+        <p:spPr>
+          <a:xfrm>
+            <a:off x="755650" y="0"/>
+            <a:ext cx="7931150" cy="836613"/>
+          </a:xfrm>
+        </p:spPr>
+        <p:txBody>
+          <a:bodyPr>
+            <a:noAutofit/>
+          </a:bodyPr>
+          <a:lstStyle/>
+          <a:p>
+            <a:pPr lvl="0"/>
+            <a:r>
+              <a:rPr lang="en-US" sz="2800" dirty="0"/>
+              <a:t>Tip 8: Upload solution to CI server</a:t>
+            </a:r>
+            <a:endParaRPr lang="es-AR" sz="2800" dirty="0"/>
+          </a:p>
+        </p:txBody>
+      </p:sp>
+    </p:spTree>
+    <p:extLst>
+      <p:ext uri="{BB962C8B-B14F-4D97-AF65-F5344CB8AC3E}">
+        <p14:creationId xmlns:p14="http://schemas.microsoft.com/office/powerpoint/2010/main" val="1568355859"/>
+      </p:ext>
+    </p:extLst>
+  </p:cSld>
+  <p:clrMapOvr>
+    <a:masterClrMapping/>
+  </p:clrMapOvr>
+  <p:timing>
+    <p:tnLst>
+      <p:par>
+        <p:cTn id="1" dur="indefinite" restart="never" nodeType="tmRoot"/>
+      </p:par>
+    </p:tnLst>
+  </p:timing>
+</p:sld>
+</file>
+
+<file path=ppt/slides/slide13.xml><?xml version="1.0" encoding="utf-8"?>
+<p:sld xmlns:a="http://schemas.openxmlformats.org/drawingml/2006/main" xmlns:r="http://schemas.openxmlformats.org/officeDocument/2006/relationships" xmlns:p="http://schemas.openxmlformats.org/presentationml/2006/main">
+  <p:cSld>
+    <p:spTree>
+      <p:nvGrpSpPr>
+        <p:cNvPr id="1" name=""/>
+        <p:cNvGrpSpPr/>
+        <p:nvPr/>
+      </p:nvGrpSpPr>
+      <p:grpSpPr>
+        <a:xfrm>
+          <a:off x="0" y="0"/>
+          <a:ext cx="0" cy="0"/>
+          <a:chOff x="0" y="0"/>
+          <a:chExt cx="0" cy="0"/>
+        </a:xfrm>
+      </p:grpSpPr>
+      <p:sp>
+        <p:nvSpPr>
+          <p:cNvPr id="12290" name="Content Placeholder 2"/>
+          <p:cNvSpPr>
+            <a:spLocks noGrp="1"/>
+          </p:cNvSpPr>
+          <p:nvPr>
+            <p:ph sz="half" idx="2"/>
+          </p:nvPr>
+        </p:nvSpPr>
+        <p:spPr>
+          <a:xfrm>
+            <a:off x="755650" y="1130300"/>
+            <a:ext cx="8064500" cy="4891088"/>
+          </a:xfrm>
+        </p:spPr>
+        <p:txBody>
+          <a:bodyPr/>
+          <a:lstStyle/>
+          <a:p>
+            <a:pPr marL="0" lvl="1" indent="0" eaLnBrk="1" hangingPunct="1">
+              <a:spcBef>
+                <a:spcPts val="1200"/>
+              </a:spcBef>
+              <a:buFont typeface="Wingdings" panose="05000000000000000000" pitchFamily="2" charset="2"/>
+              <a:buChar char="§"/>
+            </a:pPr>
+            <a:r>
+              <a:rPr lang="en-GB" sz="2000" dirty="0">
+                <a:latin typeface="+mj-lt"/>
+              </a:rPr>
+              <a:t> </a:t>
+            </a:r>
+            <a:endParaRPr lang="en-GB" i="1" dirty="0">
+              <a:latin typeface="+mj-lt"/>
+            </a:endParaRPr>
+          </a:p>
+        </p:txBody>
+      </p:sp>
+      <p:sp>
+        <p:nvSpPr>
+          <p:cNvPr id="6" name="Title 5"/>
+          <p:cNvSpPr>
+            <a:spLocks noGrp="1"/>
+          </p:cNvSpPr>
+          <p:nvPr>
+            <p:ph type="title"/>
+          </p:nvPr>
+        </p:nvSpPr>
+        <p:spPr>
+          <a:xfrm>
+            <a:off x="755650" y="0"/>
+            <a:ext cx="7931150" cy="836613"/>
+          </a:xfrm>
+        </p:spPr>
+        <p:txBody>
+          <a:bodyPr>
+            <a:noAutofit/>
+          </a:bodyPr>
+          <a:lstStyle/>
+          <a:p>
+            <a:pPr lvl="0"/>
+            <a:r>
+              <a:rPr lang="en-US" sz="2800" dirty="0"/>
+              <a:t>Tip 9: Add UT tasks to CI</a:t>
+            </a:r>
+            <a:endParaRPr lang="es-AR" sz="2800" dirty="0"/>
+          </a:p>
+        </p:txBody>
+      </p:sp>
+    </p:spTree>
+    <p:extLst>
+      <p:ext uri="{BB962C8B-B14F-4D97-AF65-F5344CB8AC3E}">
+        <p14:creationId xmlns:p14="http://schemas.microsoft.com/office/powerpoint/2010/main" val="2439082405"/>
+      </p:ext>
+    </p:extLst>
+  </p:cSld>
+  <p:clrMapOvr>
+    <a:masterClrMapping/>
+  </p:clrMapOvr>
+  <p:timing>
+    <p:tnLst>
+      <p:par>
+        <p:cTn id="1" dur="indefinite" restart="never" nodeType="tmRoot"/>
+      </p:par>
+    </p:tnLst>
+  </p:timing>
+</p:sld>
+</file>
+
+<file path=ppt/slides/slide14.xml><?xml version="1.0" encoding="utf-8"?>
+<p:sld xmlns:a="http://schemas.openxmlformats.org/drawingml/2006/main" xmlns:r="http://schemas.openxmlformats.org/officeDocument/2006/relationships" xmlns:p="http://schemas.openxmlformats.org/presentationml/2006/main">
+  <p:cSld>
+    <p:spTree>
+      <p:nvGrpSpPr>
+        <p:cNvPr id="1" name=""/>
+        <p:cNvGrpSpPr/>
+        <p:nvPr/>
+      </p:nvGrpSpPr>
+      <p:grpSpPr>
+        <a:xfrm>
+          <a:off x="0" y="0"/>
+          <a:ext cx="0" cy="0"/>
+          <a:chOff x="0" y="0"/>
+          <a:chExt cx="0" cy="0"/>
+        </a:xfrm>
+      </p:grpSpPr>
+      <p:sp>
+        <p:nvSpPr>
+          <p:cNvPr id="4" name="3 Título"/>
+          <p:cNvSpPr>
+            <a:spLocks noGrp="1"/>
+          </p:cNvSpPr>
+          <p:nvPr>
+            <p:ph type="title"/>
+          </p:nvPr>
+        </p:nvSpPr>
+        <p:spPr>
+          <a:xfrm>
+            <a:off x="971600" y="1844824"/>
+            <a:ext cx="8064896" cy="1362075"/>
+          </a:xfrm>
+          <a:extLst/>
+        </p:spPr>
+        <p:txBody>
+          <a:bodyPr rtlCol="0">
+            <a:normAutofit/>
+          </a:bodyPr>
+          <a:lstStyle/>
+          <a:p>
+            <a:pPr fontAlgn="auto">
+              <a:spcAft>
+                <a:spcPts val="0"/>
+              </a:spcAft>
+              <a:defRPr/>
+            </a:pPr>
+            <a:r>
+              <a:rPr lang="es-AR" sz="2800" dirty="0" smtClean="0">
+                <a:latin typeface="+mn-lt"/>
+              </a:rPr>
+              <a:t>DB </a:t>
+            </a:r>
+            <a:r>
+              <a:rPr lang="es-AR" sz="2800" dirty="0" err="1" smtClean="0">
+                <a:latin typeface="+mn-lt"/>
+              </a:rPr>
+              <a:t>Integration</a:t>
+            </a:r>
+            <a:r>
+              <a:rPr lang="es-AR" sz="2800" dirty="0" smtClean="0">
+                <a:latin typeface="+mn-lt"/>
+              </a:rPr>
+              <a:t> test-</a:t>
+            </a:r>
+            <a:r>
+              <a:rPr lang="es-AR" sz="2800" dirty="0" err="1" smtClean="0">
+                <a:latin typeface="+mn-lt"/>
+              </a:rPr>
+              <a:t>oriented</a:t>
+            </a:r>
+            <a:r>
+              <a:rPr lang="es-AR" sz="2800" dirty="0" smtClean="0">
+                <a:latin typeface="+mn-lt"/>
+              </a:rPr>
+              <a:t> </a:t>
+            </a:r>
+            <a:r>
+              <a:rPr lang="es-AR" sz="2800" dirty="0" err="1" smtClean="0">
+                <a:latin typeface="+mn-lt"/>
+              </a:rPr>
+              <a:t>development</a:t>
+            </a:r>
+            <a:r>
+              <a:rPr lang="es-AR" sz="2800" dirty="0" smtClean="0">
+                <a:latin typeface="+mn-lt"/>
+              </a:rPr>
+              <a:t> </a:t>
+            </a:r>
+            <a:r>
+              <a:rPr lang="es-AR" sz="2800" dirty="0" err="1" smtClean="0">
+                <a:latin typeface="+mn-lt"/>
+              </a:rPr>
+              <a:t>Tips</a:t>
+            </a:r>
+            <a:endParaRPr sz="2800" dirty="0">
+              <a:latin typeface="+mn-lt"/>
+            </a:endParaRPr>
+          </a:p>
+        </p:txBody>
+      </p:sp>
+      <p:sp>
+        <p:nvSpPr>
+          <p:cNvPr id="5" name="4 Marcador de texto"/>
+          <p:cNvSpPr>
+            <a:spLocks noGrp="1"/>
+          </p:cNvSpPr>
+          <p:nvPr>
+            <p:ph type="body" idx="1"/>
+          </p:nvPr>
+        </p:nvSpPr>
+        <p:spPr>
+          <a:xfrm>
+            <a:off x="971550" y="3513138"/>
+            <a:ext cx="7412038" cy="1500187"/>
+          </a:xfrm>
+        </p:spPr>
+        <p:txBody>
+          <a:bodyPr rtlCol="0">
+            <a:noAutofit/>
+          </a:bodyPr>
+          <a:lstStyle/>
+          <a:p>
+            <a:pPr eaLnBrk="1" fontAlgn="auto" hangingPunct="1">
+              <a:spcAft>
+                <a:spcPts val="0"/>
+              </a:spcAft>
+              <a:defRPr/>
+            </a:pPr>
+            <a:endParaRPr lang="es-AR" sz="1600" dirty="0">
+              <a:latin typeface="+mn-lt"/>
+            </a:endParaRPr>
+          </a:p>
+          <a:p>
+            <a:pPr eaLnBrk="1" fontAlgn="auto" hangingPunct="1">
+              <a:spcAft>
+                <a:spcPts val="0"/>
+              </a:spcAft>
+              <a:defRPr/>
+            </a:pPr>
+            <a:endParaRPr lang="es-AR" dirty="0"/>
+          </a:p>
+        </p:txBody>
+      </p:sp>
+    </p:spTree>
+    <p:extLst>
+      <p:ext uri="{BB962C8B-B14F-4D97-AF65-F5344CB8AC3E}">
+        <p14:creationId xmlns:p14="http://schemas.microsoft.com/office/powerpoint/2010/main" val="3416321983"/>
+      </p:ext>
+    </p:extLst>
+  </p:cSld>
+  <p:clrMapOvr>
+    <a:masterClrMapping/>
+  </p:clrMapOvr>
+  <p:timing>
+    <p:tnLst>
+      <p:par>
+        <p:cTn id="1" dur="indefinite" restart="never" nodeType="tmRoot"/>
+      </p:par>
+    </p:tnLst>
+  </p:timing>
+</p:sld>
+</file>
+
+<file path=ppt/slides/slide15.xml><?xml version="1.0" encoding="utf-8"?>
+<p:sld xmlns:a="http://schemas.openxmlformats.org/drawingml/2006/main" xmlns:r="http://schemas.openxmlformats.org/officeDocument/2006/relationships" xmlns:p="http://schemas.openxmlformats.org/presentationml/2006/main">
+  <p:cSld>
+    <p:spTree>
+      <p:nvGrpSpPr>
+        <p:cNvPr id="1" name=""/>
+        <p:cNvGrpSpPr/>
+        <p:nvPr/>
+      </p:nvGrpSpPr>
+      <p:grpSpPr>
+        <a:xfrm>
+          <a:off x="0" y="0"/>
+          <a:ext cx="0" cy="0"/>
+          <a:chOff x="0" y="0"/>
+          <a:chExt cx="0" cy="0"/>
+        </a:xfrm>
+      </p:grpSpPr>
+      <p:sp>
+        <p:nvSpPr>
+          <p:cNvPr id="12290" name="Content Placeholder 2"/>
+          <p:cNvSpPr>
+            <a:spLocks noGrp="1"/>
+          </p:cNvSpPr>
+          <p:nvPr>
+            <p:ph sz="half" idx="2"/>
+          </p:nvPr>
+        </p:nvSpPr>
+        <p:spPr>
+          <a:xfrm>
+            <a:off x="755650" y="1130300"/>
+            <a:ext cx="8064500" cy="4891088"/>
+          </a:xfrm>
+        </p:spPr>
+        <p:txBody>
+          <a:bodyPr/>
+          <a:lstStyle/>
+          <a:p>
+            <a:pPr marL="0" lvl="1" indent="0" eaLnBrk="1" hangingPunct="1">
+              <a:spcBef>
+                <a:spcPts val="1200"/>
+              </a:spcBef>
+              <a:buFont typeface="Wingdings" panose="05000000000000000000" pitchFamily="2" charset="2"/>
+              <a:buChar char="§"/>
+            </a:pPr>
+            <a:r>
+              <a:rPr lang="en-GB" sz="2000" dirty="0">
+                <a:latin typeface="+mj-lt"/>
+              </a:rPr>
+              <a:t> </a:t>
+            </a:r>
+            <a:endParaRPr lang="en-GB" i="1" dirty="0">
+              <a:latin typeface="+mj-lt"/>
+            </a:endParaRPr>
+          </a:p>
+        </p:txBody>
+      </p:sp>
+      <p:sp>
+        <p:nvSpPr>
+          <p:cNvPr id="6" name="Title 5"/>
+          <p:cNvSpPr>
+            <a:spLocks noGrp="1"/>
+          </p:cNvSpPr>
+          <p:nvPr>
+            <p:ph type="title"/>
+          </p:nvPr>
+        </p:nvSpPr>
+        <p:spPr>
+          <a:xfrm>
+            <a:off x="755650" y="0"/>
+            <a:ext cx="7931150" cy="836613"/>
+          </a:xfrm>
+        </p:spPr>
+        <p:txBody>
+          <a:bodyPr>
+            <a:noAutofit/>
+          </a:bodyPr>
+          <a:lstStyle/>
+          <a:p>
+            <a:pPr lvl="0"/>
+            <a:r>
+              <a:rPr lang="en-US" sz="2000" dirty="0"/>
+              <a:t>Tip 1: Generate creation scripts for DB, Tables, Views, SPs, Functions</a:t>
+            </a:r>
+            <a:endParaRPr lang="es-AR" sz="2000" dirty="0"/>
+          </a:p>
+        </p:txBody>
+      </p:sp>
+    </p:spTree>
+    <p:extLst>
+      <p:ext uri="{BB962C8B-B14F-4D97-AF65-F5344CB8AC3E}">
+        <p14:creationId xmlns:p14="http://schemas.microsoft.com/office/powerpoint/2010/main" val="382617550"/>
+      </p:ext>
+    </p:extLst>
+  </p:cSld>
+  <p:clrMapOvr>
+    <a:masterClrMapping/>
+  </p:clrMapOvr>
+  <p:timing>
+    <p:tnLst>
+      <p:par>
+        <p:cTn id="1" dur="indefinite" restart="never" nodeType="tmRoot"/>
+      </p:par>
+    </p:tnLst>
+  </p:timing>
+</p:sld>
+</file>
+
+<file path=ppt/slides/slide16.xml><?xml version="1.0" encoding="utf-8"?>
+<p:sld xmlns:a="http://schemas.openxmlformats.org/drawingml/2006/main" xmlns:r="http://schemas.openxmlformats.org/officeDocument/2006/relationships" xmlns:p="http://schemas.openxmlformats.org/presentationml/2006/main">
+  <p:cSld>
+    <p:spTree>
+      <p:nvGrpSpPr>
+        <p:cNvPr id="1" name=""/>
+        <p:cNvGrpSpPr/>
+        <p:nvPr/>
+      </p:nvGrpSpPr>
+      <p:grpSpPr>
+        <a:xfrm>
+          <a:off x="0" y="0"/>
+          <a:ext cx="0" cy="0"/>
+          <a:chOff x="0" y="0"/>
+          <a:chExt cx="0" cy="0"/>
+        </a:xfrm>
+      </p:grpSpPr>
+      <p:sp>
+        <p:nvSpPr>
+          <p:cNvPr id="12290" name="Content Placeholder 2"/>
+          <p:cNvSpPr>
+            <a:spLocks noGrp="1"/>
+          </p:cNvSpPr>
+          <p:nvPr>
+            <p:ph sz="half" idx="2"/>
+          </p:nvPr>
+        </p:nvSpPr>
+        <p:spPr>
+          <a:xfrm>
+            <a:off x="755650" y="1130300"/>
+            <a:ext cx="8064500" cy="4891088"/>
+          </a:xfrm>
+        </p:spPr>
+        <p:txBody>
+          <a:bodyPr/>
+          <a:lstStyle/>
+          <a:p>
+            <a:pPr marL="0" lvl="1" indent="0" eaLnBrk="1" hangingPunct="1">
+              <a:spcBef>
+                <a:spcPts val="1200"/>
+              </a:spcBef>
+              <a:buFont typeface="Wingdings" panose="05000000000000000000" pitchFamily="2" charset="2"/>
+              <a:buChar char="§"/>
+            </a:pPr>
+            <a:r>
+              <a:rPr lang="en-GB" sz="2000" dirty="0">
+                <a:latin typeface="+mj-lt"/>
+              </a:rPr>
+              <a:t> </a:t>
+            </a:r>
+            <a:endParaRPr lang="en-GB" i="1" dirty="0">
+              <a:latin typeface="+mj-lt"/>
+            </a:endParaRPr>
+          </a:p>
+        </p:txBody>
+      </p:sp>
+      <p:sp>
+        <p:nvSpPr>
+          <p:cNvPr id="6" name="Title 5"/>
+          <p:cNvSpPr>
+            <a:spLocks noGrp="1"/>
+          </p:cNvSpPr>
+          <p:nvPr>
+            <p:ph type="title"/>
+          </p:nvPr>
+        </p:nvSpPr>
+        <p:spPr>
+          <a:xfrm>
+            <a:off x="755650" y="0"/>
+            <a:ext cx="7931150" cy="836613"/>
+          </a:xfrm>
+        </p:spPr>
+        <p:txBody>
+          <a:bodyPr>
+            <a:noAutofit/>
+          </a:bodyPr>
+          <a:lstStyle/>
+          <a:p>
+            <a:pPr lvl="0"/>
+            <a:r>
+              <a:rPr lang="en-US" sz="2400" dirty="0"/>
+              <a:t>Tip 2: Generate “master” data insertion scripts</a:t>
+            </a:r>
+            <a:endParaRPr lang="es-AR" sz="2400" dirty="0"/>
+          </a:p>
+        </p:txBody>
+      </p:sp>
+    </p:spTree>
+    <p:extLst>
+      <p:ext uri="{BB962C8B-B14F-4D97-AF65-F5344CB8AC3E}">
+        <p14:creationId xmlns:p14="http://schemas.microsoft.com/office/powerpoint/2010/main" val="298219647"/>
+      </p:ext>
+    </p:extLst>
+  </p:cSld>
+  <p:clrMapOvr>
+    <a:masterClrMapping/>
+  </p:clrMapOvr>
+  <p:timing>
+    <p:tnLst>
+      <p:par>
+        <p:cTn id="1" dur="indefinite" restart="never" nodeType="tmRoot"/>
+      </p:par>
+    </p:tnLst>
+  </p:timing>
+</p:sld>
+</file>
+
+<file path=ppt/slides/slide17.xml><?xml version="1.0" encoding="utf-8"?>
+<p:sld xmlns:a="http://schemas.openxmlformats.org/drawingml/2006/main" xmlns:r="http://schemas.openxmlformats.org/officeDocument/2006/relationships" xmlns:p="http://schemas.openxmlformats.org/presentationml/2006/main">
+  <p:cSld>
+    <p:spTree>
+      <p:nvGrpSpPr>
+        <p:cNvPr id="1" name=""/>
+        <p:cNvGrpSpPr/>
+        <p:nvPr/>
+      </p:nvGrpSpPr>
+      <p:grpSpPr>
+        <a:xfrm>
+          <a:off x="0" y="0"/>
+          <a:ext cx="0" cy="0"/>
+          <a:chOff x="0" y="0"/>
+          <a:chExt cx="0" cy="0"/>
+        </a:xfrm>
+      </p:grpSpPr>
+      <p:sp>
+        <p:nvSpPr>
+          <p:cNvPr id="12290" name="Content Placeholder 2"/>
+          <p:cNvSpPr>
+            <a:spLocks noGrp="1"/>
+          </p:cNvSpPr>
+          <p:nvPr>
+            <p:ph sz="half" idx="2"/>
+          </p:nvPr>
+        </p:nvSpPr>
+        <p:spPr>
+          <a:xfrm>
+            <a:off x="755650" y="1130300"/>
+            <a:ext cx="8064500" cy="4891088"/>
+          </a:xfrm>
+        </p:spPr>
+        <p:txBody>
+          <a:bodyPr/>
+          <a:lstStyle/>
+          <a:p>
+            <a:pPr marL="0" lvl="1" indent="0" eaLnBrk="1" hangingPunct="1">
+              <a:spcBef>
+                <a:spcPts val="1200"/>
+              </a:spcBef>
+              <a:buFont typeface="Wingdings" panose="05000000000000000000" pitchFamily="2" charset="2"/>
+              <a:buChar char="§"/>
+            </a:pPr>
+            <a:r>
+              <a:rPr lang="en-GB" sz="2000" dirty="0">
+                <a:latin typeface="+mj-lt"/>
+              </a:rPr>
+              <a:t> </a:t>
+            </a:r>
+            <a:endParaRPr lang="en-GB" i="1" dirty="0">
+              <a:latin typeface="+mj-lt"/>
+            </a:endParaRPr>
+          </a:p>
+        </p:txBody>
+      </p:sp>
+      <p:sp>
+        <p:nvSpPr>
+          <p:cNvPr id="6" name="Title 5"/>
+          <p:cNvSpPr>
+            <a:spLocks noGrp="1"/>
+          </p:cNvSpPr>
+          <p:nvPr>
+            <p:ph type="title"/>
+          </p:nvPr>
+        </p:nvSpPr>
+        <p:spPr>
+          <a:xfrm>
+            <a:off x="755650" y="0"/>
+            <a:ext cx="7931150" cy="836613"/>
+          </a:xfrm>
+        </p:spPr>
+        <p:txBody>
+          <a:bodyPr>
+            <a:noAutofit/>
+          </a:bodyPr>
+          <a:lstStyle/>
+          <a:p>
+            <a:pPr lvl="0"/>
+            <a:r>
+              <a:rPr lang="en-US" sz="2400" dirty="0"/>
+              <a:t>Tip 3: Execute scripts automatically</a:t>
+            </a:r>
+            <a:endParaRPr lang="es-AR" sz="2400" dirty="0"/>
+          </a:p>
+        </p:txBody>
+      </p:sp>
+    </p:spTree>
+    <p:extLst>
+      <p:ext uri="{BB962C8B-B14F-4D97-AF65-F5344CB8AC3E}">
+        <p14:creationId xmlns:p14="http://schemas.microsoft.com/office/powerpoint/2010/main" val="3623297376"/>
+      </p:ext>
+    </p:extLst>
+  </p:cSld>
+  <p:clrMapOvr>
+    <a:masterClrMapping/>
+  </p:clrMapOvr>
+  <p:timing>
+    <p:tnLst>
+      <p:par>
+        <p:cTn id="1" dur="indefinite" restart="never" nodeType="tmRoot"/>
+      </p:par>
+    </p:tnLst>
+  </p:timing>
+</p:sld>
+</file>
+
+<file path=ppt/slides/slide18.xml><?xml version="1.0" encoding="utf-8"?>
+<p:sld xmlns:a="http://schemas.openxmlformats.org/drawingml/2006/main" xmlns:r="http://schemas.openxmlformats.org/officeDocument/2006/relationships" xmlns:p="http://schemas.openxmlformats.org/presentationml/2006/main">
+  <p:cSld>
+    <p:spTree>
+      <p:nvGrpSpPr>
+        <p:cNvPr id="1" name=""/>
+        <p:cNvGrpSpPr/>
+        <p:nvPr/>
+      </p:nvGrpSpPr>
+      <p:grpSpPr>
+        <a:xfrm>
+          <a:off x="0" y="0"/>
+          <a:ext cx="0" cy="0"/>
+          <a:chOff x="0" y="0"/>
+          <a:chExt cx="0" cy="0"/>
+        </a:xfrm>
+      </p:grpSpPr>
+      <p:sp>
+        <p:nvSpPr>
+          <p:cNvPr id="12290" name="Content Placeholder 2"/>
+          <p:cNvSpPr>
+            <a:spLocks noGrp="1"/>
+          </p:cNvSpPr>
+          <p:nvPr>
+            <p:ph sz="half" idx="2"/>
+          </p:nvPr>
+        </p:nvSpPr>
+        <p:spPr>
+          <a:xfrm>
+            <a:off x="755650" y="1130300"/>
+            <a:ext cx="8064500" cy="4891088"/>
+          </a:xfrm>
+        </p:spPr>
+        <p:txBody>
+          <a:bodyPr/>
+          <a:lstStyle/>
+          <a:p>
+            <a:pPr marL="0" lvl="1" indent="0" eaLnBrk="1" hangingPunct="1">
+              <a:spcBef>
+                <a:spcPts val="1200"/>
+              </a:spcBef>
+              <a:buFont typeface="Wingdings" panose="05000000000000000000" pitchFamily="2" charset="2"/>
+              <a:buChar char="§"/>
+            </a:pPr>
+            <a:r>
+              <a:rPr lang="en-GB" sz="2000" dirty="0">
+                <a:latin typeface="+mj-lt"/>
+              </a:rPr>
+              <a:t> </a:t>
+            </a:r>
+            <a:endParaRPr lang="en-GB" i="1" dirty="0">
+              <a:latin typeface="+mj-lt"/>
+            </a:endParaRPr>
+          </a:p>
+        </p:txBody>
+      </p:sp>
+      <p:sp>
+        <p:nvSpPr>
+          <p:cNvPr id="6" name="Title 5"/>
+          <p:cNvSpPr>
+            <a:spLocks noGrp="1"/>
+          </p:cNvSpPr>
+          <p:nvPr>
+            <p:ph type="title"/>
+          </p:nvPr>
+        </p:nvSpPr>
+        <p:spPr>
+          <a:xfrm>
+            <a:off x="755650" y="0"/>
+            <a:ext cx="7931150" cy="836613"/>
+          </a:xfrm>
+        </p:spPr>
+        <p:txBody>
+          <a:bodyPr>
+            <a:noAutofit/>
+          </a:bodyPr>
+          <a:lstStyle/>
+          <a:p>
+            <a:pPr lvl="0"/>
+            <a:r>
+              <a:rPr lang="en-US" sz="2400" dirty="0"/>
+              <a:t>Tip 4: Setup CI to regenerate DB on each build</a:t>
+            </a:r>
+            <a:endParaRPr lang="es-AR" sz="2400" dirty="0"/>
+          </a:p>
+        </p:txBody>
+      </p:sp>
+    </p:spTree>
+    <p:extLst>
+      <p:ext uri="{BB962C8B-B14F-4D97-AF65-F5344CB8AC3E}">
+        <p14:creationId xmlns:p14="http://schemas.microsoft.com/office/powerpoint/2010/main" val="1575955872"/>
+      </p:ext>
+    </p:extLst>
+  </p:cSld>
+  <p:clrMapOvr>
+    <a:masterClrMapping/>
+  </p:clrMapOvr>
+  <p:timing>
+    <p:tnLst>
+      <p:par>
+        <p:cTn id="1" dur="indefinite" restart="never" nodeType="tmRoot"/>
+      </p:par>
+    </p:tnLst>
+  </p:timing>
+</p:sld>
+</file>
+
+<file path=ppt/slides/slide19.xml><?xml version="1.0" encoding="utf-8"?>
+<p:sld xmlns:a="http://schemas.openxmlformats.org/drawingml/2006/main" xmlns:r="http://schemas.openxmlformats.org/officeDocument/2006/relationships" xmlns:p="http://schemas.openxmlformats.org/presentationml/2006/main">
+  <p:cSld>
+    <p:spTree>
+      <p:nvGrpSpPr>
+        <p:cNvPr id="1" name=""/>
+        <p:cNvGrpSpPr/>
+        <p:nvPr/>
+      </p:nvGrpSpPr>
+      <p:grpSpPr>
+        <a:xfrm>
+          <a:off x="0" y="0"/>
+          <a:ext cx="0" cy="0"/>
+          <a:chOff x="0" y="0"/>
+          <a:chExt cx="0" cy="0"/>
+        </a:xfrm>
+      </p:grpSpPr>
+      <p:sp>
+        <p:nvSpPr>
+          <p:cNvPr id="12290" name="Content Placeholder 2"/>
+          <p:cNvSpPr>
+            <a:spLocks noGrp="1"/>
+          </p:cNvSpPr>
+          <p:nvPr>
+            <p:ph sz="half" idx="2"/>
+          </p:nvPr>
+        </p:nvSpPr>
+        <p:spPr>
+          <a:xfrm>
+            <a:off x="755650" y="1130300"/>
+            <a:ext cx="8064500" cy="4891088"/>
+          </a:xfrm>
+        </p:spPr>
+        <p:txBody>
+          <a:bodyPr/>
+          <a:lstStyle/>
+          <a:p>
+            <a:pPr marL="0" lvl="1" indent="0" eaLnBrk="1" hangingPunct="1">
+              <a:spcBef>
+                <a:spcPts val="1200"/>
+              </a:spcBef>
+              <a:buFont typeface="Wingdings" panose="05000000000000000000" pitchFamily="2" charset="2"/>
+              <a:buChar char="§"/>
+            </a:pPr>
+            <a:r>
+              <a:rPr lang="en-GB" sz="2000" dirty="0">
+                <a:latin typeface="+mj-lt"/>
+              </a:rPr>
+              <a:t> </a:t>
+            </a:r>
+            <a:endParaRPr lang="en-GB" i="1" dirty="0">
+              <a:latin typeface="+mj-lt"/>
+            </a:endParaRPr>
+          </a:p>
+        </p:txBody>
+      </p:sp>
+      <p:sp>
+        <p:nvSpPr>
+          <p:cNvPr id="6" name="Title 5"/>
+          <p:cNvSpPr>
+            <a:spLocks noGrp="1"/>
+          </p:cNvSpPr>
+          <p:nvPr>
+            <p:ph type="title"/>
+          </p:nvPr>
+        </p:nvSpPr>
+        <p:spPr>
+          <a:xfrm>
+            <a:off x="755650" y="0"/>
+            <a:ext cx="7931150" cy="836613"/>
+          </a:xfrm>
+        </p:spPr>
+        <p:txBody>
+          <a:bodyPr>
+            <a:noAutofit/>
+          </a:bodyPr>
+          <a:lstStyle/>
+          <a:p>
+            <a:pPr lvl="0"/>
+            <a:r>
+              <a:rPr lang="en-US" sz="2400" dirty="0"/>
+              <a:t>Tip 5: Setup test data (initialization &amp; cleanup)</a:t>
+            </a:r>
+            <a:endParaRPr lang="es-AR" sz="2400" dirty="0"/>
+          </a:p>
+        </p:txBody>
+      </p:sp>
+    </p:spTree>
+    <p:extLst>
+      <p:ext uri="{BB962C8B-B14F-4D97-AF65-F5344CB8AC3E}">
+        <p14:creationId xmlns:p14="http://schemas.microsoft.com/office/powerpoint/2010/main" val="653606196"/>
+      </p:ext>
+    </p:extLst>
+  </p:cSld>
+  <p:clrMapOvr>
+    <a:masterClrMapping/>
+  </p:clrMapOvr>
+  <p:timing>
+    <p:tnLst>
+      <p:par>
+        <p:cTn id="1" dur="indefinite" restart="never" nodeType="tmRoot"/>
+      </p:par>
+    </p:tnLst>
+  </p:timing>
+</p:sld>
+</file>
+
+<file path=ppt/slides/slide2.xml><?xml version="1.0" encoding="utf-8"?>
+<p:sld xmlns:a="http://schemas.openxmlformats.org/drawingml/2006/main" xmlns:r="http://schemas.openxmlformats.org/officeDocument/2006/relationships" xmlns:p="http://schemas.openxmlformats.org/presentationml/2006/main">
+  <p:cSld>
+    <p:spTree>
+      <p:nvGrpSpPr>
+        <p:cNvPr id="1" name=""/>
+        <p:cNvGrpSpPr/>
+        <p:nvPr/>
+      </p:nvGrpSpPr>
+      <p:grpSpPr>
+        <a:xfrm>
+          <a:off x="0" y="0"/>
+          <a:ext cx="0" cy="0"/>
+          <a:chOff x="0" y="0"/>
+          <a:chExt cx="0" cy="0"/>
+        </a:xfrm>
+      </p:grpSpPr>
+      <p:sp>
+        <p:nvSpPr>
+          <p:cNvPr id="10242" name="Content Placeholder 2"/>
+          <p:cNvSpPr>
+            <a:spLocks noGrp="1"/>
+          </p:cNvSpPr>
+          <p:nvPr>
+            <p:ph sz="half" idx="2"/>
+          </p:nvPr>
+        </p:nvSpPr>
+        <p:spPr>
+          <a:xfrm>
+            <a:off x="755650" y="1130300"/>
+            <a:ext cx="8064500" cy="4891088"/>
+          </a:xfrm>
+        </p:spPr>
+        <p:txBody>
+          <a:bodyPr/>
+          <a:lstStyle/>
+          <a:p>
+            <a:pPr marL="0" indent="0" eaLnBrk="1" hangingPunct="1">
+              <a:spcBef>
+                <a:spcPts val="1200"/>
+              </a:spcBef>
+            </a:pPr>
+            <a:r>
+              <a:rPr lang="es-AR" altLang="es-AR" sz="1800" dirty="0" smtClean="0">
+                <a:latin typeface="Calibri" panose="020F0502020204030204" pitchFamily="34" charset="0"/>
+              </a:rPr>
+              <a:t> Objetivos</a:t>
+            </a:r>
+            <a:endParaRPr lang="es-AR" altLang="es-AR" sz="1600" dirty="0" smtClean="0">
+              <a:latin typeface="Calibri" panose="020F0502020204030204" pitchFamily="34" charset="0"/>
+            </a:endParaRPr>
+          </a:p>
+        </p:txBody>
+      </p:sp>
+      <p:sp>
+        <p:nvSpPr>
+          <p:cNvPr id="6" name="Title 5"/>
+          <p:cNvSpPr>
+            <a:spLocks noGrp="1"/>
+          </p:cNvSpPr>
+          <p:nvPr>
+            <p:ph type="title"/>
+          </p:nvPr>
+        </p:nvSpPr>
+        <p:spPr>
+          <a:xfrm>
+            <a:off x="755650" y="0"/>
+            <a:ext cx="7931150" cy="836613"/>
+          </a:xfrm>
+        </p:spPr>
+        <p:txBody>
+          <a:bodyPr/>
+          <a:lstStyle/>
+          <a:p>
+            <a:pPr eaLnBrk="1" fontAlgn="auto" hangingPunct="1">
+              <a:spcAft>
+                <a:spcPts val="0"/>
+              </a:spcAft>
+              <a:defRPr/>
+            </a:pPr>
+            <a:r>
+              <a:rPr dirty="0" smtClean="0"/>
+              <a:t>Agenda</a:t>
+            </a:r>
+            <a:endParaRPr dirty="0"/>
+          </a:p>
+        </p:txBody>
+      </p:sp>
+    </p:spTree>
+  </p:cSld>
+  <p:clrMapOvr>
+    <a:masterClrMapping/>
+  </p:clrMapOvr>
+  <p:timing>
+    <p:tnLst>
+      <p:par>
+        <p:cTn id="1" dur="indefinite" restart="never" nodeType="tmRoot"/>
+      </p:par>
+    </p:tnLst>
+  </p:timing>
+</p:sld>
+</file>
+
+<file path=ppt/slides/slide20.xml><?xml version="1.0" encoding="utf-8"?>
+<p:sld xmlns:a="http://schemas.openxmlformats.org/drawingml/2006/main" xmlns:r="http://schemas.openxmlformats.org/officeDocument/2006/relationships" xmlns:p="http://schemas.openxmlformats.org/presentationml/2006/main">
+  <p:cSld>
+    <p:spTree>
+      <p:nvGrpSpPr>
+        <p:cNvPr id="1" name=""/>
+        <p:cNvGrpSpPr/>
+        <p:nvPr/>
+      </p:nvGrpSpPr>
+      <p:grpSpPr>
+        <a:xfrm>
+          <a:off x="0" y="0"/>
+          <a:ext cx="0" cy="0"/>
+          <a:chOff x="0" y="0"/>
+          <a:chExt cx="0" cy="0"/>
+        </a:xfrm>
+      </p:grpSpPr>
+      <p:sp>
+        <p:nvSpPr>
+          <p:cNvPr id="12290" name="Content Placeholder 2"/>
+          <p:cNvSpPr>
+            <a:spLocks noGrp="1"/>
+          </p:cNvSpPr>
+          <p:nvPr>
+            <p:ph sz="half" idx="2"/>
+          </p:nvPr>
+        </p:nvSpPr>
+        <p:spPr>
+          <a:xfrm>
+            <a:off x="755650" y="1130300"/>
+            <a:ext cx="8064500" cy="4891088"/>
+          </a:xfrm>
+        </p:spPr>
+        <p:txBody>
+          <a:bodyPr/>
+          <a:lstStyle/>
+          <a:p>
+            <a:pPr marL="0" lvl="1" indent="0" eaLnBrk="1" hangingPunct="1">
+              <a:spcBef>
+                <a:spcPts val="1200"/>
+              </a:spcBef>
+              <a:buFont typeface="Wingdings" panose="05000000000000000000" pitchFamily="2" charset="2"/>
+              <a:buChar char="§"/>
+            </a:pPr>
+            <a:r>
+              <a:rPr lang="en-GB" sz="2000" dirty="0">
+                <a:latin typeface="+mj-lt"/>
+              </a:rPr>
+              <a:t> </a:t>
+            </a:r>
+            <a:endParaRPr lang="en-GB" i="1" dirty="0">
+              <a:latin typeface="+mj-lt"/>
+            </a:endParaRPr>
+          </a:p>
+        </p:txBody>
+      </p:sp>
+      <p:sp>
+        <p:nvSpPr>
+          <p:cNvPr id="6" name="Title 5"/>
+          <p:cNvSpPr>
+            <a:spLocks noGrp="1"/>
+          </p:cNvSpPr>
+          <p:nvPr>
+            <p:ph type="title"/>
+          </p:nvPr>
+        </p:nvSpPr>
+        <p:spPr>
+          <a:xfrm>
+            <a:off x="755650" y="0"/>
+            <a:ext cx="7931150" cy="836613"/>
+          </a:xfrm>
+        </p:spPr>
+        <p:txBody>
+          <a:bodyPr>
+            <a:noAutofit/>
+          </a:bodyPr>
+          <a:lstStyle/>
+          <a:p>
+            <a:pPr lvl="0"/>
+            <a:r>
+              <a:rPr lang="en-US" sz="2400" dirty="0"/>
+              <a:t>Tip 6: Generate Integration tests</a:t>
+            </a:r>
+            <a:endParaRPr lang="es-AR" sz="2400" dirty="0"/>
+          </a:p>
+        </p:txBody>
+      </p:sp>
+    </p:spTree>
+    <p:extLst>
+      <p:ext uri="{BB962C8B-B14F-4D97-AF65-F5344CB8AC3E}">
+        <p14:creationId xmlns:p14="http://schemas.microsoft.com/office/powerpoint/2010/main" val="1963521844"/>
+      </p:ext>
+    </p:extLst>
+  </p:cSld>
+  <p:clrMapOvr>
+    <a:masterClrMapping/>
+  </p:clrMapOvr>
+  <p:timing>
+    <p:tnLst>
+      <p:par>
+        <p:cTn id="1" dur="indefinite" restart="never" nodeType="tmRoot"/>
+      </p:par>
+    </p:tnLst>
+  </p:timing>
+</p:sld>
+</file>
+
+<file path=ppt/slides/slide21.xml><?xml version="1.0" encoding="utf-8"?>
+<p:sld xmlns:a="http://schemas.openxmlformats.org/drawingml/2006/main" xmlns:r="http://schemas.openxmlformats.org/officeDocument/2006/relationships" xmlns:p="http://schemas.openxmlformats.org/presentationml/2006/main">
+  <p:cSld>
+    <p:spTree>
+      <p:nvGrpSpPr>
+        <p:cNvPr id="1" name=""/>
+        <p:cNvGrpSpPr/>
+        <p:nvPr/>
+      </p:nvGrpSpPr>
+      <p:grpSpPr>
+        <a:xfrm>
+          <a:off x="0" y="0"/>
+          <a:ext cx="0" cy="0"/>
+          <a:chOff x="0" y="0"/>
+          <a:chExt cx="0" cy="0"/>
+        </a:xfrm>
+      </p:grpSpPr>
+      <p:sp>
+        <p:nvSpPr>
+          <p:cNvPr id="12290" name="Content Placeholder 2"/>
+          <p:cNvSpPr>
+            <a:spLocks noGrp="1"/>
+          </p:cNvSpPr>
+          <p:nvPr>
+            <p:ph sz="half" idx="2"/>
+          </p:nvPr>
+        </p:nvSpPr>
+        <p:spPr>
+          <a:xfrm>
+            <a:off x="755650" y="1130300"/>
+            <a:ext cx="8064500" cy="4891088"/>
+          </a:xfrm>
+        </p:spPr>
+        <p:txBody>
+          <a:bodyPr/>
+          <a:lstStyle/>
+          <a:p>
+            <a:pPr marL="0" lvl="1" indent="0" eaLnBrk="1" hangingPunct="1">
+              <a:spcBef>
+                <a:spcPts val="1200"/>
+              </a:spcBef>
+              <a:buFont typeface="Wingdings" panose="05000000000000000000" pitchFamily="2" charset="2"/>
+              <a:buChar char="§"/>
+            </a:pPr>
+            <a:r>
+              <a:rPr lang="en-GB" sz="2000" dirty="0">
+                <a:latin typeface="+mj-lt"/>
+              </a:rPr>
+              <a:t> </a:t>
+            </a:r>
+            <a:endParaRPr lang="en-GB" i="1" dirty="0">
+              <a:latin typeface="+mj-lt"/>
+            </a:endParaRPr>
+          </a:p>
+        </p:txBody>
+      </p:sp>
+      <p:sp>
+        <p:nvSpPr>
+          <p:cNvPr id="6" name="Title 5"/>
+          <p:cNvSpPr>
+            <a:spLocks noGrp="1"/>
+          </p:cNvSpPr>
+          <p:nvPr>
+            <p:ph type="title"/>
+          </p:nvPr>
+        </p:nvSpPr>
+        <p:spPr>
+          <a:xfrm>
+            <a:off x="755650" y="0"/>
+            <a:ext cx="7931150" cy="836613"/>
+          </a:xfrm>
+        </p:spPr>
+        <p:txBody>
+          <a:bodyPr>
+            <a:noAutofit/>
+          </a:bodyPr>
+          <a:lstStyle/>
+          <a:p>
+            <a:pPr lvl="0"/>
+            <a:r>
+              <a:rPr lang="en-US" sz="2400" dirty="0"/>
+              <a:t>Tip 7: Add task to CI</a:t>
+            </a:r>
+            <a:endParaRPr lang="es-AR" sz="2400" dirty="0"/>
+          </a:p>
+        </p:txBody>
+      </p:sp>
+    </p:spTree>
+    <p:extLst>
+      <p:ext uri="{BB962C8B-B14F-4D97-AF65-F5344CB8AC3E}">
+        <p14:creationId xmlns:p14="http://schemas.microsoft.com/office/powerpoint/2010/main" val="3567453063"/>
+      </p:ext>
+    </p:extLst>
+  </p:cSld>
+  <p:clrMapOvr>
+    <a:masterClrMapping/>
+  </p:clrMapOvr>
+  <p:timing>
+    <p:tnLst>
+      <p:par>
+        <p:cTn id="1" dur="indefinite" restart="never" nodeType="tmRoot"/>
+      </p:par>
+    </p:tnLst>
+  </p:timing>
+</p:sld>
+</file>
+
+<file path=ppt/slides/slide22.xml><?xml version="1.0" encoding="utf-8"?>
+<p:sld xmlns:a="http://schemas.openxmlformats.org/drawingml/2006/main" xmlns:r="http://schemas.openxmlformats.org/officeDocument/2006/relationships" xmlns:p="http://schemas.openxmlformats.org/presentationml/2006/main">
+  <p:cSld>
+    <p:spTree>
+      <p:nvGrpSpPr>
+        <p:cNvPr id="1" name=""/>
+        <p:cNvGrpSpPr/>
+        <p:nvPr/>
+      </p:nvGrpSpPr>
+      <p:grpSpPr>
+        <a:xfrm>
+          <a:off x="0" y="0"/>
+          <a:ext cx="0" cy="0"/>
+          <a:chOff x="0" y="0"/>
+          <a:chExt cx="0" cy="0"/>
+        </a:xfrm>
+      </p:grpSpPr>
+      <p:sp>
+        <p:nvSpPr>
+          <p:cNvPr id="4" name="3 Título"/>
+          <p:cNvSpPr>
+            <a:spLocks noGrp="1"/>
+          </p:cNvSpPr>
+          <p:nvPr>
+            <p:ph type="title"/>
+          </p:nvPr>
+        </p:nvSpPr>
+        <p:spPr>
+          <a:extLst/>
+        </p:spPr>
+        <p:txBody>
+          <a:bodyPr rtlCol="0"/>
+          <a:lstStyle/>
+          <a:p>
+            <a:pPr fontAlgn="auto">
+              <a:spcAft>
+                <a:spcPts val="0"/>
+              </a:spcAft>
+              <a:defRPr/>
+            </a:pPr>
+            <a:r>
+              <a:rPr lang="es-AR" dirty="0" err="1" smtClean="0">
+                <a:latin typeface="+mn-lt"/>
+              </a:rPr>
+              <a:t>Working</a:t>
+            </a:r>
+            <a:r>
+              <a:rPr lang="es-AR" dirty="0" smtClean="0">
+                <a:latin typeface="+mn-lt"/>
+              </a:rPr>
+              <a:t> </a:t>
+            </a:r>
+            <a:r>
+              <a:rPr lang="es-AR" dirty="0" err="1" smtClean="0">
+                <a:latin typeface="+mn-lt"/>
+              </a:rPr>
+              <a:t>with</a:t>
+            </a:r>
+            <a:r>
+              <a:rPr lang="es-AR" dirty="0" smtClean="0">
+                <a:latin typeface="+mn-lt"/>
+              </a:rPr>
+              <a:t> </a:t>
+            </a:r>
+            <a:r>
+              <a:rPr lang="es-AR" dirty="0" err="1" smtClean="0">
+                <a:latin typeface="+mn-lt"/>
+              </a:rPr>
+              <a:t>Legacy</a:t>
+            </a:r>
+            <a:r>
+              <a:rPr lang="es-AR" dirty="0" smtClean="0">
+                <a:latin typeface="+mn-lt"/>
+              </a:rPr>
+              <a:t> </a:t>
+            </a:r>
+            <a:r>
+              <a:rPr lang="es-AR" dirty="0" err="1" smtClean="0">
+                <a:latin typeface="+mn-lt"/>
+              </a:rPr>
+              <a:t>code</a:t>
+            </a:r>
+            <a:endParaRPr dirty="0">
+              <a:latin typeface="+mn-lt"/>
+            </a:endParaRPr>
+          </a:p>
+        </p:txBody>
+      </p:sp>
+      <p:sp>
+        <p:nvSpPr>
+          <p:cNvPr id="5" name="4 Marcador de texto"/>
+          <p:cNvSpPr>
+            <a:spLocks noGrp="1"/>
+          </p:cNvSpPr>
+          <p:nvPr>
+            <p:ph type="body" idx="1"/>
+          </p:nvPr>
+        </p:nvSpPr>
+        <p:spPr>
+          <a:xfrm>
+            <a:off x="971550" y="3513138"/>
+            <a:ext cx="7412038" cy="1500187"/>
+          </a:xfrm>
+        </p:spPr>
+        <p:txBody>
+          <a:bodyPr rtlCol="0">
+            <a:noAutofit/>
+          </a:bodyPr>
+          <a:lstStyle/>
+          <a:p>
+            <a:pPr eaLnBrk="1" fontAlgn="auto" hangingPunct="1">
+              <a:spcAft>
+                <a:spcPts val="0"/>
+              </a:spcAft>
+              <a:defRPr/>
+            </a:pPr>
+            <a:endParaRPr lang="es-AR" sz="1600" dirty="0">
+              <a:latin typeface="+mn-lt"/>
+            </a:endParaRPr>
+          </a:p>
+          <a:p>
+            <a:pPr eaLnBrk="1" fontAlgn="auto" hangingPunct="1">
+              <a:spcAft>
+                <a:spcPts val="0"/>
+              </a:spcAft>
+              <a:defRPr/>
+            </a:pPr>
+            <a:endParaRPr lang="es-AR" dirty="0"/>
+          </a:p>
+        </p:txBody>
+      </p:sp>
+    </p:spTree>
+    <p:extLst>
+      <p:ext uri="{BB962C8B-B14F-4D97-AF65-F5344CB8AC3E}">
+        <p14:creationId xmlns:p14="http://schemas.microsoft.com/office/powerpoint/2010/main" val="1383738177"/>
+      </p:ext>
+    </p:extLst>
+  </p:cSld>
+  <p:clrMapOvr>
+    <a:masterClrMapping/>
+  </p:clrMapOvr>
+  <p:timing>
+    <p:tnLst>
+      <p:par>
+        <p:cTn id="1" dur="indefinite" restart="never" nodeType="tmRoot"/>
+      </p:par>
+    </p:tnLst>
+  </p:timing>
+</p:sld>
+</file>
+
+<file path=ppt/slides/slide23.xml><?xml version="1.0" encoding="utf-8"?>
+<p:sld xmlns:a="http://schemas.openxmlformats.org/drawingml/2006/main" xmlns:r="http://schemas.openxmlformats.org/officeDocument/2006/relationships" xmlns:p="http://schemas.openxmlformats.org/presentationml/2006/main">
+  <p:cSld>
+    <p:spTree>
+      <p:nvGrpSpPr>
+        <p:cNvPr id="1" name=""/>
+        <p:cNvGrpSpPr/>
+        <p:nvPr/>
+      </p:nvGrpSpPr>
+      <p:grpSpPr>
+        <a:xfrm>
+          <a:off x="0" y="0"/>
+          <a:ext cx="0" cy="0"/>
+          <a:chOff x="0" y="0"/>
+          <a:chExt cx="0" cy="0"/>
+        </a:xfrm>
+      </p:grpSpPr>
+      <p:sp>
+        <p:nvSpPr>
+          <p:cNvPr id="12290" name="Content Placeholder 2"/>
+          <p:cNvSpPr>
+            <a:spLocks noGrp="1"/>
+          </p:cNvSpPr>
+          <p:nvPr>
+            <p:ph sz="half" idx="2"/>
+          </p:nvPr>
+        </p:nvSpPr>
+        <p:spPr>
+          <a:xfrm>
+            <a:off x="755650" y="1130300"/>
+            <a:ext cx="8064500" cy="4891088"/>
+          </a:xfrm>
+        </p:spPr>
+        <p:txBody>
+          <a:bodyPr/>
+          <a:lstStyle/>
+          <a:p>
+            <a:pPr marL="0" lvl="1" indent="0" eaLnBrk="1" hangingPunct="1">
+              <a:spcBef>
+                <a:spcPts val="1200"/>
+              </a:spcBef>
+              <a:buFont typeface="Wingdings" panose="05000000000000000000" pitchFamily="2" charset="2"/>
+              <a:buChar char="§"/>
+            </a:pPr>
+            <a:r>
+              <a:rPr lang="en-GB" sz="2000" dirty="0">
+                <a:latin typeface="+mj-lt"/>
+              </a:rPr>
+              <a:t> </a:t>
+            </a:r>
+            <a:endParaRPr lang="en-GB" i="1" dirty="0">
+              <a:latin typeface="+mj-lt"/>
+            </a:endParaRPr>
+          </a:p>
+        </p:txBody>
+      </p:sp>
+      <p:sp>
+        <p:nvSpPr>
+          <p:cNvPr id="6" name="Title 5"/>
+          <p:cNvSpPr>
+            <a:spLocks noGrp="1"/>
+          </p:cNvSpPr>
+          <p:nvPr>
+            <p:ph type="title"/>
+          </p:nvPr>
+        </p:nvSpPr>
+        <p:spPr>
+          <a:xfrm>
+            <a:off x="755650" y="0"/>
+            <a:ext cx="7931150" cy="836613"/>
+          </a:xfrm>
+        </p:spPr>
+        <p:txBody>
+          <a:bodyPr>
+            <a:noAutofit/>
+          </a:bodyPr>
+          <a:lstStyle/>
+          <a:p>
+            <a:pPr lvl="0"/>
+            <a:r>
+              <a:rPr lang="es-AR" sz="2400" dirty="0" err="1"/>
+              <a:t>Tip</a:t>
+            </a:r>
+            <a:r>
+              <a:rPr lang="es-AR" sz="2400" dirty="0"/>
+              <a:t> 1: </a:t>
+            </a:r>
+            <a:r>
+              <a:rPr lang="es-AR" sz="2400" dirty="0" err="1"/>
+              <a:t>Decouple</a:t>
+            </a:r>
+            <a:r>
+              <a:rPr lang="es-AR" sz="2400" dirty="0"/>
+              <a:t> </a:t>
+            </a:r>
+            <a:r>
+              <a:rPr lang="es-AR" sz="2400" dirty="0" err="1"/>
+              <a:t>method</a:t>
+            </a:r>
+            <a:r>
+              <a:rPr lang="es-AR" sz="2400" dirty="0"/>
+              <a:t> </a:t>
+            </a:r>
+            <a:r>
+              <a:rPr lang="es-AR" sz="2400" dirty="0" err="1"/>
+              <a:t>code</a:t>
+            </a:r>
+            <a:endParaRPr lang="es-AR" sz="2400" dirty="0"/>
+          </a:p>
+        </p:txBody>
+      </p:sp>
+    </p:spTree>
+    <p:extLst>
+      <p:ext uri="{BB962C8B-B14F-4D97-AF65-F5344CB8AC3E}">
+        <p14:creationId xmlns:p14="http://schemas.microsoft.com/office/powerpoint/2010/main" val="2433608601"/>
+      </p:ext>
+    </p:extLst>
+  </p:cSld>
+  <p:clrMapOvr>
+    <a:masterClrMapping/>
+  </p:clrMapOvr>
+  <p:timing>
+    <p:tnLst>
+      <p:par>
+        <p:cTn id="1" dur="indefinite" restart="never" nodeType="tmRoot"/>
+      </p:par>
+    </p:tnLst>
+  </p:timing>
+</p:sld>
+</file>
+
+<file path=ppt/slides/slide24.xml><?xml version="1.0" encoding="utf-8"?>
+<p:sld xmlns:a="http://schemas.openxmlformats.org/drawingml/2006/main" xmlns:r="http://schemas.openxmlformats.org/officeDocument/2006/relationships" xmlns:p="http://schemas.openxmlformats.org/presentationml/2006/main">
+  <p:cSld>
+    <p:spTree>
+      <p:nvGrpSpPr>
+        <p:cNvPr id="1" name=""/>
+        <p:cNvGrpSpPr/>
+        <p:nvPr/>
+      </p:nvGrpSpPr>
+      <p:grpSpPr>
+        <a:xfrm>
+          <a:off x="0" y="0"/>
+          <a:ext cx="0" cy="0"/>
+          <a:chOff x="0" y="0"/>
+          <a:chExt cx="0" cy="0"/>
+        </a:xfrm>
+      </p:grpSpPr>
+      <p:sp>
+        <p:nvSpPr>
+          <p:cNvPr id="12290" name="Content Placeholder 2"/>
+          <p:cNvSpPr>
+            <a:spLocks noGrp="1"/>
+          </p:cNvSpPr>
+          <p:nvPr>
+            <p:ph sz="half" idx="2"/>
+          </p:nvPr>
+        </p:nvSpPr>
+        <p:spPr>
+          <a:xfrm>
+            <a:off x="755650" y="1130300"/>
+            <a:ext cx="8064500" cy="4891088"/>
+          </a:xfrm>
+        </p:spPr>
+        <p:txBody>
+          <a:bodyPr/>
+          <a:lstStyle/>
+          <a:p>
+            <a:pPr marL="0" lvl="1" indent="0" eaLnBrk="1" hangingPunct="1">
+              <a:spcBef>
+                <a:spcPts val="1200"/>
+              </a:spcBef>
+              <a:buFont typeface="Wingdings" panose="05000000000000000000" pitchFamily="2" charset="2"/>
+              <a:buChar char="§"/>
+            </a:pPr>
+            <a:r>
+              <a:rPr lang="en-GB" sz="2000" dirty="0">
+                <a:latin typeface="+mj-lt"/>
+              </a:rPr>
+              <a:t> </a:t>
+            </a:r>
+            <a:endParaRPr lang="en-GB" i="1" dirty="0">
+              <a:latin typeface="+mj-lt"/>
+            </a:endParaRPr>
+          </a:p>
+        </p:txBody>
+      </p:sp>
+      <p:sp>
+        <p:nvSpPr>
+          <p:cNvPr id="6" name="Title 5"/>
+          <p:cNvSpPr>
+            <a:spLocks noGrp="1"/>
+          </p:cNvSpPr>
+          <p:nvPr>
+            <p:ph type="title"/>
+          </p:nvPr>
+        </p:nvSpPr>
+        <p:spPr>
+          <a:xfrm>
+            <a:off x="755650" y="0"/>
+            <a:ext cx="7931150" cy="836613"/>
+          </a:xfrm>
+        </p:spPr>
+        <p:txBody>
+          <a:bodyPr>
+            <a:noAutofit/>
+          </a:bodyPr>
+          <a:lstStyle/>
+          <a:p>
+            <a:pPr lvl="0"/>
+            <a:r>
+              <a:rPr lang="es-AR" sz="2400" dirty="0" err="1"/>
+              <a:t>Tip</a:t>
+            </a:r>
+            <a:r>
+              <a:rPr lang="es-AR" sz="2400" dirty="0"/>
+              <a:t> 2: Test </a:t>
+            </a:r>
+            <a:r>
+              <a:rPr lang="es-AR" sz="2400" dirty="0" err="1"/>
+              <a:t>method</a:t>
+            </a:r>
+            <a:endParaRPr lang="es-AR" sz="2400" dirty="0"/>
+          </a:p>
+        </p:txBody>
+      </p:sp>
+    </p:spTree>
+    <p:extLst>
+      <p:ext uri="{BB962C8B-B14F-4D97-AF65-F5344CB8AC3E}">
+        <p14:creationId xmlns:p14="http://schemas.microsoft.com/office/powerpoint/2010/main" val="3712365801"/>
+      </p:ext>
+    </p:extLst>
+  </p:cSld>
+  <p:clrMapOvr>
+    <a:masterClrMapping/>
+  </p:clrMapOvr>
+  <p:timing>
+    <p:tnLst>
+      <p:par>
+        <p:cTn id="1" dur="indefinite" restart="never" nodeType="tmRoot"/>
+      </p:par>
+    </p:tnLst>
+  </p:timing>
+</p:sld>
+</file>
+
+<file path=ppt/slides/slide25.xml><?xml version="1.0" encoding="utf-8"?>
+<p:sld xmlns:a="http://schemas.openxmlformats.org/drawingml/2006/main" xmlns:r="http://schemas.openxmlformats.org/officeDocument/2006/relationships" xmlns:p="http://schemas.openxmlformats.org/presentationml/2006/main">
+  <p:cSld>
+    <p:spTree>
+      <p:nvGrpSpPr>
+        <p:cNvPr id="1" name=""/>
+        <p:cNvGrpSpPr/>
+        <p:nvPr/>
+      </p:nvGrpSpPr>
+      <p:grpSpPr>
+        <a:xfrm>
+          <a:off x="0" y="0"/>
+          <a:ext cx="0" cy="0"/>
+          <a:chOff x="0" y="0"/>
+          <a:chExt cx="0" cy="0"/>
+        </a:xfrm>
+      </p:grpSpPr>
+      <p:sp>
+        <p:nvSpPr>
+          <p:cNvPr id="12290" name="Content Placeholder 2"/>
+          <p:cNvSpPr>
+            <a:spLocks noGrp="1"/>
+          </p:cNvSpPr>
+          <p:nvPr>
+            <p:ph sz="half" idx="2"/>
+          </p:nvPr>
+        </p:nvSpPr>
+        <p:spPr>
+          <a:xfrm>
+            <a:off x="755650" y="1130300"/>
+            <a:ext cx="8064500" cy="4891088"/>
+          </a:xfrm>
+        </p:spPr>
+        <p:txBody>
+          <a:bodyPr/>
+          <a:lstStyle/>
+          <a:p>
+            <a:pPr marL="0" lvl="1" indent="0" eaLnBrk="1" hangingPunct="1">
+              <a:spcBef>
+                <a:spcPts val="1200"/>
+              </a:spcBef>
+              <a:buFont typeface="Wingdings" panose="05000000000000000000" pitchFamily="2" charset="2"/>
+              <a:buChar char="§"/>
+            </a:pPr>
+            <a:r>
+              <a:rPr lang="en-GB" sz="2000" dirty="0">
+                <a:latin typeface="+mj-lt"/>
+              </a:rPr>
+              <a:t> </a:t>
+            </a:r>
+            <a:endParaRPr lang="en-GB" i="1" dirty="0">
+              <a:latin typeface="+mj-lt"/>
+            </a:endParaRPr>
+          </a:p>
+        </p:txBody>
+      </p:sp>
+      <p:sp>
+        <p:nvSpPr>
+          <p:cNvPr id="6" name="Title 5"/>
+          <p:cNvSpPr>
+            <a:spLocks noGrp="1"/>
+          </p:cNvSpPr>
+          <p:nvPr>
+            <p:ph type="title"/>
+          </p:nvPr>
+        </p:nvSpPr>
+        <p:spPr>
+          <a:xfrm>
+            <a:off x="755650" y="0"/>
+            <a:ext cx="7931150" cy="836613"/>
+          </a:xfrm>
+        </p:spPr>
+        <p:txBody>
+          <a:bodyPr>
+            <a:noAutofit/>
+          </a:bodyPr>
+          <a:lstStyle/>
+          <a:p>
+            <a:pPr lvl="0"/>
+            <a:r>
+              <a:rPr lang="es-AR" sz="2400" dirty="0" err="1"/>
+              <a:t>Tip</a:t>
+            </a:r>
+            <a:r>
+              <a:rPr lang="es-AR" sz="2400" dirty="0"/>
+              <a:t> 3: </a:t>
+            </a:r>
+            <a:r>
+              <a:rPr lang="es-AR" sz="2400" dirty="0" err="1"/>
+              <a:t>Refactoring</a:t>
+            </a:r>
+            <a:endParaRPr lang="es-AR" sz="2400" dirty="0"/>
+          </a:p>
+        </p:txBody>
+      </p:sp>
+      <p:pic>
+        <p:nvPicPr>
+          <p:cNvPr id="1026" name="Picture 2" descr="http://1.bp.blogspot.com/-Mpykpfpj4l4/U7mwCWCX7TI/AAAAAAAAr_I/nEhB7tgjYhY/w600-h450/Brtku2iCMAI36EV.jpg"/>
+          <p:cNvPicPr>
+            <a:picLocks noChangeAspect="1" noChangeArrowheads="1"/>
+          </p:cNvPicPr>
+          <p:nvPr/>
+        </p:nvPicPr>
+        <p:blipFill>
+          <a:blip r:embed="rId2">
+            <a:extLst>
+              <a:ext uri="{28A0092B-C50C-407E-A947-70E740481C1C}">
+                <a14:useLocalDpi xmlns:a14="http://schemas.microsoft.com/office/drawing/2010/main" val="0"/>
+              </a:ext>
+            </a:extLst>
+          </a:blip>
+          <a:srcRect/>
+          <a:stretch>
+            <a:fillRect/>
+          </a:stretch>
+        </p:blipFill>
+        <p:spPr bwMode="auto">
+          <a:xfrm>
+            <a:off x="1475656" y="1196752"/>
+            <a:ext cx="5715000" cy="4286250"/>
+          </a:xfrm>
+          <a:prstGeom prst="rect">
+            <a:avLst/>
+          </a:prstGeom>
+          <a:noFill/>
+          <a:extLst>
+            <a:ext uri="{909E8E84-426E-40DD-AFC4-6F175D3DCCD1}">
+              <a14:hiddenFill xmlns:a14="http://schemas.microsoft.com/office/drawing/2010/main">
+                <a:solidFill>
+                  <a:srgbClr val="FFFFFF"/>
+                </a:solidFill>
+              </a14:hiddenFill>
+            </a:ext>
+          </a:extLst>
+        </p:spPr>
+      </p:pic>
+    </p:spTree>
+    <p:extLst>
+      <p:ext uri="{BB962C8B-B14F-4D97-AF65-F5344CB8AC3E}">
+        <p14:creationId xmlns:p14="http://schemas.microsoft.com/office/powerpoint/2010/main" val="4270315029"/>
+      </p:ext>
+    </p:extLst>
+  </p:cSld>
+  <p:clrMapOvr>
+    <a:masterClrMapping/>
+  </p:clrMapOvr>
+  <p:timing>
+    <p:tnLst>
+      <p:par>
+        <p:cTn id="1" dur="indefinite" restart="never" nodeType="tmRoot"/>
+      </p:par>
+    </p:tnLst>
+  </p:timing>
+</p:sld>
+</file>
+
+<file path=ppt/slides/slide26.xml><?xml version="1.0" encoding="utf-8"?>
+<p:sld xmlns:a="http://schemas.openxmlformats.org/drawingml/2006/main" xmlns:r="http://schemas.openxmlformats.org/officeDocument/2006/relationships" xmlns:p="http://schemas.openxmlformats.org/presentationml/2006/main">
+  <p:cSld>
+    <p:spTree>
+      <p:nvGrpSpPr>
+        <p:cNvPr id="1" name=""/>
+        <p:cNvGrpSpPr/>
+        <p:nvPr/>
+      </p:nvGrpSpPr>
+      <p:grpSpPr>
+        <a:xfrm>
+          <a:off x="0" y="0"/>
+          <a:ext cx="0" cy="0"/>
+          <a:chOff x="0" y="0"/>
+          <a:chExt cx="0" cy="0"/>
+        </a:xfrm>
+      </p:grpSpPr>
+      <p:sp>
+        <p:nvSpPr>
           <p:cNvPr id="36866" name="Line 6"/>
           <p:cNvSpPr>
             <a:spLocks noChangeShapeType="1"/>
@@ -6039,109 +8045,6 @@
 </p:sld>
 </file>
 
-<file path=ppt/slides/slide2.xml><?xml version="1.0" encoding="utf-8"?>
-<p:sld xmlns:a="http://schemas.openxmlformats.org/drawingml/2006/main" xmlns:r="http://schemas.openxmlformats.org/officeDocument/2006/relationships" xmlns:p="http://schemas.openxmlformats.org/presentationml/2006/main">
-  <p:cSld>
-    <p:spTree>
-      <p:nvGrpSpPr>
-        <p:cNvPr id="1" name=""/>
-        <p:cNvGrpSpPr/>
-        <p:nvPr/>
-      </p:nvGrpSpPr>
-      <p:grpSpPr>
-        <a:xfrm>
-          <a:off x="0" y="0"/>
-          <a:ext cx="0" cy="0"/>
-          <a:chOff x="0" y="0"/>
-          <a:chExt cx="0" cy="0"/>
-        </a:xfrm>
-      </p:grpSpPr>
-      <p:sp>
-        <p:nvSpPr>
-          <p:cNvPr id="10242" name="Content Placeholder 2"/>
-          <p:cNvSpPr>
-            <a:spLocks noGrp="1"/>
-          </p:cNvSpPr>
-          <p:nvPr>
-            <p:ph sz="half" idx="2"/>
-          </p:nvPr>
-        </p:nvSpPr>
-        <p:spPr>
-          <a:xfrm>
-            <a:off x="755650" y="1130300"/>
-            <a:ext cx="8064500" cy="4891088"/>
-          </a:xfrm>
-        </p:spPr>
-        <p:txBody>
-          <a:bodyPr/>
-          <a:lstStyle/>
-          <a:p>
-            <a:pPr marL="0" indent="0" eaLnBrk="1" hangingPunct="1">
-              <a:spcBef>
-                <a:spcPts val="1200"/>
-              </a:spcBef>
-            </a:pPr>
-            <a:r>
-              <a:rPr lang="es-AR" altLang="es-AR" sz="1800" dirty="0" smtClean="0">
-                <a:latin typeface="Calibri" panose="020F0502020204030204" pitchFamily="34" charset="0"/>
-              </a:rPr>
-              <a:t> Objetivos</a:t>
-            </a:r>
-            <a:endParaRPr lang="es-AR" altLang="es-AR" sz="1600" dirty="0" smtClean="0">
-              <a:latin typeface="Calibri" panose="020F0502020204030204" pitchFamily="34" charset="0"/>
-            </a:endParaRPr>
-          </a:p>
-        </p:txBody>
-      </p:sp>
-      <p:sp>
-        <p:nvSpPr>
-          <p:cNvPr id="6" name="Title 5"/>
-          <p:cNvSpPr>
-            <a:spLocks noGrp="1"/>
-          </p:cNvSpPr>
-          <p:nvPr>
-            <p:ph type="title"/>
-          </p:nvPr>
-        </p:nvSpPr>
-        <p:spPr>
-          <a:xfrm>
-            <a:off x="755650" y="0"/>
-            <a:ext cx="7931150" cy="836613"/>
-          </a:xfrm>
-        </p:spPr>
-        <p:txBody>
-          <a:bodyPr/>
-          <a:lstStyle/>
-          <a:p>
-            <a:pPr eaLnBrk="1" fontAlgn="auto" hangingPunct="1">
-              <a:spcAft>
-                <a:spcPts val="0"/>
-              </a:spcAft>
-              <a:defRPr/>
-            </a:pPr>
-            <a:r>
-              <a:rPr dirty="0" smtClean="0"/>
-              <a:t>Agenda</a:t>
-            </a:r>
-            <a:endParaRPr dirty="0"/>
-          </a:p>
-        </p:txBody>
-      </p:sp>
-    </p:spTree>
-  </p:cSld>
-  <p:clrMapOvr>
-    <a:masterClrMapping/>
-  </p:clrMapOvr>
-  <p:timing>
-    <p:tnLst>
-      <p:par>
-        <p:cTn id="1" dur="indefinite" restart="never" nodeType="tmRoot"/>
-      </p:par>
-    </p:tnLst>
-  </p:timing>
-</p:sld>
-</file>
-
 <file path=ppt/slides/slide3.xml><?xml version="1.0" encoding="utf-8"?>
 <p:sld xmlns:a="http://schemas.openxmlformats.org/drawingml/2006/main" xmlns:r="http://schemas.openxmlformats.org/officeDocument/2006/relationships" xmlns:p="http://schemas.openxmlformats.org/presentationml/2006/main">
   <p:cSld>
@@ -6361,29 +8264,6 @@
               </a:spcAft>
               <a:defRPr/>
             </a:pPr>
-            <a:r>
-              <a:rPr lang="es-AR" sz="1600" dirty="0" err="1" smtClean="0">
-                <a:latin typeface="+mn-lt"/>
-              </a:rPr>
-              <a:t>Tip</a:t>
-            </a:r>
-            <a:r>
-              <a:rPr lang="es-AR" sz="1600" dirty="0" smtClean="0">
-                <a:latin typeface="+mn-lt"/>
-              </a:rPr>
-              <a:t> 1….</a:t>
-            </a:r>
-            <a:endParaRPr lang="es-AR" sz="1600" dirty="0">
-              <a:latin typeface="+mn-lt"/>
-            </a:endParaRPr>
-          </a:p>
-          <a:p>
-            <a:pPr eaLnBrk="1" fontAlgn="auto" hangingPunct="1">
-              <a:spcAft>
-                <a:spcPts val="0"/>
-              </a:spcAft>
-              <a:defRPr/>
-            </a:pPr>
             <a:endParaRPr lang="es-AR" sz="1600" dirty="0">
               <a:latin typeface="+mn-lt"/>
             </a:endParaRPr>
@@ -6730,13 +8610,289 @@
           <a:bodyPr/>
           <a:lstStyle/>
           <a:p>
-            <a:pPr marL="0" indent="0" eaLnBrk="1" hangingPunct="1">
+            <a:pPr eaLnBrk="1" hangingPunct="1">
               <a:spcBef>
                 <a:spcPts val="1200"/>
               </a:spcBef>
-              <a:buNone/>
-            </a:pPr>
-            <a:endParaRPr lang="en-GB" altLang="es-AR" dirty="0" smtClean="0">
+            </a:pPr>
+            <a:r>
+              <a:rPr lang="en-US" dirty="0">
+                <a:latin typeface="+mj-lt"/>
+              </a:rPr>
+              <a:t>An injection is the passing of a dependency </a:t>
+            </a:r>
+            <a:r>
+              <a:rPr lang="en-US" dirty="0" smtClean="0">
+                <a:latin typeface="+mj-lt"/>
+              </a:rPr>
+              <a:t>(a service) to </a:t>
+            </a:r>
+            <a:r>
+              <a:rPr lang="en-US" dirty="0">
+                <a:latin typeface="+mj-lt"/>
+              </a:rPr>
+              <a:t>a dependent object</a:t>
+            </a:r>
+            <a:r>
+              <a:rPr lang="en-US" dirty="0" smtClean="0">
+                <a:latin typeface="+mj-lt"/>
+              </a:rPr>
+              <a:t> (a client). </a:t>
+            </a:r>
+            <a:r>
+              <a:rPr lang="en-US" dirty="0">
+                <a:latin typeface="+mj-lt"/>
+              </a:rPr>
+              <a:t>The service is made part of the client's state. </a:t>
+            </a:r>
+            <a:r>
+              <a:rPr lang="en-US" dirty="0" smtClean="0">
+                <a:latin typeface="+mj-lt"/>
+              </a:rPr>
+              <a:t>The </a:t>
+            </a:r>
+            <a:r>
+              <a:rPr lang="en-US" dirty="0">
+                <a:latin typeface="+mj-lt"/>
+              </a:rPr>
+              <a:t>client </a:t>
+            </a:r>
+            <a:r>
+              <a:rPr lang="en-US" dirty="0" smtClean="0">
+                <a:latin typeface="+mj-lt"/>
+              </a:rPr>
+              <a:t>does not build </a:t>
+            </a:r>
+            <a:r>
+              <a:rPr lang="en-US" dirty="0">
+                <a:latin typeface="+mj-lt"/>
+              </a:rPr>
+              <a:t>or find the </a:t>
+            </a:r>
+            <a:r>
+              <a:rPr lang="en-US" dirty="0" smtClean="0">
+                <a:latin typeface="+mj-lt"/>
+              </a:rPr>
+              <a:t>service.</a:t>
+            </a:r>
+            <a:endParaRPr lang="en-US" dirty="0">
+              <a:latin typeface="+mj-lt"/>
+            </a:endParaRPr>
+          </a:p>
+          <a:p>
+            <a:pPr eaLnBrk="1" hangingPunct="1">
+              <a:spcBef>
+                <a:spcPts val="1200"/>
+              </a:spcBef>
+            </a:pPr>
+            <a:r>
+              <a:rPr lang="en-US" dirty="0" smtClean="0">
+                <a:latin typeface="+mj-lt"/>
+              </a:rPr>
+              <a:t>Requires </a:t>
+            </a:r>
+            <a:r>
+              <a:rPr lang="en-US" dirty="0">
+                <a:latin typeface="+mj-lt"/>
+              </a:rPr>
+              <a:t>the client to provide a parameter in a constructor for the </a:t>
+            </a:r>
+            <a:r>
+              <a:rPr lang="en-US" dirty="0" smtClean="0">
+                <a:latin typeface="+mj-lt"/>
+              </a:rPr>
+              <a:t>dependency</a:t>
+            </a:r>
+          </a:p>
+          <a:p>
+            <a:pPr lvl="1" eaLnBrk="1" hangingPunct="1">
+              <a:spcBef>
+                <a:spcPts val="1200"/>
+              </a:spcBef>
+              <a:buFont typeface="Wingdings" panose="05000000000000000000" pitchFamily="2" charset="2"/>
+              <a:buChar char="§"/>
+            </a:pPr>
+            <a:r>
+              <a:rPr lang="en-US" dirty="0" smtClean="0">
+                <a:latin typeface="+mj-lt"/>
+              </a:rPr>
+              <a:t>public Constructor (</a:t>
+            </a:r>
+            <a:r>
+              <a:rPr lang="en-US" dirty="0" err="1" smtClean="0">
+                <a:latin typeface="+mj-lt"/>
+              </a:rPr>
+              <a:t>IDependency</a:t>
+            </a:r>
+            <a:r>
+              <a:rPr lang="en-US" dirty="0" smtClean="0">
+                <a:latin typeface="+mj-lt"/>
+              </a:rPr>
+              <a:t> dependency)</a:t>
+            </a:r>
+          </a:p>
+          <a:p>
+            <a:pPr eaLnBrk="1" hangingPunct="1">
+              <a:spcBef>
+                <a:spcPts val="1200"/>
+              </a:spcBef>
+            </a:pPr>
+            <a:r>
+              <a:rPr lang="en-US" dirty="0">
+                <a:latin typeface="+mj-lt"/>
+              </a:rPr>
+              <a:t>Removes all knowledge about a concrete implementation a client needs to use, promoting reusability, testability and maintainability</a:t>
+            </a:r>
+            <a:endParaRPr lang="en-US" dirty="0">
+              <a:latin typeface="+mj-lt"/>
+            </a:endParaRPr>
+          </a:p>
+          <a:p>
+            <a:pPr eaLnBrk="1" hangingPunct="1">
+              <a:spcBef>
+                <a:spcPts val="1200"/>
+              </a:spcBef>
+            </a:pPr>
+            <a:r>
+              <a:rPr lang="en-US" dirty="0" smtClean="0">
+                <a:latin typeface="+mj-lt"/>
+              </a:rPr>
+              <a:t>Mock objects can be injected for unit-testing</a:t>
+            </a:r>
+            <a:endParaRPr lang="en-US" dirty="0">
+              <a:latin typeface="+mj-lt"/>
+            </a:endParaRPr>
+          </a:p>
+          <a:p>
+            <a:pPr eaLnBrk="1" hangingPunct="1">
+              <a:spcBef>
+                <a:spcPts val="1200"/>
+              </a:spcBef>
+            </a:pPr>
+            <a:r>
+              <a:rPr lang="en-GB" dirty="0">
+                <a:latin typeface="+mj-lt"/>
+              </a:rPr>
+              <a:t>Adheres to Dependency inversion </a:t>
+            </a:r>
+            <a:r>
+              <a:rPr lang="en-GB" dirty="0">
+                <a:latin typeface="+mj-lt"/>
+              </a:rPr>
+              <a:t>principle</a:t>
+            </a:r>
+            <a:endParaRPr lang="en-US" dirty="0">
+              <a:latin typeface="+mj-lt"/>
+            </a:endParaRPr>
+          </a:p>
+          <a:p>
+            <a:pPr eaLnBrk="1" hangingPunct="1">
+              <a:spcBef>
+                <a:spcPts val="1200"/>
+              </a:spcBef>
+            </a:pPr>
+            <a:r>
+              <a:rPr lang="en-US" dirty="0" smtClean="0">
+                <a:latin typeface="+mj-lt"/>
+              </a:rPr>
+              <a:t>Makes </a:t>
+            </a:r>
+            <a:r>
+              <a:rPr lang="en-US" dirty="0">
+                <a:latin typeface="+mj-lt"/>
+              </a:rPr>
+              <a:t>violations of the Single Responsibility Principle </a:t>
+            </a:r>
+            <a:r>
+              <a:rPr lang="en-US" dirty="0" smtClean="0">
+                <a:latin typeface="+mj-lt"/>
+              </a:rPr>
+              <a:t>obvious</a:t>
+            </a:r>
+            <a:endParaRPr lang="en-GB" dirty="0" smtClean="0">
+              <a:latin typeface="+mj-lt"/>
+            </a:endParaRPr>
+          </a:p>
+          <a:p>
+            <a:pPr lvl="1" eaLnBrk="1" hangingPunct="1">
+              <a:spcBef>
+                <a:spcPts val="1200"/>
+              </a:spcBef>
+              <a:buFont typeface="Wingdings" panose="05000000000000000000" pitchFamily="2" charset="2"/>
+              <a:buChar char="§"/>
+            </a:pPr>
+            <a:r>
+              <a:rPr lang="en-GB" dirty="0" smtClean="0">
+                <a:latin typeface="+mj-lt"/>
+              </a:rPr>
+              <a:t>public Constructor(IClass1 c1, IClass2 c2, IClass3 c3, IClass4 c4, IClass5 c5, ……)</a:t>
+            </a:r>
+          </a:p>
+          <a:p>
+            <a:pPr eaLnBrk="1" hangingPunct="1">
+              <a:spcBef>
+                <a:spcPts val="1200"/>
+              </a:spcBef>
+            </a:pPr>
+            <a:r>
+              <a:rPr lang="en-GB" dirty="0" smtClean="0">
+                <a:latin typeface="+mj-lt"/>
+              </a:rPr>
+              <a:t>Dependency injection frameworks (IOC)</a:t>
+            </a:r>
+          </a:p>
+          <a:p>
+            <a:pPr lvl="1" eaLnBrk="1" hangingPunct="1">
+              <a:spcBef>
+                <a:spcPts val="1200"/>
+              </a:spcBef>
+              <a:buFont typeface="Wingdings" panose="05000000000000000000" pitchFamily="2" charset="2"/>
+              <a:buChar char="§"/>
+            </a:pPr>
+            <a:r>
+              <a:rPr lang="en-GB" dirty="0" err="1" smtClean="0">
+                <a:latin typeface="+mj-lt"/>
+              </a:rPr>
+              <a:t>Ninject</a:t>
+            </a:r>
+            <a:r>
+              <a:rPr lang="en-GB" dirty="0" smtClean="0">
+                <a:latin typeface="+mj-lt"/>
+              </a:rPr>
+              <a:t>, </a:t>
+            </a:r>
+            <a:r>
+              <a:rPr lang="en-GB" dirty="0" err="1" smtClean="0">
+                <a:latin typeface="+mj-lt"/>
+              </a:rPr>
+              <a:t>SimpleInjector</a:t>
+            </a:r>
+            <a:r>
+              <a:rPr lang="en-GB" dirty="0" smtClean="0">
+                <a:latin typeface="+mj-lt"/>
+              </a:rPr>
+              <a:t>, Castle, </a:t>
+            </a:r>
+            <a:r>
+              <a:rPr lang="en-GB" dirty="0" err="1" smtClean="0">
+                <a:latin typeface="+mj-lt"/>
+              </a:rPr>
+              <a:t>Autofac</a:t>
+            </a:r>
+            <a:r>
+              <a:rPr lang="en-GB" dirty="0" smtClean="0">
+                <a:latin typeface="+mj-lt"/>
+              </a:rPr>
+              <a:t>, Unity, Spring.NET…</a:t>
+            </a:r>
+          </a:p>
+          <a:p>
+            <a:pPr eaLnBrk="1" hangingPunct="1">
+              <a:spcBef>
+                <a:spcPts val="1200"/>
+              </a:spcBef>
+            </a:pPr>
+            <a:endParaRPr lang="en-US" dirty="0">
               <a:latin typeface="+mj-lt"/>
             </a:endParaRPr>
           </a:p>
@@ -6852,13 +9008,7 @@
               <a:rPr lang="en-GB" dirty="0" smtClean="0">
                 <a:latin typeface="+mj-lt"/>
               </a:rPr>
-              <a:t> Allows </a:t>
-            </a:r>
-            <a:r>
-              <a:rPr lang="en-GB" dirty="0" smtClean="0">
-                <a:latin typeface="+mj-lt"/>
-              </a:rPr>
-              <a:t>subclasses to implement new functionality without affecting other subclasses.</a:t>
+              <a:t> Allows subclasses to implement new functionality without affecting other subclasses.</a:t>
             </a:r>
           </a:p>
           <a:p>
@@ -7102,13 +9252,7 @@
               <a:rPr lang="en-US" dirty="0">
                 <a:latin typeface="+mj-lt"/>
               </a:rPr>
-              <a:t>Assert on the expected </a:t>
-            </a:r>
-            <a:r>
-              <a:rPr lang="en-US" dirty="0">
-                <a:latin typeface="+mj-lt"/>
-              </a:rPr>
-              <a:t>results</a:t>
+              <a:t>Assert on the expected results</a:t>
             </a:r>
           </a:p>
           <a:p>
@@ -7268,7 +9412,13 @@
               <a:rPr lang="en-US" dirty="0" smtClean="0">
                 <a:latin typeface="+mj-lt"/>
               </a:rPr>
-              <a:t>Named clearly and consistently</a:t>
+              <a:t>Is named </a:t>
+            </a:r>
+            <a:r>
+              <a:rPr lang="en-US" dirty="0" smtClean="0">
+                <a:latin typeface="+mj-lt"/>
+              </a:rPr>
+              <a:t>clearly and consistently</a:t>
             </a:r>
             <a:endParaRPr lang="en-US" dirty="0">
               <a:latin typeface="+mj-lt"/>
@@ -7283,11 +9433,14 @@
               <a:buChar char="§"/>
             </a:pPr>
             <a:r>
-              <a:rPr lang="en-US" dirty="0">
-                <a:latin typeface="+mj-lt"/>
-              </a:rPr>
-              <a:t>Readable</a:t>
-            </a:r>
+              <a:rPr lang="en-US" dirty="0" smtClean="0">
+                <a:latin typeface="+mj-lt"/>
+              </a:rPr>
+              <a:t>Is readable</a:t>
+            </a:r>
+            <a:endParaRPr lang="en-US" dirty="0">
+              <a:latin typeface="+mj-lt"/>
+            </a:endParaRPr>
           </a:p>
           <a:p>
             <a:pPr marL="547688" lvl="1" indent="-285750" eaLnBrk="1" hangingPunct="1">
@@ -7301,7 +9454,7 @@
               <a:rPr lang="en-US" dirty="0" smtClean="0">
                 <a:latin typeface="+mj-lt"/>
               </a:rPr>
-              <a:t>Maintainable</a:t>
+              <a:t>Is maintainable</a:t>
             </a:r>
             <a:endParaRPr lang="en-GB" i="1" dirty="0">
               <a:latin typeface="+mj-lt"/>
@@ -7397,7 +9550,7 @@
         </p:nvSpPr>
         <p:spPr>
           <a:xfrm>
-            <a:off x="755650" y="1130300"/>
+            <a:off x="755650" y="1052736"/>
             <a:ext cx="8064500" cy="4891088"/>
           </a:xfrm>
         </p:spPr>
@@ -7414,13 +9567,7 @@
               <a:rPr lang="en-US" dirty="0">
                 <a:latin typeface="+mj-lt"/>
               </a:rPr>
-              <a:t>Mock objects are simulated objects that mimic the behavior of real objects in controlled </a:t>
-            </a:r>
-            <a:r>
-              <a:rPr lang="en-US" dirty="0">
-                <a:latin typeface="+mj-lt"/>
-              </a:rPr>
-              <a:t>ways</a:t>
+              <a:t>Mock objects are simulated objects that mimic the behavior of real objects in controlled ways</a:t>
             </a:r>
           </a:p>
           <a:p>
@@ -7486,13 +9633,7 @@
               <a:rPr lang="en-US" dirty="0">
                 <a:latin typeface="+mj-lt"/>
               </a:rPr>
-              <a:t>Program to an interface, not an </a:t>
-            </a:r>
-            <a:r>
-              <a:rPr lang="en-US" dirty="0">
-                <a:latin typeface="+mj-lt"/>
-              </a:rPr>
-              <a:t>implementation</a:t>
+              <a:t>Program to an interface, not an implementation</a:t>
             </a:r>
           </a:p>
           <a:p>
@@ -7604,7 +9745,30 @@
               <a:rPr lang="en-US" dirty="0" smtClean="0">
                 <a:latin typeface="+mj-lt"/>
               </a:rPr>
-              <a:t>Verify that the mock object was called the expected number of times and with the expected parameters</a:t>
+              <a:t>Verify that the mock object was called the expected </a:t>
+            </a:r>
+            <a:r>
+              <a:rPr lang="en-US" dirty="0" smtClean="0">
+                <a:latin typeface="+mj-lt"/>
+              </a:rPr>
+              <a:t>number</a:t>
+            </a:r>
+            <a:br>
+              <a:rPr lang="en-US" dirty="0" smtClean="0">
+                <a:latin typeface="+mj-lt"/>
+              </a:rPr>
+            </a:br>
+            <a:r>
+              <a:rPr lang="en-US" dirty="0" smtClean="0">
+                <a:latin typeface="+mj-lt"/>
+              </a:rPr>
+              <a:t>of </a:t>
+            </a:r>
+            <a:r>
+              <a:rPr lang="en-US" dirty="0" smtClean="0">
+                <a:latin typeface="+mj-lt"/>
+              </a:rPr>
+              <a:t>times and with the expected parameters</a:t>
             </a:r>
             <a:endParaRPr lang="en-US" dirty="0">
               <a:latin typeface="+mj-lt"/>

</xml_diff>

<commit_message>
MSBuild + Tips 8 y 9
</commit_message>
<xml_diff>
--- a/Test-Oriented Development.pptx
+++ b/Test-Oriented Development.pptx
@@ -5,10 +5,10 @@
     <p:sldMasterId id="2147483648" r:id="rId1"/>
   </p:sldMasterIdLst>
   <p:notesMasterIdLst>
-    <p:notesMasterId r:id="rId28"/>
+    <p:notesMasterId r:id="rId32"/>
   </p:notesMasterIdLst>
   <p:handoutMasterIdLst>
-    <p:handoutMasterId r:id="rId29"/>
+    <p:handoutMasterId r:id="rId33"/>
   </p:handoutMasterIdLst>
   <p:sldIdLst>
     <p:sldId id="276" r:id="rId2"/>
@@ -23,20 +23,24 @@
     <p:sldId id="433" r:id="rId11"/>
     <p:sldId id="436" r:id="rId12"/>
     <p:sldId id="437" r:id="rId13"/>
-    <p:sldId id="438" r:id="rId14"/>
-    <p:sldId id="439" r:id="rId15"/>
-    <p:sldId id="441" r:id="rId16"/>
-    <p:sldId id="442" r:id="rId17"/>
-    <p:sldId id="443" r:id="rId18"/>
-    <p:sldId id="444" r:id="rId19"/>
-    <p:sldId id="445" r:id="rId20"/>
-    <p:sldId id="446" r:id="rId21"/>
-    <p:sldId id="447" r:id="rId22"/>
-    <p:sldId id="440" r:id="rId23"/>
-    <p:sldId id="448" r:id="rId24"/>
-    <p:sldId id="449" r:id="rId25"/>
-    <p:sldId id="450" r:id="rId26"/>
-    <p:sldId id="428" r:id="rId27"/>
+    <p:sldId id="451" r:id="rId14"/>
+    <p:sldId id="452" r:id="rId15"/>
+    <p:sldId id="453" r:id="rId16"/>
+    <p:sldId id="438" r:id="rId17"/>
+    <p:sldId id="454" r:id="rId18"/>
+    <p:sldId id="439" r:id="rId19"/>
+    <p:sldId id="441" r:id="rId20"/>
+    <p:sldId id="442" r:id="rId21"/>
+    <p:sldId id="443" r:id="rId22"/>
+    <p:sldId id="444" r:id="rId23"/>
+    <p:sldId id="445" r:id="rId24"/>
+    <p:sldId id="446" r:id="rId25"/>
+    <p:sldId id="447" r:id="rId26"/>
+    <p:sldId id="440" r:id="rId27"/>
+    <p:sldId id="448" r:id="rId28"/>
+    <p:sldId id="449" r:id="rId29"/>
+    <p:sldId id="450" r:id="rId30"/>
+    <p:sldId id="428" r:id="rId31"/>
   </p:sldIdLst>
   <p:sldSz cx="9144000" cy="6858000" type="screen4x3"/>
   <p:notesSz cx="7099300" cy="10234613"/>
@@ -320,7 +324,7 @@
               <a:pPr>
                 <a:defRPr/>
               </a:pPr>
-              <a:t>20/01/2015</a:t>
+              <a:t>20/02/2015</a:t>
             </a:fld>
             <a:endParaRPr lang="es-AR"/>
           </a:p>
@@ -539,7 +543,7 @@
               <a:pPr>
                 <a:defRPr/>
               </a:pPr>
-              <a:t>20/01/2015</a:t>
+              <a:t>20/02/2015</a:t>
             </a:fld>
             <a:endParaRPr lang="es-AR"/>
           </a:p>
@@ -1243,7 +1247,7 @@
               <a:pPr>
                 <a:defRPr/>
               </a:pPr>
-              <a:t>20/01/2015</a:t>
+              <a:t>20/02/2015</a:t>
             </a:fld>
             <a:endParaRPr lang="es-AR"/>
           </a:p>
@@ -1522,7 +1526,7 @@
               <a:pPr>
                 <a:defRPr/>
               </a:pPr>
-              <a:t>20/01/2015</a:t>
+              <a:t>20/02/2015</a:t>
             </a:fld>
             <a:endParaRPr lang="es-AR"/>
           </a:p>
@@ -1902,7 +1906,7 @@
               <a:pPr>
                 <a:defRPr/>
               </a:pPr>
-              <a:t>20/01/2015</a:t>
+              <a:t>20/02/2015</a:t>
             </a:fld>
             <a:endParaRPr lang="es-AR"/>
           </a:p>
@@ -2489,7 +2493,7 @@
               <a:pPr>
                 <a:defRPr/>
               </a:pPr>
-              <a:t>20/01/2015</a:t>
+              <a:t>20/02/2015</a:t>
             </a:fld>
             <a:endParaRPr lang="es-AR"/>
           </a:p>
@@ -2679,7 +2683,7 @@
               <a:pPr>
                 <a:defRPr/>
               </a:pPr>
-              <a:t>20/01/2015</a:t>
+              <a:t>20/02/2015</a:t>
             </a:fld>
             <a:endParaRPr lang="es-AR"/>
           </a:p>
@@ -2801,7 +2805,7 @@
               <a:pPr>
                 <a:defRPr/>
               </a:pPr>
-              <a:t>20/01/2015</a:t>
+              <a:t>20/02/2015</a:t>
             </a:fld>
             <a:endParaRPr lang="es-AR"/>
           </a:p>
@@ -3183,7 +3187,7 @@
               <a:pPr>
                 <a:defRPr/>
               </a:pPr>
-              <a:t>20/01/2015</a:t>
+              <a:t>20/02/2015</a:t>
             </a:fld>
             <a:endParaRPr lang="es-AR"/>
           </a:p>
@@ -4586,12 +4590,29 @@
               <a:buChar char="§"/>
             </a:pPr>
             <a:r>
-              <a:rPr lang="en-GB" sz="2000" dirty="0">
+              <a:rPr lang="en-GB" sz="2000" dirty="0" smtClean="0">
                 <a:latin typeface="+mj-lt"/>
               </a:rPr>
               <a:t> </a:t>
             </a:r>
-            <a:endParaRPr lang="en-GB" i="1" dirty="0">
+            <a:r>
+              <a:rPr lang="en-GB" sz="2000" dirty="0" err="1" smtClean="0">
+                <a:latin typeface="+mj-lt"/>
+              </a:rPr>
+              <a:t>Cleanup</a:t>
+            </a:r>
+            <a:endParaRPr lang="en-GB" sz="2000" dirty="0">
+              <a:latin typeface="+mj-lt"/>
+            </a:endParaRPr>
+          </a:p>
+          <a:p>
+            <a:pPr marL="0" lvl="1" indent="0" eaLnBrk="1" hangingPunct="1">
+              <a:spcBef>
+                <a:spcPts val="1200"/>
+              </a:spcBef>
+              <a:buNone/>
+            </a:pPr>
+            <a:endParaRPr lang="en-GB" sz="2000" dirty="0">
               <a:latin typeface="+mj-lt"/>
             </a:endParaRPr>
           </a:p>
@@ -4622,12 +4643,48 @@
             <a:pPr lvl="0"/>
             <a:r>
               <a:rPr lang="en-US" sz="2800" dirty="0"/>
-              <a:t>Tip 8: Upload solution to CI server</a:t>
+              <a:t>Tip 8: </a:t>
+            </a:r>
+            <a:r>
+              <a:rPr lang="en-US" sz="2800" dirty="0" smtClean="0"/>
+              <a:t>Create </a:t>
+            </a:r>
+            <a:r>
+              <a:rPr lang="en-US" sz="2800" dirty="0" err="1" smtClean="0"/>
+              <a:t>MSBuild</a:t>
+            </a:r>
+            <a:r>
+              <a:rPr lang="en-US" sz="2800" dirty="0" smtClean="0"/>
+              <a:t> configuration</a:t>
             </a:r>
             <a:endParaRPr lang="es-AR" sz="2800" dirty="0"/>
           </a:p>
         </p:txBody>
       </p:sp>
+      <p:pic>
+        <p:nvPicPr>
+          <p:cNvPr id="3" name="Picture 2"/>
+          <p:cNvPicPr>
+            <a:picLocks noChangeAspect="1"/>
+          </p:cNvPicPr>
+          <p:nvPr/>
+        </p:nvPicPr>
+        <p:blipFill>
+          <a:blip r:embed="rId2"/>
+          <a:stretch>
+            <a:fillRect/>
+          </a:stretch>
+        </p:blipFill>
+        <p:spPr>
+          <a:xfrm>
+            <a:off x="886309" y="2204864"/>
+            <a:ext cx="7811590" cy="2429214"/>
+          </a:xfrm>
+          <a:prstGeom prst="rect">
+            <a:avLst/>
+          </a:prstGeom>
+        </p:spPr>
+      </p:pic>
     </p:spTree>
     <p:extLst>
       <p:ext uri="{BB962C8B-B14F-4D97-AF65-F5344CB8AC3E}">
@@ -4693,12 +4750,63 @@
               <a:buChar char="§"/>
             </a:pPr>
             <a:r>
+              <a:rPr lang="en-GB" sz="2000" dirty="0" smtClean="0">
+                <a:latin typeface="+mj-lt"/>
+              </a:rPr>
+              <a:t> Build solution</a:t>
+            </a:r>
+          </a:p>
+          <a:p>
+            <a:pPr marL="0" lvl="1" indent="0" eaLnBrk="1" hangingPunct="1">
+              <a:spcBef>
+                <a:spcPts val="1200"/>
+              </a:spcBef>
+              <a:buFont typeface="Wingdings" panose="05000000000000000000" pitchFamily="2" charset="2"/>
+              <a:buChar char="§"/>
+            </a:pPr>
+            <a:endParaRPr lang="en-GB" sz="2000" dirty="0">
+              <a:latin typeface="+mj-lt"/>
+            </a:endParaRPr>
+          </a:p>
+          <a:p>
+            <a:pPr marL="0" lvl="1" indent="0" eaLnBrk="1" hangingPunct="1">
+              <a:spcBef>
+                <a:spcPts val="1200"/>
+              </a:spcBef>
+              <a:buFont typeface="Wingdings" panose="05000000000000000000" pitchFamily="2" charset="2"/>
+              <a:buChar char="§"/>
+            </a:pPr>
+            <a:endParaRPr lang="en-GB" sz="2000" dirty="0" smtClean="0">
+              <a:latin typeface="+mj-lt"/>
+            </a:endParaRPr>
+          </a:p>
+          <a:p>
+            <a:pPr marL="0" lvl="1" indent="0" eaLnBrk="1" hangingPunct="1">
+              <a:spcBef>
+                <a:spcPts val="1200"/>
+              </a:spcBef>
+              <a:buFont typeface="Wingdings" panose="05000000000000000000" pitchFamily="2" charset="2"/>
+              <a:buChar char="§"/>
+            </a:pPr>
+            <a:r>
+              <a:rPr lang="en-GB" sz="2000" dirty="0"/>
+              <a:t> </a:t>
+            </a:r>
+            <a:r>
               <a:rPr lang="en-GB" sz="2000" dirty="0">
                 <a:latin typeface="+mj-lt"/>
               </a:rPr>
-              <a:t> </a:t>
-            </a:r>
-            <a:endParaRPr lang="en-GB" i="1" dirty="0">
+              <a:t>Run Unit tests</a:t>
+            </a:r>
+          </a:p>
+          <a:p>
+            <a:pPr marL="0" lvl="1" indent="0" eaLnBrk="1" hangingPunct="1">
+              <a:spcBef>
+                <a:spcPts val="1200"/>
+              </a:spcBef>
+              <a:buNone/>
+            </a:pPr>
+            <a:endParaRPr lang="en-GB" sz="2000" dirty="0">
               <a:latin typeface="+mj-lt"/>
             </a:endParaRPr>
           </a:p>
@@ -4729,16 +4837,76 @@
             <a:pPr lvl="0"/>
             <a:r>
               <a:rPr lang="en-US" sz="2800" dirty="0"/>
-              <a:t>Tip 9: Add UT tasks to CI</a:t>
+              <a:t>Tip 8: </a:t>
+            </a:r>
+            <a:r>
+              <a:rPr lang="en-US" sz="2800" dirty="0" smtClean="0"/>
+              <a:t>Create </a:t>
+            </a:r>
+            <a:r>
+              <a:rPr lang="en-US" sz="2800" dirty="0" err="1" smtClean="0"/>
+              <a:t>MSBuild</a:t>
+            </a:r>
+            <a:r>
+              <a:rPr lang="en-US" sz="2800" dirty="0" smtClean="0"/>
+              <a:t> configuration</a:t>
             </a:r>
             <a:endParaRPr lang="es-AR" sz="2800" dirty="0"/>
           </a:p>
         </p:txBody>
       </p:sp>
+      <p:pic>
+        <p:nvPicPr>
+          <p:cNvPr id="2" name="Picture 1"/>
+          <p:cNvPicPr>
+            <a:picLocks noChangeAspect="1"/>
+          </p:cNvPicPr>
+          <p:nvPr/>
+        </p:nvPicPr>
+        <p:blipFill>
+          <a:blip r:embed="rId2"/>
+          <a:stretch>
+            <a:fillRect/>
+          </a:stretch>
+        </p:blipFill>
+        <p:spPr>
+          <a:xfrm>
+            <a:off x="744950" y="1700808"/>
+            <a:ext cx="8085899" cy="467055"/>
+          </a:xfrm>
+          <a:prstGeom prst="rect">
+            <a:avLst/>
+          </a:prstGeom>
+        </p:spPr>
+      </p:pic>
+      <p:pic>
+        <p:nvPicPr>
+          <p:cNvPr id="3" name="Picture 2"/>
+          <p:cNvPicPr>
+            <a:picLocks noChangeAspect="1"/>
+          </p:cNvPicPr>
+          <p:nvPr/>
+        </p:nvPicPr>
+        <p:blipFill>
+          <a:blip r:embed="rId3"/>
+          <a:stretch>
+            <a:fillRect/>
+          </a:stretch>
+        </p:blipFill>
+        <p:spPr>
+          <a:xfrm>
+            <a:off x="729244" y="3356992"/>
+            <a:ext cx="8117310" cy="2125801"/>
+          </a:xfrm>
+          <a:prstGeom prst="rect">
+            <a:avLst/>
+          </a:prstGeom>
+        </p:spPr>
+      </p:pic>
     </p:spTree>
     <p:extLst>
       <p:ext uri="{BB962C8B-B14F-4D97-AF65-F5344CB8AC3E}">
-        <p14:creationId xmlns:p14="http://schemas.microsoft.com/office/powerpoint/2010/main" val="2439082405"/>
+        <p14:creationId xmlns:p14="http://schemas.microsoft.com/office/powerpoint/2010/main" val="655975683"/>
       </p:ext>
     </p:extLst>
   </p:cSld>
@@ -4774,7 +4942,132 @@
       </p:grpSpPr>
       <p:sp>
         <p:nvSpPr>
-          <p:cNvPr id="4" name="3 Título"/>
+          <p:cNvPr id="12290" name="Content Placeholder 2"/>
+          <p:cNvSpPr>
+            <a:spLocks noGrp="1"/>
+          </p:cNvSpPr>
+          <p:nvPr>
+            <p:ph sz="half" idx="2"/>
+          </p:nvPr>
+        </p:nvSpPr>
+        <p:spPr>
+          <a:xfrm>
+            <a:off x="755650" y="1130300"/>
+            <a:ext cx="8064500" cy="4891088"/>
+          </a:xfrm>
+        </p:spPr>
+        <p:txBody>
+          <a:bodyPr/>
+          <a:lstStyle/>
+          <a:p>
+            <a:pPr marL="0" lvl="1" indent="0" eaLnBrk="1" hangingPunct="1">
+              <a:spcBef>
+                <a:spcPts val="1200"/>
+              </a:spcBef>
+              <a:buFont typeface="Wingdings" panose="05000000000000000000" pitchFamily="2" charset="2"/>
+              <a:buChar char="§"/>
+            </a:pPr>
+            <a:r>
+              <a:rPr lang="en-GB" sz="2000" dirty="0" smtClean="0">
+                <a:latin typeface="+mj-lt"/>
+              </a:rPr>
+              <a:t> Publish </a:t>
+            </a:r>
+            <a:r>
+              <a:rPr lang="en-GB" sz="2000" dirty="0">
+                <a:latin typeface="+mj-lt"/>
+              </a:rPr>
+              <a:t>websites &amp; services </a:t>
+            </a:r>
+            <a:r>
+              <a:rPr lang="en-GB" sz="2000" dirty="0">
+                <a:latin typeface="+mj-lt"/>
+              </a:rPr>
+              <a:t>(optional</a:t>
+            </a:r>
+            <a:r>
+              <a:rPr lang="en-GB" sz="2000" dirty="0" smtClean="0">
+                <a:latin typeface="+mj-lt"/>
+              </a:rPr>
+              <a:t>)</a:t>
+            </a:r>
+          </a:p>
+          <a:p>
+            <a:pPr marL="0" lvl="1" indent="0" eaLnBrk="1" hangingPunct="1">
+              <a:spcBef>
+                <a:spcPts val="1200"/>
+              </a:spcBef>
+              <a:buFont typeface="Wingdings" panose="05000000000000000000" pitchFamily="2" charset="2"/>
+              <a:buChar char="§"/>
+            </a:pPr>
+            <a:endParaRPr lang="en-GB" sz="2000" dirty="0">
+              <a:latin typeface="+mj-lt"/>
+            </a:endParaRPr>
+          </a:p>
+          <a:p>
+            <a:pPr marL="0" lvl="1" indent="0" eaLnBrk="1" hangingPunct="1">
+              <a:spcBef>
+                <a:spcPts val="1200"/>
+              </a:spcBef>
+              <a:buFont typeface="Wingdings" panose="05000000000000000000" pitchFamily="2" charset="2"/>
+              <a:buChar char="§"/>
+            </a:pPr>
+            <a:endParaRPr lang="en-GB" sz="2000" dirty="0" smtClean="0">
+              <a:latin typeface="+mj-lt"/>
+            </a:endParaRPr>
+          </a:p>
+          <a:p>
+            <a:pPr marL="0" lvl="1" indent="0" eaLnBrk="1" hangingPunct="1">
+              <a:spcBef>
+                <a:spcPts val="1200"/>
+              </a:spcBef>
+              <a:buFont typeface="Wingdings" panose="05000000000000000000" pitchFamily="2" charset="2"/>
+              <a:buChar char="§"/>
+            </a:pPr>
+            <a:endParaRPr lang="en-GB" sz="2000" dirty="0">
+              <a:latin typeface="+mj-lt"/>
+            </a:endParaRPr>
+          </a:p>
+          <a:p>
+            <a:pPr marL="0" lvl="1" indent="0" eaLnBrk="1" hangingPunct="1">
+              <a:spcBef>
+                <a:spcPts val="1200"/>
+              </a:spcBef>
+              <a:buNone/>
+            </a:pPr>
+            <a:endParaRPr lang="en-GB" sz="2000" dirty="0">
+              <a:latin typeface="+mj-lt"/>
+            </a:endParaRPr>
+          </a:p>
+          <a:p>
+            <a:pPr marL="0" lvl="1" indent="0" eaLnBrk="1" hangingPunct="1">
+              <a:spcBef>
+                <a:spcPts val="1200"/>
+              </a:spcBef>
+              <a:buFont typeface="Wingdings" panose="05000000000000000000" pitchFamily="2" charset="2"/>
+              <a:buChar char="§"/>
+            </a:pPr>
+            <a:r>
+              <a:rPr lang="en-GB" sz="2000" dirty="0">
+                <a:latin typeface="+mj-lt"/>
+              </a:rPr>
+              <a:t> </a:t>
+            </a:r>
+            <a:r>
+              <a:rPr lang="en-GB" sz="2000" dirty="0">
+                <a:latin typeface="+mj-lt"/>
+              </a:rPr>
+              <a:t>Deploy (optional)</a:t>
+            </a:r>
+            <a:endParaRPr lang="en-GB" sz="2000" dirty="0">
+              <a:latin typeface="+mj-lt"/>
+            </a:endParaRPr>
+          </a:p>
+        </p:txBody>
+      </p:sp>
+      <p:sp>
+        <p:nvSpPr>
+          <p:cNvPr id="6" name="Title 5"/>
           <p:cNvSpPr>
             <a:spLocks noGrp="1"/>
           </p:cNvSpPr>
@@ -4784,124 +5077,89 @@
         </p:nvSpPr>
         <p:spPr>
           <a:xfrm>
-            <a:off x="971600" y="1844824"/>
-            <a:ext cx="8064896" cy="1362075"/>
-          </a:xfrm>
-          <a:extLst/>
-        </p:spPr>
-        <p:txBody>
-          <a:bodyPr rtlCol="0">
-            <a:normAutofit/>
-          </a:bodyPr>
-          <a:lstStyle/>
-          <a:p>
-            <a:pPr fontAlgn="auto">
-              <a:spcAft>
-                <a:spcPts val="0"/>
-              </a:spcAft>
-              <a:defRPr/>
-            </a:pPr>
-            <a:r>
-              <a:rPr lang="es-AR" sz="2800" dirty="0" smtClean="0">
-                <a:latin typeface="+mn-lt"/>
-              </a:rPr>
-              <a:t>DB </a:t>
-            </a:r>
-            <a:r>
-              <a:rPr lang="es-AR" sz="2800" dirty="0" err="1" smtClean="0">
-                <a:latin typeface="+mn-lt"/>
-              </a:rPr>
-              <a:t>Integration</a:t>
-            </a:r>
-            <a:r>
-              <a:rPr lang="es-AR" sz="2800" dirty="0" smtClean="0">
-                <a:latin typeface="+mn-lt"/>
-              </a:rPr>
-              <a:t> test-</a:t>
-            </a:r>
-            <a:r>
-              <a:rPr lang="es-AR" sz="2800" dirty="0" err="1" smtClean="0">
-                <a:latin typeface="+mn-lt"/>
-              </a:rPr>
-              <a:t>oriented</a:t>
-            </a:r>
-            <a:r>
-              <a:rPr lang="es-AR" sz="2800" dirty="0" smtClean="0">
-                <a:latin typeface="+mn-lt"/>
-              </a:rPr>
-              <a:t> </a:t>
-            </a:r>
-            <a:r>
-              <a:rPr lang="es-AR" sz="2800" dirty="0" err="1" smtClean="0">
-                <a:latin typeface="+mn-lt"/>
-              </a:rPr>
-              <a:t>development</a:t>
-            </a:r>
-            <a:r>
-              <a:rPr lang="es-AR" sz="2800" dirty="0" smtClean="0">
-                <a:latin typeface="+mn-lt"/>
-              </a:rPr>
-              <a:t> </a:t>
-            </a:r>
-            <a:r>
-              <a:rPr lang="es-AR" sz="2800" dirty="0" err="1" smtClean="0">
-                <a:latin typeface="+mn-lt"/>
-              </a:rPr>
-              <a:t>Tips</a:t>
-            </a:r>
-            <a:endParaRPr sz="2800" dirty="0">
-              <a:latin typeface="+mn-lt"/>
-            </a:endParaRPr>
-          </a:p>
-        </p:txBody>
-      </p:sp>
-      <p:sp>
-        <p:nvSpPr>
-          <p:cNvPr id="5" name="4 Marcador de texto"/>
-          <p:cNvSpPr>
-            <a:spLocks noGrp="1"/>
-          </p:cNvSpPr>
-          <p:nvPr>
-            <p:ph type="body" idx="1"/>
-          </p:nvPr>
-        </p:nvSpPr>
-        <p:spPr>
-          <a:xfrm>
-            <a:off x="971550" y="3513138"/>
-            <a:ext cx="7412038" cy="1500187"/>
+            <a:off x="755650" y="0"/>
+            <a:ext cx="7931150" cy="836613"/>
           </a:xfrm>
         </p:spPr>
         <p:txBody>
-          <a:bodyPr rtlCol="0">
+          <a:bodyPr>
             <a:noAutofit/>
           </a:bodyPr>
           <a:lstStyle/>
           <a:p>
-            <a:pPr eaLnBrk="1" fontAlgn="auto" hangingPunct="1">
-              <a:spcAft>
-                <a:spcPts val="0"/>
-              </a:spcAft>
-              <a:defRPr/>
-            </a:pPr>
-            <a:endParaRPr lang="es-AR" sz="1600" dirty="0">
-              <a:latin typeface="+mn-lt"/>
-            </a:endParaRPr>
-          </a:p>
-          <a:p>
-            <a:pPr eaLnBrk="1" fontAlgn="auto" hangingPunct="1">
-              <a:spcAft>
-                <a:spcPts val="0"/>
-              </a:spcAft>
-              <a:defRPr/>
-            </a:pPr>
-            <a:endParaRPr lang="es-AR" dirty="0"/>
+            <a:pPr lvl="0"/>
+            <a:r>
+              <a:rPr lang="en-US" sz="2800" dirty="0"/>
+              <a:t>Tip 8: </a:t>
+            </a:r>
+            <a:r>
+              <a:rPr lang="en-US" sz="2800" dirty="0" smtClean="0"/>
+              <a:t>Create </a:t>
+            </a:r>
+            <a:r>
+              <a:rPr lang="en-US" sz="2800" dirty="0" err="1" smtClean="0"/>
+              <a:t>MSBuild</a:t>
+            </a:r>
+            <a:r>
+              <a:rPr lang="en-US" sz="2800" dirty="0" smtClean="0"/>
+              <a:t> configuration</a:t>
+            </a:r>
+            <a:endParaRPr lang="es-AR" sz="2800" dirty="0"/>
           </a:p>
         </p:txBody>
       </p:sp>
+      <p:pic>
+        <p:nvPicPr>
+          <p:cNvPr id="2" name="Picture 1"/>
+          <p:cNvPicPr>
+            <a:picLocks noChangeAspect="1"/>
+          </p:cNvPicPr>
+          <p:nvPr/>
+        </p:nvPicPr>
+        <p:blipFill>
+          <a:blip r:embed="rId2"/>
+          <a:stretch>
+            <a:fillRect/>
+          </a:stretch>
+        </p:blipFill>
+        <p:spPr>
+          <a:xfrm>
+            <a:off x="755650" y="1916832"/>
+            <a:ext cx="8064500" cy="997033"/>
+          </a:xfrm>
+          <a:prstGeom prst="rect">
+            <a:avLst/>
+          </a:prstGeom>
+        </p:spPr>
+      </p:pic>
+      <p:pic>
+        <p:nvPicPr>
+          <p:cNvPr id="3" name="Picture 2"/>
+          <p:cNvPicPr>
+            <a:picLocks noChangeAspect="1"/>
+          </p:cNvPicPr>
+          <p:nvPr/>
+        </p:nvPicPr>
+        <p:blipFill>
+          <a:blip r:embed="rId3"/>
+          <a:stretch>
+            <a:fillRect/>
+          </a:stretch>
+        </p:blipFill>
+        <p:spPr>
+          <a:xfrm>
+            <a:off x="706122" y="4149080"/>
+            <a:ext cx="8163556" cy="1440160"/>
+          </a:xfrm>
+          <a:prstGeom prst="rect">
+            <a:avLst/>
+          </a:prstGeom>
+        </p:spPr>
+      </p:pic>
     </p:spTree>
     <p:extLst>
       <p:ext uri="{BB962C8B-B14F-4D97-AF65-F5344CB8AC3E}">
-        <p14:creationId xmlns:p14="http://schemas.microsoft.com/office/powerpoint/2010/main" val="3416321983"/>
+        <p14:creationId xmlns:p14="http://schemas.microsoft.com/office/powerpoint/2010/main" val="2033654316"/>
       </p:ext>
     </p:extLst>
   </p:cSld>
@@ -4937,45 +5195,6 @@
       </p:grpSpPr>
       <p:sp>
         <p:nvSpPr>
-          <p:cNvPr id="12290" name="Content Placeholder 2"/>
-          <p:cNvSpPr>
-            <a:spLocks noGrp="1"/>
-          </p:cNvSpPr>
-          <p:nvPr>
-            <p:ph sz="half" idx="2"/>
-          </p:nvPr>
-        </p:nvSpPr>
-        <p:spPr>
-          <a:xfrm>
-            <a:off x="755650" y="1130300"/>
-            <a:ext cx="8064500" cy="4891088"/>
-          </a:xfrm>
-        </p:spPr>
-        <p:txBody>
-          <a:bodyPr/>
-          <a:lstStyle/>
-          <a:p>
-            <a:pPr marL="0" lvl="1" indent="0" eaLnBrk="1" hangingPunct="1">
-              <a:spcBef>
-                <a:spcPts val="1200"/>
-              </a:spcBef>
-              <a:buFont typeface="Wingdings" panose="05000000000000000000" pitchFamily="2" charset="2"/>
-              <a:buChar char="§"/>
-            </a:pPr>
-            <a:r>
-              <a:rPr lang="en-GB" sz="2000" dirty="0">
-                <a:latin typeface="+mj-lt"/>
-              </a:rPr>
-              <a:t> </a:t>
-            </a:r>
-            <a:endParaRPr lang="en-GB" i="1" dirty="0">
-              <a:latin typeface="+mj-lt"/>
-            </a:endParaRPr>
-          </a:p>
-        </p:txBody>
-      </p:sp>
-      <p:sp>
-        <p:nvSpPr>
           <p:cNvPr id="6" name="Title 5"/>
           <p:cNvSpPr>
             <a:spLocks noGrp="1"/>
@@ -4998,17 +5217,53 @@
           <a:p>
             <a:pPr lvl="0"/>
             <a:r>
-              <a:rPr lang="en-US" sz="2000" dirty="0"/>
-              <a:t>Tip 1: Generate creation scripts for DB, Tables, Views, SPs, Functions</a:t>
-            </a:r>
-            <a:endParaRPr lang="es-AR" sz="2000" dirty="0"/>
+              <a:rPr lang="en-US" sz="2800" dirty="0"/>
+              <a:t>Tip 8: </a:t>
+            </a:r>
+            <a:r>
+              <a:rPr lang="en-US" sz="2800" dirty="0" smtClean="0"/>
+              <a:t>Create </a:t>
+            </a:r>
+            <a:r>
+              <a:rPr lang="en-US" sz="2800" dirty="0" err="1" smtClean="0"/>
+              <a:t>MSBuild</a:t>
+            </a:r>
+            <a:r>
+              <a:rPr lang="en-US" sz="2800" dirty="0" smtClean="0"/>
+              <a:t> configuration</a:t>
+            </a:r>
+            <a:endParaRPr lang="es-AR" sz="2800" dirty="0"/>
           </a:p>
         </p:txBody>
       </p:sp>
+      <p:pic>
+        <p:nvPicPr>
+          <p:cNvPr id="5" name="Picture 4"/>
+          <p:cNvPicPr>
+            <a:picLocks noChangeAspect="1"/>
+          </p:cNvPicPr>
+          <p:nvPr/>
+        </p:nvPicPr>
+        <p:blipFill>
+          <a:blip r:embed="rId2"/>
+          <a:stretch>
+            <a:fillRect/>
+          </a:stretch>
+        </p:blipFill>
+        <p:spPr>
+          <a:xfrm>
+            <a:off x="824956" y="1412776"/>
+            <a:ext cx="7792537" cy="3886742"/>
+          </a:xfrm>
+          <a:prstGeom prst="rect">
+            <a:avLst/>
+          </a:prstGeom>
+        </p:spPr>
+      </p:pic>
     </p:spTree>
     <p:extLst>
       <p:ext uri="{BB962C8B-B14F-4D97-AF65-F5344CB8AC3E}">
-        <p14:creationId xmlns:p14="http://schemas.microsoft.com/office/powerpoint/2010/main" val="382617550"/>
+        <p14:creationId xmlns:p14="http://schemas.microsoft.com/office/powerpoint/2010/main" val="3613484667"/>
       </p:ext>
     </p:extLst>
   </p:cSld>
@@ -5075,6 +5330,12 @@
               </a:rPr>
               <a:t> </a:t>
             </a:r>
+            <a:r>
+              <a:rPr lang="en-GB" sz="2000" dirty="0" smtClean="0">
+                <a:latin typeface="+mj-lt"/>
+              </a:rPr>
+              <a:t>Set up CI Job (Jenkins)</a:t>
+            </a:r>
             <a:endParaRPr lang="en-GB" i="1" dirty="0">
               <a:latin typeface="+mj-lt"/>
             </a:endParaRPr>
@@ -5105,17 +5366,45 @@
           <a:p>
             <a:pPr lvl="0"/>
             <a:r>
-              <a:rPr lang="en-US" sz="2400" dirty="0"/>
-              <a:t>Tip 2: Generate “master” data insertion scripts</a:t>
-            </a:r>
-            <a:endParaRPr lang="es-AR" sz="2400" dirty="0"/>
+              <a:rPr lang="en-US" sz="2800" dirty="0"/>
+              <a:t>Tip 9: </a:t>
+            </a:r>
+            <a:r>
+              <a:rPr lang="en-US" sz="2800" dirty="0"/>
+              <a:t>Upload solution to CI server</a:t>
+            </a:r>
+            <a:endParaRPr lang="es-AR" sz="2800" dirty="0"/>
           </a:p>
         </p:txBody>
       </p:sp>
+      <p:pic>
+        <p:nvPicPr>
+          <p:cNvPr id="3" name="Picture 2"/>
+          <p:cNvPicPr>
+            <a:picLocks noChangeAspect="1"/>
+          </p:cNvPicPr>
+          <p:nvPr/>
+        </p:nvPicPr>
+        <p:blipFill>
+          <a:blip r:embed="rId2"/>
+          <a:stretch>
+            <a:fillRect/>
+          </a:stretch>
+        </p:blipFill>
+        <p:spPr>
+          <a:xfrm>
+            <a:off x="710988" y="1706464"/>
+            <a:ext cx="8153824" cy="4314924"/>
+          </a:xfrm>
+          <a:prstGeom prst="rect">
+            <a:avLst/>
+          </a:prstGeom>
+        </p:spPr>
+      </p:pic>
     </p:spTree>
     <p:extLst>
       <p:ext uri="{BB962C8B-B14F-4D97-AF65-F5344CB8AC3E}">
-        <p14:creationId xmlns:p14="http://schemas.microsoft.com/office/powerpoint/2010/main" val="298219647"/>
+        <p14:creationId xmlns:p14="http://schemas.microsoft.com/office/powerpoint/2010/main" val="2439082405"/>
       </p:ext>
     </p:extLst>
   </p:cSld>
@@ -5177,10 +5466,22 @@
               <a:buChar char="§"/>
             </a:pPr>
             <a:r>
-              <a:rPr lang="en-GB" sz="2000" dirty="0">
-                <a:latin typeface="+mj-lt"/>
-              </a:rPr>
-              <a:t> </a:t>
+              <a:rPr lang="en-GB" sz="2000" dirty="0" smtClean="0">
+                <a:latin typeface="+mj-lt"/>
+              </a:rPr>
+              <a:t> Run </a:t>
+            </a:r>
+            <a:r>
+              <a:rPr lang="en-GB" sz="2000" dirty="0" err="1" smtClean="0">
+                <a:latin typeface="+mj-lt"/>
+              </a:rPr>
+              <a:t>MSBuild</a:t>
+            </a:r>
+            <a:r>
+              <a:rPr lang="en-GB" sz="2000" dirty="0" smtClean="0">
+                <a:latin typeface="+mj-lt"/>
+              </a:rPr>
+              <a:t> file</a:t>
             </a:r>
             <a:endParaRPr lang="en-GB" i="1" dirty="0">
               <a:latin typeface="+mj-lt"/>
@@ -5212,17 +5513,45 @@
           <a:p>
             <a:pPr lvl="0"/>
             <a:r>
-              <a:rPr lang="en-US" sz="2400" dirty="0"/>
-              <a:t>Tip 3: Execute scripts automatically</a:t>
-            </a:r>
-            <a:endParaRPr lang="es-AR" sz="2400" dirty="0"/>
+              <a:rPr lang="en-US" sz="2800" dirty="0"/>
+              <a:t>Tip 9: </a:t>
+            </a:r>
+            <a:r>
+              <a:rPr lang="en-US" sz="2800" dirty="0"/>
+              <a:t>Upload solution to CI server</a:t>
+            </a:r>
+            <a:endParaRPr lang="es-AR" sz="2800" dirty="0"/>
           </a:p>
         </p:txBody>
       </p:sp>
+      <p:pic>
+        <p:nvPicPr>
+          <p:cNvPr id="2" name="Picture 1"/>
+          <p:cNvPicPr>
+            <a:picLocks noChangeAspect="1"/>
+          </p:cNvPicPr>
+          <p:nvPr/>
+        </p:nvPicPr>
+        <p:blipFill>
+          <a:blip r:embed="rId2"/>
+          <a:stretch>
+            <a:fillRect/>
+          </a:stretch>
+        </p:blipFill>
+        <p:spPr>
+          <a:xfrm>
+            <a:off x="441237" y="2852936"/>
+            <a:ext cx="8559976" cy="1126090"/>
+          </a:xfrm>
+          <a:prstGeom prst="rect">
+            <a:avLst/>
+          </a:prstGeom>
+        </p:spPr>
+      </p:pic>
     </p:spTree>
     <p:extLst>
       <p:ext uri="{BB962C8B-B14F-4D97-AF65-F5344CB8AC3E}">
-        <p14:creationId xmlns:p14="http://schemas.microsoft.com/office/powerpoint/2010/main" val="3623297376"/>
+        <p14:creationId xmlns:p14="http://schemas.microsoft.com/office/powerpoint/2010/main" val="522258182"/>
       </p:ext>
     </p:extLst>
   </p:cSld>
@@ -5258,46 +5587,7 @@
       </p:grpSpPr>
       <p:sp>
         <p:nvSpPr>
-          <p:cNvPr id="12290" name="Content Placeholder 2"/>
-          <p:cNvSpPr>
-            <a:spLocks noGrp="1"/>
-          </p:cNvSpPr>
-          <p:nvPr>
-            <p:ph sz="half" idx="2"/>
-          </p:nvPr>
-        </p:nvSpPr>
-        <p:spPr>
-          <a:xfrm>
-            <a:off x="755650" y="1130300"/>
-            <a:ext cx="8064500" cy="4891088"/>
-          </a:xfrm>
-        </p:spPr>
-        <p:txBody>
-          <a:bodyPr/>
-          <a:lstStyle/>
-          <a:p>
-            <a:pPr marL="0" lvl="1" indent="0" eaLnBrk="1" hangingPunct="1">
-              <a:spcBef>
-                <a:spcPts val="1200"/>
-              </a:spcBef>
-              <a:buFont typeface="Wingdings" panose="05000000000000000000" pitchFamily="2" charset="2"/>
-              <a:buChar char="§"/>
-            </a:pPr>
-            <a:r>
-              <a:rPr lang="en-GB" sz="2000" dirty="0">
-                <a:latin typeface="+mj-lt"/>
-              </a:rPr>
-              <a:t> </a:t>
-            </a:r>
-            <a:endParaRPr lang="en-GB" i="1" dirty="0">
-              <a:latin typeface="+mj-lt"/>
-            </a:endParaRPr>
-          </a:p>
-        </p:txBody>
-      </p:sp>
-      <p:sp>
-        <p:nvSpPr>
-          <p:cNvPr id="6" name="Title 5"/>
+          <p:cNvPr id="4" name="3 Título"/>
           <p:cNvSpPr>
             <a:spLocks noGrp="1"/>
           </p:cNvSpPr>
@@ -5307,29 +5597,124 @@
         </p:nvSpPr>
         <p:spPr>
           <a:xfrm>
-            <a:off x="755650" y="0"/>
-            <a:ext cx="7931150" cy="836613"/>
+            <a:off x="971600" y="1844824"/>
+            <a:ext cx="8064896" cy="1362075"/>
+          </a:xfrm>
+          <a:extLst/>
+        </p:spPr>
+        <p:txBody>
+          <a:bodyPr rtlCol="0">
+            <a:normAutofit/>
+          </a:bodyPr>
+          <a:lstStyle/>
+          <a:p>
+            <a:pPr fontAlgn="auto">
+              <a:spcAft>
+                <a:spcPts val="0"/>
+              </a:spcAft>
+              <a:defRPr/>
+            </a:pPr>
+            <a:r>
+              <a:rPr lang="es-AR" sz="2800" dirty="0" smtClean="0">
+                <a:latin typeface="+mn-lt"/>
+              </a:rPr>
+              <a:t>DB </a:t>
+            </a:r>
+            <a:r>
+              <a:rPr lang="es-AR" sz="2800" dirty="0" err="1" smtClean="0">
+                <a:latin typeface="+mn-lt"/>
+              </a:rPr>
+              <a:t>Integration</a:t>
+            </a:r>
+            <a:r>
+              <a:rPr lang="es-AR" sz="2800" dirty="0" smtClean="0">
+                <a:latin typeface="+mn-lt"/>
+              </a:rPr>
+              <a:t> test-</a:t>
+            </a:r>
+            <a:r>
+              <a:rPr lang="es-AR" sz="2800" dirty="0" err="1" smtClean="0">
+                <a:latin typeface="+mn-lt"/>
+              </a:rPr>
+              <a:t>oriented</a:t>
+            </a:r>
+            <a:r>
+              <a:rPr lang="es-AR" sz="2800" dirty="0" smtClean="0">
+                <a:latin typeface="+mn-lt"/>
+              </a:rPr>
+              <a:t> </a:t>
+            </a:r>
+            <a:r>
+              <a:rPr lang="es-AR" sz="2800" dirty="0" err="1" smtClean="0">
+                <a:latin typeface="+mn-lt"/>
+              </a:rPr>
+              <a:t>development</a:t>
+            </a:r>
+            <a:r>
+              <a:rPr lang="es-AR" sz="2800" dirty="0" smtClean="0">
+                <a:latin typeface="+mn-lt"/>
+              </a:rPr>
+              <a:t> </a:t>
+            </a:r>
+            <a:r>
+              <a:rPr lang="es-AR" sz="2800" dirty="0" err="1" smtClean="0">
+                <a:latin typeface="+mn-lt"/>
+              </a:rPr>
+              <a:t>Tips</a:t>
+            </a:r>
+            <a:endParaRPr sz="2800" dirty="0">
+              <a:latin typeface="+mn-lt"/>
+            </a:endParaRPr>
+          </a:p>
+        </p:txBody>
+      </p:sp>
+      <p:sp>
+        <p:nvSpPr>
+          <p:cNvPr id="5" name="4 Marcador de texto"/>
+          <p:cNvSpPr>
+            <a:spLocks noGrp="1"/>
+          </p:cNvSpPr>
+          <p:nvPr>
+            <p:ph type="body" idx="1"/>
+          </p:nvPr>
+        </p:nvSpPr>
+        <p:spPr>
+          <a:xfrm>
+            <a:off x="971550" y="3513138"/>
+            <a:ext cx="7412038" cy="1500187"/>
           </a:xfrm>
         </p:spPr>
         <p:txBody>
-          <a:bodyPr>
+          <a:bodyPr rtlCol="0">
             <a:noAutofit/>
           </a:bodyPr>
           <a:lstStyle/>
           <a:p>
-            <a:pPr lvl="0"/>
-            <a:r>
-              <a:rPr lang="en-US" sz="2400" dirty="0"/>
-              <a:t>Tip 4: Setup CI to regenerate DB on each build</a:t>
-            </a:r>
-            <a:endParaRPr lang="es-AR" sz="2400" dirty="0"/>
+            <a:pPr eaLnBrk="1" fontAlgn="auto" hangingPunct="1">
+              <a:spcAft>
+                <a:spcPts val="0"/>
+              </a:spcAft>
+              <a:defRPr/>
+            </a:pPr>
+            <a:endParaRPr lang="es-AR" sz="1600" dirty="0">
+              <a:latin typeface="+mn-lt"/>
+            </a:endParaRPr>
+          </a:p>
+          <a:p>
+            <a:pPr eaLnBrk="1" fontAlgn="auto" hangingPunct="1">
+              <a:spcAft>
+                <a:spcPts val="0"/>
+              </a:spcAft>
+              <a:defRPr/>
+            </a:pPr>
+            <a:endParaRPr lang="es-AR" dirty="0"/>
           </a:p>
         </p:txBody>
       </p:sp>
     </p:spTree>
     <p:extLst>
       <p:ext uri="{BB962C8B-B14F-4D97-AF65-F5344CB8AC3E}">
-        <p14:creationId xmlns:p14="http://schemas.microsoft.com/office/powerpoint/2010/main" val="1575955872"/>
+        <p14:creationId xmlns:p14="http://schemas.microsoft.com/office/powerpoint/2010/main" val="3416321983"/>
       </p:ext>
     </p:extLst>
   </p:cSld>
@@ -5426,17 +5811,17 @@
           <a:p>
             <a:pPr lvl="0"/>
             <a:r>
-              <a:rPr lang="en-US" sz="2400" dirty="0"/>
-              <a:t>Tip 5: Setup test data (initialization &amp; cleanup)</a:t>
-            </a:r>
-            <a:endParaRPr lang="es-AR" sz="2400" dirty="0"/>
+              <a:rPr lang="en-US" sz="2000" dirty="0"/>
+              <a:t>Tip 1: Generate creation scripts for DB, Tables, Views, SPs, Functions</a:t>
+            </a:r>
+            <a:endParaRPr lang="es-AR" sz="2000" dirty="0"/>
           </a:p>
         </p:txBody>
       </p:sp>
     </p:spTree>
     <p:extLst>
       <p:ext uri="{BB962C8B-B14F-4D97-AF65-F5344CB8AC3E}">
-        <p14:creationId xmlns:p14="http://schemas.microsoft.com/office/powerpoint/2010/main" val="653606196"/>
+        <p14:creationId xmlns:p14="http://schemas.microsoft.com/office/powerpoint/2010/main" val="382617550"/>
       </p:ext>
     </p:extLst>
   </p:cSld>
@@ -5637,7 +6022,7 @@
             <a:pPr lvl="0"/>
             <a:r>
               <a:rPr lang="en-US" sz="2400" dirty="0"/>
-              <a:t>Tip 6: Generate Integration tests</a:t>
+              <a:t>Tip 2: Generate “master” data insertion scripts</a:t>
             </a:r>
             <a:endParaRPr lang="es-AR" sz="2400" dirty="0"/>
           </a:p>
@@ -5646,7 +6031,7 @@
     </p:spTree>
     <p:extLst>
       <p:ext uri="{BB962C8B-B14F-4D97-AF65-F5344CB8AC3E}">
-        <p14:creationId xmlns:p14="http://schemas.microsoft.com/office/powerpoint/2010/main" val="1963521844"/>
+        <p14:creationId xmlns:p14="http://schemas.microsoft.com/office/powerpoint/2010/main" val="298219647"/>
       </p:ext>
     </p:extLst>
   </p:cSld>
@@ -5744,7 +6129,7 @@
             <a:pPr lvl="0"/>
             <a:r>
               <a:rPr lang="en-US" sz="2400" dirty="0"/>
-              <a:t>Tip 7: Add task to CI</a:t>
+              <a:t>Tip 3: Execute scripts automatically</a:t>
             </a:r>
             <a:endParaRPr lang="es-AR" sz="2400" dirty="0"/>
           </a:p>
@@ -5753,7 +6138,7 @@
     </p:spTree>
     <p:extLst>
       <p:ext uri="{BB962C8B-B14F-4D97-AF65-F5344CB8AC3E}">
-        <p14:creationId xmlns:p14="http://schemas.microsoft.com/office/powerpoint/2010/main" val="3567453063"/>
+        <p14:creationId xmlns:p14="http://schemas.microsoft.com/office/powerpoint/2010/main" val="3623297376"/>
       </p:ext>
     </p:extLst>
   </p:cSld>
@@ -5789,7 +6174,46 @@
       </p:grpSpPr>
       <p:sp>
         <p:nvSpPr>
-          <p:cNvPr id="4" name="3 Título"/>
+          <p:cNvPr id="12290" name="Content Placeholder 2"/>
+          <p:cNvSpPr>
+            <a:spLocks noGrp="1"/>
+          </p:cNvSpPr>
+          <p:nvPr>
+            <p:ph sz="half" idx="2"/>
+          </p:nvPr>
+        </p:nvSpPr>
+        <p:spPr>
+          <a:xfrm>
+            <a:off x="755650" y="1130300"/>
+            <a:ext cx="8064500" cy="4891088"/>
+          </a:xfrm>
+        </p:spPr>
+        <p:txBody>
+          <a:bodyPr/>
+          <a:lstStyle/>
+          <a:p>
+            <a:pPr marL="0" lvl="1" indent="0" eaLnBrk="1" hangingPunct="1">
+              <a:spcBef>
+                <a:spcPts val="1200"/>
+              </a:spcBef>
+              <a:buFont typeface="Wingdings" panose="05000000000000000000" pitchFamily="2" charset="2"/>
+              <a:buChar char="§"/>
+            </a:pPr>
+            <a:r>
+              <a:rPr lang="en-GB" sz="2000" dirty="0">
+                <a:latin typeface="+mj-lt"/>
+              </a:rPr>
+              <a:t> </a:t>
+            </a:r>
+            <a:endParaRPr lang="en-GB" i="1" dirty="0">
+              <a:latin typeface="+mj-lt"/>
+            </a:endParaRPr>
+          </a:p>
+        </p:txBody>
+      </p:sp>
+      <p:sp>
+        <p:nvSpPr>
+          <p:cNvPr id="6" name="Title 5"/>
           <p:cNvSpPr>
             <a:spLocks noGrp="1"/>
           </p:cNvSpPr>
@@ -5798,113 +6222,30 @@
           </p:nvPr>
         </p:nvSpPr>
         <p:spPr>
-          <a:extLst/>
-        </p:spPr>
-        <p:txBody>
-          <a:bodyPr rtlCol="0"/>
-          <a:lstStyle/>
-          <a:p>
-            <a:pPr fontAlgn="auto">
-              <a:spcAft>
-                <a:spcPts val="0"/>
-              </a:spcAft>
-              <a:defRPr/>
-            </a:pPr>
-            <a:r>
-              <a:rPr lang="es-AR" dirty="0" err="1" smtClean="0">
-                <a:latin typeface="+mn-lt"/>
-              </a:rPr>
-              <a:t>Working</a:t>
-            </a:r>
-            <a:r>
-              <a:rPr lang="es-AR" dirty="0" smtClean="0">
-                <a:latin typeface="+mn-lt"/>
-              </a:rPr>
-              <a:t> </a:t>
-            </a:r>
-            <a:r>
-              <a:rPr lang="es-AR" dirty="0" err="1" smtClean="0">
-                <a:latin typeface="+mn-lt"/>
-              </a:rPr>
-              <a:t>with</a:t>
-            </a:r>
-            <a:r>
-              <a:rPr lang="es-AR" dirty="0" smtClean="0">
-                <a:latin typeface="+mn-lt"/>
-              </a:rPr>
-              <a:t> </a:t>
-            </a:r>
-            <a:r>
-              <a:rPr lang="es-AR" dirty="0" err="1" smtClean="0">
-                <a:latin typeface="+mn-lt"/>
-              </a:rPr>
-              <a:t>Legacy</a:t>
-            </a:r>
-            <a:r>
-              <a:rPr lang="es-AR" dirty="0" smtClean="0">
-                <a:latin typeface="+mn-lt"/>
-              </a:rPr>
-              <a:t> </a:t>
-            </a:r>
-            <a:r>
-              <a:rPr lang="es-AR" dirty="0" err="1" smtClean="0">
-                <a:latin typeface="+mn-lt"/>
-              </a:rPr>
-              <a:t>code</a:t>
-            </a:r>
-            <a:endParaRPr dirty="0">
-              <a:latin typeface="+mn-lt"/>
-            </a:endParaRPr>
-          </a:p>
-        </p:txBody>
-      </p:sp>
-      <p:sp>
-        <p:nvSpPr>
-          <p:cNvPr id="5" name="4 Marcador de texto"/>
-          <p:cNvSpPr>
-            <a:spLocks noGrp="1"/>
-          </p:cNvSpPr>
-          <p:nvPr>
-            <p:ph type="body" idx="1"/>
-          </p:nvPr>
-        </p:nvSpPr>
-        <p:spPr>
           <a:xfrm>
-            <a:off x="971550" y="3513138"/>
-            <a:ext cx="7412038" cy="1500187"/>
+            <a:off x="755650" y="0"/>
+            <a:ext cx="7931150" cy="836613"/>
           </a:xfrm>
         </p:spPr>
         <p:txBody>
-          <a:bodyPr rtlCol="0">
+          <a:bodyPr>
             <a:noAutofit/>
           </a:bodyPr>
           <a:lstStyle/>
           <a:p>
-            <a:pPr eaLnBrk="1" fontAlgn="auto" hangingPunct="1">
-              <a:spcAft>
-                <a:spcPts val="0"/>
-              </a:spcAft>
-              <a:defRPr/>
-            </a:pPr>
-            <a:endParaRPr lang="es-AR" sz="1600" dirty="0">
-              <a:latin typeface="+mn-lt"/>
-            </a:endParaRPr>
-          </a:p>
-          <a:p>
-            <a:pPr eaLnBrk="1" fontAlgn="auto" hangingPunct="1">
-              <a:spcAft>
-                <a:spcPts val="0"/>
-              </a:spcAft>
-              <a:defRPr/>
-            </a:pPr>
-            <a:endParaRPr lang="es-AR" dirty="0"/>
+            <a:pPr lvl="0"/>
+            <a:r>
+              <a:rPr lang="en-US" sz="2400" dirty="0"/>
+              <a:t>Tip 4: Setup CI to regenerate DB on each build</a:t>
+            </a:r>
+            <a:endParaRPr lang="es-AR" sz="2400" dirty="0"/>
           </a:p>
         </p:txBody>
       </p:sp>
     </p:spTree>
     <p:extLst>
       <p:ext uri="{BB962C8B-B14F-4D97-AF65-F5344CB8AC3E}">
-        <p14:creationId xmlns:p14="http://schemas.microsoft.com/office/powerpoint/2010/main" val="1383738177"/>
+        <p14:creationId xmlns:p14="http://schemas.microsoft.com/office/powerpoint/2010/main" val="1575955872"/>
       </p:ext>
     </p:extLst>
   </p:cSld>
@@ -6001,32 +6342,8 @@
           <a:p>
             <a:pPr lvl="0"/>
             <a:r>
-              <a:rPr lang="es-AR" sz="2400" dirty="0" err="1"/>
-              <a:t>Tip</a:t>
-            </a:r>
-            <a:r>
-              <a:rPr lang="es-AR" sz="2400" dirty="0"/>
-              <a:t> 1: </a:t>
-            </a:r>
-            <a:r>
-              <a:rPr lang="es-AR" sz="2400" dirty="0" err="1"/>
-              <a:t>Decouple</a:t>
-            </a:r>
-            <a:r>
-              <a:rPr lang="es-AR" sz="2400" dirty="0"/>
-              <a:t> </a:t>
-            </a:r>
-            <a:r>
-              <a:rPr lang="es-AR" sz="2400" dirty="0" err="1"/>
-              <a:t>method</a:t>
-            </a:r>
-            <a:r>
-              <a:rPr lang="es-AR" sz="2400" dirty="0"/>
-              <a:t> </a:t>
-            </a:r>
-            <a:r>
-              <a:rPr lang="es-AR" sz="2400" dirty="0" err="1"/>
-              <a:t>code</a:t>
+              <a:rPr lang="en-US" sz="2400" dirty="0"/>
+              <a:t>Tip 5: Setup test data (initialization &amp; cleanup)</a:t>
             </a:r>
             <a:endParaRPr lang="es-AR" sz="2400" dirty="0"/>
           </a:p>
@@ -6035,7 +6352,7 @@
     </p:spTree>
     <p:extLst>
       <p:ext uri="{BB962C8B-B14F-4D97-AF65-F5344CB8AC3E}">
-        <p14:creationId xmlns:p14="http://schemas.microsoft.com/office/powerpoint/2010/main" val="2433608601"/>
+        <p14:creationId xmlns:p14="http://schemas.microsoft.com/office/powerpoint/2010/main" val="653606196"/>
       </p:ext>
     </p:extLst>
   </p:cSld>
@@ -6132,16 +6449,8 @@
           <a:p>
             <a:pPr lvl="0"/>
             <a:r>
-              <a:rPr lang="es-AR" sz="2400" dirty="0" err="1"/>
-              <a:t>Tip</a:t>
-            </a:r>
-            <a:r>
-              <a:rPr lang="es-AR" sz="2400" dirty="0"/>
-              <a:t> 2: Test </a:t>
-            </a:r>
-            <a:r>
-              <a:rPr lang="es-AR" sz="2400" dirty="0" err="1"/>
-              <a:t>method</a:t>
+              <a:rPr lang="en-US" sz="2400" dirty="0"/>
+              <a:t>Tip 6: Generate Integration tests</a:t>
             </a:r>
             <a:endParaRPr lang="es-AR" sz="2400" dirty="0"/>
           </a:p>
@@ -6150,7 +6459,7 @@
     </p:spTree>
     <p:extLst>
       <p:ext uri="{BB962C8B-B14F-4D97-AF65-F5344CB8AC3E}">
-        <p14:creationId xmlns:p14="http://schemas.microsoft.com/office/powerpoint/2010/main" val="3712365801"/>
+        <p14:creationId xmlns:p14="http://schemas.microsoft.com/office/powerpoint/2010/main" val="1963521844"/>
       </p:ext>
     </p:extLst>
   </p:cSld>
@@ -6247,6 +6556,510 @@
           <a:p>
             <a:pPr lvl="0"/>
             <a:r>
+              <a:rPr lang="en-US" sz="2400" dirty="0"/>
+              <a:t>Tip 7: Add task to CI</a:t>
+            </a:r>
+            <a:endParaRPr lang="es-AR" sz="2400" dirty="0"/>
+          </a:p>
+        </p:txBody>
+      </p:sp>
+    </p:spTree>
+    <p:extLst>
+      <p:ext uri="{BB962C8B-B14F-4D97-AF65-F5344CB8AC3E}">
+        <p14:creationId xmlns:p14="http://schemas.microsoft.com/office/powerpoint/2010/main" val="3567453063"/>
+      </p:ext>
+    </p:extLst>
+  </p:cSld>
+  <p:clrMapOvr>
+    <a:masterClrMapping/>
+  </p:clrMapOvr>
+  <p:timing>
+    <p:tnLst>
+      <p:par>
+        <p:cTn id="1" dur="indefinite" restart="never" nodeType="tmRoot"/>
+      </p:par>
+    </p:tnLst>
+  </p:timing>
+</p:sld>
+</file>
+
+<file path=ppt/slides/slide26.xml><?xml version="1.0" encoding="utf-8"?>
+<p:sld xmlns:a="http://schemas.openxmlformats.org/drawingml/2006/main" xmlns:r="http://schemas.openxmlformats.org/officeDocument/2006/relationships" xmlns:p="http://schemas.openxmlformats.org/presentationml/2006/main">
+  <p:cSld>
+    <p:spTree>
+      <p:nvGrpSpPr>
+        <p:cNvPr id="1" name=""/>
+        <p:cNvGrpSpPr/>
+        <p:nvPr/>
+      </p:nvGrpSpPr>
+      <p:grpSpPr>
+        <a:xfrm>
+          <a:off x="0" y="0"/>
+          <a:ext cx="0" cy="0"/>
+          <a:chOff x="0" y="0"/>
+          <a:chExt cx="0" cy="0"/>
+        </a:xfrm>
+      </p:grpSpPr>
+      <p:sp>
+        <p:nvSpPr>
+          <p:cNvPr id="4" name="3 Título"/>
+          <p:cNvSpPr>
+            <a:spLocks noGrp="1"/>
+          </p:cNvSpPr>
+          <p:nvPr>
+            <p:ph type="title"/>
+          </p:nvPr>
+        </p:nvSpPr>
+        <p:spPr>
+          <a:extLst/>
+        </p:spPr>
+        <p:txBody>
+          <a:bodyPr rtlCol="0"/>
+          <a:lstStyle/>
+          <a:p>
+            <a:pPr fontAlgn="auto">
+              <a:spcAft>
+                <a:spcPts val="0"/>
+              </a:spcAft>
+              <a:defRPr/>
+            </a:pPr>
+            <a:r>
+              <a:rPr lang="es-AR" dirty="0" err="1" smtClean="0">
+                <a:latin typeface="+mn-lt"/>
+              </a:rPr>
+              <a:t>Working</a:t>
+            </a:r>
+            <a:r>
+              <a:rPr lang="es-AR" dirty="0" smtClean="0">
+                <a:latin typeface="+mn-lt"/>
+              </a:rPr>
+              <a:t> </a:t>
+            </a:r>
+            <a:r>
+              <a:rPr lang="es-AR" dirty="0" err="1" smtClean="0">
+                <a:latin typeface="+mn-lt"/>
+              </a:rPr>
+              <a:t>with</a:t>
+            </a:r>
+            <a:r>
+              <a:rPr lang="es-AR" dirty="0" smtClean="0">
+                <a:latin typeface="+mn-lt"/>
+              </a:rPr>
+              <a:t> </a:t>
+            </a:r>
+            <a:r>
+              <a:rPr lang="es-AR" dirty="0" err="1" smtClean="0">
+                <a:latin typeface="+mn-lt"/>
+              </a:rPr>
+              <a:t>Legacy</a:t>
+            </a:r>
+            <a:r>
+              <a:rPr lang="es-AR" dirty="0" smtClean="0">
+                <a:latin typeface="+mn-lt"/>
+              </a:rPr>
+              <a:t> </a:t>
+            </a:r>
+            <a:r>
+              <a:rPr lang="es-AR" dirty="0" err="1" smtClean="0">
+                <a:latin typeface="+mn-lt"/>
+              </a:rPr>
+              <a:t>code</a:t>
+            </a:r>
+            <a:endParaRPr dirty="0">
+              <a:latin typeface="+mn-lt"/>
+            </a:endParaRPr>
+          </a:p>
+        </p:txBody>
+      </p:sp>
+      <p:sp>
+        <p:nvSpPr>
+          <p:cNvPr id="5" name="4 Marcador de texto"/>
+          <p:cNvSpPr>
+            <a:spLocks noGrp="1"/>
+          </p:cNvSpPr>
+          <p:nvPr>
+            <p:ph type="body" idx="1"/>
+          </p:nvPr>
+        </p:nvSpPr>
+        <p:spPr>
+          <a:xfrm>
+            <a:off x="971550" y="3513138"/>
+            <a:ext cx="7412038" cy="1500187"/>
+          </a:xfrm>
+        </p:spPr>
+        <p:txBody>
+          <a:bodyPr rtlCol="0">
+            <a:noAutofit/>
+          </a:bodyPr>
+          <a:lstStyle/>
+          <a:p>
+            <a:pPr eaLnBrk="1" fontAlgn="auto" hangingPunct="1">
+              <a:spcAft>
+                <a:spcPts val="0"/>
+              </a:spcAft>
+              <a:defRPr/>
+            </a:pPr>
+            <a:endParaRPr lang="es-AR" sz="1600" dirty="0">
+              <a:latin typeface="+mn-lt"/>
+            </a:endParaRPr>
+          </a:p>
+          <a:p>
+            <a:pPr eaLnBrk="1" fontAlgn="auto" hangingPunct="1">
+              <a:spcAft>
+                <a:spcPts val="0"/>
+              </a:spcAft>
+              <a:defRPr/>
+            </a:pPr>
+            <a:endParaRPr lang="es-AR" dirty="0"/>
+          </a:p>
+        </p:txBody>
+      </p:sp>
+    </p:spTree>
+    <p:extLst>
+      <p:ext uri="{BB962C8B-B14F-4D97-AF65-F5344CB8AC3E}">
+        <p14:creationId xmlns:p14="http://schemas.microsoft.com/office/powerpoint/2010/main" val="1383738177"/>
+      </p:ext>
+    </p:extLst>
+  </p:cSld>
+  <p:clrMapOvr>
+    <a:masterClrMapping/>
+  </p:clrMapOvr>
+  <p:timing>
+    <p:tnLst>
+      <p:par>
+        <p:cTn id="1" dur="indefinite" restart="never" nodeType="tmRoot"/>
+      </p:par>
+    </p:tnLst>
+  </p:timing>
+</p:sld>
+</file>
+
+<file path=ppt/slides/slide27.xml><?xml version="1.0" encoding="utf-8"?>
+<p:sld xmlns:a="http://schemas.openxmlformats.org/drawingml/2006/main" xmlns:r="http://schemas.openxmlformats.org/officeDocument/2006/relationships" xmlns:p="http://schemas.openxmlformats.org/presentationml/2006/main">
+  <p:cSld>
+    <p:spTree>
+      <p:nvGrpSpPr>
+        <p:cNvPr id="1" name=""/>
+        <p:cNvGrpSpPr/>
+        <p:nvPr/>
+      </p:nvGrpSpPr>
+      <p:grpSpPr>
+        <a:xfrm>
+          <a:off x="0" y="0"/>
+          <a:ext cx="0" cy="0"/>
+          <a:chOff x="0" y="0"/>
+          <a:chExt cx="0" cy="0"/>
+        </a:xfrm>
+      </p:grpSpPr>
+      <p:sp>
+        <p:nvSpPr>
+          <p:cNvPr id="12290" name="Content Placeholder 2"/>
+          <p:cNvSpPr>
+            <a:spLocks noGrp="1"/>
+          </p:cNvSpPr>
+          <p:nvPr>
+            <p:ph sz="half" idx="2"/>
+          </p:nvPr>
+        </p:nvSpPr>
+        <p:spPr>
+          <a:xfrm>
+            <a:off x="755650" y="1130300"/>
+            <a:ext cx="8064500" cy="4891088"/>
+          </a:xfrm>
+        </p:spPr>
+        <p:txBody>
+          <a:bodyPr/>
+          <a:lstStyle/>
+          <a:p>
+            <a:pPr marL="0" lvl="1" indent="0" eaLnBrk="1" hangingPunct="1">
+              <a:spcBef>
+                <a:spcPts val="1200"/>
+              </a:spcBef>
+              <a:buFont typeface="Wingdings" panose="05000000000000000000" pitchFamily="2" charset="2"/>
+              <a:buChar char="§"/>
+            </a:pPr>
+            <a:r>
+              <a:rPr lang="en-GB" sz="2000" dirty="0">
+                <a:latin typeface="+mj-lt"/>
+              </a:rPr>
+              <a:t> </a:t>
+            </a:r>
+            <a:endParaRPr lang="en-GB" i="1" dirty="0">
+              <a:latin typeface="+mj-lt"/>
+            </a:endParaRPr>
+          </a:p>
+        </p:txBody>
+      </p:sp>
+      <p:sp>
+        <p:nvSpPr>
+          <p:cNvPr id="6" name="Title 5"/>
+          <p:cNvSpPr>
+            <a:spLocks noGrp="1"/>
+          </p:cNvSpPr>
+          <p:nvPr>
+            <p:ph type="title"/>
+          </p:nvPr>
+        </p:nvSpPr>
+        <p:spPr>
+          <a:xfrm>
+            <a:off x="755650" y="0"/>
+            <a:ext cx="7931150" cy="836613"/>
+          </a:xfrm>
+        </p:spPr>
+        <p:txBody>
+          <a:bodyPr>
+            <a:noAutofit/>
+          </a:bodyPr>
+          <a:lstStyle/>
+          <a:p>
+            <a:pPr lvl="0"/>
+            <a:r>
+              <a:rPr lang="es-AR" sz="2400" dirty="0" err="1"/>
+              <a:t>Tip</a:t>
+            </a:r>
+            <a:r>
+              <a:rPr lang="es-AR" sz="2400" dirty="0"/>
+              <a:t> 1: </a:t>
+            </a:r>
+            <a:r>
+              <a:rPr lang="es-AR" sz="2400" dirty="0" err="1"/>
+              <a:t>Decouple</a:t>
+            </a:r>
+            <a:r>
+              <a:rPr lang="es-AR" sz="2400" dirty="0"/>
+              <a:t> </a:t>
+            </a:r>
+            <a:r>
+              <a:rPr lang="es-AR" sz="2400" dirty="0" err="1"/>
+              <a:t>method</a:t>
+            </a:r>
+            <a:r>
+              <a:rPr lang="es-AR" sz="2400" dirty="0"/>
+              <a:t> </a:t>
+            </a:r>
+            <a:r>
+              <a:rPr lang="es-AR" sz="2400" dirty="0" err="1"/>
+              <a:t>code</a:t>
+            </a:r>
+            <a:endParaRPr lang="es-AR" sz="2400" dirty="0"/>
+          </a:p>
+        </p:txBody>
+      </p:sp>
+    </p:spTree>
+    <p:extLst>
+      <p:ext uri="{BB962C8B-B14F-4D97-AF65-F5344CB8AC3E}">
+        <p14:creationId xmlns:p14="http://schemas.microsoft.com/office/powerpoint/2010/main" val="2433608601"/>
+      </p:ext>
+    </p:extLst>
+  </p:cSld>
+  <p:clrMapOvr>
+    <a:masterClrMapping/>
+  </p:clrMapOvr>
+  <p:timing>
+    <p:tnLst>
+      <p:par>
+        <p:cTn id="1" dur="indefinite" restart="never" nodeType="tmRoot"/>
+      </p:par>
+    </p:tnLst>
+  </p:timing>
+</p:sld>
+</file>
+
+<file path=ppt/slides/slide28.xml><?xml version="1.0" encoding="utf-8"?>
+<p:sld xmlns:a="http://schemas.openxmlformats.org/drawingml/2006/main" xmlns:r="http://schemas.openxmlformats.org/officeDocument/2006/relationships" xmlns:p="http://schemas.openxmlformats.org/presentationml/2006/main">
+  <p:cSld>
+    <p:spTree>
+      <p:nvGrpSpPr>
+        <p:cNvPr id="1" name=""/>
+        <p:cNvGrpSpPr/>
+        <p:nvPr/>
+      </p:nvGrpSpPr>
+      <p:grpSpPr>
+        <a:xfrm>
+          <a:off x="0" y="0"/>
+          <a:ext cx="0" cy="0"/>
+          <a:chOff x="0" y="0"/>
+          <a:chExt cx="0" cy="0"/>
+        </a:xfrm>
+      </p:grpSpPr>
+      <p:sp>
+        <p:nvSpPr>
+          <p:cNvPr id="12290" name="Content Placeholder 2"/>
+          <p:cNvSpPr>
+            <a:spLocks noGrp="1"/>
+          </p:cNvSpPr>
+          <p:nvPr>
+            <p:ph sz="half" idx="2"/>
+          </p:nvPr>
+        </p:nvSpPr>
+        <p:spPr>
+          <a:xfrm>
+            <a:off x="755650" y="1130300"/>
+            <a:ext cx="8064500" cy="4891088"/>
+          </a:xfrm>
+        </p:spPr>
+        <p:txBody>
+          <a:bodyPr/>
+          <a:lstStyle/>
+          <a:p>
+            <a:pPr marL="0" lvl="1" indent="0" eaLnBrk="1" hangingPunct="1">
+              <a:spcBef>
+                <a:spcPts val="1200"/>
+              </a:spcBef>
+              <a:buFont typeface="Wingdings" panose="05000000000000000000" pitchFamily="2" charset="2"/>
+              <a:buChar char="§"/>
+            </a:pPr>
+            <a:r>
+              <a:rPr lang="en-GB" sz="2000" dirty="0">
+                <a:latin typeface="+mj-lt"/>
+              </a:rPr>
+              <a:t> </a:t>
+            </a:r>
+            <a:endParaRPr lang="en-GB" i="1" dirty="0">
+              <a:latin typeface="+mj-lt"/>
+            </a:endParaRPr>
+          </a:p>
+        </p:txBody>
+      </p:sp>
+      <p:sp>
+        <p:nvSpPr>
+          <p:cNvPr id="6" name="Title 5"/>
+          <p:cNvSpPr>
+            <a:spLocks noGrp="1"/>
+          </p:cNvSpPr>
+          <p:nvPr>
+            <p:ph type="title"/>
+          </p:nvPr>
+        </p:nvSpPr>
+        <p:spPr>
+          <a:xfrm>
+            <a:off x="755650" y="0"/>
+            <a:ext cx="7931150" cy="836613"/>
+          </a:xfrm>
+        </p:spPr>
+        <p:txBody>
+          <a:bodyPr>
+            <a:noAutofit/>
+          </a:bodyPr>
+          <a:lstStyle/>
+          <a:p>
+            <a:pPr lvl="0"/>
+            <a:r>
+              <a:rPr lang="es-AR" sz="2400" dirty="0" err="1"/>
+              <a:t>Tip</a:t>
+            </a:r>
+            <a:r>
+              <a:rPr lang="es-AR" sz="2400" dirty="0"/>
+              <a:t> 2: Test </a:t>
+            </a:r>
+            <a:r>
+              <a:rPr lang="es-AR" sz="2400" dirty="0" err="1"/>
+              <a:t>method</a:t>
+            </a:r>
+            <a:endParaRPr lang="es-AR" sz="2400" dirty="0"/>
+          </a:p>
+        </p:txBody>
+      </p:sp>
+    </p:spTree>
+    <p:extLst>
+      <p:ext uri="{BB962C8B-B14F-4D97-AF65-F5344CB8AC3E}">
+        <p14:creationId xmlns:p14="http://schemas.microsoft.com/office/powerpoint/2010/main" val="3712365801"/>
+      </p:ext>
+    </p:extLst>
+  </p:cSld>
+  <p:clrMapOvr>
+    <a:masterClrMapping/>
+  </p:clrMapOvr>
+  <p:timing>
+    <p:tnLst>
+      <p:par>
+        <p:cTn id="1" dur="indefinite" restart="never" nodeType="tmRoot"/>
+      </p:par>
+    </p:tnLst>
+  </p:timing>
+</p:sld>
+</file>
+
+<file path=ppt/slides/slide29.xml><?xml version="1.0" encoding="utf-8"?>
+<p:sld xmlns:a="http://schemas.openxmlformats.org/drawingml/2006/main" xmlns:r="http://schemas.openxmlformats.org/officeDocument/2006/relationships" xmlns:p="http://schemas.openxmlformats.org/presentationml/2006/main">
+  <p:cSld>
+    <p:spTree>
+      <p:nvGrpSpPr>
+        <p:cNvPr id="1" name=""/>
+        <p:cNvGrpSpPr/>
+        <p:nvPr/>
+      </p:nvGrpSpPr>
+      <p:grpSpPr>
+        <a:xfrm>
+          <a:off x="0" y="0"/>
+          <a:ext cx="0" cy="0"/>
+          <a:chOff x="0" y="0"/>
+          <a:chExt cx="0" cy="0"/>
+        </a:xfrm>
+      </p:grpSpPr>
+      <p:sp>
+        <p:nvSpPr>
+          <p:cNvPr id="12290" name="Content Placeholder 2"/>
+          <p:cNvSpPr>
+            <a:spLocks noGrp="1"/>
+          </p:cNvSpPr>
+          <p:nvPr>
+            <p:ph sz="half" idx="2"/>
+          </p:nvPr>
+        </p:nvSpPr>
+        <p:spPr>
+          <a:xfrm>
+            <a:off x="755650" y="1130300"/>
+            <a:ext cx="8064500" cy="4891088"/>
+          </a:xfrm>
+        </p:spPr>
+        <p:txBody>
+          <a:bodyPr/>
+          <a:lstStyle/>
+          <a:p>
+            <a:pPr marL="0" lvl="1" indent="0" eaLnBrk="1" hangingPunct="1">
+              <a:spcBef>
+                <a:spcPts val="1200"/>
+              </a:spcBef>
+              <a:buFont typeface="Wingdings" panose="05000000000000000000" pitchFamily="2" charset="2"/>
+              <a:buChar char="§"/>
+            </a:pPr>
+            <a:r>
+              <a:rPr lang="en-GB" sz="2000" dirty="0">
+                <a:latin typeface="+mj-lt"/>
+              </a:rPr>
+              <a:t> </a:t>
+            </a:r>
+            <a:endParaRPr lang="en-GB" i="1" dirty="0">
+              <a:latin typeface="+mj-lt"/>
+            </a:endParaRPr>
+          </a:p>
+        </p:txBody>
+      </p:sp>
+      <p:sp>
+        <p:nvSpPr>
+          <p:cNvPr id="6" name="Title 5"/>
+          <p:cNvSpPr>
+            <a:spLocks noGrp="1"/>
+          </p:cNvSpPr>
+          <p:nvPr>
+            <p:ph type="title"/>
+          </p:nvPr>
+        </p:nvSpPr>
+        <p:spPr>
+          <a:xfrm>
+            <a:off x="755650" y="0"/>
+            <a:ext cx="7931150" cy="836613"/>
+          </a:xfrm>
+        </p:spPr>
+        <p:txBody>
+          <a:bodyPr>
+            <a:noAutofit/>
+          </a:bodyPr>
+          <a:lstStyle/>
+          <a:p>
+            <a:pPr lvl="0"/>
+            <a:r>
               <a:rPr lang="es-AR" sz="2400" dirty="0" err="1"/>
               <a:t>Tip</a:t>
             </a:r>
@@ -6323,7 +7136,104 @@
 </p:sld>
 </file>
 
-<file path=ppt/slides/slide26.xml><?xml version="1.0" encoding="utf-8"?>
+<file path=ppt/slides/slide3.xml><?xml version="1.0" encoding="utf-8"?>
+<p:sld xmlns:a="http://schemas.openxmlformats.org/drawingml/2006/main" xmlns:r="http://schemas.openxmlformats.org/officeDocument/2006/relationships" xmlns:p="http://schemas.openxmlformats.org/presentationml/2006/main">
+  <p:cSld>
+    <p:spTree>
+      <p:nvGrpSpPr>
+        <p:cNvPr id="1" name=""/>
+        <p:cNvGrpSpPr/>
+        <p:nvPr/>
+      </p:nvGrpSpPr>
+      <p:grpSpPr>
+        <a:xfrm>
+          <a:off x="0" y="0"/>
+          <a:ext cx="0" cy="0"/>
+          <a:chOff x="0" y="0"/>
+          <a:chExt cx="0" cy="0"/>
+        </a:xfrm>
+      </p:grpSpPr>
+      <p:sp>
+        <p:nvSpPr>
+          <p:cNvPr id="11266" name="Content Placeholder 2"/>
+          <p:cNvSpPr>
+            <a:spLocks noGrp="1"/>
+          </p:cNvSpPr>
+          <p:nvPr>
+            <p:ph sz="half" idx="2"/>
+          </p:nvPr>
+        </p:nvSpPr>
+        <p:spPr>
+          <a:xfrm>
+            <a:off x="755650" y="1130300"/>
+            <a:ext cx="8064500" cy="4891088"/>
+          </a:xfrm>
+        </p:spPr>
+        <p:txBody>
+          <a:bodyPr/>
+          <a:lstStyle/>
+          <a:p>
+            <a:pPr marL="0" indent="0" eaLnBrk="1" hangingPunct="1">
+              <a:spcBef>
+                <a:spcPts val="1200"/>
+              </a:spcBef>
+            </a:pPr>
+            <a:endParaRPr lang="es-AR" altLang="es-AR" sz="1600" dirty="0" smtClean="0">
+              <a:latin typeface="Calibri" panose="020F0502020204030204" pitchFamily="34" charset="0"/>
+            </a:endParaRPr>
+          </a:p>
+        </p:txBody>
+      </p:sp>
+      <p:sp>
+        <p:nvSpPr>
+          <p:cNvPr id="6" name="Title 5"/>
+          <p:cNvSpPr>
+            <a:spLocks noGrp="1"/>
+          </p:cNvSpPr>
+          <p:nvPr>
+            <p:ph type="title"/>
+          </p:nvPr>
+        </p:nvSpPr>
+        <p:spPr>
+          <a:xfrm>
+            <a:off x="755650" y="0"/>
+            <a:ext cx="7931150" cy="836613"/>
+          </a:xfrm>
+        </p:spPr>
+        <p:txBody>
+          <a:bodyPr/>
+          <a:lstStyle/>
+          <a:p>
+            <a:pPr eaLnBrk="1" fontAlgn="auto" hangingPunct="1">
+              <a:spcAft>
+                <a:spcPts val="0"/>
+              </a:spcAft>
+              <a:defRPr/>
+            </a:pPr>
+            <a:r>
+              <a:rPr dirty="0" smtClean="0"/>
+              <a:t>Objetivos</a:t>
+            </a:r>
+            <a:endParaRPr dirty="0"/>
+          </a:p>
+        </p:txBody>
+      </p:sp>
+    </p:spTree>
+  </p:cSld>
+  <p:clrMapOvr>
+    <a:masterClrMapping/>
+  </p:clrMapOvr>
+  <p:timing>
+    <p:tnLst>
+      <p:par>
+        <p:cTn id="1" dur="indefinite" restart="never" nodeType="tmRoot"/>
+      </p:par>
+    </p:tnLst>
+  </p:timing>
+</p:sld>
+</file>
+
+<file path=ppt/slides/slide30.xml><?xml version="1.0" encoding="utf-8"?>
 <p:sld xmlns:a="http://schemas.openxmlformats.org/drawingml/2006/main" xmlns:r="http://schemas.openxmlformats.org/officeDocument/2006/relationships" xmlns:p="http://schemas.openxmlformats.org/presentationml/2006/main">
   <p:cSld>
     <p:spTree>
@@ -8027,103 +8937,6 @@
               </a:rPr>
               <a:t>¡Muchas Gracias!</a:t>
             </a:r>
-          </a:p>
-        </p:txBody>
-      </p:sp>
-    </p:spTree>
-  </p:cSld>
-  <p:clrMapOvr>
-    <a:masterClrMapping/>
-  </p:clrMapOvr>
-  <p:timing>
-    <p:tnLst>
-      <p:par>
-        <p:cTn id="1" dur="indefinite" restart="never" nodeType="tmRoot"/>
-      </p:par>
-    </p:tnLst>
-  </p:timing>
-</p:sld>
-</file>
-
-<file path=ppt/slides/slide3.xml><?xml version="1.0" encoding="utf-8"?>
-<p:sld xmlns:a="http://schemas.openxmlformats.org/drawingml/2006/main" xmlns:r="http://schemas.openxmlformats.org/officeDocument/2006/relationships" xmlns:p="http://schemas.openxmlformats.org/presentationml/2006/main">
-  <p:cSld>
-    <p:spTree>
-      <p:nvGrpSpPr>
-        <p:cNvPr id="1" name=""/>
-        <p:cNvGrpSpPr/>
-        <p:nvPr/>
-      </p:nvGrpSpPr>
-      <p:grpSpPr>
-        <a:xfrm>
-          <a:off x="0" y="0"/>
-          <a:ext cx="0" cy="0"/>
-          <a:chOff x="0" y="0"/>
-          <a:chExt cx="0" cy="0"/>
-        </a:xfrm>
-      </p:grpSpPr>
-      <p:sp>
-        <p:nvSpPr>
-          <p:cNvPr id="11266" name="Content Placeholder 2"/>
-          <p:cNvSpPr>
-            <a:spLocks noGrp="1"/>
-          </p:cNvSpPr>
-          <p:nvPr>
-            <p:ph sz="half" idx="2"/>
-          </p:nvPr>
-        </p:nvSpPr>
-        <p:spPr>
-          <a:xfrm>
-            <a:off x="755650" y="1130300"/>
-            <a:ext cx="8064500" cy="4891088"/>
-          </a:xfrm>
-        </p:spPr>
-        <p:txBody>
-          <a:bodyPr/>
-          <a:lstStyle/>
-          <a:p>
-            <a:pPr marL="0" indent="0" eaLnBrk="1" hangingPunct="1">
-              <a:spcBef>
-                <a:spcPts val="1200"/>
-              </a:spcBef>
-            </a:pPr>
-            <a:endParaRPr lang="es-AR" altLang="es-AR" sz="1600" dirty="0" smtClean="0">
-              <a:latin typeface="Calibri" panose="020F0502020204030204" pitchFamily="34" charset="0"/>
-            </a:endParaRPr>
-          </a:p>
-        </p:txBody>
-      </p:sp>
-      <p:sp>
-        <p:nvSpPr>
-          <p:cNvPr id="6" name="Title 5"/>
-          <p:cNvSpPr>
-            <a:spLocks noGrp="1"/>
-          </p:cNvSpPr>
-          <p:nvPr>
-            <p:ph type="title"/>
-          </p:nvPr>
-        </p:nvSpPr>
-        <p:spPr>
-          <a:xfrm>
-            <a:off x="755650" y="0"/>
-            <a:ext cx="7931150" cy="836613"/>
-          </a:xfrm>
-        </p:spPr>
-        <p:txBody>
-          <a:bodyPr/>
-          <a:lstStyle/>
-          <a:p>
-            <a:pPr eaLnBrk="1" fontAlgn="auto" hangingPunct="1">
-              <a:spcAft>
-                <a:spcPts val="0"/>
-              </a:spcAft>
-              <a:defRPr/>
-            </a:pPr>
-            <a:r>
-              <a:rPr dirty="0" smtClean="0"/>
-              <a:t>Objetivos</a:t>
-            </a:r>
-            <a:endParaRPr dirty="0"/>
           </a:p>
         </p:txBody>
       </p:sp>
@@ -8743,6 +9556,19 @@
               </a:rPr>
               <a:t>Removes all knowledge about a concrete implementation a client needs to use, promoting reusability, testability and maintainability</a:t>
             </a:r>
+          </a:p>
+          <a:p>
+            <a:pPr eaLnBrk="1" hangingPunct="1">
+              <a:spcBef>
+                <a:spcPts val="1200"/>
+              </a:spcBef>
+            </a:pPr>
+            <a:r>
+              <a:rPr lang="en-US" dirty="0" smtClean="0">
+                <a:latin typeface="+mj-lt"/>
+              </a:rPr>
+              <a:t>Mock objects can be injected for unit-testing</a:t>
+            </a:r>
             <a:endParaRPr lang="en-US" dirty="0">
               <a:latin typeface="+mj-lt"/>
             </a:endParaRPr>
@@ -8754,32 +9580,10 @@
               </a:spcBef>
             </a:pPr>
             <a:r>
-              <a:rPr lang="en-US" dirty="0" smtClean="0">
-                <a:latin typeface="+mj-lt"/>
-              </a:rPr>
-              <a:t>Mock objects can be injected for unit-testing</a:t>
-            </a:r>
-            <a:endParaRPr lang="en-US" dirty="0">
-              <a:latin typeface="+mj-lt"/>
-            </a:endParaRPr>
-          </a:p>
-          <a:p>
-            <a:pPr eaLnBrk="1" hangingPunct="1">
-              <a:spcBef>
-                <a:spcPts val="1200"/>
-              </a:spcBef>
-            </a:pPr>
-            <a:r>
               <a:rPr lang="en-GB" dirty="0">
                 <a:latin typeface="+mj-lt"/>
               </a:rPr>
-              <a:t>Adheres to Dependency inversion </a:t>
-            </a:r>
-            <a:r>
-              <a:rPr lang="en-GB" dirty="0">
-                <a:latin typeface="+mj-lt"/>
-              </a:rPr>
-              <a:t>principle</a:t>
+              <a:t>Adheres to Dependency inversion principle</a:t>
             </a:r>
             <a:endParaRPr lang="en-US" dirty="0">
               <a:latin typeface="+mj-lt"/>
@@ -9412,13 +10216,7 @@
               <a:rPr lang="en-US" dirty="0" smtClean="0">
                 <a:latin typeface="+mj-lt"/>
               </a:rPr>
-              <a:t>Is named </a:t>
-            </a:r>
-            <a:r>
-              <a:rPr lang="en-US" dirty="0" smtClean="0">
-                <a:latin typeface="+mj-lt"/>
-              </a:rPr>
-              <a:t>clearly and consistently</a:t>
+              <a:t>Is named clearly and consistently</a:t>
             </a:r>
             <a:endParaRPr lang="en-US" dirty="0">
               <a:latin typeface="+mj-lt"/>
@@ -9745,13 +10543,7 @@
               <a:rPr lang="en-US" dirty="0" smtClean="0">
                 <a:latin typeface="+mj-lt"/>
               </a:rPr>
-              <a:t>Verify that the mock object was called the expected </a:t>
-            </a:r>
-            <a:r>
-              <a:rPr lang="en-US" dirty="0" smtClean="0">
-                <a:latin typeface="+mj-lt"/>
-              </a:rPr>
-              <a:t>number</a:t>
+              <a:t>Verify that the mock object was called the expected number</a:t>
             </a:r>
             <a:br>
               <a:rPr lang="en-US" dirty="0" smtClean="0">
@@ -9762,13 +10554,7 @@
               <a:rPr lang="en-US" dirty="0" smtClean="0">
                 <a:latin typeface="+mj-lt"/>
               </a:rPr>
-              <a:t>of </a:t>
-            </a:r>
-            <a:r>
-              <a:rPr lang="en-US" dirty="0" smtClean="0">
-                <a:latin typeface="+mj-lt"/>
-              </a:rPr>
-              <a:t>times and with the expected parameters</a:t>
+              <a:t>of times and with the expected parameters</a:t>
             </a:r>
             <a:endParaRPr lang="en-US" dirty="0">
               <a:latin typeface="+mj-lt"/>

</xml_diff>

<commit_message>
MSBuild separado por archivos + Actualizacion ppt
</commit_message>
<xml_diff>
--- a/Test-Oriented Development.pptx
+++ b/Test-Oriented Development.pptx
@@ -324,7 +324,7 @@
               <a:pPr>
                 <a:defRPr/>
               </a:pPr>
-              <a:t>20/02/2015</a:t>
+              <a:t>04/03/2015</a:t>
             </a:fld>
             <a:endParaRPr lang="es-AR"/>
           </a:p>
@@ -543,7 +543,7 @@
               <a:pPr>
                 <a:defRPr/>
               </a:pPr>
-              <a:t>20/02/2015</a:t>
+              <a:t>04/03/2015</a:t>
             </a:fld>
             <a:endParaRPr lang="es-AR"/>
           </a:p>
@@ -1247,7 +1247,7 @@
               <a:pPr>
                 <a:defRPr/>
               </a:pPr>
-              <a:t>20/02/2015</a:t>
+              <a:t>04/03/2015</a:t>
             </a:fld>
             <a:endParaRPr lang="es-AR"/>
           </a:p>
@@ -1526,7 +1526,7 @@
               <a:pPr>
                 <a:defRPr/>
               </a:pPr>
-              <a:t>20/02/2015</a:t>
+              <a:t>04/03/2015</a:t>
             </a:fld>
             <a:endParaRPr lang="es-AR"/>
           </a:p>
@@ -1906,7 +1906,7 @@
               <a:pPr>
                 <a:defRPr/>
               </a:pPr>
-              <a:t>20/02/2015</a:t>
+              <a:t>04/03/2015</a:t>
             </a:fld>
             <a:endParaRPr lang="es-AR"/>
           </a:p>
@@ -2493,7 +2493,7 @@
               <a:pPr>
                 <a:defRPr/>
               </a:pPr>
-              <a:t>20/02/2015</a:t>
+              <a:t>04/03/2015</a:t>
             </a:fld>
             <a:endParaRPr lang="es-AR"/>
           </a:p>
@@ -2683,7 +2683,7 @@
               <a:pPr>
                 <a:defRPr/>
               </a:pPr>
-              <a:t>20/02/2015</a:t>
+              <a:t>04/03/2015</a:t>
             </a:fld>
             <a:endParaRPr lang="es-AR"/>
           </a:p>
@@ -2805,7 +2805,7 @@
               <a:pPr>
                 <a:defRPr/>
               </a:pPr>
-              <a:t>20/02/2015</a:t>
+              <a:t>04/03/2015</a:t>
             </a:fld>
             <a:endParaRPr lang="es-AR"/>
           </a:p>
@@ -3187,7 +3187,7 @@
               <a:pPr>
                 <a:defRPr/>
               </a:pPr>
-              <a:t>20/02/2015</a:t>
+              <a:t>04/03/2015</a:t>
             </a:fld>
             <a:endParaRPr lang="es-AR"/>
           </a:p>
@@ -4977,13 +4977,7 @@
               <a:rPr lang="en-GB" sz="2000" dirty="0">
                 <a:latin typeface="+mj-lt"/>
               </a:rPr>
-              <a:t>websites &amp; services </a:t>
-            </a:r>
-            <a:r>
-              <a:rPr lang="en-GB" sz="2000" dirty="0">
-                <a:latin typeface="+mj-lt"/>
-              </a:rPr>
-              <a:t>(optional</a:t>
+              <a:t>websites &amp; services (optional</a:t>
             </a:r>
             <a:r>
               <a:rPr lang="en-GB" sz="2000" dirty="0" smtClean="0">
@@ -5051,17 +5045,8 @@
               <a:rPr lang="en-GB" sz="2000" dirty="0">
                 <a:latin typeface="+mj-lt"/>
               </a:rPr>
-              <a:t> </a:t>
-            </a:r>
-            <a:r>
-              <a:rPr lang="en-GB" sz="2000" dirty="0">
-                <a:latin typeface="+mj-lt"/>
-              </a:rPr>
-              <a:t>Deploy (optional)</a:t>
-            </a:r>
-            <a:endParaRPr lang="en-GB" sz="2000" dirty="0">
-              <a:latin typeface="+mj-lt"/>
-            </a:endParaRPr>
+              <a:t> Deploy (optional)</a:t>
+            </a:r>
           </a:p>
         </p:txBody>
       </p:sp>
@@ -5238,22 +5223,28 @@
       </p:sp>
       <p:pic>
         <p:nvPicPr>
-          <p:cNvPr id="5" name="Picture 4"/>
+          <p:cNvPr id="2" name="Picture 1"/>
           <p:cNvPicPr>
             <a:picLocks noChangeAspect="1"/>
           </p:cNvPicPr>
           <p:nvPr/>
         </p:nvPicPr>
         <p:blipFill>
-          <a:blip r:embed="rId2"/>
+          <a:blip r:embed="rId2">
+            <a:extLst>
+              <a:ext uri="{28A0092B-C50C-407E-A947-70E740481C1C}">
+                <a14:useLocalDpi xmlns:a14="http://schemas.microsoft.com/office/drawing/2010/main" val="0"/>
+              </a:ext>
+            </a:extLst>
+          </a:blip>
           <a:stretch>
             <a:fillRect/>
           </a:stretch>
         </p:blipFill>
         <p:spPr>
           <a:xfrm>
-            <a:off x="824956" y="1412776"/>
-            <a:ext cx="7792537" cy="3886742"/>
+            <a:off x="772666" y="1412776"/>
+            <a:ext cx="7687748" cy="3315163"/>
           </a:xfrm>
           <a:prstGeom prst="rect">
             <a:avLst/>
@@ -5367,11 +5358,7 @@
             <a:pPr lvl="0"/>
             <a:r>
               <a:rPr lang="en-US" sz="2800" dirty="0"/>
-              <a:t>Tip 9: </a:t>
-            </a:r>
-            <a:r>
-              <a:rPr lang="en-US" sz="2800" dirty="0"/>
-              <a:t>Upload solution to CI server</a:t>
+              <a:t>Tip 9: Upload solution to CI server</a:t>
             </a:r>
             <a:endParaRPr lang="es-AR" sz="2800" dirty="0"/>
           </a:p>
@@ -5514,11 +5501,7 @@
             <a:pPr lvl="0"/>
             <a:r>
               <a:rPr lang="en-US" sz="2800" dirty="0"/>
-              <a:t>Tip 9: </a:t>
-            </a:r>
-            <a:r>
-              <a:rPr lang="en-US" sz="2800" dirty="0"/>
-              <a:t>Upload solution to CI server</a:t>
+              <a:t>Tip 9: Upload solution to CI server</a:t>
             </a:r>
             <a:endParaRPr lang="es-AR" sz="2800" dirty="0"/>
           </a:p>
@@ -5884,9 +5867,210 @@
               <a:rPr lang="es-AR" altLang="es-AR" sz="1800" dirty="0" smtClean="0">
                 <a:latin typeface="Calibri" panose="020F0502020204030204" pitchFamily="34" charset="0"/>
               </a:rPr>
-              <a:t> Objetivos</a:t>
-            </a:r>
-            <a:endParaRPr lang="es-AR" altLang="es-AR" sz="1600" dirty="0" smtClean="0">
+              <a:t> </a:t>
+            </a:r>
+            <a:r>
+              <a:rPr lang="es-AR" altLang="es-AR" sz="1800" dirty="0" err="1" smtClean="0">
+                <a:latin typeface="Calibri" panose="020F0502020204030204" pitchFamily="34" charset="0"/>
+              </a:rPr>
+              <a:t>Objectives</a:t>
+            </a:r>
+            <a:endParaRPr lang="es-AR" altLang="es-AR" sz="1800" dirty="0" smtClean="0">
+              <a:latin typeface="Calibri" panose="020F0502020204030204" pitchFamily="34" charset="0"/>
+            </a:endParaRPr>
+          </a:p>
+          <a:p>
+            <a:pPr marL="0" indent="0" eaLnBrk="1" hangingPunct="1">
+              <a:spcBef>
+                <a:spcPts val="1200"/>
+              </a:spcBef>
+            </a:pPr>
+            <a:r>
+              <a:rPr lang="en-US" sz="1800" dirty="0">
+                <a:latin typeface="Calibri" panose="020F0502020204030204" pitchFamily="34" charset="0"/>
+              </a:rPr>
+              <a:t>Tip 1: Program to an interface, not an </a:t>
+            </a:r>
+            <a:r>
+              <a:rPr lang="en-US" sz="1800" dirty="0" smtClean="0">
+                <a:latin typeface="Calibri" panose="020F0502020204030204" pitchFamily="34" charset="0"/>
+              </a:rPr>
+              <a:t>implementation</a:t>
+            </a:r>
+          </a:p>
+          <a:p>
+            <a:pPr marL="0" indent="0" eaLnBrk="1" hangingPunct="1">
+              <a:spcBef>
+                <a:spcPts val="1200"/>
+              </a:spcBef>
+            </a:pPr>
+            <a:r>
+              <a:rPr lang="en-US" sz="1800" dirty="0">
+                <a:latin typeface="Calibri" panose="020F0502020204030204" pitchFamily="34" charset="0"/>
+              </a:rPr>
+              <a:t>Tip 2: Use Constructor dependency </a:t>
+            </a:r>
+            <a:r>
+              <a:rPr lang="en-US" sz="1800" dirty="0" smtClean="0">
+                <a:latin typeface="Calibri" panose="020F0502020204030204" pitchFamily="34" charset="0"/>
+              </a:rPr>
+              <a:t>injection</a:t>
+            </a:r>
+          </a:p>
+          <a:p>
+            <a:pPr marL="0" indent="0" eaLnBrk="1" hangingPunct="1">
+              <a:spcBef>
+                <a:spcPts val="1200"/>
+              </a:spcBef>
+            </a:pPr>
+            <a:r>
+              <a:rPr lang="en-US" sz="1800" dirty="0">
+                <a:latin typeface="Calibri" panose="020F0502020204030204" pitchFamily="34" charset="0"/>
+              </a:rPr>
+              <a:t>Tip 3: </a:t>
+            </a:r>
+            <a:r>
+              <a:rPr lang="en-US" sz="1800" dirty="0" err="1">
+                <a:latin typeface="Calibri" panose="020F0502020204030204" pitchFamily="34" charset="0"/>
+              </a:rPr>
+              <a:t>Favour</a:t>
+            </a:r>
+            <a:r>
+              <a:rPr lang="en-US" sz="1800" dirty="0">
+                <a:latin typeface="Calibri" panose="020F0502020204030204" pitchFamily="34" charset="0"/>
+              </a:rPr>
+              <a:t> composition over </a:t>
+            </a:r>
+            <a:r>
+              <a:rPr lang="en-US" sz="1800" dirty="0" smtClean="0">
+                <a:latin typeface="Calibri" panose="020F0502020204030204" pitchFamily="34" charset="0"/>
+              </a:rPr>
+              <a:t>inheritance</a:t>
+            </a:r>
+          </a:p>
+          <a:p>
+            <a:pPr marL="0" indent="0" eaLnBrk="1" hangingPunct="1">
+              <a:spcBef>
+                <a:spcPts val="1200"/>
+              </a:spcBef>
+            </a:pPr>
+            <a:r>
+              <a:rPr lang="en-US" sz="1800" dirty="0">
+                <a:latin typeface="Calibri" panose="020F0502020204030204" pitchFamily="34" charset="0"/>
+              </a:rPr>
+              <a:t>Tip 4: Generate Unit </a:t>
+            </a:r>
+            <a:r>
+              <a:rPr lang="en-US" sz="1800" dirty="0" smtClean="0">
+                <a:latin typeface="Calibri" panose="020F0502020204030204" pitchFamily="34" charset="0"/>
+              </a:rPr>
+              <a:t>tests</a:t>
+            </a:r>
+          </a:p>
+          <a:p>
+            <a:pPr marL="0" indent="0" eaLnBrk="1" hangingPunct="1">
+              <a:spcBef>
+                <a:spcPts val="1200"/>
+              </a:spcBef>
+            </a:pPr>
+            <a:r>
+              <a:rPr lang="en-US" sz="1800" dirty="0">
+                <a:latin typeface="Calibri" panose="020F0502020204030204" pitchFamily="34" charset="0"/>
+              </a:rPr>
+              <a:t>Tip 5: Mock </a:t>
+            </a:r>
+            <a:r>
+              <a:rPr lang="en-US" sz="1800" dirty="0" smtClean="0">
+                <a:latin typeface="Calibri" panose="020F0502020204030204" pitchFamily="34" charset="0"/>
+              </a:rPr>
+              <a:t>dependencies</a:t>
+            </a:r>
+          </a:p>
+          <a:p>
+            <a:pPr marL="0" indent="0" eaLnBrk="1" hangingPunct="1">
+              <a:spcBef>
+                <a:spcPts val="1200"/>
+              </a:spcBef>
+            </a:pPr>
+            <a:r>
+              <a:rPr lang="en-US" sz="1800" dirty="0">
+                <a:latin typeface="Calibri" panose="020F0502020204030204" pitchFamily="34" charset="0"/>
+              </a:rPr>
+              <a:t>Tip 6: Writing Testable </a:t>
+            </a:r>
+            <a:r>
+              <a:rPr lang="en-US" sz="1800" dirty="0" smtClean="0">
+                <a:latin typeface="Calibri" panose="020F0502020204030204" pitchFamily="34" charset="0"/>
+              </a:rPr>
+              <a:t>Code</a:t>
+            </a:r>
+            <a:endParaRPr lang="es-AR" altLang="es-AR" sz="1800" dirty="0" smtClean="0">
+              <a:latin typeface="Calibri" panose="020F0502020204030204" pitchFamily="34" charset="0"/>
+            </a:endParaRPr>
+          </a:p>
+          <a:p>
+            <a:pPr marL="0" indent="0" eaLnBrk="1" hangingPunct="1">
+              <a:spcBef>
+                <a:spcPts val="1200"/>
+              </a:spcBef>
+            </a:pPr>
+            <a:r>
+              <a:rPr lang="en-US" sz="1800" dirty="0">
+                <a:latin typeface="Calibri" panose="020F0502020204030204" pitchFamily="34" charset="0"/>
+              </a:rPr>
+              <a:t>Tip 7: Use wrappers to encapsulate static </a:t>
+            </a:r>
+            <a:r>
+              <a:rPr lang="en-US" sz="1800" dirty="0" smtClean="0">
+                <a:latin typeface="Calibri" panose="020F0502020204030204" pitchFamily="34" charset="0"/>
+              </a:rPr>
+              <a:t>dependencies</a:t>
+            </a:r>
+          </a:p>
+          <a:p>
+            <a:pPr marL="0" indent="0" eaLnBrk="1" hangingPunct="1">
+              <a:spcBef>
+                <a:spcPts val="1200"/>
+              </a:spcBef>
+            </a:pPr>
+            <a:r>
+              <a:rPr lang="en-US" sz="1800" dirty="0">
+                <a:latin typeface="Calibri" panose="020F0502020204030204" pitchFamily="34" charset="0"/>
+              </a:rPr>
+              <a:t>Tip 8: Create </a:t>
+            </a:r>
+            <a:r>
+              <a:rPr lang="en-US" sz="1800" dirty="0" err="1">
+                <a:latin typeface="Calibri" panose="020F0502020204030204" pitchFamily="34" charset="0"/>
+              </a:rPr>
+              <a:t>MSBuild</a:t>
+            </a:r>
+            <a:r>
+              <a:rPr lang="en-US" sz="1800" dirty="0">
+                <a:latin typeface="Calibri" panose="020F0502020204030204" pitchFamily="34" charset="0"/>
+              </a:rPr>
+              <a:t> </a:t>
+            </a:r>
+            <a:r>
+              <a:rPr lang="en-US" sz="1800" dirty="0" smtClean="0">
+                <a:latin typeface="Calibri" panose="020F0502020204030204" pitchFamily="34" charset="0"/>
+              </a:rPr>
+              <a:t>configuration</a:t>
+            </a:r>
+          </a:p>
+          <a:p>
+            <a:pPr marL="0" indent="0" eaLnBrk="1" hangingPunct="1">
+              <a:spcBef>
+                <a:spcPts val="1200"/>
+              </a:spcBef>
+            </a:pPr>
+            <a:r>
+              <a:rPr lang="en-US" sz="1800" dirty="0">
+                <a:latin typeface="Calibri" panose="020F0502020204030204" pitchFamily="34" charset="0"/>
+              </a:rPr>
+              <a:t>Tip 9: Upload solution to CI server</a:t>
+            </a:r>
+            <a:endParaRPr lang="es-AR" altLang="es-AR" sz="1800" dirty="0">
               <a:latin typeface="Calibri" panose="020F0502020204030204" pitchFamily="34" charset="0"/>
             </a:endParaRPr>
           </a:p>
@@ -7211,8 +7395,8 @@
               <a:defRPr/>
             </a:pPr>
             <a:r>
-              <a:rPr dirty="0" smtClean="0"/>
-              <a:t>Objetivos</a:t>
+              <a:rPr dirty="0" err="1" smtClean="0"/>
+              <a:t>Objectives</a:t>
             </a:r>
             <a:endParaRPr dirty="0"/>
           </a:p>

</xml_diff>